<commit_message>
Updated pptx to version 1.2
</commit_message>
<xml_diff>
--- a/WDSR - zarys programu.pptx
+++ b/WDSR - zarys programu.pptx
@@ -5,10 +5,10 @@
     <p:sldMasterId id="2147483650" r:id="rId4"/>
   </p:sldMasterIdLst>
   <p:notesMasterIdLst>
-    <p:notesMasterId r:id="rId16"/>
+    <p:notesMasterId r:id="rId17"/>
   </p:notesMasterIdLst>
   <p:handoutMasterIdLst>
-    <p:handoutMasterId r:id="rId17"/>
+    <p:handoutMasterId r:id="rId18"/>
   </p:handoutMasterIdLst>
   <p:sldIdLst>
     <p:sldId id="556" r:id="rId5"/>
@@ -19,9 +19,10 @@
     <p:sldId id="563" r:id="rId10"/>
     <p:sldId id="564" r:id="rId11"/>
     <p:sldId id="566" r:id="rId12"/>
-    <p:sldId id="567" r:id="rId13"/>
-    <p:sldId id="568" r:id="rId14"/>
-    <p:sldId id="546" r:id="rId15"/>
+    <p:sldId id="569" r:id="rId13"/>
+    <p:sldId id="567" r:id="rId14"/>
+    <p:sldId id="568" r:id="rId15"/>
+    <p:sldId id="546" r:id="rId16"/>
   </p:sldIdLst>
   <p:sldSz cx="9144000" cy="6858000" type="screen4x3"/>
   <p:notesSz cx="6858000" cy="9926638"/>
@@ -150,6 +151,25 @@
       </a:defRPr>
     </a:lvl9pPr>
   </p:defaultTextStyle>
+  <p:extLst>
+    <p:ext uri="{EFAFB233-063F-42B5-8137-9DF3F51BA10A}">
+      <p15:sldGuideLst xmlns:p15="http://schemas.microsoft.com/office/powerpoint/2012/main" xmlns="">
+        <p15:guide id="1" orient="horz" pos="2160">
+          <p15:clr>
+            <a:srgbClr val="A4A3A4"/>
+          </p15:clr>
+        </p15:guide>
+        <p15:guide id="2" pos="2880">
+          <p15:clr>
+            <a:srgbClr val="A4A3A4"/>
+          </p15:clr>
+        </p15:guide>
+      </p15:sldGuideLst>
+    </p:ext>
+    <p:ext uri="{2D200454-40CA-4A62-9FC3-DE9A4176ACB9}">
+      <p15:notesGuideLst xmlns:p15="http://schemas.microsoft.com/office/powerpoint/2012/main" xmlns=""/>
+    </p:ext>
+  </p:extLst>
 </p:presentation>
 </file>
 
@@ -4879,13 +4899,8 @@
         <a:p>
           <a:r>
             <a:rPr lang="pl-PL" dirty="0" smtClean="0"/>
-            <a:t>Komunikacja synchroniczna z wykorzystaniem web </a:t>
+            <a:t>Komunikacja synchroniczna z wykorzystaniem web services</a:t>
           </a:r>
-          <a:r>
-            <a:rPr lang="pl-PL" dirty="0" smtClean="0"/>
-            <a:t>services</a:t>
-          </a:r>
-          <a:endParaRPr lang="pl-PL" dirty="0" smtClean="0"/>
         </a:p>
       </dgm:t>
     </dgm:pt>
@@ -5070,7 +5085,7 @@
         <a:p>
           <a:r>
             <a:rPr lang="pl-PL" dirty="0" smtClean="0"/>
-            <a:t>Testowanie jednostkowe - Spock</a:t>
+            <a:t>Testowanie jednostkowe - JUnit</a:t>
           </a:r>
           <a:endParaRPr lang="pl-PL" dirty="0"/>
         </a:p>
@@ -7298,7 +7313,7 @@
           </a:pPr>
           <a:r>
             <a:rPr lang="pl-PL" sz="1600" kern="1200" dirty="0" smtClean="0"/>
-            <a:t>Testowanie jednostkowe - Spock</a:t>
+            <a:t>Testowanie jednostkowe - JUnit</a:t>
           </a:r>
           <a:endParaRPr lang="pl-PL" sz="1600" kern="1200" dirty="0"/>
         </a:p>
@@ -7452,13 +7467,8 @@
           </a:pPr>
           <a:r>
             <a:rPr lang="pl-PL" sz="2100" kern="1200" dirty="0" smtClean="0"/>
-            <a:t>Komunikacja synchroniczna z wykorzystaniem web </a:t>
+            <a:t>Komunikacja synchroniczna z wykorzystaniem web services</a:t>
           </a:r>
-          <a:r>
-            <a:rPr lang="pl-PL" sz="2100" kern="1200" dirty="0" smtClean="0"/>
-            <a:t>services</a:t>
-          </a:r>
-          <a:endParaRPr lang="pl-PL" sz="2100" kern="1200" dirty="0" smtClean="0"/>
         </a:p>
       </dsp:txBody>
       <dsp:txXfrm>
@@ -13347,13 +13357,18 @@
             <a:fld id="{E9ED4B55-51F0-4636-8388-59997869CC7A}" type="slidenum">
               <a:rPr lang="de-DE" altLang="pl-PL" sz="1300"/>
               <a:pPr/>
-              <a:t>11</a:t>
+              <a:t>12</a:t>
             </a:fld>
             <a:endParaRPr lang="de-DE" altLang="pl-PL" sz="1300"/>
           </a:p>
         </p:txBody>
       </p:sp>
     </p:spTree>
+    <p:extLst>
+      <p:ext uri="{BB962C8B-B14F-4D97-AF65-F5344CB8AC3E}">
+        <p14:creationId xmlns:p14="http://schemas.microsoft.com/office/powerpoint/2010/main" val="3818956960"/>
+      </p:ext>
+    </p:extLst>
   </p:cSld>
   <p:clrMapOvr>
     <a:masterClrMapping/>
@@ -14687,7 +14702,7 @@
             <a:fld id="{E906F336-2E39-43F8-9DF9-B9244679DDFB}" type="datetime5">
               <a:rPr lang="en-US" altLang="pl-PL"/>
               <a:pPr/>
-              <a:t>19-Feb-16</a:t>
+              <a:t>23-Feb-16</a:t>
             </a:fld>
             <a:endParaRPr lang="en-US" altLang="pl-PL"/>
           </a:p>
@@ -15014,7 +15029,7 @@
             <a:fld id="{7B2EBB8C-B024-47EA-BB67-9AC43555CB71}" type="datetime5">
               <a:rPr lang="en-US" altLang="pl-PL"/>
               <a:pPr/>
-              <a:t>19-Feb-16</a:t>
+              <a:t>23-Feb-16</a:t>
             </a:fld>
             <a:endParaRPr lang="en-US" altLang="pl-PL"/>
           </a:p>
@@ -15578,7 +15593,7 @@
             <a:fld id="{AF037DEB-4CF1-4C5F-B037-398229B9C945}" type="datetime5">
               <a:rPr lang="en-US" altLang="pl-PL"/>
               <a:pPr/>
-              <a:t>19-Feb-16</a:t>
+              <a:t>23-Feb-16</a:t>
             </a:fld>
             <a:endParaRPr lang="de-DE" altLang="pl-PL"/>
           </a:p>
@@ -15728,7 +15743,7 @@
             <a:fld id="{9D49F2BD-E1AC-4AED-B4E5-321CBE4AD3D2}" type="datetime5">
               <a:rPr lang="en-US" altLang="pl-PL"/>
               <a:pPr/>
-              <a:t>19-Feb-16</a:t>
+              <a:t>23-Feb-16</a:t>
             </a:fld>
             <a:endParaRPr lang="en-US" altLang="pl-PL"/>
           </a:p>
@@ -16002,7 +16017,7 @@
             <a:fld id="{6DE49DB7-DE0A-4B13-98D6-E8B911A92E91}" type="datetime5">
               <a:rPr lang="en-US" altLang="pl-PL"/>
               <a:pPr/>
-              <a:t>19-Feb-16</a:t>
+              <a:t>23-Feb-16</a:t>
             </a:fld>
             <a:endParaRPr lang="en-US" altLang="pl-PL"/>
           </a:p>
@@ -16459,7 +16474,7 @@
             <a:fld id="{57896E6B-B1BC-4ECC-9043-421F9FF1FF7E}" type="datetime5">
               <a:rPr lang="en-US" altLang="pl-PL"/>
               <a:pPr/>
-              <a:t>19-Feb-16</a:t>
+              <a:t>23-Feb-16</a:t>
             </a:fld>
             <a:endParaRPr lang="en-US" altLang="pl-PL"/>
           </a:p>
@@ -17209,13 +17224,7 @@
               <a:rPr lang="pl-PL" altLang="pl-PL" dirty="0" smtClean="0">
                 <a:cs typeface="ＭＳ Ｐゴシック" charset="-128"/>
               </a:rPr>
-              <a:t>Wersja </a:t>
-            </a:r>
-            <a:r>
-              <a:rPr lang="pl-PL" altLang="pl-PL" dirty="0" smtClean="0">
-                <a:cs typeface="ＭＳ Ｐゴシック" charset="-128"/>
-              </a:rPr>
-              <a:t>1.1</a:t>
+              <a:t>Wersja 1.2</a:t>
             </a:r>
             <a:endParaRPr lang="en-US" altLang="pl-PL" dirty="0" smtClean="0">
               <a:cs typeface="ＭＳ Ｐゴシック" charset="-128"/>
@@ -17263,7 +17272,7 @@
               <a:rPr lang="pl-PL" sz="2400" dirty="0" smtClean="0">
                 <a:ea typeface="MS PGothic" panose="020B0600070205080204" pitchFamily="34" charset="-128"/>
               </a:rPr>
-              <a:t>Zarys programu</a:t>
+              <a:t>Zarys programu + ćwiczenie 0</a:t>
             </a:r>
             <a:endParaRPr lang="en-US" dirty="0">
               <a:ea typeface="MS PGothic" panose="020B0600070205080204" pitchFamily="34" charset="-128"/>
@@ -17330,7 +17339,7 @@
               <a:rPr lang="pl-PL" dirty="0" smtClean="0">
                 <a:ea typeface="MS PGothic" panose="020B0600070205080204" pitchFamily="34" charset="-128"/>
               </a:rPr>
-              <a:t>Na następne zajęcia</a:t>
+              <a:t>Na następne zajęcia (ćwiczenie 0)</a:t>
             </a:r>
             <a:endParaRPr lang="de-DE" dirty="0">
               <a:ea typeface="MS PGothic" panose="020B0600070205080204" pitchFamily="34" charset="-128"/>
@@ -17480,7 +17489,7 @@
                 </a:solidFill>
               </a:rPr>
               <a:pPr/>
-              <a:t>19-Feb-16</a:t>
+              <a:t>23-Feb-16</a:t>
             </a:fld>
             <a:endParaRPr lang="en-US" altLang="pl-PL" sz="900">
               <a:solidFill>
@@ -17783,6 +17792,1165 @@
               </a:rPr>
               <a:pPr/>
               <a:t>10</a:t>
+            </a:fld>
+            <a:endParaRPr lang="en-US" altLang="pl-PL" sz="900">
+              <a:solidFill>
+                <a:srgbClr val="898989"/>
+              </a:solidFill>
+            </a:endParaRPr>
+          </a:p>
+        </p:txBody>
+      </p:sp>
+      <p:sp>
+        <p:nvSpPr>
+          <p:cNvPr id="7" name="pole tekstowe 6"/>
+          <p:cNvSpPr txBox="1"/>
+          <p:nvPr/>
+        </p:nvSpPr>
+        <p:spPr bwMode="auto">
+          <a:xfrm>
+            <a:off x="712099" y="1359462"/>
+            <a:ext cx="7744078" cy="4601260"/>
+          </a:xfrm>
+          <a:prstGeom prst="rect">
+            <a:avLst/>
+          </a:prstGeom>
+          <a:noFill/>
+          <a:ln w="9525">
+            <a:noFill/>
+            <a:miter lim="800000"/>
+            <a:headEnd/>
+            <a:tailEnd/>
+          </a:ln>
+        </p:spPr>
+        <p:txBody>
+          <a:bodyPr wrap="square" lIns="0" tIns="0" rIns="0" bIns="0" rtlCol="0">
+            <a:spAutoFit/>
+          </a:bodyPr>
+          <a:lstStyle/>
+          <a:p>
+            <a:pPr marL="171450" indent="-171450">
+              <a:spcBef>
+                <a:spcPts val="100"/>
+              </a:spcBef>
+              <a:spcAft>
+                <a:spcPts val="100"/>
+              </a:spcAft>
+              <a:buFont typeface="Arial" panose="020B0604020202020204" pitchFamily="34" charset="0"/>
+              <a:buChar char="•"/>
+            </a:pPr>
+            <a:r>
+              <a:rPr lang="pl-PL" sz="1600" dirty="0" smtClean="0"/>
+              <a:t>Załóż konto na </a:t>
+            </a:r>
+            <a:r>
+              <a:rPr lang="pl-PL" sz="1600" dirty="0" smtClean="0">
+                <a:hlinkClick r:id="rId2"/>
+              </a:rPr>
+              <a:t>https://github.com</a:t>
+            </a:r>
+            <a:r>
+              <a:rPr lang="pl-PL" sz="1600" dirty="0" smtClean="0"/>
+              <a:t> (plan </a:t>
+            </a:r>
+            <a:r>
+              <a:rPr lang="pl-PL" sz="1600" dirty="0" err="1" smtClean="0"/>
+              <a:t>free</a:t>
+            </a:r>
+            <a:r>
+              <a:rPr lang="pl-PL" sz="1600" dirty="0" smtClean="0"/>
+              <a:t> w zupełności wystarczy).</a:t>
+            </a:r>
+          </a:p>
+          <a:p>
+            <a:pPr marL="171450" indent="-171450">
+              <a:spcBef>
+                <a:spcPts val="100"/>
+              </a:spcBef>
+              <a:spcAft>
+                <a:spcPts val="100"/>
+              </a:spcAft>
+              <a:buFont typeface="Arial" panose="020B0604020202020204" pitchFamily="34" charset="0"/>
+              <a:buChar char="•"/>
+            </a:pPr>
+            <a:r>
+              <a:rPr lang="pl-PL" sz="900" dirty="0" smtClean="0"/>
+              <a:t>Przejdź tutorial (15 minut): </a:t>
+            </a:r>
+            <a:r>
+              <a:rPr lang="pl-PL" sz="900" dirty="0" smtClean="0">
+                <a:hlinkClick r:id="rId3"/>
+              </a:rPr>
+              <a:t>https</a:t>
+            </a:r>
+            <a:r>
+              <a:rPr lang="pl-PL" sz="900" dirty="0">
+                <a:hlinkClick r:id="rId3"/>
+              </a:rPr>
+              <a:t>://</a:t>
+            </a:r>
+            <a:r>
+              <a:rPr lang="pl-PL" sz="900" dirty="0" smtClean="0">
+                <a:hlinkClick r:id="rId3"/>
+              </a:rPr>
+              <a:t>try.github.io</a:t>
+            </a:r>
+            <a:r>
+              <a:rPr lang="pl-PL" sz="900" dirty="0" smtClean="0"/>
+              <a:t> (OPCJONALNIE)</a:t>
+            </a:r>
+          </a:p>
+          <a:p>
+            <a:pPr marL="171450" indent="-171450">
+              <a:spcBef>
+                <a:spcPts val="100"/>
+              </a:spcBef>
+              <a:spcAft>
+                <a:spcPts val="100"/>
+              </a:spcAft>
+              <a:buFont typeface="Arial" panose="020B0604020202020204" pitchFamily="34" charset="0"/>
+              <a:buChar char="•"/>
+            </a:pPr>
+            <a:endParaRPr lang="pl-PL" sz="1600" dirty="0" smtClean="0"/>
+          </a:p>
+          <a:p>
+            <a:pPr marL="171450" indent="-171450">
+              <a:spcBef>
+                <a:spcPts val="100"/>
+              </a:spcBef>
+              <a:spcAft>
+                <a:spcPts val="100"/>
+              </a:spcAft>
+              <a:buFont typeface="Arial" panose="020B0604020202020204" pitchFamily="34" charset="0"/>
+              <a:buChar char="•"/>
+            </a:pPr>
+            <a:r>
+              <a:rPr lang="pl-PL" sz="1600" dirty="0" smtClean="0"/>
+              <a:t>Zrób kopię (</a:t>
+            </a:r>
+            <a:r>
+              <a:rPr lang="pl-PL" sz="1600" dirty="0" err="1" smtClean="0"/>
+              <a:t>fork</a:t>
+            </a:r>
+            <a:r>
+              <a:rPr lang="pl-PL" sz="1600" dirty="0" smtClean="0"/>
+              <a:t>) repozytorium </a:t>
+            </a:r>
+            <a:r>
+              <a:rPr lang="pl-PL" sz="1600" dirty="0">
+                <a:hlinkClick r:id="rId4"/>
+              </a:rPr>
+              <a:t>https://</a:t>
+            </a:r>
+            <a:r>
+              <a:rPr lang="pl-PL" sz="1600" dirty="0" smtClean="0">
+                <a:hlinkClick r:id="rId4"/>
+              </a:rPr>
+              <a:t>github.com/wdsr/exercise0</a:t>
+            </a:r>
+            <a:endParaRPr lang="pl-PL" sz="1600" dirty="0" smtClean="0"/>
+          </a:p>
+          <a:p>
+            <a:pPr marL="628650" lvl="1" indent="-171450">
+              <a:spcBef>
+                <a:spcPts val="100"/>
+              </a:spcBef>
+              <a:spcAft>
+                <a:spcPts val="100"/>
+              </a:spcAft>
+              <a:buFont typeface="Arial" panose="020B0604020202020204" pitchFamily="34" charset="0"/>
+              <a:buChar char="•"/>
+            </a:pPr>
+            <a:r>
+              <a:rPr lang="pl-PL" sz="1100" dirty="0" smtClean="0"/>
+              <a:t>Zobacz zrzut ekranu na następnym slajdzie</a:t>
+            </a:r>
+            <a:endParaRPr lang="pl-PL" sz="1100" dirty="0"/>
+          </a:p>
+          <a:p>
+            <a:pPr marL="171450" indent="-171450">
+              <a:spcBef>
+                <a:spcPts val="100"/>
+              </a:spcBef>
+              <a:spcAft>
+                <a:spcPts val="100"/>
+              </a:spcAft>
+              <a:buFont typeface="Arial" panose="020B0604020202020204" pitchFamily="34" charset="0"/>
+              <a:buChar char="•"/>
+            </a:pPr>
+            <a:r>
+              <a:rPr lang="pl-PL" sz="1600" dirty="0" smtClean="0"/>
+              <a:t>Sklonuj </a:t>
+            </a:r>
+            <a:r>
+              <a:rPr lang="pl-PL" sz="1600" dirty="0"/>
+              <a:t>repozytorium </a:t>
+            </a:r>
+            <a:r>
+              <a:rPr lang="pl-PL" sz="1600" dirty="0" smtClean="0">
+                <a:hlinkClick r:id="rId4"/>
+              </a:rPr>
+              <a:t>https</a:t>
+            </a:r>
+            <a:r>
+              <a:rPr lang="pl-PL" sz="1600" dirty="0">
+                <a:hlinkClick r:id="rId4"/>
+              </a:rPr>
+              <a:t>://</a:t>
+            </a:r>
+            <a:r>
+              <a:rPr lang="pl-PL" sz="1600" dirty="0" smtClean="0">
+                <a:hlinkClick r:id="rId4"/>
+              </a:rPr>
+              <a:t>github.com/&lt;usr&gt;/exercise0</a:t>
+            </a:r>
+            <a:endParaRPr lang="pl-PL" sz="1600" dirty="0" smtClean="0"/>
+          </a:p>
+          <a:p>
+            <a:pPr marL="628650" lvl="1" indent="-171450">
+              <a:spcBef>
+                <a:spcPts val="100"/>
+              </a:spcBef>
+              <a:spcAft>
+                <a:spcPts val="100"/>
+              </a:spcAft>
+              <a:buFont typeface="Arial" panose="020B0604020202020204" pitchFamily="34" charset="0"/>
+              <a:buChar char="•"/>
+            </a:pPr>
+            <a:r>
+              <a:rPr lang="pl-PL" sz="1600" dirty="0" smtClean="0">
+                <a:solidFill>
+                  <a:srgbClr val="0070C0"/>
+                </a:solidFill>
+              </a:rPr>
+              <a:t>git </a:t>
+            </a:r>
+            <a:r>
+              <a:rPr lang="pl-PL" sz="1600" dirty="0">
+                <a:solidFill>
+                  <a:srgbClr val="0070C0"/>
+                </a:solidFill>
+              </a:rPr>
+              <a:t>clone </a:t>
+            </a:r>
+            <a:r>
+              <a:rPr lang="pl-PL" sz="1600" dirty="0">
+                <a:solidFill>
+                  <a:srgbClr val="0070C0"/>
+                </a:solidFill>
+                <a:hlinkClick r:id="rId5"/>
+              </a:rPr>
+              <a:t>https://</a:t>
+            </a:r>
+            <a:r>
+              <a:rPr lang="pl-PL" sz="1600" dirty="0" smtClean="0">
+                <a:solidFill>
+                  <a:srgbClr val="0070C0"/>
+                </a:solidFill>
+                <a:hlinkClick r:id="rId5"/>
+              </a:rPr>
+              <a:t>github.com/&lt;usr&gt;/exercise0.git</a:t>
+            </a:r>
+            <a:endParaRPr lang="pl-PL" sz="1600" dirty="0" smtClean="0">
+              <a:solidFill>
+                <a:srgbClr val="0070C0"/>
+              </a:solidFill>
+            </a:endParaRPr>
+          </a:p>
+          <a:p>
+            <a:pPr marL="628650" lvl="1" indent="-171450">
+              <a:spcBef>
+                <a:spcPts val="100"/>
+              </a:spcBef>
+              <a:spcAft>
+                <a:spcPts val="100"/>
+              </a:spcAft>
+              <a:buFont typeface="Arial" panose="020B0604020202020204" pitchFamily="34" charset="0"/>
+              <a:buChar char="•"/>
+            </a:pPr>
+            <a:r>
+              <a:rPr lang="pl-PL" sz="1100" dirty="0"/>
+              <a:t>Zobacz zrzut ekranu na następnym </a:t>
+            </a:r>
+            <a:r>
+              <a:rPr lang="pl-PL" sz="1100" dirty="0" smtClean="0"/>
+              <a:t>slajdzie</a:t>
+            </a:r>
+          </a:p>
+          <a:p>
+            <a:pPr marL="171450" indent="-171450">
+              <a:spcBef>
+                <a:spcPts val="100"/>
+              </a:spcBef>
+              <a:spcAft>
+                <a:spcPts val="100"/>
+              </a:spcAft>
+              <a:buFont typeface="Arial" panose="020B0604020202020204" pitchFamily="34" charset="0"/>
+              <a:buChar char="•"/>
+            </a:pPr>
+            <a:r>
+              <a:rPr lang="pl-PL" sz="1600" dirty="0" smtClean="0"/>
+              <a:t>Zmodyfikuj w dowolnym edytorze plik README.md – dopisz link do swojego profilu GitHub na końcu pliku.</a:t>
+            </a:r>
+          </a:p>
+          <a:p>
+            <a:pPr marL="171450" indent="-171450">
+              <a:spcBef>
+                <a:spcPts val="100"/>
+              </a:spcBef>
+              <a:spcAft>
+                <a:spcPts val="100"/>
+              </a:spcAft>
+              <a:buFont typeface="Arial" panose="020B0604020202020204" pitchFamily="34" charset="0"/>
+              <a:buChar char="•"/>
+            </a:pPr>
+            <a:r>
+              <a:rPr lang="pl-PL" sz="1600" dirty="0" smtClean="0"/>
+              <a:t>Wgraj zmodyfikowany plik z powrotem do repozytorium:</a:t>
+            </a:r>
+          </a:p>
+          <a:p>
+            <a:pPr marL="628650" lvl="1" indent="-171450">
+              <a:spcBef>
+                <a:spcPts val="100"/>
+              </a:spcBef>
+              <a:spcAft>
+                <a:spcPts val="100"/>
+              </a:spcAft>
+              <a:buFont typeface="Arial" panose="020B0604020202020204" pitchFamily="34" charset="0"/>
+              <a:buChar char="•"/>
+            </a:pPr>
+            <a:r>
+              <a:rPr lang="pl-PL" sz="1600" dirty="0" smtClean="0">
+                <a:solidFill>
+                  <a:srgbClr val="0070C0"/>
+                </a:solidFill>
+              </a:rPr>
+              <a:t>git </a:t>
+            </a:r>
+            <a:r>
+              <a:rPr lang="pl-PL" sz="1600" dirty="0" err="1" smtClean="0">
+                <a:solidFill>
+                  <a:srgbClr val="0070C0"/>
+                </a:solidFill>
+              </a:rPr>
+              <a:t>add</a:t>
+            </a:r>
+            <a:r>
+              <a:rPr lang="pl-PL" sz="1600" dirty="0" smtClean="0">
+                <a:solidFill>
+                  <a:srgbClr val="0070C0"/>
+                </a:solidFill>
+              </a:rPr>
+              <a:t> README.md</a:t>
+            </a:r>
+          </a:p>
+          <a:p>
+            <a:pPr marL="628650" lvl="1" indent="-171450">
+              <a:spcBef>
+                <a:spcPts val="100"/>
+              </a:spcBef>
+              <a:spcAft>
+                <a:spcPts val="100"/>
+              </a:spcAft>
+              <a:buFont typeface="Arial" panose="020B0604020202020204" pitchFamily="34" charset="0"/>
+              <a:buChar char="•"/>
+            </a:pPr>
+            <a:r>
+              <a:rPr lang="pl-PL" sz="1600" dirty="0" smtClean="0">
+                <a:solidFill>
+                  <a:srgbClr val="0070C0"/>
+                </a:solidFill>
+              </a:rPr>
+              <a:t>git </a:t>
+            </a:r>
+            <a:r>
+              <a:rPr lang="pl-PL" sz="1600" dirty="0" err="1" smtClean="0">
+                <a:solidFill>
+                  <a:srgbClr val="0070C0"/>
+                </a:solidFill>
+              </a:rPr>
+              <a:t>commit</a:t>
+            </a:r>
+            <a:r>
+              <a:rPr lang="pl-PL" sz="1600" dirty="0" smtClean="0">
+                <a:solidFill>
+                  <a:srgbClr val="0070C0"/>
+                </a:solidFill>
+              </a:rPr>
+              <a:t> –m „</a:t>
+            </a:r>
+            <a:r>
+              <a:rPr lang="pl-PL" sz="1600" dirty="0" err="1" smtClean="0">
+                <a:solidFill>
+                  <a:srgbClr val="0070C0"/>
+                </a:solidFill>
+              </a:rPr>
+              <a:t>Added</a:t>
+            </a:r>
+            <a:r>
+              <a:rPr lang="pl-PL" sz="1600" dirty="0" smtClean="0">
+                <a:solidFill>
+                  <a:srgbClr val="0070C0"/>
+                </a:solidFill>
+              </a:rPr>
+              <a:t> </a:t>
+            </a:r>
+            <a:r>
+              <a:rPr lang="pl-PL" sz="1600" dirty="0" err="1" smtClean="0">
+                <a:solidFill>
+                  <a:srgbClr val="0070C0"/>
+                </a:solidFill>
+              </a:rPr>
+              <a:t>new</a:t>
+            </a:r>
+            <a:r>
+              <a:rPr lang="pl-PL" sz="1600" dirty="0" smtClean="0">
+                <a:solidFill>
+                  <a:srgbClr val="0070C0"/>
+                </a:solidFill>
+              </a:rPr>
+              <a:t> profile”</a:t>
+            </a:r>
+          </a:p>
+          <a:p>
+            <a:pPr marL="628650" lvl="1" indent="-171450">
+              <a:spcBef>
+                <a:spcPts val="100"/>
+              </a:spcBef>
+              <a:spcAft>
+                <a:spcPts val="100"/>
+              </a:spcAft>
+              <a:buFont typeface="Arial" panose="020B0604020202020204" pitchFamily="34" charset="0"/>
+              <a:buChar char="•"/>
+            </a:pPr>
+            <a:r>
+              <a:rPr lang="pl-PL" sz="1600" dirty="0" smtClean="0">
+                <a:solidFill>
+                  <a:srgbClr val="0070C0"/>
+                </a:solidFill>
+              </a:rPr>
+              <a:t>git </a:t>
+            </a:r>
+            <a:r>
+              <a:rPr lang="pl-PL" sz="1600" dirty="0" err="1" smtClean="0">
+                <a:solidFill>
+                  <a:srgbClr val="0070C0"/>
+                </a:solidFill>
+              </a:rPr>
+              <a:t>push</a:t>
+            </a:r>
+            <a:endParaRPr lang="pl-PL" sz="1600" dirty="0" smtClean="0"/>
+          </a:p>
+          <a:p>
+            <a:pPr marL="171450" indent="-171450">
+              <a:spcBef>
+                <a:spcPts val="100"/>
+              </a:spcBef>
+              <a:spcAft>
+                <a:spcPts val="100"/>
+              </a:spcAft>
+              <a:buFont typeface="Arial" panose="020B0604020202020204" pitchFamily="34" charset="0"/>
+              <a:buChar char="•"/>
+            </a:pPr>
+            <a:r>
+              <a:rPr lang="pl-PL" sz="900" dirty="0" smtClean="0"/>
+              <a:t>Git </a:t>
+            </a:r>
+            <a:r>
+              <a:rPr lang="pl-PL" sz="900" dirty="0" err="1" smtClean="0"/>
+              <a:t>cheat</a:t>
+            </a:r>
+            <a:r>
+              <a:rPr lang="pl-PL" sz="900" dirty="0" smtClean="0"/>
+              <a:t> </a:t>
+            </a:r>
+            <a:r>
+              <a:rPr lang="pl-PL" sz="900" dirty="0" err="1" smtClean="0"/>
+              <a:t>sheet</a:t>
+            </a:r>
+            <a:r>
+              <a:rPr lang="pl-PL" sz="900" dirty="0" smtClean="0"/>
+              <a:t>: </a:t>
+            </a:r>
+            <a:r>
+              <a:rPr lang="pl-PL" sz="900" dirty="0" smtClean="0">
+                <a:hlinkClick r:id="rId6"/>
+              </a:rPr>
+              <a:t>https</a:t>
+            </a:r>
+            <a:r>
+              <a:rPr lang="pl-PL" sz="900" dirty="0">
+                <a:hlinkClick r:id="rId6"/>
+              </a:rPr>
+              <a:t>://</a:t>
+            </a:r>
+            <a:r>
+              <a:rPr lang="pl-PL" sz="900" dirty="0" smtClean="0">
+                <a:hlinkClick r:id="rId6"/>
+              </a:rPr>
+              <a:t>training.github.com/kit/downloads/github-git-cheat-sheet.pdf</a:t>
+            </a:r>
+            <a:endParaRPr lang="pl-PL" sz="900" dirty="0" smtClean="0"/>
+          </a:p>
+          <a:p>
+            <a:pPr marL="171450" indent="-171450">
+              <a:spcBef>
+                <a:spcPts val="100"/>
+              </a:spcBef>
+              <a:spcAft>
+                <a:spcPts val="100"/>
+              </a:spcAft>
+              <a:buFont typeface="Arial" panose="020B0604020202020204" pitchFamily="34" charset="0"/>
+              <a:buChar char="•"/>
+            </a:pPr>
+            <a:endParaRPr lang="pl-PL" sz="900" dirty="0" smtClean="0"/>
+          </a:p>
+          <a:p>
+            <a:pPr marL="171450" indent="-171450">
+              <a:spcBef>
+                <a:spcPts val="100"/>
+              </a:spcBef>
+              <a:spcAft>
+                <a:spcPts val="100"/>
+              </a:spcAft>
+              <a:buFont typeface="Arial" panose="020B0604020202020204" pitchFamily="34" charset="0"/>
+              <a:buChar char="•"/>
+            </a:pPr>
+            <a:endParaRPr lang="pl-PL" sz="1100" dirty="0" smtClean="0"/>
+          </a:p>
+          <a:p>
+            <a:pPr marL="171450" indent="-171450">
+              <a:spcBef>
+                <a:spcPts val="100"/>
+              </a:spcBef>
+              <a:spcAft>
+                <a:spcPts val="100"/>
+              </a:spcAft>
+              <a:buFont typeface="Arial" panose="020B0604020202020204" pitchFamily="34" charset="0"/>
+              <a:buChar char="•"/>
+            </a:pPr>
+            <a:endParaRPr lang="pl-PL" sz="1100" dirty="0" smtClean="0"/>
+          </a:p>
+          <a:p>
+            <a:pPr marL="171450" indent="-171450">
+              <a:spcBef>
+                <a:spcPts val="100"/>
+              </a:spcBef>
+              <a:spcAft>
+                <a:spcPts val="100"/>
+              </a:spcAft>
+              <a:buFont typeface="Arial" panose="020B0604020202020204" pitchFamily="34" charset="0"/>
+              <a:buChar char="•"/>
+            </a:pPr>
+            <a:endParaRPr lang="pl-PL" sz="1100" dirty="0"/>
+          </a:p>
+          <a:p>
+            <a:pPr>
+              <a:spcBef>
+                <a:spcPts val="100"/>
+              </a:spcBef>
+              <a:spcAft>
+                <a:spcPts val="100"/>
+              </a:spcAft>
+            </a:pPr>
+            <a:endParaRPr lang="pl-PL" sz="1100" dirty="0" smtClean="0"/>
+          </a:p>
+        </p:txBody>
+      </p:sp>
+      <p:sp>
+        <p:nvSpPr>
+          <p:cNvPr id="8" name="pole tekstowe 7"/>
+          <p:cNvSpPr txBox="1"/>
+          <p:nvPr/>
+        </p:nvSpPr>
+        <p:spPr bwMode="auto">
+          <a:xfrm>
+            <a:off x="1247670" y="5628194"/>
+            <a:ext cx="6751848" cy="518091"/>
+          </a:xfrm>
+          <a:prstGeom prst="rect">
+            <a:avLst/>
+          </a:prstGeom>
+          <a:noFill/>
+          <a:ln w="9525">
+            <a:noFill/>
+            <a:miter lim="800000"/>
+            <a:headEnd/>
+            <a:tailEnd/>
+          </a:ln>
+        </p:spPr>
+        <p:txBody>
+          <a:bodyPr wrap="none" lIns="0" tIns="0" rIns="0" bIns="0" rtlCol="0">
+            <a:spAutoFit/>
+          </a:bodyPr>
+          <a:lstStyle/>
+          <a:p>
+            <a:pPr>
+              <a:spcBef>
+                <a:spcPts val="100"/>
+              </a:spcBef>
+              <a:spcAft>
+                <a:spcPts val="100"/>
+              </a:spcAft>
+            </a:pPr>
+            <a:r>
+              <a:rPr lang="pl-PL" sz="1600" b="1" dirty="0" smtClean="0">
+                <a:solidFill>
+                  <a:srgbClr val="00B050"/>
+                </a:solidFill>
+              </a:rPr>
+              <a:t>Ostateczny termin zaliczenia ćwiczenia: poniedziałek 29 lutego</a:t>
+            </a:r>
+          </a:p>
+          <a:p>
+            <a:pPr>
+              <a:spcBef>
+                <a:spcPts val="100"/>
+              </a:spcBef>
+              <a:spcAft>
+                <a:spcPts val="100"/>
+              </a:spcAft>
+            </a:pPr>
+            <a:r>
+              <a:rPr lang="pl-PL" sz="1600" b="1" dirty="0" smtClean="0">
+                <a:solidFill>
+                  <a:srgbClr val="00B050"/>
+                </a:solidFill>
+              </a:rPr>
+              <a:t>Rozwiązania dostarczone później nie będą uwzględniane (0 punktów)</a:t>
+            </a:r>
+            <a:endParaRPr lang="pl-PL" sz="1600" b="1" dirty="0">
+              <a:solidFill>
+                <a:srgbClr val="00B050"/>
+              </a:solidFill>
+            </a:endParaRPr>
+          </a:p>
+        </p:txBody>
+      </p:sp>
+    </p:spTree>
+    <p:extLst>
+      <p:ext uri="{BB962C8B-B14F-4D97-AF65-F5344CB8AC3E}">
+        <p14:creationId xmlns:p14="http://schemas.microsoft.com/office/powerpoint/2010/main" val="2253719762"/>
+      </p:ext>
+    </p:extLst>
+  </p:cSld>
+  <p:clrMapOvr>
+    <a:masterClrMapping/>
+  </p:clrMapOvr>
+  <p:transition spd="slow">
+    <p:push dir="u"/>
+  </p:transition>
+  <p:timing>
+    <p:tnLst>
+      <p:par>
+        <p:cTn id="1" dur="indefinite" restart="never" nodeType="tmRoot"/>
+      </p:par>
+    </p:tnLst>
+  </p:timing>
+</p:sld>
+</file>
+
+<file path=ppt/slides/slide11.xml><?xml version="1.0" encoding="utf-8"?>
+<p:sld xmlns:a="http://schemas.openxmlformats.org/drawingml/2006/main" xmlns:r="http://schemas.openxmlformats.org/officeDocument/2006/relationships" xmlns:p="http://schemas.openxmlformats.org/presentationml/2006/main">
+  <p:cSld>
+    <p:spTree>
+      <p:nvGrpSpPr>
+        <p:cNvPr id="1" name=""/>
+        <p:cNvGrpSpPr/>
+        <p:nvPr/>
+      </p:nvGrpSpPr>
+      <p:grpSpPr>
+        <a:xfrm>
+          <a:off x="0" y="0"/>
+          <a:ext cx="0" cy="0"/>
+          <a:chOff x="0" y="0"/>
+          <a:chExt cx="0" cy="0"/>
+        </a:xfrm>
+      </p:grpSpPr>
+      <p:sp>
+        <p:nvSpPr>
+          <p:cNvPr id="3" name="Titel 2"/>
+          <p:cNvSpPr>
+            <a:spLocks noGrp="1"/>
+          </p:cNvSpPr>
+          <p:nvPr>
+            <p:ph type="title"/>
+          </p:nvPr>
+        </p:nvSpPr>
+        <p:spPr/>
+        <p:txBody>
+          <a:bodyPr/>
+          <a:lstStyle/>
+          <a:p>
+            <a:pPr>
+              <a:buFont typeface="+mj-lt"/>
+              <a:buNone/>
+              <a:defRPr/>
+            </a:pPr>
+            <a:r>
+              <a:rPr lang="pl-PL" dirty="0" smtClean="0">
+                <a:ea typeface="MS PGothic" panose="020B0600070205080204" pitchFamily="34" charset="-128"/>
+              </a:rPr>
+              <a:t>Na następne </a:t>
+            </a:r>
+            <a:r>
+              <a:rPr lang="pl-PL" dirty="0">
+                <a:ea typeface="MS PGothic" panose="020B0600070205080204" pitchFamily="34" charset="-128"/>
+              </a:rPr>
+              <a:t>zajęcia (ćwiczenie 0)</a:t>
+            </a:r>
+            <a:endParaRPr lang="de-DE" dirty="0">
+              <a:ea typeface="MS PGothic" panose="020B0600070205080204" pitchFamily="34" charset="-128"/>
+            </a:endParaRPr>
+          </a:p>
+        </p:txBody>
+      </p:sp>
+      <p:sp>
+        <p:nvSpPr>
+          <p:cNvPr id="17411" name="Datumsplatzhalter 3"/>
+          <p:cNvSpPr>
+            <a:spLocks noGrp="1"/>
+          </p:cNvSpPr>
+          <p:nvPr>
+            <p:ph type="dt" sz="quarter" idx="10"/>
+          </p:nvPr>
+        </p:nvSpPr>
+        <p:spPr>
+          <a:noFill/>
+          <a:extLst>
+            <a:ext uri="{91240B29-F687-4F45-9708-019B960494DF}">
+              <a14:hiddenLine xmlns:a14="http://schemas.microsoft.com/office/drawing/2010/main" w="9525">
+                <a:solidFill>
+                  <a:srgbClr val="000000"/>
+                </a:solidFill>
+                <a:miter lim="800000"/>
+                <a:headEnd/>
+                <a:tailEnd/>
+              </a14:hiddenLine>
+            </a:ext>
+          </a:extLst>
+        </p:spPr>
+        <p:txBody>
+          <a:bodyPr/>
+          <a:lstStyle>
+            <a:lvl1pPr eaLnBrk="0" hangingPunct="0">
+              <a:defRPr sz="1500">
+                <a:solidFill>
+                  <a:schemeClr val="tx1"/>
+                </a:solidFill>
+                <a:latin typeface="Arial" pitchFamily="34" charset="0"/>
+                <a:ea typeface="ＭＳ Ｐゴシック" charset="-128"/>
+              </a:defRPr>
+            </a:lvl1pPr>
+            <a:lvl2pPr marL="742950" indent="-285750" eaLnBrk="0" hangingPunct="0">
+              <a:defRPr sz="1500">
+                <a:solidFill>
+                  <a:schemeClr val="tx1"/>
+                </a:solidFill>
+                <a:latin typeface="Arial" pitchFamily="34" charset="0"/>
+                <a:ea typeface="ＭＳ Ｐゴシック" charset="-128"/>
+              </a:defRPr>
+            </a:lvl2pPr>
+            <a:lvl3pPr marL="1143000" indent="-228600" eaLnBrk="0" hangingPunct="0">
+              <a:defRPr sz="1500">
+                <a:solidFill>
+                  <a:schemeClr val="tx1"/>
+                </a:solidFill>
+                <a:latin typeface="Arial" pitchFamily="34" charset="0"/>
+                <a:ea typeface="ＭＳ Ｐゴシック" charset="-128"/>
+              </a:defRPr>
+            </a:lvl3pPr>
+            <a:lvl4pPr marL="1600200" indent="-228600" eaLnBrk="0" hangingPunct="0">
+              <a:defRPr sz="1500">
+                <a:solidFill>
+                  <a:schemeClr val="tx1"/>
+                </a:solidFill>
+                <a:latin typeface="Arial" pitchFamily="34" charset="0"/>
+                <a:ea typeface="ＭＳ Ｐゴシック" charset="-128"/>
+              </a:defRPr>
+            </a:lvl4pPr>
+            <a:lvl5pPr marL="2057400" indent="-228600" eaLnBrk="0" hangingPunct="0">
+              <a:defRPr sz="1500">
+                <a:solidFill>
+                  <a:schemeClr val="tx1"/>
+                </a:solidFill>
+                <a:latin typeface="Arial" pitchFamily="34" charset="0"/>
+                <a:ea typeface="ＭＳ Ｐゴシック" charset="-128"/>
+              </a:defRPr>
+            </a:lvl5pPr>
+            <a:lvl6pPr marL="2514600" indent="-228600" eaLnBrk="0" fontAlgn="base" hangingPunct="0">
+              <a:spcBef>
+                <a:spcPct val="0"/>
+              </a:spcBef>
+              <a:spcAft>
+                <a:spcPct val="0"/>
+              </a:spcAft>
+              <a:defRPr sz="1500">
+                <a:solidFill>
+                  <a:schemeClr val="tx1"/>
+                </a:solidFill>
+                <a:latin typeface="Arial" pitchFamily="34" charset="0"/>
+                <a:ea typeface="ＭＳ Ｐゴシック" charset="-128"/>
+              </a:defRPr>
+            </a:lvl6pPr>
+            <a:lvl7pPr marL="2971800" indent="-228600" eaLnBrk="0" fontAlgn="base" hangingPunct="0">
+              <a:spcBef>
+                <a:spcPct val="0"/>
+              </a:spcBef>
+              <a:spcAft>
+                <a:spcPct val="0"/>
+              </a:spcAft>
+              <a:defRPr sz="1500">
+                <a:solidFill>
+                  <a:schemeClr val="tx1"/>
+                </a:solidFill>
+                <a:latin typeface="Arial" pitchFamily="34" charset="0"/>
+                <a:ea typeface="ＭＳ Ｐゴシック" charset="-128"/>
+              </a:defRPr>
+            </a:lvl7pPr>
+            <a:lvl8pPr marL="3429000" indent="-228600" eaLnBrk="0" fontAlgn="base" hangingPunct="0">
+              <a:spcBef>
+                <a:spcPct val="0"/>
+              </a:spcBef>
+              <a:spcAft>
+                <a:spcPct val="0"/>
+              </a:spcAft>
+              <a:defRPr sz="1500">
+                <a:solidFill>
+                  <a:schemeClr val="tx1"/>
+                </a:solidFill>
+                <a:latin typeface="Arial" pitchFamily="34" charset="0"/>
+                <a:ea typeface="ＭＳ Ｐゴシック" charset="-128"/>
+              </a:defRPr>
+            </a:lvl8pPr>
+            <a:lvl9pPr marL="3886200" indent="-228600" eaLnBrk="0" fontAlgn="base" hangingPunct="0">
+              <a:spcBef>
+                <a:spcPct val="0"/>
+              </a:spcBef>
+              <a:spcAft>
+                <a:spcPct val="0"/>
+              </a:spcAft>
+              <a:defRPr sz="1500">
+                <a:solidFill>
+                  <a:schemeClr val="tx1"/>
+                </a:solidFill>
+                <a:latin typeface="Arial" pitchFamily="34" charset="0"/>
+                <a:ea typeface="ＭＳ Ｐゴシック" charset="-128"/>
+              </a:defRPr>
+            </a:lvl9pPr>
+          </a:lstStyle>
+          <a:p>
+            <a:fld id="{D848C8B2-07A2-4CD2-87E7-F1C8D5AD1B0C}" type="datetime5">
+              <a:rPr lang="en-US" altLang="pl-PL" sz="900">
+                <a:solidFill>
+                  <a:srgbClr val="898989"/>
+                </a:solidFill>
+              </a:rPr>
+              <a:pPr/>
+              <a:t>23-Feb-16</a:t>
+            </a:fld>
+            <a:endParaRPr lang="en-US" altLang="pl-PL" sz="900">
+              <a:solidFill>
+                <a:srgbClr val="898989"/>
+              </a:solidFill>
+            </a:endParaRPr>
+          </a:p>
+        </p:txBody>
+      </p:sp>
+      <p:sp>
+        <p:nvSpPr>
+          <p:cNvPr id="17412" name="Fußzeilenplatzhalter 4"/>
+          <p:cNvSpPr>
+            <a:spLocks noGrp="1"/>
+          </p:cNvSpPr>
+          <p:nvPr>
+            <p:ph type="ftr" sz="quarter" idx="11"/>
+          </p:nvPr>
+        </p:nvSpPr>
+        <p:spPr>
+          <a:noFill/>
+          <a:extLst>
+            <a:ext uri="{91240B29-F687-4F45-9708-019B960494DF}">
+              <a14:hiddenLine xmlns:a14="http://schemas.microsoft.com/office/drawing/2010/main" w="9525">
+                <a:solidFill>
+                  <a:srgbClr val="000000"/>
+                </a:solidFill>
+                <a:miter lim="800000"/>
+                <a:headEnd/>
+                <a:tailEnd/>
+              </a14:hiddenLine>
+            </a:ext>
+          </a:extLst>
+        </p:spPr>
+        <p:txBody>
+          <a:bodyPr numCol="1" compatLnSpc="1">
+            <a:prstTxWarp prst="textNoShape">
+              <a:avLst/>
+            </a:prstTxWarp>
+          </a:bodyPr>
+          <a:lstStyle>
+            <a:lvl1pPr eaLnBrk="0" hangingPunct="0">
+              <a:defRPr sz="1500">
+                <a:solidFill>
+                  <a:schemeClr val="tx1"/>
+                </a:solidFill>
+                <a:latin typeface="Arial" pitchFamily="34" charset="0"/>
+                <a:ea typeface="ＭＳ Ｐゴシック" charset="-128"/>
+              </a:defRPr>
+            </a:lvl1pPr>
+            <a:lvl2pPr marL="742950" indent="-285750" eaLnBrk="0" hangingPunct="0">
+              <a:defRPr sz="1500">
+                <a:solidFill>
+                  <a:schemeClr val="tx1"/>
+                </a:solidFill>
+                <a:latin typeface="Arial" pitchFamily="34" charset="0"/>
+                <a:ea typeface="ＭＳ Ｐゴシック" charset="-128"/>
+              </a:defRPr>
+            </a:lvl2pPr>
+            <a:lvl3pPr marL="1143000" indent="-228600" eaLnBrk="0" hangingPunct="0">
+              <a:defRPr sz="1500">
+                <a:solidFill>
+                  <a:schemeClr val="tx1"/>
+                </a:solidFill>
+                <a:latin typeface="Arial" pitchFamily="34" charset="0"/>
+                <a:ea typeface="ＭＳ Ｐゴシック" charset="-128"/>
+              </a:defRPr>
+            </a:lvl3pPr>
+            <a:lvl4pPr marL="1600200" indent="-228600" eaLnBrk="0" hangingPunct="0">
+              <a:defRPr sz="1500">
+                <a:solidFill>
+                  <a:schemeClr val="tx1"/>
+                </a:solidFill>
+                <a:latin typeface="Arial" pitchFamily="34" charset="0"/>
+                <a:ea typeface="ＭＳ Ｐゴシック" charset="-128"/>
+              </a:defRPr>
+            </a:lvl4pPr>
+            <a:lvl5pPr marL="2057400" indent="-228600" eaLnBrk="0" hangingPunct="0">
+              <a:defRPr sz="1500">
+                <a:solidFill>
+                  <a:schemeClr val="tx1"/>
+                </a:solidFill>
+                <a:latin typeface="Arial" pitchFamily="34" charset="0"/>
+                <a:ea typeface="ＭＳ Ｐゴシック" charset="-128"/>
+              </a:defRPr>
+            </a:lvl5pPr>
+            <a:lvl6pPr marL="2514600" indent="-228600" eaLnBrk="0" fontAlgn="base" hangingPunct="0">
+              <a:spcBef>
+                <a:spcPct val="0"/>
+              </a:spcBef>
+              <a:spcAft>
+                <a:spcPct val="0"/>
+              </a:spcAft>
+              <a:defRPr sz="1500">
+                <a:solidFill>
+                  <a:schemeClr val="tx1"/>
+                </a:solidFill>
+                <a:latin typeface="Arial" pitchFamily="34" charset="0"/>
+                <a:ea typeface="ＭＳ Ｐゴシック" charset="-128"/>
+              </a:defRPr>
+            </a:lvl6pPr>
+            <a:lvl7pPr marL="2971800" indent="-228600" eaLnBrk="0" fontAlgn="base" hangingPunct="0">
+              <a:spcBef>
+                <a:spcPct val="0"/>
+              </a:spcBef>
+              <a:spcAft>
+                <a:spcPct val="0"/>
+              </a:spcAft>
+              <a:defRPr sz="1500">
+                <a:solidFill>
+                  <a:schemeClr val="tx1"/>
+                </a:solidFill>
+                <a:latin typeface="Arial" pitchFamily="34" charset="0"/>
+                <a:ea typeface="ＭＳ Ｐゴシック" charset="-128"/>
+              </a:defRPr>
+            </a:lvl7pPr>
+            <a:lvl8pPr marL="3429000" indent="-228600" eaLnBrk="0" fontAlgn="base" hangingPunct="0">
+              <a:spcBef>
+                <a:spcPct val="0"/>
+              </a:spcBef>
+              <a:spcAft>
+                <a:spcPct val="0"/>
+              </a:spcAft>
+              <a:defRPr sz="1500">
+                <a:solidFill>
+                  <a:schemeClr val="tx1"/>
+                </a:solidFill>
+                <a:latin typeface="Arial" pitchFamily="34" charset="0"/>
+                <a:ea typeface="ＭＳ Ｐゴシック" charset="-128"/>
+              </a:defRPr>
+            </a:lvl8pPr>
+            <a:lvl9pPr marL="3886200" indent="-228600" eaLnBrk="0" fontAlgn="base" hangingPunct="0">
+              <a:spcBef>
+                <a:spcPct val="0"/>
+              </a:spcBef>
+              <a:spcAft>
+                <a:spcPct val="0"/>
+              </a:spcAft>
+              <a:defRPr sz="1500">
+                <a:solidFill>
+                  <a:schemeClr val="tx1"/>
+                </a:solidFill>
+                <a:latin typeface="Arial" pitchFamily="34" charset="0"/>
+                <a:ea typeface="ＭＳ Ｐゴシック" charset="-128"/>
+              </a:defRPr>
+            </a:lvl9pPr>
+          </a:lstStyle>
+          <a:p>
+            <a:r>
+              <a:rPr lang="en-US" altLang="pl-PL" sz="900" smtClean="0">
+                <a:solidFill>
+                  <a:srgbClr val="898989"/>
+                </a:solidFill>
+              </a:rPr>
+              <a:t>GFT Technologies AG</a:t>
+            </a:r>
+          </a:p>
+        </p:txBody>
+      </p:sp>
+      <p:sp>
+        <p:nvSpPr>
+          <p:cNvPr id="17413" name="Foliennummernplatzhalter 5"/>
+          <p:cNvSpPr>
+            <a:spLocks noGrp="1"/>
+          </p:cNvSpPr>
+          <p:nvPr>
+            <p:ph type="sldNum" sz="quarter" idx="12"/>
+          </p:nvPr>
+        </p:nvSpPr>
+        <p:spPr>
+          <a:noFill/>
+          <a:extLst>
+            <a:ext uri="{91240B29-F687-4F45-9708-019B960494DF}">
+              <a14:hiddenLine xmlns:a14="http://schemas.microsoft.com/office/drawing/2010/main" w="9525">
+                <a:solidFill>
+                  <a:srgbClr val="000000"/>
+                </a:solidFill>
+                <a:miter lim="800000"/>
+                <a:headEnd/>
+                <a:tailEnd/>
+              </a14:hiddenLine>
+            </a:ext>
+          </a:extLst>
+        </p:spPr>
+        <p:txBody>
+          <a:bodyPr/>
+          <a:lstStyle>
+            <a:lvl1pPr eaLnBrk="0" hangingPunct="0">
+              <a:defRPr sz="1500">
+                <a:solidFill>
+                  <a:schemeClr val="tx1"/>
+                </a:solidFill>
+                <a:latin typeface="Arial" pitchFamily="34" charset="0"/>
+                <a:ea typeface="ＭＳ Ｐゴシック" charset="-128"/>
+              </a:defRPr>
+            </a:lvl1pPr>
+            <a:lvl2pPr marL="742950" indent="-285750" eaLnBrk="0" hangingPunct="0">
+              <a:defRPr sz="1500">
+                <a:solidFill>
+                  <a:schemeClr val="tx1"/>
+                </a:solidFill>
+                <a:latin typeface="Arial" pitchFamily="34" charset="0"/>
+                <a:ea typeface="ＭＳ Ｐゴシック" charset="-128"/>
+              </a:defRPr>
+            </a:lvl2pPr>
+            <a:lvl3pPr marL="1143000" indent="-228600" eaLnBrk="0" hangingPunct="0">
+              <a:defRPr sz="1500">
+                <a:solidFill>
+                  <a:schemeClr val="tx1"/>
+                </a:solidFill>
+                <a:latin typeface="Arial" pitchFamily="34" charset="0"/>
+                <a:ea typeface="ＭＳ Ｐゴシック" charset="-128"/>
+              </a:defRPr>
+            </a:lvl3pPr>
+            <a:lvl4pPr marL="1600200" indent="-228600" eaLnBrk="0" hangingPunct="0">
+              <a:defRPr sz="1500">
+                <a:solidFill>
+                  <a:schemeClr val="tx1"/>
+                </a:solidFill>
+                <a:latin typeface="Arial" pitchFamily="34" charset="0"/>
+                <a:ea typeface="ＭＳ Ｐゴシック" charset="-128"/>
+              </a:defRPr>
+            </a:lvl4pPr>
+            <a:lvl5pPr marL="2057400" indent="-228600" eaLnBrk="0" hangingPunct="0">
+              <a:defRPr sz="1500">
+                <a:solidFill>
+                  <a:schemeClr val="tx1"/>
+                </a:solidFill>
+                <a:latin typeface="Arial" pitchFamily="34" charset="0"/>
+                <a:ea typeface="ＭＳ Ｐゴシック" charset="-128"/>
+              </a:defRPr>
+            </a:lvl5pPr>
+            <a:lvl6pPr marL="2514600" indent="-228600" eaLnBrk="0" fontAlgn="base" hangingPunct="0">
+              <a:spcBef>
+                <a:spcPct val="0"/>
+              </a:spcBef>
+              <a:spcAft>
+                <a:spcPct val="0"/>
+              </a:spcAft>
+              <a:defRPr sz="1500">
+                <a:solidFill>
+                  <a:schemeClr val="tx1"/>
+                </a:solidFill>
+                <a:latin typeface="Arial" pitchFamily="34" charset="0"/>
+                <a:ea typeface="ＭＳ Ｐゴシック" charset="-128"/>
+              </a:defRPr>
+            </a:lvl6pPr>
+            <a:lvl7pPr marL="2971800" indent="-228600" eaLnBrk="0" fontAlgn="base" hangingPunct="0">
+              <a:spcBef>
+                <a:spcPct val="0"/>
+              </a:spcBef>
+              <a:spcAft>
+                <a:spcPct val="0"/>
+              </a:spcAft>
+              <a:defRPr sz="1500">
+                <a:solidFill>
+                  <a:schemeClr val="tx1"/>
+                </a:solidFill>
+                <a:latin typeface="Arial" pitchFamily="34" charset="0"/>
+                <a:ea typeface="ＭＳ Ｐゴシック" charset="-128"/>
+              </a:defRPr>
+            </a:lvl7pPr>
+            <a:lvl8pPr marL="3429000" indent="-228600" eaLnBrk="0" fontAlgn="base" hangingPunct="0">
+              <a:spcBef>
+                <a:spcPct val="0"/>
+              </a:spcBef>
+              <a:spcAft>
+                <a:spcPct val="0"/>
+              </a:spcAft>
+              <a:defRPr sz="1500">
+                <a:solidFill>
+                  <a:schemeClr val="tx1"/>
+                </a:solidFill>
+                <a:latin typeface="Arial" pitchFamily="34" charset="0"/>
+                <a:ea typeface="ＭＳ Ｐゴシック" charset="-128"/>
+              </a:defRPr>
+            </a:lvl8pPr>
+            <a:lvl9pPr marL="3886200" indent="-228600" eaLnBrk="0" fontAlgn="base" hangingPunct="0">
+              <a:spcBef>
+                <a:spcPct val="0"/>
+              </a:spcBef>
+              <a:spcAft>
+                <a:spcPct val="0"/>
+              </a:spcAft>
+              <a:defRPr sz="1500">
+                <a:solidFill>
+                  <a:schemeClr val="tx1"/>
+                </a:solidFill>
+                <a:latin typeface="Arial" pitchFamily="34" charset="0"/>
+                <a:ea typeface="ＭＳ Ｐゴシック" charset="-128"/>
+              </a:defRPr>
+            </a:lvl9pPr>
+          </a:lstStyle>
+          <a:p>
+            <a:fld id="{004FF41C-1B3A-4627-96E2-F7FAB4AA8A1A}" type="slidenum">
+              <a:rPr lang="en-US" altLang="pl-PL" sz="900">
+                <a:solidFill>
+                  <a:srgbClr val="898989"/>
+                </a:solidFill>
+              </a:rPr>
+              <a:pPr/>
+              <a:t>11</a:t>
             </a:fld>
             <a:endParaRPr lang="en-US" altLang="pl-PL" sz="900">
               <a:solidFill>
@@ -17954,6 +19122,76 @@
           </a:extLst>
         </p:spPr>
       </p:pic>
+      <p:sp>
+        <p:nvSpPr>
+          <p:cNvPr id="2" name="pole tekstowe 1"/>
+          <p:cNvSpPr txBox="1"/>
+          <p:nvPr/>
+        </p:nvSpPr>
+        <p:spPr bwMode="auto">
+          <a:xfrm>
+            <a:off x="550256" y="5802366"/>
+            <a:ext cx="3981859" cy="318036"/>
+          </a:xfrm>
+          <a:prstGeom prst="rect">
+            <a:avLst/>
+          </a:prstGeom>
+          <a:noFill/>
+          <a:ln w="9525">
+            <a:noFill/>
+            <a:miter lim="800000"/>
+            <a:headEnd/>
+            <a:tailEnd/>
+          </a:ln>
+        </p:spPr>
+        <p:txBody>
+          <a:bodyPr wrap="none" lIns="0" tIns="0" rIns="0" bIns="0" rtlCol="0">
+            <a:spAutoFit/>
+          </a:bodyPr>
+          <a:lstStyle/>
+          <a:p>
+            <a:pPr>
+              <a:spcBef>
+                <a:spcPts val="100"/>
+              </a:spcBef>
+              <a:spcAft>
+                <a:spcPts val="100"/>
+              </a:spcAft>
+            </a:pPr>
+            <a:r>
+              <a:rPr lang="pl-PL" sz="950" b="1" dirty="0" smtClean="0">
+                <a:solidFill>
+                  <a:srgbClr val="00B050"/>
+                </a:solidFill>
+              </a:rPr>
+              <a:t>Ostateczny termin zaliczenia ćwiczenia: poniedziałek 29 lutego</a:t>
+            </a:r>
+          </a:p>
+          <a:p>
+            <a:pPr>
+              <a:spcBef>
+                <a:spcPts val="100"/>
+              </a:spcBef>
+              <a:spcAft>
+                <a:spcPts val="100"/>
+              </a:spcAft>
+            </a:pPr>
+            <a:r>
+              <a:rPr lang="pl-PL" sz="950" b="1" dirty="0" smtClean="0">
+                <a:solidFill>
+                  <a:srgbClr val="00B050"/>
+                </a:solidFill>
+              </a:rPr>
+              <a:t>Rozwiązania dostarczone później nie będą uwzględniane (0 punktów)</a:t>
+            </a:r>
+            <a:endParaRPr lang="pl-PL" sz="950" b="1" dirty="0">
+              <a:solidFill>
+                <a:srgbClr val="00B050"/>
+              </a:solidFill>
+            </a:endParaRPr>
+          </a:p>
+        </p:txBody>
+      </p:sp>
     </p:spTree>
     <p:extLst>
       <p:ext uri="{BB962C8B-B14F-4D97-AF65-F5344CB8AC3E}">
@@ -17977,7 +19215,7 @@
 </p:sld>
 </file>
 
-<file path=ppt/slides/slide11.xml><?xml version="1.0" encoding="utf-8"?>
+<file path=ppt/slides/slide12.xml><?xml version="1.0" encoding="utf-8"?>
 <p:sld xmlns:a="http://schemas.openxmlformats.org/drawingml/2006/main" xmlns:r="http://schemas.openxmlformats.org/officeDocument/2006/relationships" xmlns:p="http://schemas.openxmlformats.org/presentationml/2006/main">
   <p:cSld>
     <p:spTree>
@@ -18006,7 +19244,7 @@
         </p:nvSpPr>
         <p:spPr>
           <a:xfrm>
-            <a:off x="741363" y="2889250"/>
+            <a:off x="741363" y="2674937"/>
             <a:ext cx="4972050" cy="2519363"/>
           </a:xfrm>
         </p:spPr>
@@ -18622,7 +19860,7 @@
                 </a:solidFill>
               </a:rPr>
               <a:pPr/>
-              <a:t>19-Feb-16</a:t>
+              <a:t>23-Feb-16</a:t>
             </a:fld>
             <a:endParaRPr lang="en-US" altLang="pl-PL" sz="900">
               <a:solidFill>
@@ -19277,7 +20515,7 @@
                 </a:solidFill>
               </a:rPr>
               <a:pPr/>
-              <a:t>19-Feb-16</a:t>
+              <a:t>23-Feb-16</a:t>
             </a:fld>
             <a:endParaRPr lang="en-US" altLang="pl-PL" sz="900">
               <a:solidFill>
@@ -20617,7 +21855,7 @@
                 </a:solidFill>
               </a:rPr>
               <a:pPr/>
-              <a:t>19-Feb-16</a:t>
+              <a:t>23-Feb-16</a:t>
             </a:fld>
             <a:endParaRPr lang="en-US" altLang="pl-PL" sz="900">
               <a:solidFill>
@@ -21685,7 +22923,7 @@
                 </a:solidFill>
               </a:rPr>
               <a:pPr/>
-              <a:t>19-Feb-16</a:t>
+              <a:t>23-Feb-16</a:t>
             </a:fld>
             <a:endParaRPr lang="en-US" altLang="pl-PL" sz="900">
               <a:solidFill>
@@ -22557,7 +23795,7 @@
                 </a:solidFill>
               </a:rPr>
               <a:pPr/>
-              <a:t>19-Feb-16</a:t>
+              <a:t>23-Feb-16</a:t>
             </a:fld>
             <a:endParaRPr lang="en-US" altLang="pl-PL" sz="900">
               <a:solidFill>
@@ -23625,7 +24863,7 @@
                 </a:solidFill>
               </a:rPr>
               <a:pPr/>
-              <a:t>19-Feb-16</a:t>
+              <a:t>23-Feb-16</a:t>
             </a:fld>
             <a:endParaRPr lang="en-US" altLang="pl-PL" sz="900">
               <a:solidFill>
@@ -24237,7 +25475,7 @@
                 </a:solidFill>
               </a:rPr>
               <a:pPr/>
-              <a:t>19-Feb-16</a:t>
+              <a:t>23-Feb-16</a:t>
             </a:fld>
             <a:endParaRPr lang="en-US" altLang="pl-PL" sz="900">
               <a:solidFill>
@@ -24556,7 +25794,7 @@
           <p:nvPr>
             <p:extLst>
               <p:ext uri="{D42A27DB-BD31-4B8C-83A1-F6EECF244321}">
-                <p14:modId xmlns:p14="http://schemas.microsoft.com/office/powerpoint/2010/main" val="4239939759"/>
+                <p14:modId xmlns:p14="http://schemas.microsoft.com/office/powerpoint/2010/main" val="1049449028"/>
               </p:ext>
             </p:extLst>
           </p:nvPr>
@@ -24959,7 +26197,7 @@
               <a:rPr lang="pl-PL" dirty="0" smtClean="0">
                 <a:ea typeface="MS PGothic" panose="020B0600070205080204" pitchFamily="34" charset="-128"/>
               </a:rPr>
-              <a:t>Na następne zajęcia</a:t>
+              <a:t>Kryteria zaliczenia</a:t>
             </a:r>
             <a:endParaRPr lang="de-DE" dirty="0">
               <a:ea typeface="MS PGothic" panose="020B0600070205080204" pitchFamily="34" charset="-128"/>
@@ -25109,7 +26347,7 @@
                 </a:solidFill>
               </a:rPr>
               <a:pPr/>
-              <a:t>19-Feb-16</a:t>
+              <a:t>23-Feb-16</a:t>
             </a:fld>
             <a:endParaRPr lang="en-US" altLang="pl-PL" sz="900">
               <a:solidFill>
@@ -25421,16 +26659,646 @@
           </a:p>
         </p:txBody>
       </p:sp>
+      <p:graphicFrame>
+        <p:nvGraphicFramePr>
+          <p:cNvPr id="2" name="Tabela 1"/>
+          <p:cNvGraphicFramePr>
+            <a:graphicFrameLocks noGrp="1"/>
+          </p:cNvGraphicFramePr>
+          <p:nvPr>
+            <p:extLst>
+              <p:ext uri="{D42A27DB-BD31-4B8C-83A1-F6EECF244321}">
+                <p14:modId xmlns:p14="http://schemas.microsoft.com/office/powerpoint/2010/main" val="3150831170"/>
+              </p:ext>
+            </p:extLst>
+          </p:nvPr>
+        </p:nvGraphicFramePr>
+        <p:xfrm>
+          <a:off x="663546" y="1267857"/>
+          <a:ext cx="4563907" cy="3826513"/>
+        </p:xfrm>
+        <a:graphic>
+          <a:graphicData uri="http://schemas.openxmlformats.org/drawingml/2006/table">
+            <a:tbl>
+              <a:tblPr firstRow="1" bandRow="1">
+                <a:tableStyleId>{5C22544A-7EE6-4342-B048-85BDC9FD1C3A}</a:tableStyleId>
+              </a:tblPr>
+              <a:tblGrid>
+                <a:gridCol w="2563064"/>
+                <a:gridCol w="2000843"/>
+              </a:tblGrid>
+              <a:tr h="587548">
+                <a:tc>
+                  <a:txBody>
+                    <a:bodyPr/>
+                    <a:lstStyle/>
+                    <a:p>
+                      <a:r>
+                        <a:rPr lang="pl-PL" dirty="0" smtClean="0"/>
+                        <a:t>Element</a:t>
+                      </a:r>
+                      <a:endParaRPr lang="pl-PL" dirty="0"/>
+                    </a:p>
+                  </a:txBody>
+                  <a:tcPr/>
+                </a:tc>
+                <a:tc>
+                  <a:txBody>
+                    <a:bodyPr/>
+                    <a:lstStyle/>
+                    <a:p>
+                      <a:r>
+                        <a:rPr lang="pl-PL" dirty="0" smtClean="0"/>
+                        <a:t>Pula</a:t>
+                      </a:r>
+                      <a:r>
+                        <a:rPr lang="pl-PL" baseline="0" dirty="0" smtClean="0"/>
+                        <a:t> punktów</a:t>
+                      </a:r>
+                      <a:endParaRPr lang="pl-PL" dirty="0"/>
+                    </a:p>
+                  </a:txBody>
+                  <a:tcPr/>
+                </a:tc>
+              </a:tr>
+              <a:tr h="302576">
+                <a:tc>
+                  <a:txBody>
+                    <a:bodyPr/>
+                    <a:lstStyle/>
+                    <a:p>
+                      <a:r>
+                        <a:rPr lang="pl-PL" sz="1100" dirty="0" smtClean="0"/>
+                        <a:t>Frekwencja</a:t>
+                      </a:r>
+                      <a:endParaRPr lang="pl-PL" sz="1100" dirty="0"/>
+                    </a:p>
+                  </a:txBody>
+                  <a:tcPr/>
+                </a:tc>
+                <a:tc>
+                  <a:txBody>
+                    <a:bodyPr/>
+                    <a:lstStyle/>
+                    <a:p>
+                      <a:r>
+                        <a:rPr lang="pl-PL" sz="1100" dirty="0" smtClean="0"/>
+                        <a:t>2</a:t>
+                      </a:r>
+                      <a:r>
+                        <a:rPr lang="pl-PL" sz="1100" baseline="0" dirty="0" smtClean="0"/>
+                        <a:t> </a:t>
+                      </a:r>
+                      <a:r>
+                        <a:rPr lang="pl-PL" sz="1100" dirty="0" smtClean="0"/>
+                        <a:t>punkty</a:t>
+                      </a:r>
+                      <a:r>
+                        <a:rPr lang="pl-PL" sz="1100" baseline="0" dirty="0" smtClean="0"/>
+                        <a:t> za każde zajęcia</a:t>
+                      </a:r>
+                    </a:p>
+                    <a:p>
+                      <a:r>
+                        <a:rPr lang="pl-PL" sz="1100" baseline="0" dirty="0" smtClean="0"/>
+                        <a:t>(14 zajęć </a:t>
+                      </a:r>
+                      <a:r>
+                        <a:rPr lang="pl-PL" sz="1100" baseline="0" dirty="0" smtClean="0">
+                          <a:sym typeface="Wingdings" panose="05000000000000000000" pitchFamily="2" charset="2"/>
+                        </a:rPr>
+                        <a:t> max. </a:t>
+                      </a:r>
+                      <a:r>
+                        <a:rPr lang="pl-PL" sz="1100" baseline="0" smtClean="0">
+                          <a:sym typeface="Wingdings" panose="05000000000000000000" pitchFamily="2" charset="2"/>
+                        </a:rPr>
+                        <a:t>28pktów)</a:t>
+                      </a:r>
+                      <a:endParaRPr lang="pl-PL" sz="1100" dirty="0"/>
+                    </a:p>
+                  </a:txBody>
+                  <a:tcPr/>
+                </a:tc>
+              </a:tr>
+              <a:tr h="186117">
+                <a:tc>
+                  <a:txBody>
+                    <a:bodyPr/>
+                    <a:lstStyle/>
+                    <a:p>
+                      <a:r>
+                        <a:rPr lang="pl-PL" sz="1100" dirty="0" smtClean="0"/>
+                        <a:t>Ćwiczenie 0</a:t>
+                      </a:r>
+                      <a:r>
+                        <a:rPr lang="pl-PL" sz="1100" baseline="0" dirty="0" smtClean="0"/>
+                        <a:t> – </a:t>
+                      </a:r>
+                      <a:r>
+                        <a:rPr lang="pl-PL" sz="1100" dirty="0" smtClean="0"/>
+                        <a:t>Wstęp</a:t>
+                      </a:r>
+                      <a:endParaRPr lang="pl-PL" sz="1100" dirty="0"/>
+                    </a:p>
+                  </a:txBody>
+                  <a:tcPr/>
+                </a:tc>
+                <a:tc>
+                  <a:txBody>
+                    <a:bodyPr/>
+                    <a:lstStyle/>
+                    <a:p>
+                      <a:r>
+                        <a:rPr lang="pl-PL" sz="1100" dirty="0" smtClean="0"/>
+                        <a:t>2 punkty</a:t>
+                      </a:r>
+                      <a:endParaRPr lang="pl-PL" sz="1100" dirty="0"/>
+                    </a:p>
+                  </a:txBody>
+                  <a:tcPr/>
+                </a:tc>
+              </a:tr>
+              <a:tr h="0">
+                <a:tc>
+                  <a:txBody>
+                    <a:bodyPr/>
+                    <a:lstStyle/>
+                    <a:p>
+                      <a:r>
+                        <a:rPr lang="pl-PL" sz="1100" dirty="0" smtClean="0"/>
+                        <a:t>Ćwiczenie 1</a:t>
+                      </a:r>
+                      <a:r>
+                        <a:rPr lang="pl-PL" sz="1100" baseline="0" dirty="0" smtClean="0"/>
+                        <a:t> – </a:t>
+                      </a:r>
+                      <a:r>
+                        <a:rPr lang="pl-PL" sz="1100" dirty="0" smtClean="0"/>
+                        <a:t>Narzędzia</a:t>
+                      </a:r>
+                      <a:endParaRPr lang="pl-PL" sz="1100" dirty="0"/>
+                    </a:p>
+                  </a:txBody>
+                  <a:tcPr/>
+                </a:tc>
+                <a:tc>
+                  <a:txBody>
+                    <a:bodyPr/>
+                    <a:lstStyle/>
+                    <a:p>
+                      <a:r>
+                        <a:rPr lang="pl-PL" sz="1100" dirty="0" smtClean="0"/>
+                        <a:t>10 punktów</a:t>
+                      </a:r>
+                      <a:endParaRPr lang="pl-PL" sz="1100" dirty="0"/>
+                    </a:p>
+                  </a:txBody>
+                  <a:tcPr/>
+                </a:tc>
+              </a:tr>
+              <a:tr h="379569">
+                <a:tc>
+                  <a:txBody>
+                    <a:bodyPr/>
+                    <a:lstStyle/>
+                    <a:p>
+                      <a:r>
+                        <a:rPr lang="pl-PL" sz="1100" dirty="0" smtClean="0"/>
+                        <a:t>Ćwiczenie 2</a:t>
+                      </a:r>
+                      <a:r>
+                        <a:rPr lang="pl-PL" sz="1100" baseline="0" dirty="0" smtClean="0"/>
+                        <a:t> - </a:t>
+                      </a:r>
+                      <a:r>
+                        <a:rPr lang="pl-PL" sz="1100" dirty="0" err="1" smtClean="0"/>
+                        <a:t>Progr</a:t>
+                      </a:r>
+                      <a:r>
+                        <a:rPr lang="pl-PL" sz="1100" dirty="0" smtClean="0"/>
+                        <a:t>. Współbieżne</a:t>
+                      </a:r>
+                      <a:endParaRPr lang="pl-PL" sz="1100" dirty="0"/>
+                    </a:p>
+                  </a:txBody>
+                  <a:tcPr/>
+                </a:tc>
+                <a:tc>
+                  <a:txBody>
+                    <a:bodyPr/>
+                    <a:lstStyle/>
+                    <a:p>
+                      <a:r>
+                        <a:rPr lang="pl-PL" sz="1100" dirty="0" smtClean="0"/>
+                        <a:t>15 punktów</a:t>
+                      </a:r>
+                      <a:endParaRPr lang="pl-PL" sz="1100" dirty="0"/>
+                    </a:p>
+                  </a:txBody>
+                  <a:tcPr/>
+                </a:tc>
+              </a:tr>
+              <a:tr h="379569">
+                <a:tc>
+                  <a:txBody>
+                    <a:bodyPr/>
+                    <a:lstStyle/>
+                    <a:p>
+                      <a:r>
+                        <a:rPr lang="pl-PL" sz="1100" dirty="0" smtClean="0"/>
+                        <a:t>Ćwiczenie 3</a:t>
+                      </a:r>
+                      <a:r>
+                        <a:rPr lang="pl-PL" sz="1100" baseline="0" dirty="0" smtClean="0"/>
+                        <a:t> - </a:t>
+                      </a:r>
+                      <a:r>
+                        <a:rPr lang="pl-PL" sz="1100" dirty="0" smtClean="0"/>
+                        <a:t>Komunikacja </a:t>
+                      </a:r>
+                      <a:r>
+                        <a:rPr lang="pl-PL" sz="1100" dirty="0" err="1" smtClean="0"/>
+                        <a:t>Synchr</a:t>
+                      </a:r>
+                      <a:r>
+                        <a:rPr lang="pl-PL" sz="1100" dirty="0" smtClean="0"/>
+                        <a:t>.</a:t>
+                      </a:r>
+                      <a:endParaRPr lang="pl-PL" sz="1100" dirty="0"/>
+                    </a:p>
+                  </a:txBody>
+                  <a:tcPr/>
+                </a:tc>
+                <a:tc>
+                  <a:txBody>
+                    <a:bodyPr/>
+                    <a:lstStyle/>
+                    <a:p>
+                      <a:r>
+                        <a:rPr lang="pl-PL" sz="1100" dirty="0" smtClean="0"/>
+                        <a:t>15 punktów</a:t>
+                      </a:r>
+                      <a:endParaRPr lang="pl-PL" sz="1100" dirty="0"/>
+                    </a:p>
+                  </a:txBody>
+                  <a:tcPr/>
+                </a:tc>
+              </a:tr>
+              <a:tr h="379569">
+                <a:tc>
+                  <a:txBody>
+                    <a:bodyPr/>
+                    <a:lstStyle/>
+                    <a:p>
+                      <a:r>
+                        <a:rPr lang="pl-PL" sz="1100" dirty="0" smtClean="0"/>
+                        <a:t>Ćwiczenie 4</a:t>
+                      </a:r>
+                      <a:r>
+                        <a:rPr lang="pl-PL" sz="1100" baseline="0" dirty="0" smtClean="0"/>
+                        <a:t> - </a:t>
+                      </a:r>
+                      <a:r>
+                        <a:rPr lang="pl-PL" sz="1100" dirty="0" smtClean="0"/>
+                        <a:t>Komunikacja </a:t>
+                      </a:r>
+                      <a:r>
+                        <a:rPr lang="pl-PL" sz="1100" dirty="0" err="1" smtClean="0"/>
+                        <a:t>Asynchr</a:t>
+                      </a:r>
+                      <a:r>
+                        <a:rPr lang="pl-PL" sz="1100" dirty="0" smtClean="0"/>
+                        <a:t>.</a:t>
+                      </a:r>
+                    </a:p>
+                  </a:txBody>
+                  <a:tcPr/>
+                </a:tc>
+                <a:tc>
+                  <a:txBody>
+                    <a:bodyPr/>
+                    <a:lstStyle/>
+                    <a:p>
+                      <a:r>
+                        <a:rPr lang="pl-PL" sz="1100" dirty="0" smtClean="0"/>
+                        <a:t>15 punktów</a:t>
+                      </a:r>
+                      <a:endParaRPr lang="pl-PL" sz="1100" dirty="0"/>
+                    </a:p>
+                  </a:txBody>
+                  <a:tcPr/>
+                </a:tc>
+              </a:tr>
+              <a:tr h="379569">
+                <a:tc>
+                  <a:txBody>
+                    <a:bodyPr/>
+                    <a:lstStyle/>
+                    <a:p>
+                      <a:r>
+                        <a:rPr lang="pl-PL" sz="1100" dirty="0" smtClean="0"/>
+                        <a:t>Ćwiczenie</a:t>
+                      </a:r>
+                      <a:r>
+                        <a:rPr lang="pl-PL" sz="1100" baseline="0" dirty="0" smtClean="0"/>
+                        <a:t> 5 - Baza danych</a:t>
+                      </a:r>
+                      <a:endParaRPr lang="pl-PL" sz="1100" dirty="0" smtClean="0"/>
+                    </a:p>
+                  </a:txBody>
+                  <a:tcPr/>
+                </a:tc>
+                <a:tc>
+                  <a:txBody>
+                    <a:bodyPr/>
+                    <a:lstStyle/>
+                    <a:p>
+                      <a:r>
+                        <a:rPr lang="pl-PL" sz="1100" dirty="0" smtClean="0"/>
+                        <a:t>15 punktów</a:t>
+                      </a:r>
+                      <a:endParaRPr lang="pl-PL" sz="1100" dirty="0"/>
+                    </a:p>
+                  </a:txBody>
+                  <a:tcPr/>
+                </a:tc>
+              </a:tr>
+              <a:tr h="347938">
+                <a:tc gridSpan="2">
+                  <a:txBody>
+                    <a:bodyPr/>
+                    <a:lstStyle/>
+                    <a:p>
+                      <a:pPr algn="ctr"/>
+                      <a:r>
+                        <a:rPr lang="pl-PL" sz="2000" b="1" dirty="0" smtClean="0">
+                          <a:solidFill>
+                            <a:srgbClr val="00B050"/>
+                          </a:solidFill>
+                        </a:rPr>
+                        <a:t>LUB</a:t>
+                      </a:r>
+                    </a:p>
+                  </a:txBody>
+                  <a:tcPr/>
+                </a:tc>
+                <a:tc hMerge="1">
+                  <a:txBody>
+                    <a:bodyPr/>
+                    <a:lstStyle/>
+                    <a:p>
+                      <a:endParaRPr lang="pl-PL" sz="1000" dirty="0"/>
+                    </a:p>
+                  </a:txBody>
+                  <a:tcPr/>
+                </a:tc>
+              </a:tr>
+              <a:tr h="379569">
+                <a:tc>
+                  <a:txBody>
+                    <a:bodyPr/>
+                    <a:lstStyle/>
+                    <a:p>
+                      <a:r>
+                        <a:rPr lang="pl-PL" sz="1100" dirty="0" smtClean="0"/>
+                        <a:t>Projekt</a:t>
+                      </a:r>
+                    </a:p>
+                  </a:txBody>
+                  <a:tcPr/>
+                </a:tc>
+                <a:tc>
+                  <a:txBody>
+                    <a:bodyPr/>
+                    <a:lstStyle/>
+                    <a:p>
+                      <a:r>
+                        <a:rPr lang="pl-PL" sz="1100" dirty="0" smtClean="0"/>
+                        <a:t>100</a:t>
+                      </a:r>
+                      <a:r>
+                        <a:rPr lang="pl-PL" sz="1100" baseline="0" dirty="0" smtClean="0"/>
+                        <a:t> </a:t>
+                      </a:r>
+                      <a:r>
+                        <a:rPr lang="pl-PL" sz="1100" dirty="0" smtClean="0"/>
+                        <a:t>punktów</a:t>
+                      </a:r>
+                      <a:endParaRPr lang="pl-PL" sz="1100" dirty="0"/>
+                    </a:p>
+                  </a:txBody>
+                  <a:tcPr/>
+                </a:tc>
+              </a:tr>
+            </a:tbl>
+          </a:graphicData>
+        </a:graphic>
+      </p:graphicFrame>
+      <p:graphicFrame>
+        <p:nvGraphicFramePr>
+          <p:cNvPr id="5" name="Tabela 4"/>
+          <p:cNvGraphicFramePr>
+            <a:graphicFrameLocks noGrp="1"/>
+          </p:cNvGraphicFramePr>
+          <p:nvPr>
+            <p:extLst>
+              <p:ext uri="{D42A27DB-BD31-4B8C-83A1-F6EECF244321}">
+                <p14:modId xmlns:p14="http://schemas.microsoft.com/office/powerpoint/2010/main" val="3857556710"/>
+              </p:ext>
+            </p:extLst>
+          </p:nvPr>
+        </p:nvGraphicFramePr>
+        <p:xfrm>
+          <a:off x="6040438" y="1655945"/>
+          <a:ext cx="2564540" cy="3179480"/>
+        </p:xfrm>
+        <a:graphic>
+          <a:graphicData uri="http://schemas.openxmlformats.org/drawingml/2006/table">
+            <a:tbl>
+              <a:tblPr firstRow="1" bandRow="1">
+                <a:tableStyleId>{5C22544A-7EE6-4342-B048-85BDC9FD1C3A}</a:tableStyleId>
+              </a:tblPr>
+              <a:tblGrid>
+                <a:gridCol w="1282270"/>
+                <a:gridCol w="1282270"/>
+              </a:tblGrid>
+              <a:tr h="634850">
+                <a:tc>
+                  <a:txBody>
+                    <a:bodyPr/>
+                    <a:lstStyle/>
+                    <a:p>
+                      <a:r>
+                        <a:rPr lang="pl-PL" dirty="0" smtClean="0"/>
+                        <a:t>Liczba punktów</a:t>
+                      </a:r>
+                      <a:endParaRPr lang="pl-PL" dirty="0"/>
+                    </a:p>
+                  </a:txBody>
+                  <a:tcPr/>
+                </a:tc>
+                <a:tc>
+                  <a:txBody>
+                    <a:bodyPr/>
+                    <a:lstStyle/>
+                    <a:p>
+                      <a:r>
+                        <a:rPr lang="pl-PL" dirty="0" smtClean="0"/>
+                        <a:t>Ocena</a:t>
+                      </a:r>
+                      <a:endParaRPr lang="pl-PL" dirty="0"/>
+                    </a:p>
+                  </a:txBody>
+                  <a:tcPr/>
+                </a:tc>
+              </a:tr>
+              <a:tr h="634850">
+                <a:tc>
+                  <a:txBody>
+                    <a:bodyPr/>
+                    <a:lstStyle/>
+                    <a:p>
+                      <a:r>
+                        <a:rPr lang="pl-PL" sz="1400" dirty="0" smtClean="0"/>
+                        <a:t>&lt;60</a:t>
+                      </a:r>
+                      <a:endParaRPr lang="pl-PL" sz="1400" dirty="0"/>
+                    </a:p>
+                  </a:txBody>
+                  <a:tcPr/>
+                </a:tc>
+                <a:tc>
+                  <a:txBody>
+                    <a:bodyPr/>
+                    <a:lstStyle/>
+                    <a:p>
+                      <a:r>
+                        <a:rPr lang="pl-PL" sz="1400" dirty="0" smtClean="0"/>
+                        <a:t>Przedmiot</a:t>
+                      </a:r>
+                      <a:r>
+                        <a:rPr lang="pl-PL" sz="1400" baseline="0" dirty="0" smtClean="0"/>
+                        <a:t> niezaliczony</a:t>
+                      </a:r>
+                      <a:endParaRPr lang="pl-PL" sz="1400" dirty="0"/>
+                    </a:p>
+                  </a:txBody>
+                  <a:tcPr/>
+                </a:tc>
+              </a:tr>
+              <a:tr h="634850">
+                <a:tc>
+                  <a:txBody>
+                    <a:bodyPr/>
+                    <a:lstStyle/>
+                    <a:p>
+                      <a:r>
+                        <a:rPr lang="pl-PL" sz="1400" dirty="0" smtClean="0"/>
+                        <a:t>60 – 70</a:t>
+                      </a:r>
+                      <a:endParaRPr lang="pl-PL" sz="1400" dirty="0"/>
+                    </a:p>
+                  </a:txBody>
+                  <a:tcPr/>
+                </a:tc>
+                <a:tc>
+                  <a:txBody>
+                    <a:bodyPr/>
+                    <a:lstStyle/>
+                    <a:p>
+                      <a:r>
+                        <a:rPr lang="pl-PL" sz="1400" dirty="0" smtClean="0"/>
+                        <a:t>Dostateczna</a:t>
+                      </a:r>
+                      <a:endParaRPr lang="pl-PL" sz="1400" dirty="0"/>
+                    </a:p>
+                  </a:txBody>
+                  <a:tcPr/>
+                </a:tc>
+              </a:tr>
+              <a:tr h="634850">
+                <a:tc>
+                  <a:txBody>
+                    <a:bodyPr/>
+                    <a:lstStyle/>
+                    <a:p>
+                      <a:r>
+                        <a:rPr lang="pl-PL" sz="1400" dirty="0" smtClean="0"/>
+                        <a:t>70</a:t>
+                      </a:r>
+                      <a:r>
+                        <a:rPr lang="pl-PL" sz="1400" baseline="0" dirty="0" smtClean="0"/>
+                        <a:t> – 80</a:t>
+                      </a:r>
+                      <a:endParaRPr lang="pl-PL" sz="1400" dirty="0"/>
+                    </a:p>
+                  </a:txBody>
+                  <a:tcPr/>
+                </a:tc>
+                <a:tc>
+                  <a:txBody>
+                    <a:bodyPr/>
+                    <a:lstStyle/>
+                    <a:p>
+                      <a:r>
+                        <a:rPr lang="pl-PL" sz="1400" dirty="0" smtClean="0"/>
+                        <a:t>Dobra</a:t>
+                      </a:r>
+                      <a:endParaRPr lang="pl-PL" sz="1400" dirty="0"/>
+                    </a:p>
+                  </a:txBody>
+                  <a:tcPr/>
+                </a:tc>
+              </a:tr>
+              <a:tr h="634850">
+                <a:tc>
+                  <a:txBody>
+                    <a:bodyPr/>
+                    <a:lstStyle/>
+                    <a:p>
+                      <a:r>
+                        <a:rPr lang="pl-PL" sz="1400" dirty="0" smtClean="0"/>
+                        <a:t>80 - 100</a:t>
+                      </a:r>
+                      <a:endParaRPr lang="pl-PL" sz="1400" dirty="0"/>
+                    </a:p>
+                  </a:txBody>
+                  <a:tcPr/>
+                </a:tc>
+                <a:tc>
+                  <a:txBody>
+                    <a:bodyPr/>
+                    <a:lstStyle/>
+                    <a:p>
+                      <a:r>
+                        <a:rPr lang="pl-PL" sz="1400" dirty="0" smtClean="0"/>
+                        <a:t>Bardzo</a:t>
+                      </a:r>
+                      <a:r>
+                        <a:rPr lang="pl-PL" sz="1400" baseline="0" dirty="0" smtClean="0"/>
+                        <a:t> dobra</a:t>
+                      </a:r>
+                      <a:endParaRPr lang="pl-PL" sz="1400" dirty="0"/>
+                    </a:p>
+                  </a:txBody>
+                  <a:tcPr/>
+                </a:tc>
+              </a:tr>
+            </a:tbl>
+          </a:graphicData>
+        </a:graphic>
+      </p:graphicFrame>
       <p:sp>
         <p:nvSpPr>
-          <p:cNvPr id="7" name="pole tekstowe 6"/>
+          <p:cNvPr id="4" name="pole tekstowe 3"/>
           <p:cNvSpPr txBox="1"/>
           <p:nvPr/>
         </p:nvSpPr>
         <p:spPr bwMode="auto">
           <a:xfrm>
-            <a:off x="712099" y="1359462"/>
-            <a:ext cx="7744078" cy="4601260"/>
+            <a:off x="790575" y="5470216"/>
+            <a:ext cx="7276031" cy="146194"/>
           </a:xfrm>
           <a:prstGeom prst="rect">
             <a:avLst/>
@@ -25444,533 +27312,10 @@
           </a:ln>
         </p:spPr>
         <p:txBody>
-          <a:bodyPr wrap="square" lIns="0" tIns="0" rIns="0" bIns="0" rtlCol="0">
+          <a:bodyPr wrap="none" lIns="0" tIns="0" rIns="0" bIns="0" rtlCol="0">
             <a:spAutoFit/>
           </a:bodyPr>
           <a:lstStyle/>
-          <a:p>
-            <a:pPr marL="171450" indent="-171450">
-              <a:spcBef>
-                <a:spcPts val="100"/>
-              </a:spcBef>
-              <a:spcAft>
-                <a:spcPts val="100"/>
-              </a:spcAft>
-              <a:buFont typeface="Arial" panose="020B0604020202020204" pitchFamily="34" charset="0"/>
-              <a:buChar char="•"/>
-            </a:pPr>
-            <a:r>
-              <a:rPr lang="pl-PL" sz="1600" dirty="0" smtClean="0"/>
-              <a:t>Załóż konto na </a:t>
-            </a:r>
-            <a:r>
-              <a:rPr lang="pl-PL" sz="1600" dirty="0" smtClean="0">
-                <a:hlinkClick r:id="rId2"/>
-              </a:rPr>
-              <a:t>https://github.com</a:t>
-            </a:r>
-            <a:r>
-              <a:rPr lang="pl-PL" sz="1600" dirty="0" smtClean="0"/>
-              <a:t> (plan </a:t>
-            </a:r>
-            <a:r>
-              <a:rPr lang="pl-PL" sz="1600" dirty="0" err="1" smtClean="0"/>
-              <a:t>free</a:t>
-            </a:r>
-            <a:r>
-              <a:rPr lang="pl-PL" sz="1600" dirty="0" smtClean="0"/>
-              <a:t> w zupełności wystarczy).</a:t>
-            </a:r>
-          </a:p>
-          <a:p>
-            <a:pPr marL="171450" indent="-171450">
-              <a:spcBef>
-                <a:spcPts val="100"/>
-              </a:spcBef>
-              <a:spcAft>
-                <a:spcPts val="100"/>
-              </a:spcAft>
-              <a:buFont typeface="Arial" panose="020B0604020202020204" pitchFamily="34" charset="0"/>
-              <a:buChar char="•"/>
-            </a:pPr>
-            <a:r>
-              <a:rPr lang="pl-PL" sz="900" dirty="0" smtClean="0"/>
-              <a:t>Przejdź tutorial (15 minut): </a:t>
-            </a:r>
-            <a:r>
-              <a:rPr lang="pl-PL" sz="900" dirty="0" smtClean="0">
-                <a:hlinkClick r:id="rId3"/>
-              </a:rPr>
-              <a:t>https</a:t>
-            </a:r>
-            <a:r>
-              <a:rPr lang="pl-PL" sz="900" dirty="0">
-                <a:hlinkClick r:id="rId3"/>
-              </a:rPr>
-              <a:t>://</a:t>
-            </a:r>
-            <a:r>
-              <a:rPr lang="pl-PL" sz="900" dirty="0" smtClean="0">
-                <a:hlinkClick r:id="rId3"/>
-              </a:rPr>
-              <a:t>try.github.io</a:t>
-            </a:r>
-            <a:r>
-              <a:rPr lang="pl-PL" sz="900" dirty="0" smtClean="0"/>
-              <a:t> (OPCJONALNIE)</a:t>
-            </a:r>
-            <a:endParaRPr lang="pl-PL" sz="900" dirty="0" smtClean="0"/>
-          </a:p>
-          <a:p>
-            <a:pPr marL="171450" indent="-171450">
-              <a:spcBef>
-                <a:spcPts val="100"/>
-              </a:spcBef>
-              <a:spcAft>
-                <a:spcPts val="100"/>
-              </a:spcAft>
-              <a:buFont typeface="Arial" panose="020B0604020202020204" pitchFamily="34" charset="0"/>
-              <a:buChar char="•"/>
-            </a:pPr>
-            <a:endParaRPr lang="pl-PL" sz="1600" dirty="0" smtClean="0"/>
-          </a:p>
-          <a:p>
-            <a:pPr marL="171450" indent="-171450">
-              <a:spcBef>
-                <a:spcPts val="100"/>
-              </a:spcBef>
-              <a:spcAft>
-                <a:spcPts val="100"/>
-              </a:spcAft>
-              <a:buFont typeface="Arial" panose="020B0604020202020204" pitchFamily="34" charset="0"/>
-              <a:buChar char="•"/>
-            </a:pPr>
-            <a:r>
-              <a:rPr lang="pl-PL" sz="1600" dirty="0" smtClean="0"/>
-              <a:t>Zrób kopię (</a:t>
-            </a:r>
-            <a:r>
-              <a:rPr lang="pl-PL" sz="1600" dirty="0" err="1" smtClean="0"/>
-              <a:t>fork</a:t>
-            </a:r>
-            <a:r>
-              <a:rPr lang="pl-PL" sz="1600" dirty="0" smtClean="0"/>
-              <a:t>) repozytorium </a:t>
-            </a:r>
-            <a:r>
-              <a:rPr lang="pl-PL" sz="1600" dirty="0">
-                <a:hlinkClick r:id="rId4"/>
-              </a:rPr>
-              <a:t>https://</a:t>
-            </a:r>
-            <a:r>
-              <a:rPr lang="pl-PL" sz="1600" dirty="0" smtClean="0">
-                <a:hlinkClick r:id="rId4"/>
-              </a:rPr>
-              <a:t>github.com/wdsr/exercise0</a:t>
-            </a:r>
-            <a:endParaRPr lang="pl-PL" sz="1600" dirty="0" smtClean="0"/>
-          </a:p>
-          <a:p>
-            <a:pPr marL="628650" lvl="1" indent="-171450">
-              <a:spcBef>
-                <a:spcPts val="100"/>
-              </a:spcBef>
-              <a:spcAft>
-                <a:spcPts val="100"/>
-              </a:spcAft>
-              <a:buFont typeface="Arial" panose="020B0604020202020204" pitchFamily="34" charset="0"/>
-              <a:buChar char="•"/>
-            </a:pPr>
-            <a:r>
-              <a:rPr lang="pl-PL" sz="1100" dirty="0" smtClean="0"/>
-              <a:t>Zobacz zrzut ekranu na następnym slajdzie</a:t>
-            </a:r>
-            <a:endParaRPr lang="pl-PL" sz="1100" dirty="0"/>
-          </a:p>
-          <a:p>
-            <a:pPr marL="171450" indent="-171450">
-              <a:spcBef>
-                <a:spcPts val="100"/>
-              </a:spcBef>
-              <a:spcAft>
-                <a:spcPts val="100"/>
-              </a:spcAft>
-              <a:buFont typeface="Arial" panose="020B0604020202020204" pitchFamily="34" charset="0"/>
-              <a:buChar char="•"/>
-            </a:pPr>
-            <a:r>
-              <a:rPr lang="pl-PL" sz="1600" dirty="0" smtClean="0"/>
-              <a:t>Sklonuj </a:t>
-            </a:r>
-            <a:r>
-              <a:rPr lang="pl-PL" sz="1600" dirty="0"/>
-              <a:t>repozytorium </a:t>
-            </a:r>
-            <a:r>
-              <a:rPr lang="pl-PL" sz="1600" dirty="0" smtClean="0">
-                <a:hlinkClick r:id="rId4"/>
-              </a:rPr>
-              <a:t>https</a:t>
-            </a:r>
-            <a:r>
-              <a:rPr lang="pl-PL" sz="1600" dirty="0">
-                <a:hlinkClick r:id="rId4"/>
-              </a:rPr>
-              <a:t>://</a:t>
-            </a:r>
-            <a:r>
-              <a:rPr lang="pl-PL" sz="1600" dirty="0" smtClean="0">
-                <a:hlinkClick r:id="rId4"/>
-              </a:rPr>
-              <a:t>github.com/&lt;usr&gt;/exercise0</a:t>
-            </a:r>
-            <a:endParaRPr lang="pl-PL" sz="1600" dirty="0" smtClean="0"/>
-          </a:p>
-          <a:p>
-            <a:pPr marL="628650" lvl="1" indent="-171450">
-              <a:spcBef>
-                <a:spcPts val="100"/>
-              </a:spcBef>
-              <a:spcAft>
-                <a:spcPts val="100"/>
-              </a:spcAft>
-              <a:buFont typeface="Arial" panose="020B0604020202020204" pitchFamily="34" charset="0"/>
-              <a:buChar char="•"/>
-            </a:pPr>
-            <a:r>
-              <a:rPr lang="pl-PL" sz="1600" dirty="0" smtClean="0">
-                <a:solidFill>
-                  <a:srgbClr val="0070C0"/>
-                </a:solidFill>
-              </a:rPr>
-              <a:t>git </a:t>
-            </a:r>
-            <a:r>
-              <a:rPr lang="pl-PL" sz="1600" dirty="0">
-                <a:solidFill>
-                  <a:srgbClr val="0070C0"/>
-                </a:solidFill>
-              </a:rPr>
-              <a:t>clone </a:t>
-            </a:r>
-            <a:r>
-              <a:rPr lang="pl-PL" sz="1600" dirty="0">
-                <a:solidFill>
-                  <a:srgbClr val="0070C0"/>
-                </a:solidFill>
-                <a:hlinkClick r:id="rId5"/>
-              </a:rPr>
-              <a:t>https://</a:t>
-            </a:r>
-            <a:r>
-              <a:rPr lang="pl-PL" sz="1600" dirty="0" smtClean="0">
-                <a:solidFill>
-                  <a:srgbClr val="0070C0"/>
-                </a:solidFill>
-                <a:hlinkClick r:id="rId5"/>
-              </a:rPr>
-              <a:t>github.com/&lt;usr&gt;/exercise0.git</a:t>
-            </a:r>
-            <a:endParaRPr lang="pl-PL" sz="1600" dirty="0" smtClean="0">
-              <a:solidFill>
-                <a:srgbClr val="0070C0"/>
-              </a:solidFill>
-            </a:endParaRPr>
-          </a:p>
-          <a:p>
-            <a:pPr marL="628650" lvl="1" indent="-171450">
-              <a:spcBef>
-                <a:spcPts val="100"/>
-              </a:spcBef>
-              <a:spcAft>
-                <a:spcPts val="100"/>
-              </a:spcAft>
-              <a:buFont typeface="Arial" panose="020B0604020202020204" pitchFamily="34" charset="0"/>
-              <a:buChar char="•"/>
-            </a:pPr>
-            <a:r>
-              <a:rPr lang="pl-PL" sz="1100" dirty="0"/>
-              <a:t>Zobacz zrzut ekranu na następnym </a:t>
-            </a:r>
-            <a:r>
-              <a:rPr lang="pl-PL" sz="1100" dirty="0" smtClean="0"/>
-              <a:t>slajdzie</a:t>
-            </a:r>
-            <a:endParaRPr lang="pl-PL" sz="1100" dirty="0" smtClean="0"/>
-          </a:p>
-          <a:p>
-            <a:pPr marL="171450" indent="-171450">
-              <a:spcBef>
-                <a:spcPts val="100"/>
-              </a:spcBef>
-              <a:spcAft>
-                <a:spcPts val="100"/>
-              </a:spcAft>
-              <a:buFont typeface="Arial" panose="020B0604020202020204" pitchFamily="34" charset="0"/>
-              <a:buChar char="•"/>
-            </a:pPr>
-            <a:r>
-              <a:rPr lang="pl-PL" sz="1600" dirty="0" smtClean="0"/>
-              <a:t>Zmodyfikuj </a:t>
-            </a:r>
-            <a:r>
-              <a:rPr lang="pl-PL" sz="1600" dirty="0" smtClean="0"/>
-              <a:t>w dowolnym edytorze plik README.md – dopisz link do swojego profilu GitHub na końcu pliku.</a:t>
-            </a:r>
-          </a:p>
-          <a:p>
-            <a:pPr marL="171450" indent="-171450">
-              <a:spcBef>
-                <a:spcPts val="100"/>
-              </a:spcBef>
-              <a:spcAft>
-                <a:spcPts val="100"/>
-              </a:spcAft>
-              <a:buFont typeface="Arial" panose="020B0604020202020204" pitchFamily="34" charset="0"/>
-              <a:buChar char="•"/>
-            </a:pPr>
-            <a:r>
-              <a:rPr lang="pl-PL" sz="1600" dirty="0" smtClean="0"/>
-              <a:t>Wgraj zmodyfikowany plik z powrotem do repozytorium:</a:t>
-            </a:r>
-          </a:p>
-          <a:p>
-            <a:pPr marL="628650" lvl="1" indent="-171450">
-              <a:spcBef>
-                <a:spcPts val="100"/>
-              </a:spcBef>
-              <a:spcAft>
-                <a:spcPts val="100"/>
-              </a:spcAft>
-              <a:buFont typeface="Arial" panose="020B0604020202020204" pitchFamily="34" charset="0"/>
-              <a:buChar char="•"/>
-            </a:pPr>
-            <a:r>
-              <a:rPr lang="pl-PL" sz="1600" dirty="0" smtClean="0">
-                <a:solidFill>
-                  <a:srgbClr val="0070C0"/>
-                </a:solidFill>
-              </a:rPr>
-              <a:t>git </a:t>
-            </a:r>
-            <a:r>
-              <a:rPr lang="pl-PL" sz="1600" dirty="0" err="1" smtClean="0">
-                <a:solidFill>
-                  <a:srgbClr val="0070C0"/>
-                </a:solidFill>
-              </a:rPr>
-              <a:t>add</a:t>
-            </a:r>
-            <a:r>
-              <a:rPr lang="pl-PL" sz="1600" dirty="0" smtClean="0">
-                <a:solidFill>
-                  <a:srgbClr val="0070C0"/>
-                </a:solidFill>
-              </a:rPr>
-              <a:t> README.md</a:t>
-            </a:r>
-          </a:p>
-          <a:p>
-            <a:pPr marL="628650" lvl="1" indent="-171450">
-              <a:spcBef>
-                <a:spcPts val="100"/>
-              </a:spcBef>
-              <a:spcAft>
-                <a:spcPts val="100"/>
-              </a:spcAft>
-              <a:buFont typeface="Arial" panose="020B0604020202020204" pitchFamily="34" charset="0"/>
-              <a:buChar char="•"/>
-            </a:pPr>
-            <a:r>
-              <a:rPr lang="pl-PL" sz="1600" dirty="0" smtClean="0">
-                <a:solidFill>
-                  <a:srgbClr val="0070C0"/>
-                </a:solidFill>
-              </a:rPr>
-              <a:t>git </a:t>
-            </a:r>
-            <a:r>
-              <a:rPr lang="pl-PL" sz="1600" dirty="0" err="1" smtClean="0">
-                <a:solidFill>
-                  <a:srgbClr val="0070C0"/>
-                </a:solidFill>
-              </a:rPr>
-              <a:t>commit</a:t>
-            </a:r>
-            <a:r>
-              <a:rPr lang="pl-PL" sz="1600" dirty="0" smtClean="0">
-                <a:solidFill>
-                  <a:srgbClr val="0070C0"/>
-                </a:solidFill>
-              </a:rPr>
-              <a:t> –m „</a:t>
-            </a:r>
-            <a:r>
-              <a:rPr lang="pl-PL" sz="1600" dirty="0" err="1" smtClean="0">
-                <a:solidFill>
-                  <a:srgbClr val="0070C0"/>
-                </a:solidFill>
-              </a:rPr>
-              <a:t>Added</a:t>
-            </a:r>
-            <a:r>
-              <a:rPr lang="pl-PL" sz="1600" dirty="0" smtClean="0">
-                <a:solidFill>
-                  <a:srgbClr val="0070C0"/>
-                </a:solidFill>
-              </a:rPr>
-              <a:t> </a:t>
-            </a:r>
-            <a:r>
-              <a:rPr lang="pl-PL" sz="1600" dirty="0" err="1" smtClean="0">
-                <a:solidFill>
-                  <a:srgbClr val="0070C0"/>
-                </a:solidFill>
-              </a:rPr>
-              <a:t>new</a:t>
-            </a:r>
-            <a:r>
-              <a:rPr lang="pl-PL" sz="1600" dirty="0" smtClean="0">
-                <a:solidFill>
-                  <a:srgbClr val="0070C0"/>
-                </a:solidFill>
-              </a:rPr>
-              <a:t> profile”</a:t>
-            </a:r>
-          </a:p>
-          <a:p>
-            <a:pPr marL="628650" lvl="1" indent="-171450">
-              <a:spcBef>
-                <a:spcPts val="100"/>
-              </a:spcBef>
-              <a:spcAft>
-                <a:spcPts val="100"/>
-              </a:spcAft>
-              <a:buFont typeface="Arial" panose="020B0604020202020204" pitchFamily="34" charset="0"/>
-              <a:buChar char="•"/>
-            </a:pPr>
-            <a:r>
-              <a:rPr lang="pl-PL" sz="1600" dirty="0" smtClean="0">
-                <a:solidFill>
-                  <a:srgbClr val="0070C0"/>
-                </a:solidFill>
-              </a:rPr>
-              <a:t>git </a:t>
-            </a:r>
-            <a:r>
-              <a:rPr lang="pl-PL" sz="1600" dirty="0" err="1" smtClean="0">
-                <a:solidFill>
-                  <a:srgbClr val="0070C0"/>
-                </a:solidFill>
-              </a:rPr>
-              <a:t>push</a:t>
-            </a:r>
-            <a:endParaRPr lang="pl-PL" sz="1600" dirty="0" smtClean="0"/>
-          </a:p>
-          <a:p>
-            <a:pPr marL="171450" indent="-171450">
-              <a:spcBef>
-                <a:spcPts val="100"/>
-              </a:spcBef>
-              <a:spcAft>
-                <a:spcPts val="100"/>
-              </a:spcAft>
-              <a:buFont typeface="Arial" panose="020B0604020202020204" pitchFamily="34" charset="0"/>
-              <a:buChar char="•"/>
-            </a:pPr>
-            <a:r>
-              <a:rPr lang="pl-PL" sz="900" dirty="0" smtClean="0"/>
-              <a:t>Git </a:t>
-            </a:r>
-            <a:r>
-              <a:rPr lang="pl-PL" sz="900" dirty="0" err="1" smtClean="0"/>
-              <a:t>cheat</a:t>
-            </a:r>
-            <a:r>
-              <a:rPr lang="pl-PL" sz="900" dirty="0" smtClean="0"/>
-              <a:t> </a:t>
-            </a:r>
-            <a:r>
-              <a:rPr lang="pl-PL" sz="900" dirty="0" err="1" smtClean="0"/>
-              <a:t>sheet</a:t>
-            </a:r>
-            <a:r>
-              <a:rPr lang="pl-PL" sz="900" dirty="0" smtClean="0"/>
-              <a:t>: </a:t>
-            </a:r>
-            <a:r>
-              <a:rPr lang="pl-PL" sz="900" dirty="0" smtClean="0">
-                <a:hlinkClick r:id="rId6"/>
-              </a:rPr>
-              <a:t>https</a:t>
-            </a:r>
-            <a:r>
-              <a:rPr lang="pl-PL" sz="900" dirty="0">
-                <a:hlinkClick r:id="rId6"/>
-              </a:rPr>
-              <a:t>://</a:t>
-            </a:r>
-            <a:r>
-              <a:rPr lang="pl-PL" sz="900" dirty="0" smtClean="0">
-                <a:hlinkClick r:id="rId6"/>
-              </a:rPr>
-              <a:t>training.github.com/kit/downloads/github-git-cheat-sheet.pdf</a:t>
-            </a:r>
-            <a:endParaRPr lang="pl-PL" sz="900" dirty="0" smtClean="0"/>
-          </a:p>
-          <a:p>
-            <a:pPr marL="171450" indent="-171450">
-              <a:spcBef>
-                <a:spcPts val="100"/>
-              </a:spcBef>
-              <a:spcAft>
-                <a:spcPts val="100"/>
-              </a:spcAft>
-              <a:buFont typeface="Arial" panose="020B0604020202020204" pitchFamily="34" charset="0"/>
-              <a:buChar char="•"/>
-            </a:pPr>
-            <a:endParaRPr lang="pl-PL" sz="900" dirty="0" smtClean="0"/>
-          </a:p>
-          <a:p>
-            <a:pPr marL="171450" indent="-171450">
-              <a:spcBef>
-                <a:spcPts val="100"/>
-              </a:spcBef>
-              <a:spcAft>
-                <a:spcPts val="100"/>
-              </a:spcAft>
-              <a:buFont typeface="Arial" panose="020B0604020202020204" pitchFamily="34" charset="0"/>
-              <a:buChar char="•"/>
-            </a:pPr>
-            <a:endParaRPr lang="pl-PL" sz="1100" dirty="0" smtClean="0"/>
-          </a:p>
-          <a:p>
-            <a:pPr marL="171450" indent="-171450">
-              <a:spcBef>
-                <a:spcPts val="100"/>
-              </a:spcBef>
-              <a:spcAft>
-                <a:spcPts val="100"/>
-              </a:spcAft>
-              <a:buFont typeface="Arial" panose="020B0604020202020204" pitchFamily="34" charset="0"/>
-              <a:buChar char="•"/>
-            </a:pPr>
-            <a:endParaRPr lang="pl-PL" sz="1100" dirty="0" smtClean="0"/>
-          </a:p>
-          <a:p>
-            <a:pPr marL="171450" indent="-171450">
-              <a:spcBef>
-                <a:spcPts val="100"/>
-              </a:spcBef>
-              <a:spcAft>
-                <a:spcPts val="100"/>
-              </a:spcAft>
-              <a:buFont typeface="Arial" panose="020B0604020202020204" pitchFamily="34" charset="0"/>
-              <a:buChar char="•"/>
-            </a:pPr>
-            <a:endParaRPr lang="pl-PL" sz="1100" dirty="0"/>
-          </a:p>
           <a:p>
             <a:pPr>
               <a:spcBef>
@@ -25980,14 +27325,30 @@
                 <a:spcPts val="100"/>
               </a:spcAft>
             </a:pPr>
-            <a:endParaRPr lang="pl-PL" sz="1100" dirty="0" smtClean="0"/>
+            <a:r>
+              <a:rPr lang="pl-PL" sz="950" b="1" dirty="0" smtClean="0"/>
+              <a:t>Ważne:</a:t>
+            </a:r>
+            <a:r>
+              <a:rPr lang="pl-PL" sz="950" dirty="0" smtClean="0"/>
+              <a:t> Podstawą uznania ćwiczenia / projektu za zaliczone jest zawsze kod znajdujący się w GitHubie. Każdy pracuje na swoim </a:t>
+            </a:r>
+            <a:r>
+              <a:rPr lang="pl-PL" sz="950" dirty="0" err="1" smtClean="0"/>
+              <a:t>forku</a:t>
+            </a:r>
+            <a:r>
+              <a:rPr lang="pl-PL" sz="950" dirty="0" smtClean="0"/>
+              <a:t>.</a:t>
+            </a:r>
+            <a:endParaRPr lang="pl-PL" sz="950" dirty="0"/>
           </a:p>
         </p:txBody>
       </p:sp>
     </p:spTree>
     <p:extLst>
       <p:ext uri="{BB962C8B-B14F-4D97-AF65-F5344CB8AC3E}">
-        <p14:creationId xmlns:p14="http://schemas.microsoft.com/office/powerpoint/2010/main" val="2253719762"/>
+        <p14:creationId xmlns:p14="http://schemas.microsoft.com/office/powerpoint/2010/main" val="393837832"/>
       </p:ext>
     </p:extLst>
   </p:cSld>
@@ -26538,7 +27899,7 @@
   </a:extraClrSchemeLst>
   <a:extLst>
     <a:ext uri="{05A4C25C-085E-4340-85A3-A5531E510DB2}">
-      <thm15:themeFamily xmlns="" xmlns:thm15="http://schemas.microsoft.com/office/thememl/2012/main" name="v5_GFT_MASTER.potx" id="{0499BC36-F504-48FE-B624-679107AB1F18}" vid="{304785FB-A37F-4ED5-A32C-8677DED9BBC6}"/>
+      <thm15:themeFamily xmlns:thm15="http://schemas.microsoft.com/office/thememl/2012/main" xmlns="" name="v5_GFT_MASTER.potx" id="{0499BC36-F504-48FE-B624-679107AB1F18}" vid="{304785FB-A37F-4ED5-A32C-8677DED9BBC6}"/>
     </a:ext>
   </a:extLst>
 </a:theme>
@@ -27111,21 +28472,6 @@
 </file>
 
 <file path=customXml/item1.xml><?xml version="1.0" encoding="utf-8"?>
-<?mso-contentType ?>
-<FormTemplates xmlns="http://schemas.microsoft.com/sharepoint/v3/contenttype/forms">
-  <Display>DocumentLibraryForm</Display>
-  <Edit>DocumentLibraryForm</Edit>
-  <New>DocumentLibraryForm</New>
-</FormTemplates>
-</file>
-
-<file path=customXml/item2.xml><?xml version="1.0" encoding="utf-8"?>
-<p:properties xmlns:p="http://schemas.microsoft.com/office/2006/metadata/properties" xmlns:xsi="http://www.w3.org/2001/XMLSchema-instance" xmlns:pc="http://schemas.microsoft.com/office/infopath/2007/PartnerControls">
-  <documentManagement/>
-</p:properties>
-</file>
-
-<file path=customXml/item3.xml><?xml version="1.0" encoding="utf-8"?>
 <ct:contentTypeSchema xmlns:ct="http://schemas.microsoft.com/office/2006/metadata/contentType" xmlns:ma="http://schemas.microsoft.com/office/2006/metadata/properties/metaAttributes" ct:_="" ma:_="" ma:contentTypeName="Dokument" ma:contentTypeID="0x010100AA54360A2A4C9D41BAEAEC5B88091E96" ma:contentTypeVersion="0" ma:contentTypeDescription="Ein neues Dokument erstellen." ma:contentTypeScope="" ma:versionID="adbe31085c672446fb9e5148d79a6dc6">
   <xsd:schema xmlns:xsd="http://www.w3.org/2001/XMLSchema" xmlns:xs="http://www.w3.org/2001/XMLSchema" xmlns:p="http://schemas.microsoft.com/office/2006/metadata/properties" targetNamespace="http://schemas.microsoft.com/office/2006/metadata/properties" ma:root="true" ma:fieldsID="cb715de677b26ad619381b53932d724a">
     <xsd:element name="properties">
@@ -27239,30 +28585,22 @@
 </ct:contentTypeSchema>
 </file>
 
-<file path=customXml/itemProps1.xml><?xml version="1.0" encoding="utf-8"?>
-<ds:datastoreItem xmlns:ds="http://schemas.openxmlformats.org/officeDocument/2006/customXml" ds:itemID="{A99115DC-C02A-4EF3-990D-5FF7CC0EE91A}">
-  <ds:schemaRefs>
-    <ds:schemaRef ds:uri="http://schemas.microsoft.com/sharepoint/v3/contenttype/forms"/>
-  </ds:schemaRefs>
-</ds:datastoreItem>
+<file path=customXml/item2.xml><?xml version="1.0" encoding="utf-8"?>
+<p:properties xmlns:p="http://schemas.microsoft.com/office/2006/metadata/properties" xmlns:xsi="http://www.w3.org/2001/XMLSchema-instance" xmlns:pc="http://schemas.microsoft.com/office/infopath/2007/PartnerControls">
+  <documentManagement/>
+</p:properties>
 </file>
 
-<file path=customXml/itemProps2.xml><?xml version="1.0" encoding="utf-8"?>
-<ds:datastoreItem xmlns:ds="http://schemas.openxmlformats.org/officeDocument/2006/customXml" ds:itemID="{5405BF3B-1233-4D26-8BBF-BED295340DF6}">
-  <ds:schemaRefs>
-    <ds:schemaRef ds:uri="http://schemas.microsoft.com/office/infopath/2007/PartnerControls"/>
-    <ds:schemaRef ds:uri="http://purl.org/dc/elements/1.1/"/>
-    <ds:schemaRef ds:uri="http://schemas.microsoft.com/office/2006/metadata/properties"/>
-    <ds:schemaRef ds:uri="http://purl.org/dc/terms/"/>
-    <ds:schemaRef ds:uri="http://schemas.microsoft.com/office/2006/documentManagement/types"/>
-    <ds:schemaRef ds:uri="http://purl.org/dc/dcmitype/"/>
-    <ds:schemaRef ds:uri="http://schemas.openxmlformats.org/package/2006/metadata/core-properties"/>
-    <ds:schemaRef ds:uri="http://www.w3.org/XML/1998/namespace"/>
-  </ds:schemaRefs>
-</ds:datastoreItem>
+<file path=customXml/item3.xml><?xml version="1.0" encoding="utf-8"?>
+<?mso-contentType ?>
+<FormTemplates xmlns="http://schemas.microsoft.com/sharepoint/v3/contenttype/forms">
+  <Display>DocumentLibraryForm</Display>
+  <Edit>DocumentLibraryForm</Edit>
+  <New>DocumentLibraryForm</New>
+</FormTemplates>
 </file>
 
-<file path=customXml/itemProps3.xml><?xml version="1.0" encoding="utf-8"?>
+<file path=customXml/itemProps1.xml><?xml version="1.0" encoding="utf-8"?>
 <ds:datastoreItem xmlns:ds="http://schemas.openxmlformats.org/officeDocument/2006/customXml" ds:itemID="{C17FC477-C6F3-4824-AF67-67A952D7D3F1}">
   <ds:schemaRefs>
     <ds:schemaRef ds:uri="http://schemas.microsoft.com/office/2006/metadata/contentType"/>
@@ -27276,4 +28614,27 @@
     <ds:schemaRef ds:uri="http://schemas.microsoft.com/office/infopath/2007/PartnerControls"/>
   </ds:schemaRefs>
 </ds:datastoreItem>
+</file>
+
+<file path=customXml/itemProps2.xml><?xml version="1.0" encoding="utf-8"?>
+<ds:datastoreItem xmlns:ds="http://schemas.openxmlformats.org/officeDocument/2006/customXml" ds:itemID="{5405BF3B-1233-4D26-8BBF-BED295340DF6}">
+  <ds:schemaRefs>
+    <ds:schemaRef ds:uri="http://purl.org/dc/terms/"/>
+    <ds:schemaRef ds:uri="http://schemas.openxmlformats.org/package/2006/metadata/core-properties"/>
+    <ds:schemaRef ds:uri="http://schemas.microsoft.com/office/2006/documentManagement/types"/>
+    <ds:schemaRef ds:uri="http://schemas.microsoft.com/office/infopath/2007/PartnerControls"/>
+    <ds:schemaRef ds:uri="http://purl.org/dc/elements/1.1/"/>
+    <ds:schemaRef ds:uri="http://schemas.microsoft.com/office/2006/metadata/properties"/>
+    <ds:schemaRef ds:uri="http://www.w3.org/XML/1998/namespace"/>
+    <ds:schemaRef ds:uri="http://purl.org/dc/dcmitype/"/>
+  </ds:schemaRefs>
+</ds:datastoreItem>
+</file>
+
+<file path=customXml/itemProps3.xml><?xml version="1.0" encoding="utf-8"?>
+<ds:datastoreItem xmlns:ds="http://schemas.openxmlformats.org/officeDocument/2006/customXml" ds:itemID="{A99115DC-C02A-4EF3-990D-5FF7CC0EE91A}">
+  <ds:schemaRefs>
+    <ds:schemaRef ds:uri="http://schemas.microsoft.com/sharepoint/v3/contenttype/forms"/>
+  </ds:schemaRefs>
+</ds:datastoreItem>
 </file>
</xml_diff>

<commit_message>
Presentation updated with project criteria
</commit_message>
<xml_diff>
--- a/WDSR - zarys programu.pptx
+++ b/WDSR - zarys programu.pptx
@@ -5,10 +5,10 @@
     <p:sldMasterId id="2147483650" r:id="rId4"/>
   </p:sldMasterIdLst>
   <p:notesMasterIdLst>
-    <p:notesMasterId r:id="rId17"/>
+    <p:notesMasterId r:id="rId19"/>
   </p:notesMasterIdLst>
   <p:handoutMasterIdLst>
-    <p:handoutMasterId r:id="rId18"/>
+    <p:handoutMasterId r:id="rId20"/>
   </p:handoutMasterIdLst>
   <p:sldIdLst>
     <p:sldId id="556" r:id="rId5"/>
@@ -20,9 +20,11 @@
     <p:sldId id="564" r:id="rId11"/>
     <p:sldId id="566" r:id="rId12"/>
     <p:sldId id="569" r:id="rId13"/>
-    <p:sldId id="567" r:id="rId14"/>
-    <p:sldId id="568" r:id="rId15"/>
-    <p:sldId id="546" r:id="rId16"/>
+    <p:sldId id="570" r:id="rId14"/>
+    <p:sldId id="571" r:id="rId15"/>
+    <p:sldId id="567" r:id="rId16"/>
+    <p:sldId id="568" r:id="rId17"/>
+    <p:sldId id="546" r:id="rId18"/>
   </p:sldIdLst>
   <p:sldSz cx="9144000" cy="6858000" type="screen4x3"/>
   <p:notesSz cx="6858000" cy="9926638"/>
@@ -153,7 +155,7 @@
   </p:defaultTextStyle>
   <p:extLst>
     <p:ext uri="{EFAFB233-063F-42B5-8137-9DF3F51BA10A}">
-      <p15:sldGuideLst xmlns:p15="http://schemas.microsoft.com/office/powerpoint/2012/main" xmlns="">
+      <p15:sldGuideLst xmlns:p15="http://schemas.microsoft.com/office/powerpoint/2012/main">
         <p15:guide id="1" orient="horz" pos="2160">
           <p15:clr>
             <a:srgbClr val="A4A3A4"/>
@@ -167,7 +169,7 @@
       </p15:sldGuideLst>
     </p:ext>
     <p:ext uri="{2D200454-40CA-4A62-9FC3-DE9A4176ACB9}">
-      <p15:notesGuideLst xmlns:p15="http://schemas.microsoft.com/office/powerpoint/2012/main" xmlns=""/>
+      <p15:notesGuideLst xmlns:p15="http://schemas.microsoft.com/office/powerpoint/2012/main"/>
     </p:ext>
   </p:extLst>
 </p:presentation>
@@ -13357,7 +13359,7 @@
             <a:fld id="{E9ED4B55-51F0-4636-8388-59997869CC7A}" type="slidenum">
               <a:rPr lang="de-DE" altLang="pl-PL" sz="1300"/>
               <a:pPr/>
-              <a:t>12</a:t>
+              <a:t>14</a:t>
             </a:fld>
             <a:endParaRPr lang="de-DE" altLang="pl-PL" sz="1300"/>
           </a:p>
@@ -14702,7 +14704,7 @@
             <a:fld id="{E906F336-2E39-43F8-9DF9-B9244679DDFB}" type="datetime5">
               <a:rPr lang="en-US" altLang="pl-PL"/>
               <a:pPr/>
-              <a:t>23-Feb-16</a:t>
+              <a:t>13-Feb-17</a:t>
             </a:fld>
             <a:endParaRPr lang="en-US" altLang="pl-PL"/>
           </a:p>
@@ -15029,7 +15031,7 @@
             <a:fld id="{7B2EBB8C-B024-47EA-BB67-9AC43555CB71}" type="datetime5">
               <a:rPr lang="en-US" altLang="pl-PL"/>
               <a:pPr/>
-              <a:t>23-Feb-16</a:t>
+              <a:t>13-Feb-17</a:t>
             </a:fld>
             <a:endParaRPr lang="en-US" altLang="pl-PL"/>
           </a:p>
@@ -15593,7 +15595,7 @@
             <a:fld id="{AF037DEB-4CF1-4C5F-B037-398229B9C945}" type="datetime5">
               <a:rPr lang="en-US" altLang="pl-PL"/>
               <a:pPr/>
-              <a:t>23-Feb-16</a:t>
+              <a:t>13-Feb-17</a:t>
             </a:fld>
             <a:endParaRPr lang="de-DE" altLang="pl-PL"/>
           </a:p>
@@ -15743,7 +15745,7 @@
             <a:fld id="{9D49F2BD-E1AC-4AED-B4E5-321CBE4AD3D2}" type="datetime5">
               <a:rPr lang="en-US" altLang="pl-PL"/>
               <a:pPr/>
-              <a:t>23-Feb-16</a:t>
+              <a:t>13-Feb-17</a:t>
             </a:fld>
             <a:endParaRPr lang="en-US" altLang="pl-PL"/>
           </a:p>
@@ -16017,7 +16019,7 @@
             <a:fld id="{6DE49DB7-DE0A-4B13-98D6-E8B911A92E91}" type="datetime5">
               <a:rPr lang="en-US" altLang="pl-PL"/>
               <a:pPr/>
-              <a:t>23-Feb-16</a:t>
+              <a:t>13-Feb-17</a:t>
             </a:fld>
             <a:endParaRPr lang="en-US" altLang="pl-PL"/>
           </a:p>
@@ -16474,7 +16476,7 @@
             <a:fld id="{57896E6B-B1BC-4ECC-9043-421F9FF1FF7E}" type="datetime5">
               <a:rPr lang="en-US" altLang="pl-PL"/>
               <a:pPr/>
-              <a:t>23-Feb-16</a:t>
+              <a:t>13-Feb-17</a:t>
             </a:fld>
             <a:endParaRPr lang="en-US" altLang="pl-PL"/>
           </a:p>
@@ -17191,13 +17193,7 @@
               <a:rPr lang="pl-PL" altLang="pl-PL" dirty="0" smtClean="0">
                 <a:cs typeface="ＭＳ Ｐゴシック" charset="-128"/>
               </a:rPr>
-              <a:t>Marek </a:t>
-            </a:r>
-            <a:r>
-              <a:rPr lang="pl-PL" altLang="pl-PL" dirty="0" err="1" smtClean="0">
-                <a:cs typeface="ＭＳ Ｐゴシック" charset="-128"/>
-              </a:rPr>
-              <a:t>Strejczek</a:t>
+              <a:t>Mateusz Kołodziejski</a:t>
             </a:r>
             <a:endParaRPr lang="pl-PL" altLang="pl-PL" dirty="0" smtClean="0">
               <a:cs typeface="ＭＳ Ｐゴシック" charset="-128"/>
@@ -17212,8 +17208,17 @@
               <a:rPr lang="pl-PL" altLang="pl-PL" dirty="0" smtClean="0">
                 <a:cs typeface="ＭＳ Ｐゴシック" charset="-128"/>
               </a:rPr>
-              <a:t>Semestr letni 2016</a:t>
+              <a:t>Semestr letni </a:t>
             </a:r>
+            <a:r>
+              <a:rPr lang="pl-PL" altLang="pl-PL" dirty="0" smtClean="0">
+                <a:cs typeface="ＭＳ Ｐゴシック" charset="-128"/>
+              </a:rPr>
+              <a:t>2017</a:t>
+            </a:r>
+            <a:endParaRPr lang="pl-PL" altLang="pl-PL" dirty="0" smtClean="0">
+              <a:cs typeface="ＭＳ Ｐゴシック" charset="-128"/>
+            </a:endParaRPr>
           </a:p>
           <a:p>
             <a:pPr>
@@ -17224,7 +17229,13 @@
               <a:rPr lang="pl-PL" altLang="pl-PL" dirty="0" smtClean="0">
                 <a:cs typeface="ＭＳ Ｐゴシック" charset="-128"/>
               </a:rPr>
-              <a:t>Wersja 1.2</a:t>
+              <a:t>Wersja </a:t>
+            </a:r>
+            <a:r>
+              <a:rPr lang="pl-PL" altLang="pl-PL" dirty="0" smtClean="0">
+                <a:cs typeface="ＭＳ Ｐゴシック" charset="-128"/>
+              </a:rPr>
+              <a:t>1.3</a:t>
             </a:r>
             <a:endParaRPr lang="en-US" altLang="pl-PL" dirty="0" smtClean="0">
               <a:cs typeface="ＭＳ Ｐゴシック" charset="-128"/>
@@ -17339,7 +17350,7 @@
               <a:rPr lang="pl-PL" dirty="0" smtClean="0">
                 <a:ea typeface="MS PGothic" panose="020B0600070205080204" pitchFamily="34" charset="-128"/>
               </a:rPr>
-              <a:t>Na następne zajęcia (ćwiczenie 0)</a:t>
+              <a:t>Kryteria zaliczenia</a:t>
             </a:r>
             <a:endParaRPr lang="de-DE" dirty="0">
               <a:ea typeface="MS PGothic" panose="020B0600070205080204" pitchFamily="34" charset="-128"/>
@@ -17489,7 +17500,7 @@
                 </a:solidFill>
               </a:rPr>
               <a:pPr/>
-              <a:t>23-Feb-16</a:t>
+              <a:t>13-Feb-17</a:t>
             </a:fld>
             <a:endParaRPr lang="en-US" altLang="pl-PL" sz="900">
               <a:solidFill>
@@ -17792,6 +17803,1218 @@
               </a:rPr>
               <a:pPr/>
               <a:t>10</a:t>
+            </a:fld>
+            <a:endParaRPr lang="en-US" altLang="pl-PL" sz="900">
+              <a:solidFill>
+                <a:srgbClr val="898989"/>
+              </a:solidFill>
+            </a:endParaRPr>
+          </a:p>
+        </p:txBody>
+      </p:sp>
+      <p:graphicFrame>
+        <p:nvGraphicFramePr>
+          <p:cNvPr id="2" name="Tabela 1"/>
+          <p:cNvGraphicFramePr>
+            <a:graphicFrameLocks noGrp="1"/>
+          </p:cNvGraphicFramePr>
+          <p:nvPr>
+            <p:extLst>
+              <p:ext uri="{D42A27DB-BD31-4B8C-83A1-F6EECF244321}">
+                <p14:modId xmlns:p14="http://schemas.microsoft.com/office/powerpoint/2010/main" val="36956152"/>
+              </p:ext>
+            </p:extLst>
+          </p:nvPr>
+        </p:nvGraphicFramePr>
+        <p:xfrm>
+          <a:off x="663546" y="1267857"/>
+          <a:ext cx="7640870" cy="2612244"/>
+        </p:xfrm>
+        <a:graphic>
+          <a:graphicData uri="http://schemas.openxmlformats.org/drawingml/2006/table">
+            <a:tbl>
+              <a:tblPr firstRow="1" bandRow="1">
+                <a:tableStyleId>{5C22544A-7EE6-4342-B048-85BDC9FD1C3A}</a:tableStyleId>
+              </a:tblPr>
+              <a:tblGrid>
+                <a:gridCol w="3820435"/>
+                <a:gridCol w="3820435"/>
+              </a:tblGrid>
+              <a:tr h="587548">
+                <a:tc>
+                  <a:txBody>
+                    <a:bodyPr/>
+                    <a:lstStyle/>
+                    <a:p>
+                      <a:r>
+                        <a:rPr lang="pl-PL" dirty="0" smtClean="0"/>
+                        <a:t>Ćwiczenia </a:t>
+                      </a:r>
+                      <a:endParaRPr lang="pl-PL" dirty="0"/>
+                    </a:p>
+                  </a:txBody>
+                  <a:tcPr/>
+                </a:tc>
+                <a:tc>
+                  <a:txBody>
+                    <a:bodyPr/>
+                    <a:lstStyle/>
+                    <a:p>
+                      <a:pPr marL="0" marR="0" lvl="0" indent="0" algn="l" defTabSz="914400" rtl="0" eaLnBrk="1" fontAlgn="auto" latinLnBrk="0" hangingPunct="1">
+                        <a:lnSpc>
+                          <a:spcPct val="100000"/>
+                        </a:lnSpc>
+                        <a:spcBef>
+                          <a:spcPts val="0"/>
+                        </a:spcBef>
+                        <a:spcAft>
+                          <a:spcPts val="0"/>
+                        </a:spcAft>
+                        <a:buClrTx/>
+                        <a:buSzTx/>
+                        <a:buFontTx/>
+                        <a:buNone/>
+                        <a:tabLst/>
+                        <a:defRPr/>
+                      </a:pPr>
+                      <a:r>
+                        <a:rPr lang="pl-PL" dirty="0" smtClean="0"/>
+                        <a:t>Zajęcia (</a:t>
+                      </a:r>
+                      <a:r>
+                        <a:rPr lang="pl-PL" sz="1800" dirty="0" smtClean="0"/>
+                        <a:t>15</a:t>
+                      </a:r>
+                      <a:r>
+                        <a:rPr lang="pl-PL" sz="1800" baseline="0" dirty="0" smtClean="0"/>
+                        <a:t> zajęć w semestrze</a:t>
+                      </a:r>
+                      <a:r>
+                        <a:rPr lang="pl-PL" sz="1800" baseline="0" dirty="0"/>
+                        <a:t>)</a:t>
+                      </a:r>
+                      <a:endParaRPr lang="pl-PL" sz="1800" dirty="0" smtClean="0"/>
+                    </a:p>
+                  </a:txBody>
+                  <a:tcPr/>
+                </a:tc>
+              </a:tr>
+              <a:tr h="302576">
+                <a:tc>
+                  <a:txBody>
+                    <a:bodyPr/>
+                    <a:lstStyle/>
+                    <a:p>
+                      <a:r>
+                        <a:rPr lang="pl-PL" sz="1100" dirty="0" smtClean="0"/>
+                        <a:t>Ćwiczenie 0</a:t>
+                      </a:r>
+                      <a:r>
+                        <a:rPr lang="pl-PL" sz="1100" baseline="0" dirty="0" smtClean="0"/>
+                        <a:t> – </a:t>
+                      </a:r>
+                      <a:r>
+                        <a:rPr lang="pl-PL" sz="1100" dirty="0" smtClean="0"/>
+                        <a:t>Wstęp</a:t>
+                      </a:r>
+                      <a:endParaRPr lang="pl-PL" sz="1100" dirty="0"/>
+                    </a:p>
+                  </a:txBody>
+                  <a:tcPr/>
+                </a:tc>
+                <a:tc>
+                  <a:txBody>
+                    <a:bodyPr/>
+                    <a:lstStyle/>
+                    <a:p>
+                      <a:r>
+                        <a:rPr lang="pl-PL" sz="1100" dirty="0" smtClean="0"/>
+                        <a:t>Zajęcia 1</a:t>
+                      </a:r>
+                      <a:endParaRPr lang="pl-PL" sz="1100" dirty="0"/>
+                    </a:p>
+                  </a:txBody>
+                  <a:tcPr/>
+                </a:tc>
+              </a:tr>
+              <a:tr h="186117">
+                <a:tc>
+                  <a:txBody>
+                    <a:bodyPr/>
+                    <a:lstStyle/>
+                    <a:p>
+                      <a:r>
+                        <a:rPr lang="pl-PL" sz="1100" dirty="0" smtClean="0"/>
+                        <a:t>Ćwiczenie 1</a:t>
+                      </a:r>
+                      <a:r>
+                        <a:rPr lang="pl-PL" sz="1100" baseline="0" dirty="0" smtClean="0"/>
+                        <a:t> – </a:t>
+                      </a:r>
+                      <a:r>
+                        <a:rPr lang="pl-PL" sz="1100" dirty="0" smtClean="0"/>
+                        <a:t>Narzędzia</a:t>
+                      </a:r>
+                      <a:endParaRPr lang="pl-PL" sz="1100" dirty="0"/>
+                    </a:p>
+                  </a:txBody>
+                  <a:tcPr/>
+                </a:tc>
+                <a:tc>
+                  <a:txBody>
+                    <a:bodyPr/>
+                    <a:lstStyle/>
+                    <a:p>
+                      <a:r>
+                        <a:rPr lang="pl-PL" sz="1100" dirty="0" smtClean="0"/>
+                        <a:t>Zajęcia 2</a:t>
+                      </a:r>
+                      <a:endParaRPr lang="pl-PL" sz="1100" dirty="0"/>
+                    </a:p>
+                  </a:txBody>
+                  <a:tcPr/>
+                </a:tc>
+              </a:tr>
+              <a:tr h="186117">
+                <a:tc>
+                  <a:txBody>
+                    <a:bodyPr/>
+                    <a:lstStyle/>
+                    <a:p>
+                      <a:r>
+                        <a:rPr lang="pl-PL" sz="1100" dirty="0" smtClean="0"/>
+                        <a:t>Ćwiczenie 2</a:t>
+                      </a:r>
+                      <a:r>
+                        <a:rPr lang="pl-PL" sz="1100" baseline="0" dirty="0" smtClean="0"/>
+                        <a:t> - </a:t>
+                      </a:r>
+                      <a:r>
+                        <a:rPr lang="pl-PL" sz="1100" dirty="0" err="1" smtClean="0"/>
+                        <a:t>Progr</a:t>
+                      </a:r>
+                      <a:r>
+                        <a:rPr lang="pl-PL" sz="1100" dirty="0" smtClean="0"/>
+                        <a:t>. Współbieżne</a:t>
+                      </a:r>
+                      <a:endParaRPr lang="pl-PL" sz="1100" dirty="0"/>
+                    </a:p>
+                  </a:txBody>
+                  <a:tcPr/>
+                </a:tc>
+                <a:tc>
+                  <a:txBody>
+                    <a:bodyPr/>
+                    <a:lstStyle/>
+                    <a:p>
+                      <a:r>
+                        <a:rPr lang="pl-PL" sz="1100" dirty="0" smtClean="0"/>
+                        <a:t>Zajęcia 3-5</a:t>
+                      </a:r>
+                      <a:endParaRPr lang="pl-PL" sz="1100" dirty="0"/>
+                    </a:p>
+                  </a:txBody>
+                  <a:tcPr/>
+                </a:tc>
+              </a:tr>
+              <a:tr h="186117">
+                <a:tc>
+                  <a:txBody>
+                    <a:bodyPr/>
+                    <a:lstStyle/>
+                    <a:p>
+                      <a:r>
+                        <a:rPr lang="pl-PL" sz="1100" dirty="0" smtClean="0"/>
+                        <a:t>Ćwiczenie 3</a:t>
+                      </a:r>
+                      <a:r>
+                        <a:rPr lang="pl-PL" sz="1100" baseline="0" dirty="0" smtClean="0"/>
+                        <a:t> - </a:t>
+                      </a:r>
+                      <a:r>
+                        <a:rPr lang="pl-PL" sz="1100" dirty="0" smtClean="0"/>
+                        <a:t>Komunikacja </a:t>
+                      </a:r>
+                      <a:r>
+                        <a:rPr lang="pl-PL" sz="1100" dirty="0" err="1" smtClean="0"/>
+                        <a:t>Synchr</a:t>
+                      </a:r>
+                      <a:r>
+                        <a:rPr lang="pl-PL" sz="1100" dirty="0" smtClean="0"/>
+                        <a:t>.</a:t>
+                      </a:r>
+                      <a:endParaRPr lang="pl-PL" sz="1100" dirty="0"/>
+                    </a:p>
+                  </a:txBody>
+                  <a:tcPr/>
+                </a:tc>
+                <a:tc>
+                  <a:txBody>
+                    <a:bodyPr/>
+                    <a:lstStyle/>
+                    <a:p>
+                      <a:r>
+                        <a:rPr lang="pl-PL" sz="1100" dirty="0" smtClean="0"/>
+                        <a:t>Zajęcia 6-8</a:t>
+                      </a:r>
+                      <a:endParaRPr lang="pl-PL" sz="1100" dirty="0"/>
+                    </a:p>
+                  </a:txBody>
+                  <a:tcPr/>
+                </a:tc>
+              </a:tr>
+              <a:tr h="186117">
+                <a:tc>
+                  <a:txBody>
+                    <a:bodyPr/>
+                    <a:lstStyle/>
+                    <a:p>
+                      <a:r>
+                        <a:rPr lang="pl-PL" sz="1100" dirty="0" smtClean="0"/>
+                        <a:t>Ćwiczenie 4</a:t>
+                      </a:r>
+                      <a:r>
+                        <a:rPr lang="pl-PL" sz="1100" baseline="0" dirty="0" smtClean="0"/>
+                        <a:t> - </a:t>
+                      </a:r>
+                      <a:r>
+                        <a:rPr lang="pl-PL" sz="1100" dirty="0" smtClean="0"/>
+                        <a:t>Komunikacja </a:t>
+                      </a:r>
+                      <a:r>
+                        <a:rPr lang="pl-PL" sz="1100" dirty="0" err="1" smtClean="0"/>
+                        <a:t>Asynchr</a:t>
+                      </a:r>
+                      <a:r>
+                        <a:rPr lang="pl-PL" sz="1100" dirty="0" smtClean="0"/>
+                        <a:t>.</a:t>
+                      </a:r>
+                    </a:p>
+                  </a:txBody>
+                  <a:tcPr/>
+                </a:tc>
+                <a:tc>
+                  <a:txBody>
+                    <a:bodyPr/>
+                    <a:lstStyle/>
+                    <a:p>
+                      <a:r>
+                        <a:rPr lang="pl-PL" sz="1100" dirty="0" smtClean="0"/>
+                        <a:t>Zajęcia 9-11</a:t>
+                      </a:r>
+                      <a:endParaRPr lang="pl-PL" sz="1100" dirty="0"/>
+                    </a:p>
+                  </a:txBody>
+                  <a:tcPr/>
+                </a:tc>
+              </a:tr>
+              <a:tr h="0">
+                <a:tc>
+                  <a:txBody>
+                    <a:bodyPr/>
+                    <a:lstStyle/>
+                    <a:p>
+                      <a:r>
+                        <a:rPr lang="pl-PL" sz="1100" dirty="0" smtClean="0"/>
+                        <a:t>Ćwiczenie</a:t>
+                      </a:r>
+                      <a:r>
+                        <a:rPr lang="pl-PL" sz="1100" baseline="0" dirty="0" smtClean="0"/>
+                        <a:t> 5 - Baza danych</a:t>
+                      </a:r>
+                      <a:endParaRPr lang="pl-PL" sz="1100" dirty="0" smtClean="0"/>
+                    </a:p>
+                  </a:txBody>
+                  <a:tcPr/>
+                </a:tc>
+                <a:tc>
+                  <a:txBody>
+                    <a:bodyPr/>
+                    <a:lstStyle/>
+                    <a:p>
+                      <a:r>
+                        <a:rPr lang="pl-PL" sz="1100" dirty="0" smtClean="0"/>
+                        <a:t>Zajęcia 12-14</a:t>
+                      </a:r>
+                      <a:endParaRPr lang="pl-PL" sz="1100" dirty="0" smtClean="0"/>
+                    </a:p>
+                  </a:txBody>
+                  <a:tcPr/>
+                </a:tc>
+              </a:tr>
+              <a:tr h="379569">
+                <a:tc>
+                  <a:txBody>
+                    <a:bodyPr/>
+                    <a:lstStyle/>
+                    <a:p>
+                      <a:pPr marL="0" algn="l" defTabSz="914400" rtl="0" eaLnBrk="1" latinLnBrk="0" hangingPunct="1"/>
+                      <a:r>
+                        <a:rPr lang="pl-PL" sz="1100" kern="1200" dirty="0" smtClean="0">
+                          <a:solidFill>
+                            <a:schemeClr val="dk1"/>
+                          </a:solidFill>
+                          <a:latin typeface="+mn-lt"/>
+                          <a:ea typeface="+mn-ea"/>
+                          <a:cs typeface="+mn-cs"/>
+                        </a:rPr>
+                        <a:t>Podsumowanie i końcowe oceny.</a:t>
+                      </a:r>
+                    </a:p>
+                    <a:p>
+                      <a:pPr marL="0" algn="l" defTabSz="914400" rtl="0" eaLnBrk="1" latinLnBrk="0" hangingPunct="1"/>
+                      <a:r>
+                        <a:rPr lang="pl-PL" sz="1100" kern="1200" dirty="0" smtClean="0">
+                          <a:solidFill>
+                            <a:schemeClr val="dk1"/>
+                          </a:solidFill>
+                          <a:latin typeface="+mn-lt"/>
+                          <a:ea typeface="+mn-ea"/>
+                          <a:cs typeface="+mn-cs"/>
+                        </a:rPr>
+                        <a:t>Ostateczny termin oddania</a:t>
+                      </a:r>
+                      <a:r>
+                        <a:rPr lang="pl-PL" sz="1100" kern="1200" baseline="0" dirty="0" smtClean="0">
+                          <a:solidFill>
+                            <a:schemeClr val="dk1"/>
+                          </a:solidFill>
+                          <a:latin typeface="+mn-lt"/>
+                          <a:ea typeface="+mn-ea"/>
+                          <a:cs typeface="+mn-cs"/>
+                        </a:rPr>
+                        <a:t> projektów lub zadań z ćwiczeń.</a:t>
+                      </a:r>
+                      <a:endParaRPr lang="en-GB" sz="1100" kern="1200" dirty="0">
+                        <a:solidFill>
+                          <a:schemeClr val="dk1"/>
+                        </a:solidFill>
+                        <a:latin typeface="+mn-lt"/>
+                        <a:ea typeface="+mn-ea"/>
+                        <a:cs typeface="+mn-cs"/>
+                      </a:endParaRPr>
+                    </a:p>
+                  </a:txBody>
+                  <a:tcPr/>
+                </a:tc>
+                <a:tc>
+                  <a:txBody>
+                    <a:bodyPr/>
+                    <a:lstStyle/>
+                    <a:p>
+                      <a:r>
+                        <a:rPr lang="pl-PL" sz="1100" dirty="0" smtClean="0"/>
+                        <a:t>Zajęcia 15</a:t>
+                      </a:r>
+                      <a:endParaRPr lang="pl-PL" sz="1100" dirty="0" smtClean="0"/>
+                    </a:p>
+                  </a:txBody>
+                  <a:tcPr/>
+                </a:tc>
+              </a:tr>
+            </a:tbl>
+          </a:graphicData>
+        </a:graphic>
+      </p:graphicFrame>
+      <p:sp>
+        <p:nvSpPr>
+          <p:cNvPr id="4" name="pole tekstowe 3"/>
+          <p:cNvSpPr txBox="1"/>
+          <p:nvPr/>
+        </p:nvSpPr>
+        <p:spPr bwMode="auto">
+          <a:xfrm>
+            <a:off x="790575" y="5470216"/>
+            <a:ext cx="7652736" cy="153888"/>
+          </a:xfrm>
+          <a:prstGeom prst="rect">
+            <a:avLst/>
+          </a:prstGeom>
+          <a:noFill/>
+          <a:ln w="9525">
+            <a:noFill/>
+            <a:miter lim="800000"/>
+            <a:headEnd/>
+            <a:tailEnd/>
+          </a:ln>
+        </p:spPr>
+        <p:txBody>
+          <a:bodyPr wrap="none" lIns="0" tIns="0" rIns="0" bIns="0" rtlCol="0">
+            <a:spAutoFit/>
+          </a:bodyPr>
+          <a:lstStyle/>
+          <a:p>
+            <a:pPr>
+              <a:spcBef>
+                <a:spcPts val="100"/>
+              </a:spcBef>
+              <a:spcAft>
+                <a:spcPts val="100"/>
+              </a:spcAft>
+            </a:pPr>
+            <a:r>
+              <a:rPr lang="pl-PL" sz="1000" b="1" dirty="0" smtClean="0">
+                <a:solidFill>
+                  <a:srgbClr val="FF0000"/>
+                </a:solidFill>
+              </a:rPr>
+              <a:t>Ważne:</a:t>
+            </a:r>
+            <a:r>
+              <a:rPr lang="pl-PL" sz="1000" dirty="0" smtClean="0">
+                <a:solidFill>
+                  <a:srgbClr val="FF0000"/>
+                </a:solidFill>
+              </a:rPr>
+              <a:t> Podstawą uznania ćwiczenia / projektu za zaliczone jest zawsze kod znajdujący się w GitHubie. Każdy pracuje na swoim </a:t>
+            </a:r>
+            <a:r>
+              <a:rPr lang="pl-PL" sz="1000" dirty="0" err="1" smtClean="0">
+                <a:solidFill>
+                  <a:srgbClr val="FF0000"/>
+                </a:solidFill>
+              </a:rPr>
+              <a:t>forku</a:t>
+            </a:r>
+            <a:r>
+              <a:rPr lang="pl-PL" sz="1000" dirty="0" smtClean="0">
+                <a:solidFill>
+                  <a:srgbClr val="FF0000"/>
+                </a:solidFill>
+              </a:rPr>
+              <a:t>.</a:t>
+            </a:r>
+            <a:endParaRPr lang="pl-PL" sz="1000" dirty="0">
+              <a:solidFill>
+                <a:srgbClr val="FF0000"/>
+              </a:solidFill>
+            </a:endParaRPr>
+          </a:p>
+        </p:txBody>
+      </p:sp>
+    </p:spTree>
+    <p:extLst>
+      <p:ext uri="{BB962C8B-B14F-4D97-AF65-F5344CB8AC3E}">
+        <p14:creationId xmlns:p14="http://schemas.microsoft.com/office/powerpoint/2010/main" val="2851306553"/>
+      </p:ext>
+    </p:extLst>
+  </p:cSld>
+  <p:clrMapOvr>
+    <a:masterClrMapping/>
+  </p:clrMapOvr>
+  <p:transition spd="slow">
+    <p:push dir="u"/>
+  </p:transition>
+  <p:timing>
+    <p:tnLst>
+      <p:par>
+        <p:cTn id="1" dur="indefinite" restart="never" nodeType="tmRoot"/>
+      </p:par>
+    </p:tnLst>
+  </p:timing>
+</p:sld>
+</file>
+
+<file path=ppt/slides/slide11.xml><?xml version="1.0" encoding="utf-8"?>
+<p:sld xmlns:a="http://schemas.openxmlformats.org/drawingml/2006/main" xmlns:r="http://schemas.openxmlformats.org/officeDocument/2006/relationships" xmlns:p="http://schemas.openxmlformats.org/presentationml/2006/main">
+  <p:cSld>
+    <p:spTree>
+      <p:nvGrpSpPr>
+        <p:cNvPr id="1" name=""/>
+        <p:cNvGrpSpPr/>
+        <p:nvPr/>
+      </p:nvGrpSpPr>
+      <p:grpSpPr>
+        <a:xfrm>
+          <a:off x="0" y="0"/>
+          <a:ext cx="0" cy="0"/>
+          <a:chOff x="0" y="0"/>
+          <a:chExt cx="0" cy="0"/>
+        </a:xfrm>
+      </p:grpSpPr>
+      <p:sp>
+        <p:nvSpPr>
+          <p:cNvPr id="2" name="Content Placeholder 1"/>
+          <p:cNvSpPr>
+            <a:spLocks noGrp="1"/>
+          </p:cNvSpPr>
+          <p:nvPr>
+            <p:ph sz="half" idx="1"/>
+          </p:nvPr>
+        </p:nvSpPr>
+        <p:spPr/>
+        <p:txBody>
+          <a:bodyPr/>
+          <a:lstStyle/>
+          <a:p>
+            <a:pPr lvl="1">
+              <a:buFont typeface="Arial" panose="020B0604020202020204" pitchFamily="34" charset="0"/>
+              <a:buChar char="•"/>
+            </a:pPr>
+            <a:r>
+              <a:rPr lang="pl-PL" sz="1800" dirty="0" smtClean="0"/>
+              <a:t>Zaimplementowanie projektu zgodnie z wymaganiami. </a:t>
+            </a:r>
+          </a:p>
+          <a:p>
+            <a:pPr lvl="1">
+              <a:buFont typeface="Arial" panose="020B0604020202020204" pitchFamily="34" charset="0"/>
+              <a:buChar char="•"/>
+            </a:pPr>
+            <a:r>
+              <a:rPr lang="pl-PL" sz="1800" dirty="0" smtClean="0"/>
+              <a:t>Zamieszczenie kompletnych źródeł projektu na GitHub przez terminem 15-tych zajęć.</a:t>
+            </a:r>
+          </a:p>
+          <a:p>
+            <a:pPr lvl="1">
+              <a:buFont typeface="Arial" panose="020B0604020202020204" pitchFamily="34" charset="0"/>
+              <a:buChar char="•"/>
+            </a:pPr>
+            <a:r>
+              <a:rPr lang="pl-PL" sz="1800" dirty="0" smtClean="0"/>
+              <a:t>Nagranie krótkiego fimiku prezentującego funkcjonalności każdego z modułów.</a:t>
+            </a:r>
+          </a:p>
+          <a:p>
+            <a:pPr lvl="1">
+              <a:buFont typeface="Arial" panose="020B0604020202020204" pitchFamily="34" charset="0"/>
+              <a:buChar char="•"/>
+            </a:pPr>
+            <a:r>
+              <a:rPr lang="pl-PL" sz="1800" dirty="0" smtClean="0"/>
+              <a:t>Pokrycie testami jednostkowymi na poziomie 60% (miara pokrycia linii kodu)</a:t>
+            </a:r>
+          </a:p>
+          <a:p>
+            <a:pPr lvl="1">
+              <a:buFont typeface="Arial" panose="020B0604020202020204" pitchFamily="34" charset="0"/>
+              <a:buChar char="•"/>
+            </a:pPr>
+            <a:r>
+              <a:rPr lang="pl-PL" sz="1800" dirty="0" smtClean="0"/>
+              <a:t>Krótkie zaprezentowanie działającej aplikacji na 15-tych zajęciach.</a:t>
+            </a:r>
+          </a:p>
+          <a:p>
+            <a:pPr lvl="1">
+              <a:buFont typeface="Arial" panose="020B0604020202020204" pitchFamily="34" charset="0"/>
+              <a:buChar char="•"/>
+            </a:pPr>
+            <a:r>
+              <a:rPr lang="pl-PL" sz="1800" dirty="0" smtClean="0"/>
+              <a:t>Akceptowana jest dowolność interpretacji wymagań gdy są one nie precyzyjne. </a:t>
+            </a:r>
+          </a:p>
+        </p:txBody>
+      </p:sp>
+      <p:sp>
+        <p:nvSpPr>
+          <p:cNvPr id="3" name="Title 2"/>
+          <p:cNvSpPr>
+            <a:spLocks noGrp="1"/>
+          </p:cNvSpPr>
+          <p:nvPr>
+            <p:ph type="title"/>
+          </p:nvPr>
+        </p:nvSpPr>
+        <p:spPr/>
+        <p:txBody>
+          <a:bodyPr/>
+          <a:lstStyle/>
+          <a:p>
+            <a:r>
+              <a:rPr lang="pl-PL" dirty="0" smtClean="0"/>
+              <a:t>Zaliczenie poprzez projekt</a:t>
+            </a:r>
+            <a:endParaRPr lang="en-GB" dirty="0"/>
+          </a:p>
+        </p:txBody>
+      </p:sp>
+      <p:sp>
+        <p:nvSpPr>
+          <p:cNvPr id="4" name="Date Placeholder 3"/>
+          <p:cNvSpPr>
+            <a:spLocks noGrp="1"/>
+          </p:cNvSpPr>
+          <p:nvPr>
+            <p:ph type="dt" sz="half" idx="10"/>
+          </p:nvPr>
+        </p:nvSpPr>
+        <p:spPr/>
+        <p:txBody>
+          <a:bodyPr/>
+          <a:lstStyle/>
+          <a:p>
+            <a:fld id="{E906F336-2E39-43F8-9DF9-B9244679DDFB}" type="datetime5">
+              <a:rPr lang="en-US" altLang="pl-PL" smtClean="0"/>
+              <a:pPr/>
+              <a:t>14-Feb-17</a:t>
+            </a:fld>
+            <a:endParaRPr lang="en-US" altLang="pl-PL"/>
+          </a:p>
+        </p:txBody>
+      </p:sp>
+      <p:sp>
+        <p:nvSpPr>
+          <p:cNvPr id="5" name="Footer Placeholder 4"/>
+          <p:cNvSpPr>
+            <a:spLocks noGrp="1"/>
+          </p:cNvSpPr>
+          <p:nvPr>
+            <p:ph type="ftr" sz="quarter" idx="11"/>
+          </p:nvPr>
+        </p:nvSpPr>
+        <p:spPr/>
+        <p:txBody>
+          <a:bodyPr/>
+          <a:lstStyle/>
+          <a:p>
+            <a:pPr>
+              <a:defRPr/>
+            </a:pPr>
+            <a:r>
+              <a:rPr lang="en-US" smtClean="0"/>
+              <a:t>GFT Technologies AG</a:t>
+            </a:r>
+            <a:endParaRPr lang="en-US"/>
+          </a:p>
+        </p:txBody>
+      </p:sp>
+      <p:sp>
+        <p:nvSpPr>
+          <p:cNvPr id="6" name="Slide Number Placeholder 5"/>
+          <p:cNvSpPr>
+            <a:spLocks noGrp="1"/>
+          </p:cNvSpPr>
+          <p:nvPr>
+            <p:ph type="sldNum" sz="quarter" idx="12"/>
+          </p:nvPr>
+        </p:nvSpPr>
+        <p:spPr/>
+        <p:txBody>
+          <a:bodyPr/>
+          <a:lstStyle/>
+          <a:p>
+            <a:fld id="{62008791-523A-4B28-9563-D3C392EF9C46}" type="slidenum">
+              <a:rPr lang="en-US" altLang="pl-PL" smtClean="0"/>
+              <a:pPr/>
+              <a:t>11</a:t>
+            </a:fld>
+            <a:endParaRPr lang="en-US" altLang="pl-PL"/>
+          </a:p>
+        </p:txBody>
+      </p:sp>
+    </p:spTree>
+    <p:extLst>
+      <p:ext uri="{BB962C8B-B14F-4D97-AF65-F5344CB8AC3E}">
+        <p14:creationId xmlns:p14="http://schemas.microsoft.com/office/powerpoint/2010/main" val="3319988810"/>
+      </p:ext>
+    </p:extLst>
+  </p:cSld>
+  <p:clrMapOvr>
+    <a:masterClrMapping/>
+  </p:clrMapOvr>
+  <p:transition spd="slow">
+    <p:push dir="u"/>
+  </p:transition>
+</p:sld>
+</file>
+
+<file path=ppt/slides/slide12.xml><?xml version="1.0" encoding="utf-8"?>
+<p:sld xmlns:a="http://schemas.openxmlformats.org/drawingml/2006/main" xmlns:r="http://schemas.openxmlformats.org/officeDocument/2006/relationships" xmlns:p="http://schemas.openxmlformats.org/presentationml/2006/main">
+  <p:cSld>
+    <p:spTree>
+      <p:nvGrpSpPr>
+        <p:cNvPr id="1" name=""/>
+        <p:cNvGrpSpPr/>
+        <p:nvPr/>
+      </p:nvGrpSpPr>
+      <p:grpSpPr>
+        <a:xfrm>
+          <a:off x="0" y="0"/>
+          <a:ext cx="0" cy="0"/>
+          <a:chOff x="0" y="0"/>
+          <a:chExt cx="0" cy="0"/>
+        </a:xfrm>
+      </p:grpSpPr>
+      <p:sp>
+        <p:nvSpPr>
+          <p:cNvPr id="3" name="Titel 2"/>
+          <p:cNvSpPr>
+            <a:spLocks noGrp="1"/>
+          </p:cNvSpPr>
+          <p:nvPr>
+            <p:ph type="title"/>
+          </p:nvPr>
+        </p:nvSpPr>
+        <p:spPr/>
+        <p:txBody>
+          <a:bodyPr/>
+          <a:lstStyle/>
+          <a:p>
+            <a:pPr>
+              <a:buFont typeface="+mj-lt"/>
+              <a:buNone/>
+              <a:defRPr/>
+            </a:pPr>
+            <a:r>
+              <a:rPr lang="pl-PL" dirty="0" smtClean="0">
+                <a:ea typeface="MS PGothic" panose="020B0600070205080204" pitchFamily="34" charset="-128"/>
+              </a:rPr>
+              <a:t>Na następne zajęcia (ćwiczenie 0)</a:t>
+            </a:r>
+            <a:endParaRPr lang="de-DE" dirty="0">
+              <a:ea typeface="MS PGothic" panose="020B0600070205080204" pitchFamily="34" charset="-128"/>
+            </a:endParaRPr>
+          </a:p>
+        </p:txBody>
+      </p:sp>
+      <p:sp>
+        <p:nvSpPr>
+          <p:cNvPr id="17411" name="Datumsplatzhalter 3"/>
+          <p:cNvSpPr>
+            <a:spLocks noGrp="1"/>
+          </p:cNvSpPr>
+          <p:nvPr>
+            <p:ph type="dt" sz="quarter" idx="10"/>
+          </p:nvPr>
+        </p:nvSpPr>
+        <p:spPr>
+          <a:noFill/>
+          <a:extLst>
+            <a:ext uri="{91240B29-F687-4F45-9708-019B960494DF}">
+              <a14:hiddenLine xmlns:a14="http://schemas.microsoft.com/office/drawing/2010/main" w="9525">
+                <a:solidFill>
+                  <a:srgbClr val="000000"/>
+                </a:solidFill>
+                <a:miter lim="800000"/>
+                <a:headEnd/>
+                <a:tailEnd/>
+              </a14:hiddenLine>
+            </a:ext>
+          </a:extLst>
+        </p:spPr>
+        <p:txBody>
+          <a:bodyPr/>
+          <a:lstStyle>
+            <a:lvl1pPr eaLnBrk="0" hangingPunct="0">
+              <a:defRPr sz="1500">
+                <a:solidFill>
+                  <a:schemeClr val="tx1"/>
+                </a:solidFill>
+                <a:latin typeface="Arial" pitchFamily="34" charset="0"/>
+                <a:ea typeface="ＭＳ Ｐゴシック" charset="-128"/>
+              </a:defRPr>
+            </a:lvl1pPr>
+            <a:lvl2pPr marL="742950" indent="-285750" eaLnBrk="0" hangingPunct="0">
+              <a:defRPr sz="1500">
+                <a:solidFill>
+                  <a:schemeClr val="tx1"/>
+                </a:solidFill>
+                <a:latin typeface="Arial" pitchFamily="34" charset="0"/>
+                <a:ea typeface="ＭＳ Ｐゴシック" charset="-128"/>
+              </a:defRPr>
+            </a:lvl2pPr>
+            <a:lvl3pPr marL="1143000" indent="-228600" eaLnBrk="0" hangingPunct="0">
+              <a:defRPr sz="1500">
+                <a:solidFill>
+                  <a:schemeClr val="tx1"/>
+                </a:solidFill>
+                <a:latin typeface="Arial" pitchFamily="34" charset="0"/>
+                <a:ea typeface="ＭＳ Ｐゴシック" charset="-128"/>
+              </a:defRPr>
+            </a:lvl3pPr>
+            <a:lvl4pPr marL="1600200" indent="-228600" eaLnBrk="0" hangingPunct="0">
+              <a:defRPr sz="1500">
+                <a:solidFill>
+                  <a:schemeClr val="tx1"/>
+                </a:solidFill>
+                <a:latin typeface="Arial" pitchFamily="34" charset="0"/>
+                <a:ea typeface="ＭＳ Ｐゴシック" charset="-128"/>
+              </a:defRPr>
+            </a:lvl4pPr>
+            <a:lvl5pPr marL="2057400" indent="-228600" eaLnBrk="0" hangingPunct="0">
+              <a:defRPr sz="1500">
+                <a:solidFill>
+                  <a:schemeClr val="tx1"/>
+                </a:solidFill>
+                <a:latin typeface="Arial" pitchFamily="34" charset="0"/>
+                <a:ea typeface="ＭＳ Ｐゴシック" charset="-128"/>
+              </a:defRPr>
+            </a:lvl5pPr>
+            <a:lvl6pPr marL="2514600" indent="-228600" eaLnBrk="0" fontAlgn="base" hangingPunct="0">
+              <a:spcBef>
+                <a:spcPct val="0"/>
+              </a:spcBef>
+              <a:spcAft>
+                <a:spcPct val="0"/>
+              </a:spcAft>
+              <a:defRPr sz="1500">
+                <a:solidFill>
+                  <a:schemeClr val="tx1"/>
+                </a:solidFill>
+                <a:latin typeface="Arial" pitchFamily="34" charset="0"/>
+                <a:ea typeface="ＭＳ Ｐゴシック" charset="-128"/>
+              </a:defRPr>
+            </a:lvl6pPr>
+            <a:lvl7pPr marL="2971800" indent="-228600" eaLnBrk="0" fontAlgn="base" hangingPunct="0">
+              <a:spcBef>
+                <a:spcPct val="0"/>
+              </a:spcBef>
+              <a:spcAft>
+                <a:spcPct val="0"/>
+              </a:spcAft>
+              <a:defRPr sz="1500">
+                <a:solidFill>
+                  <a:schemeClr val="tx1"/>
+                </a:solidFill>
+                <a:latin typeface="Arial" pitchFamily="34" charset="0"/>
+                <a:ea typeface="ＭＳ Ｐゴシック" charset="-128"/>
+              </a:defRPr>
+            </a:lvl7pPr>
+            <a:lvl8pPr marL="3429000" indent="-228600" eaLnBrk="0" fontAlgn="base" hangingPunct="0">
+              <a:spcBef>
+                <a:spcPct val="0"/>
+              </a:spcBef>
+              <a:spcAft>
+                <a:spcPct val="0"/>
+              </a:spcAft>
+              <a:defRPr sz="1500">
+                <a:solidFill>
+                  <a:schemeClr val="tx1"/>
+                </a:solidFill>
+                <a:latin typeface="Arial" pitchFamily="34" charset="0"/>
+                <a:ea typeface="ＭＳ Ｐゴシック" charset="-128"/>
+              </a:defRPr>
+            </a:lvl8pPr>
+            <a:lvl9pPr marL="3886200" indent="-228600" eaLnBrk="0" fontAlgn="base" hangingPunct="0">
+              <a:spcBef>
+                <a:spcPct val="0"/>
+              </a:spcBef>
+              <a:spcAft>
+                <a:spcPct val="0"/>
+              </a:spcAft>
+              <a:defRPr sz="1500">
+                <a:solidFill>
+                  <a:schemeClr val="tx1"/>
+                </a:solidFill>
+                <a:latin typeface="Arial" pitchFamily="34" charset="0"/>
+                <a:ea typeface="ＭＳ Ｐゴシック" charset="-128"/>
+              </a:defRPr>
+            </a:lvl9pPr>
+          </a:lstStyle>
+          <a:p>
+            <a:fld id="{D848C8B2-07A2-4CD2-87E7-F1C8D5AD1B0C}" type="datetime5">
+              <a:rPr lang="en-US" altLang="pl-PL" sz="900">
+                <a:solidFill>
+                  <a:srgbClr val="898989"/>
+                </a:solidFill>
+              </a:rPr>
+              <a:pPr/>
+              <a:t>13-Feb-17</a:t>
+            </a:fld>
+            <a:endParaRPr lang="en-US" altLang="pl-PL" sz="900">
+              <a:solidFill>
+                <a:srgbClr val="898989"/>
+              </a:solidFill>
+            </a:endParaRPr>
+          </a:p>
+        </p:txBody>
+      </p:sp>
+      <p:sp>
+        <p:nvSpPr>
+          <p:cNvPr id="17412" name="Fußzeilenplatzhalter 4"/>
+          <p:cNvSpPr>
+            <a:spLocks noGrp="1"/>
+          </p:cNvSpPr>
+          <p:nvPr>
+            <p:ph type="ftr" sz="quarter" idx="11"/>
+          </p:nvPr>
+        </p:nvSpPr>
+        <p:spPr>
+          <a:noFill/>
+          <a:extLst>
+            <a:ext uri="{91240B29-F687-4F45-9708-019B960494DF}">
+              <a14:hiddenLine xmlns:a14="http://schemas.microsoft.com/office/drawing/2010/main" w="9525">
+                <a:solidFill>
+                  <a:srgbClr val="000000"/>
+                </a:solidFill>
+                <a:miter lim="800000"/>
+                <a:headEnd/>
+                <a:tailEnd/>
+              </a14:hiddenLine>
+            </a:ext>
+          </a:extLst>
+        </p:spPr>
+        <p:txBody>
+          <a:bodyPr numCol="1" compatLnSpc="1">
+            <a:prstTxWarp prst="textNoShape">
+              <a:avLst/>
+            </a:prstTxWarp>
+          </a:bodyPr>
+          <a:lstStyle>
+            <a:lvl1pPr eaLnBrk="0" hangingPunct="0">
+              <a:defRPr sz="1500">
+                <a:solidFill>
+                  <a:schemeClr val="tx1"/>
+                </a:solidFill>
+                <a:latin typeface="Arial" pitchFamily="34" charset="0"/>
+                <a:ea typeface="ＭＳ Ｐゴシック" charset="-128"/>
+              </a:defRPr>
+            </a:lvl1pPr>
+            <a:lvl2pPr marL="742950" indent="-285750" eaLnBrk="0" hangingPunct="0">
+              <a:defRPr sz="1500">
+                <a:solidFill>
+                  <a:schemeClr val="tx1"/>
+                </a:solidFill>
+                <a:latin typeface="Arial" pitchFamily="34" charset="0"/>
+                <a:ea typeface="ＭＳ Ｐゴシック" charset="-128"/>
+              </a:defRPr>
+            </a:lvl2pPr>
+            <a:lvl3pPr marL="1143000" indent="-228600" eaLnBrk="0" hangingPunct="0">
+              <a:defRPr sz="1500">
+                <a:solidFill>
+                  <a:schemeClr val="tx1"/>
+                </a:solidFill>
+                <a:latin typeface="Arial" pitchFamily="34" charset="0"/>
+                <a:ea typeface="ＭＳ Ｐゴシック" charset="-128"/>
+              </a:defRPr>
+            </a:lvl3pPr>
+            <a:lvl4pPr marL="1600200" indent="-228600" eaLnBrk="0" hangingPunct="0">
+              <a:defRPr sz="1500">
+                <a:solidFill>
+                  <a:schemeClr val="tx1"/>
+                </a:solidFill>
+                <a:latin typeface="Arial" pitchFamily="34" charset="0"/>
+                <a:ea typeface="ＭＳ Ｐゴシック" charset="-128"/>
+              </a:defRPr>
+            </a:lvl4pPr>
+            <a:lvl5pPr marL="2057400" indent="-228600" eaLnBrk="0" hangingPunct="0">
+              <a:defRPr sz="1500">
+                <a:solidFill>
+                  <a:schemeClr val="tx1"/>
+                </a:solidFill>
+                <a:latin typeface="Arial" pitchFamily="34" charset="0"/>
+                <a:ea typeface="ＭＳ Ｐゴシック" charset="-128"/>
+              </a:defRPr>
+            </a:lvl5pPr>
+            <a:lvl6pPr marL="2514600" indent="-228600" eaLnBrk="0" fontAlgn="base" hangingPunct="0">
+              <a:spcBef>
+                <a:spcPct val="0"/>
+              </a:spcBef>
+              <a:spcAft>
+                <a:spcPct val="0"/>
+              </a:spcAft>
+              <a:defRPr sz="1500">
+                <a:solidFill>
+                  <a:schemeClr val="tx1"/>
+                </a:solidFill>
+                <a:latin typeface="Arial" pitchFamily="34" charset="0"/>
+                <a:ea typeface="ＭＳ Ｐゴシック" charset="-128"/>
+              </a:defRPr>
+            </a:lvl6pPr>
+            <a:lvl7pPr marL="2971800" indent="-228600" eaLnBrk="0" fontAlgn="base" hangingPunct="0">
+              <a:spcBef>
+                <a:spcPct val="0"/>
+              </a:spcBef>
+              <a:spcAft>
+                <a:spcPct val="0"/>
+              </a:spcAft>
+              <a:defRPr sz="1500">
+                <a:solidFill>
+                  <a:schemeClr val="tx1"/>
+                </a:solidFill>
+                <a:latin typeface="Arial" pitchFamily="34" charset="0"/>
+                <a:ea typeface="ＭＳ Ｐゴシック" charset="-128"/>
+              </a:defRPr>
+            </a:lvl7pPr>
+            <a:lvl8pPr marL="3429000" indent="-228600" eaLnBrk="0" fontAlgn="base" hangingPunct="0">
+              <a:spcBef>
+                <a:spcPct val="0"/>
+              </a:spcBef>
+              <a:spcAft>
+                <a:spcPct val="0"/>
+              </a:spcAft>
+              <a:defRPr sz="1500">
+                <a:solidFill>
+                  <a:schemeClr val="tx1"/>
+                </a:solidFill>
+                <a:latin typeface="Arial" pitchFamily="34" charset="0"/>
+                <a:ea typeface="ＭＳ Ｐゴシック" charset="-128"/>
+              </a:defRPr>
+            </a:lvl8pPr>
+            <a:lvl9pPr marL="3886200" indent="-228600" eaLnBrk="0" fontAlgn="base" hangingPunct="0">
+              <a:spcBef>
+                <a:spcPct val="0"/>
+              </a:spcBef>
+              <a:spcAft>
+                <a:spcPct val="0"/>
+              </a:spcAft>
+              <a:defRPr sz="1500">
+                <a:solidFill>
+                  <a:schemeClr val="tx1"/>
+                </a:solidFill>
+                <a:latin typeface="Arial" pitchFamily="34" charset="0"/>
+                <a:ea typeface="ＭＳ Ｐゴシック" charset="-128"/>
+              </a:defRPr>
+            </a:lvl9pPr>
+          </a:lstStyle>
+          <a:p>
+            <a:r>
+              <a:rPr lang="en-US" altLang="pl-PL" sz="900" smtClean="0">
+                <a:solidFill>
+                  <a:srgbClr val="898989"/>
+                </a:solidFill>
+              </a:rPr>
+              <a:t>GFT Technologies AG</a:t>
+            </a:r>
+          </a:p>
+        </p:txBody>
+      </p:sp>
+      <p:sp>
+        <p:nvSpPr>
+          <p:cNvPr id="17413" name="Foliennummernplatzhalter 5"/>
+          <p:cNvSpPr>
+            <a:spLocks noGrp="1"/>
+          </p:cNvSpPr>
+          <p:nvPr>
+            <p:ph type="sldNum" sz="quarter" idx="12"/>
+          </p:nvPr>
+        </p:nvSpPr>
+        <p:spPr>
+          <a:noFill/>
+          <a:extLst>
+            <a:ext uri="{91240B29-F687-4F45-9708-019B960494DF}">
+              <a14:hiddenLine xmlns:a14="http://schemas.microsoft.com/office/drawing/2010/main" w="9525">
+                <a:solidFill>
+                  <a:srgbClr val="000000"/>
+                </a:solidFill>
+                <a:miter lim="800000"/>
+                <a:headEnd/>
+                <a:tailEnd/>
+              </a14:hiddenLine>
+            </a:ext>
+          </a:extLst>
+        </p:spPr>
+        <p:txBody>
+          <a:bodyPr/>
+          <a:lstStyle>
+            <a:lvl1pPr eaLnBrk="0" hangingPunct="0">
+              <a:defRPr sz="1500">
+                <a:solidFill>
+                  <a:schemeClr val="tx1"/>
+                </a:solidFill>
+                <a:latin typeface="Arial" pitchFamily="34" charset="0"/>
+                <a:ea typeface="ＭＳ Ｐゴシック" charset="-128"/>
+              </a:defRPr>
+            </a:lvl1pPr>
+            <a:lvl2pPr marL="742950" indent="-285750" eaLnBrk="0" hangingPunct="0">
+              <a:defRPr sz="1500">
+                <a:solidFill>
+                  <a:schemeClr val="tx1"/>
+                </a:solidFill>
+                <a:latin typeface="Arial" pitchFamily="34" charset="0"/>
+                <a:ea typeface="ＭＳ Ｐゴシック" charset="-128"/>
+              </a:defRPr>
+            </a:lvl2pPr>
+            <a:lvl3pPr marL="1143000" indent="-228600" eaLnBrk="0" hangingPunct="0">
+              <a:defRPr sz="1500">
+                <a:solidFill>
+                  <a:schemeClr val="tx1"/>
+                </a:solidFill>
+                <a:latin typeface="Arial" pitchFamily="34" charset="0"/>
+                <a:ea typeface="ＭＳ Ｐゴシック" charset="-128"/>
+              </a:defRPr>
+            </a:lvl3pPr>
+            <a:lvl4pPr marL="1600200" indent="-228600" eaLnBrk="0" hangingPunct="0">
+              <a:defRPr sz="1500">
+                <a:solidFill>
+                  <a:schemeClr val="tx1"/>
+                </a:solidFill>
+                <a:latin typeface="Arial" pitchFamily="34" charset="0"/>
+                <a:ea typeface="ＭＳ Ｐゴシック" charset="-128"/>
+              </a:defRPr>
+            </a:lvl4pPr>
+            <a:lvl5pPr marL="2057400" indent="-228600" eaLnBrk="0" hangingPunct="0">
+              <a:defRPr sz="1500">
+                <a:solidFill>
+                  <a:schemeClr val="tx1"/>
+                </a:solidFill>
+                <a:latin typeface="Arial" pitchFamily="34" charset="0"/>
+                <a:ea typeface="ＭＳ Ｐゴシック" charset="-128"/>
+              </a:defRPr>
+            </a:lvl5pPr>
+            <a:lvl6pPr marL="2514600" indent="-228600" eaLnBrk="0" fontAlgn="base" hangingPunct="0">
+              <a:spcBef>
+                <a:spcPct val="0"/>
+              </a:spcBef>
+              <a:spcAft>
+                <a:spcPct val="0"/>
+              </a:spcAft>
+              <a:defRPr sz="1500">
+                <a:solidFill>
+                  <a:schemeClr val="tx1"/>
+                </a:solidFill>
+                <a:latin typeface="Arial" pitchFamily="34" charset="0"/>
+                <a:ea typeface="ＭＳ Ｐゴシック" charset="-128"/>
+              </a:defRPr>
+            </a:lvl6pPr>
+            <a:lvl7pPr marL="2971800" indent="-228600" eaLnBrk="0" fontAlgn="base" hangingPunct="0">
+              <a:spcBef>
+                <a:spcPct val="0"/>
+              </a:spcBef>
+              <a:spcAft>
+                <a:spcPct val="0"/>
+              </a:spcAft>
+              <a:defRPr sz="1500">
+                <a:solidFill>
+                  <a:schemeClr val="tx1"/>
+                </a:solidFill>
+                <a:latin typeface="Arial" pitchFamily="34" charset="0"/>
+                <a:ea typeface="ＭＳ Ｐゴシック" charset="-128"/>
+              </a:defRPr>
+            </a:lvl7pPr>
+            <a:lvl8pPr marL="3429000" indent="-228600" eaLnBrk="0" fontAlgn="base" hangingPunct="0">
+              <a:spcBef>
+                <a:spcPct val="0"/>
+              </a:spcBef>
+              <a:spcAft>
+                <a:spcPct val="0"/>
+              </a:spcAft>
+              <a:defRPr sz="1500">
+                <a:solidFill>
+                  <a:schemeClr val="tx1"/>
+                </a:solidFill>
+                <a:latin typeface="Arial" pitchFamily="34" charset="0"/>
+                <a:ea typeface="ＭＳ Ｐゴシック" charset="-128"/>
+              </a:defRPr>
+            </a:lvl8pPr>
+            <a:lvl9pPr marL="3886200" indent="-228600" eaLnBrk="0" fontAlgn="base" hangingPunct="0">
+              <a:spcBef>
+                <a:spcPct val="0"/>
+              </a:spcBef>
+              <a:spcAft>
+                <a:spcPct val="0"/>
+              </a:spcAft>
+              <a:defRPr sz="1500">
+                <a:solidFill>
+                  <a:schemeClr val="tx1"/>
+                </a:solidFill>
+                <a:latin typeface="Arial" pitchFamily="34" charset="0"/>
+                <a:ea typeface="ＭＳ Ｐゴシック" charset="-128"/>
+              </a:defRPr>
+            </a:lvl9pPr>
+          </a:lstStyle>
+          <a:p>
+            <a:fld id="{004FF41C-1B3A-4627-96E2-F7FAB4AA8A1A}" type="slidenum">
+              <a:rPr lang="en-US" altLang="pl-PL" sz="900">
+                <a:solidFill>
+                  <a:srgbClr val="898989"/>
+                </a:solidFill>
+              </a:rPr>
+              <a:pPr/>
+              <a:t>12</a:t>
             </a:fld>
             <a:endParaRPr lang="en-US" altLang="pl-PL" sz="900">
               <a:solidFill>
@@ -18400,8 +19623,21 @@
                   <a:srgbClr val="00B050"/>
                 </a:solidFill>
               </a:rPr>
-              <a:t>Ostateczny termin zaliczenia ćwiczenia: poniedziałek 29 lutego</a:t>
+              <a:t>Ostateczny termin zaliczenia ćwiczenia: poniedziałek </a:t>
             </a:r>
+            <a:r>
+              <a:rPr lang="pl-PL" sz="1600" b="1" dirty="0" smtClean="0">
+                <a:solidFill>
+                  <a:srgbClr val="00B050"/>
+                </a:solidFill>
+              </a:rPr>
+              <a:t>27lutego</a:t>
+            </a:r>
+            <a:endParaRPr lang="pl-PL" sz="1600" b="1" dirty="0" smtClean="0">
+              <a:solidFill>
+                <a:srgbClr val="00B050"/>
+              </a:solidFill>
+            </a:endParaRPr>
           </a:p>
           <a:p>
             <a:pPr>
@@ -18451,7 +19687,7 @@
 </p:sld>
 </file>
 
-<file path=ppt/slides/slide11.xml><?xml version="1.0" encoding="utf-8"?>
+<file path=ppt/slides/slide13.xml><?xml version="1.0" encoding="utf-8"?>
 <p:sld xmlns:a="http://schemas.openxmlformats.org/drawingml/2006/main" xmlns:r="http://schemas.openxmlformats.org/officeDocument/2006/relationships" xmlns:p="http://schemas.openxmlformats.org/presentationml/2006/main">
   <p:cSld>
     <p:spTree>
@@ -18648,7 +19884,7 @@
                 </a:solidFill>
               </a:rPr>
               <a:pPr/>
-              <a:t>23-Feb-16</a:t>
+              <a:t>13-Feb-17</a:t>
             </a:fld>
             <a:endParaRPr lang="en-US" altLang="pl-PL" sz="900">
               <a:solidFill>
@@ -18950,7 +20186,7 @@
                 </a:solidFill>
               </a:rPr>
               <a:pPr/>
-              <a:t>11</a:t>
+              <a:t>13</a:t>
             </a:fld>
             <a:endParaRPr lang="en-US" altLang="pl-PL" sz="900">
               <a:solidFill>
@@ -19164,8 +20400,21 @@
                   <a:srgbClr val="00B050"/>
                 </a:solidFill>
               </a:rPr>
-              <a:t>Ostateczny termin zaliczenia ćwiczenia: poniedziałek 29 lutego</a:t>
+              <a:t>Ostateczny termin zaliczenia ćwiczenia: poniedziałek </a:t>
             </a:r>
+            <a:r>
+              <a:rPr lang="pl-PL" sz="950" b="1" dirty="0" smtClean="0">
+                <a:solidFill>
+                  <a:srgbClr val="00B050"/>
+                </a:solidFill>
+              </a:rPr>
+              <a:t>27lutego</a:t>
+            </a:r>
+            <a:endParaRPr lang="pl-PL" sz="950" b="1" dirty="0" smtClean="0">
+              <a:solidFill>
+                <a:srgbClr val="00B050"/>
+              </a:solidFill>
+            </a:endParaRPr>
           </a:p>
           <a:p>
             <a:pPr>
@@ -19215,7 +20464,7 @@
 </p:sld>
 </file>
 
-<file path=ppt/slides/slide12.xml><?xml version="1.0" encoding="utf-8"?>
+<file path=ppt/slides/slide14.xml><?xml version="1.0" encoding="utf-8"?>
 <p:sld xmlns:a="http://schemas.openxmlformats.org/drawingml/2006/main" xmlns:r="http://schemas.openxmlformats.org/officeDocument/2006/relationships" xmlns:p="http://schemas.openxmlformats.org/presentationml/2006/main">
   <p:cSld>
     <p:spTree>
@@ -19493,16 +20742,7 @@
                 </a:solidFill>
                 <a:ea typeface="+mn-ea"/>
               </a:rPr>
-              <a:t>Marek </a:t>
-            </a:r>
-            <a:r>
-              <a:rPr lang="pl-PL" sz="950" b="1" dirty="0" err="1" smtClean="0">
-                <a:solidFill>
-                  <a:srgbClr val="213E7F"/>
-                </a:solidFill>
-                <a:ea typeface="+mn-ea"/>
-              </a:rPr>
-              <a:t>Strejczek</a:t>
+              <a:t>Mateusz Kołodziejski</a:t>
             </a:r>
             <a:endParaRPr lang="en-GB" sz="950" b="1" dirty="0">
               <a:solidFill>
@@ -19528,7 +20768,7 @@
                 </a:solidFill>
                 <a:ea typeface="+mn-ea"/>
               </a:rPr>
-              <a:t>Technical Architect</a:t>
+              <a:t>Technical Lead</a:t>
             </a:r>
             <a:endParaRPr lang="en-GB" sz="950" dirty="0">
               <a:solidFill>
@@ -19640,7 +20880,7 @@
                 </a:solidFill>
                 <a:ea typeface="+mn-ea"/>
               </a:rPr>
-              <a:t>marek.strejczek@gft.com</a:t>
+              <a:t>mateusz.kolodziejski@gft.com</a:t>
             </a:r>
             <a:endParaRPr lang="en-GB" sz="950" dirty="0">
               <a:solidFill>
@@ -19860,7 +21100,7 @@
                 </a:solidFill>
               </a:rPr>
               <a:pPr/>
-              <a:t>23-Feb-16</a:t>
+              <a:t>13-Feb-17</a:t>
             </a:fld>
             <a:endParaRPr lang="en-US" altLang="pl-PL" sz="900">
               <a:solidFill>
@@ -20515,7 +21755,7 @@
                 </a:solidFill>
               </a:rPr>
               <a:pPr/>
-              <a:t>23-Feb-16</a:t>
+              <a:t>13-Feb-17</a:t>
             </a:fld>
             <a:endParaRPr lang="en-US" altLang="pl-PL" sz="900">
               <a:solidFill>
@@ -21855,7 +23095,7 @@
                 </a:solidFill>
               </a:rPr>
               <a:pPr/>
-              <a:t>23-Feb-16</a:t>
+              <a:t>13-Feb-17</a:t>
             </a:fld>
             <a:endParaRPr lang="en-US" altLang="pl-PL" sz="900">
               <a:solidFill>
@@ -22923,7 +24163,7 @@
                 </a:solidFill>
               </a:rPr>
               <a:pPr/>
-              <a:t>23-Feb-16</a:t>
+              <a:t>13-Feb-17</a:t>
             </a:fld>
             <a:endParaRPr lang="en-US" altLang="pl-PL" sz="900">
               <a:solidFill>
@@ -23795,7 +25035,7 @@
                 </a:solidFill>
               </a:rPr>
               <a:pPr/>
-              <a:t>23-Feb-16</a:t>
+              <a:t>13-Feb-17</a:t>
             </a:fld>
             <a:endParaRPr lang="en-US" altLang="pl-PL" sz="900">
               <a:solidFill>
@@ -24863,7 +26103,7 @@
                 </a:solidFill>
               </a:rPr>
               <a:pPr/>
-              <a:t>23-Feb-16</a:t>
+              <a:t>13-Feb-17</a:t>
             </a:fld>
             <a:endParaRPr lang="en-US" altLang="pl-PL" sz="900">
               <a:solidFill>
@@ -25475,7 +26715,7 @@
                 </a:solidFill>
               </a:rPr>
               <a:pPr/>
-              <a:t>23-Feb-16</a:t>
+              <a:t>13-Feb-17</a:t>
             </a:fld>
             <a:endParaRPr lang="en-US" altLang="pl-PL" sz="900">
               <a:solidFill>
@@ -26347,7 +27587,7 @@
                 </a:solidFill>
               </a:rPr>
               <a:pPr/>
-              <a:t>23-Feb-16</a:t>
+              <a:t>13-Feb-17</a:t>
             </a:fld>
             <a:endParaRPr lang="en-US" altLang="pl-PL" sz="900">
               <a:solidFill>
@@ -26668,14 +27908,14 @@
           <p:nvPr>
             <p:extLst>
               <p:ext uri="{D42A27DB-BD31-4B8C-83A1-F6EECF244321}">
-                <p14:modId xmlns:p14="http://schemas.microsoft.com/office/powerpoint/2010/main" val="3150831170"/>
+                <p14:modId xmlns:p14="http://schemas.microsoft.com/office/powerpoint/2010/main" val="3524606262"/>
               </p:ext>
             </p:extLst>
           </p:nvPr>
         </p:nvGraphicFramePr>
         <p:xfrm>
           <a:off x="663546" y="1267857"/>
-          <a:ext cx="4563907" cy="3826513"/>
+          <a:ext cx="4563907" cy="3994153"/>
         </p:xfrm>
         <a:graphic>
           <a:graphicData uri="http://schemas.openxmlformats.org/drawingml/2006/table">
@@ -26761,19 +28001,17 @@
                     <a:p>
                       <a:r>
                         <a:rPr lang="pl-PL" sz="1100" baseline="0" dirty="0" smtClean="0"/>
-                        <a:t>(14 zajęć </a:t>
+                        <a:t>(pozostało 14 </a:t>
+                      </a:r>
+                      <a:r>
+                        <a:rPr lang="pl-PL" sz="1100" baseline="0" dirty="0" smtClean="0"/>
+                        <a:t>zajęć </a:t>
                       </a:r>
                       <a:r>
                         <a:rPr lang="pl-PL" sz="1100" baseline="0" dirty="0" smtClean="0">
                           <a:sym typeface="Wingdings" panose="05000000000000000000" pitchFamily="2" charset="2"/>
                         </a:rPr>
-                        <a:t> max. </a:t>
-                      </a:r>
-                      <a:r>
-                        <a:rPr lang="pl-PL" sz="1100" baseline="0" smtClean="0">
-                          <a:sym typeface="Wingdings" panose="05000000000000000000" pitchFamily="2" charset="2"/>
-                        </a:rPr>
-                        <a:t>28pktów)</a:t>
+                        <a:t> max. 28pktów)</a:t>
                       </a:r>
                       <a:endParaRPr lang="pl-PL" sz="1100" dirty="0"/>
                     </a:p>
@@ -27075,7 +28313,7 @@
                     <a:p>
                       <a:r>
                         <a:rPr lang="pl-PL" sz="1100" dirty="0" smtClean="0"/>
-                        <a:t>100</a:t>
+                        <a:t>do 100</a:t>
                       </a:r>
                       <a:r>
                         <a:rPr lang="pl-PL" sz="1100" baseline="0" dirty="0" smtClean="0"/>
@@ -27298,7 +28536,7 @@
         <p:spPr bwMode="auto">
           <a:xfrm>
             <a:off x="790575" y="5470216"/>
-            <a:ext cx="7276031" cy="146194"/>
+            <a:ext cx="7652736" cy="153888"/>
           </a:xfrm>
           <a:prstGeom prst="rect">
             <a:avLst/>
@@ -27326,22 +28564,42 @@
               </a:spcAft>
             </a:pPr>
             <a:r>
-              <a:rPr lang="pl-PL" sz="950" b="1" dirty="0" smtClean="0"/>
+              <a:rPr lang="pl-PL" sz="1000" b="1" dirty="0" smtClean="0">
+                <a:solidFill>
+                  <a:srgbClr val="FF0000"/>
+                </a:solidFill>
+              </a:rPr>
               <a:t>Ważne:</a:t>
             </a:r>
             <a:r>
-              <a:rPr lang="pl-PL" sz="950" dirty="0" smtClean="0"/>
+              <a:rPr lang="pl-PL" sz="1000" dirty="0" smtClean="0">
+                <a:solidFill>
+                  <a:srgbClr val="FF0000"/>
+                </a:solidFill>
+              </a:rPr>
               <a:t> Podstawą uznania ćwiczenia / projektu za zaliczone jest zawsze kod znajdujący się w GitHubie. Każdy pracuje na swoim </a:t>
             </a:r>
             <a:r>
-              <a:rPr lang="pl-PL" sz="950" dirty="0" err="1" smtClean="0"/>
+              <a:rPr lang="pl-PL" sz="1000" dirty="0" err="1" smtClean="0">
+                <a:solidFill>
+                  <a:srgbClr val="FF0000"/>
+                </a:solidFill>
+              </a:rPr>
               <a:t>forku</a:t>
             </a:r>
             <a:r>
-              <a:rPr lang="pl-PL" sz="950" dirty="0" smtClean="0"/>
+              <a:rPr lang="pl-PL" sz="1000" dirty="0" smtClean="0">
+                <a:solidFill>
+                  <a:srgbClr val="FF0000"/>
+                </a:solidFill>
+              </a:rPr>
               <a:t>.</a:t>
             </a:r>
-            <a:endParaRPr lang="pl-PL" sz="950" dirty="0"/>
+            <a:endParaRPr lang="pl-PL" sz="1000" dirty="0">
+              <a:solidFill>
+                <a:srgbClr val="FF0000"/>
+              </a:solidFill>
+            </a:endParaRPr>
           </a:p>
         </p:txBody>
       </p:sp>
@@ -27899,7 +29157,7 @@
   </a:extraClrSchemeLst>
   <a:extLst>
     <a:ext uri="{05A4C25C-085E-4340-85A3-A5531E510DB2}">
-      <thm15:themeFamily xmlns:thm15="http://schemas.microsoft.com/office/thememl/2012/main" xmlns="" name="v5_GFT_MASTER.potx" id="{0499BC36-F504-48FE-B624-679107AB1F18}" vid="{304785FB-A37F-4ED5-A32C-8677DED9BBC6}"/>
+      <thm15:themeFamily xmlns:thm15="http://schemas.microsoft.com/office/thememl/2012/main" name="v5_GFT_MASTER.potx" id="{0499BC36-F504-48FE-B624-679107AB1F18}" vid="{304785FB-A37F-4ED5-A32C-8677DED9BBC6}"/>
     </a:ext>
   </a:extLst>
 </a:theme>
@@ -28586,18 +29844,18 @@
 </file>
 
 <file path=customXml/item2.xml><?xml version="1.0" encoding="utf-8"?>
-<p:properties xmlns:p="http://schemas.microsoft.com/office/2006/metadata/properties" xmlns:xsi="http://www.w3.org/2001/XMLSchema-instance" xmlns:pc="http://schemas.microsoft.com/office/infopath/2007/PartnerControls">
-  <documentManagement/>
-</p:properties>
-</file>
-
-<file path=customXml/item3.xml><?xml version="1.0" encoding="utf-8"?>
 <?mso-contentType ?>
 <FormTemplates xmlns="http://schemas.microsoft.com/sharepoint/v3/contenttype/forms">
   <Display>DocumentLibraryForm</Display>
   <Edit>DocumentLibraryForm</Edit>
   <New>DocumentLibraryForm</New>
 </FormTemplates>
+</file>
+
+<file path=customXml/item3.xml><?xml version="1.0" encoding="utf-8"?>
+<p:properties xmlns:p="http://schemas.microsoft.com/office/2006/metadata/properties" xmlns:xsi="http://www.w3.org/2001/XMLSchema-instance" xmlns:pc="http://schemas.microsoft.com/office/infopath/2007/PartnerControls">
+  <documentManagement/>
+</p:properties>
 </file>
 
 <file path=customXml/itemProps1.xml><?xml version="1.0" encoding="utf-8"?>
@@ -28617,6 +29875,14 @@
 </file>
 
 <file path=customXml/itemProps2.xml><?xml version="1.0" encoding="utf-8"?>
+<ds:datastoreItem xmlns:ds="http://schemas.openxmlformats.org/officeDocument/2006/customXml" ds:itemID="{A99115DC-C02A-4EF3-990D-5FF7CC0EE91A}">
+  <ds:schemaRefs>
+    <ds:schemaRef ds:uri="http://schemas.microsoft.com/sharepoint/v3/contenttype/forms"/>
+  </ds:schemaRefs>
+</ds:datastoreItem>
+</file>
+
+<file path=customXml/itemProps3.xml><?xml version="1.0" encoding="utf-8"?>
 <ds:datastoreItem xmlns:ds="http://schemas.openxmlformats.org/officeDocument/2006/customXml" ds:itemID="{5405BF3B-1233-4D26-8BBF-BED295340DF6}">
   <ds:schemaRefs>
     <ds:schemaRef ds:uri="http://purl.org/dc/terms/"/>
@@ -28629,12 +29895,4 @@
     <ds:schemaRef ds:uri="http://purl.org/dc/dcmitype/"/>
   </ds:schemaRefs>
 </ds:datastoreItem>
-</file>
-
-<file path=customXml/itemProps3.xml><?xml version="1.0" encoding="utf-8"?>
-<ds:datastoreItem xmlns:ds="http://schemas.openxmlformats.org/officeDocument/2006/customXml" ds:itemID="{A99115DC-C02A-4EF3-990D-5FF7CC0EE91A}">
-  <ds:schemaRefs>
-    <ds:schemaRef ds:uri="http://schemas.microsoft.com/sharepoint/v3/contenttype/forms"/>
-  </ds:schemaRefs>
-</ds:datastoreItem>
 </file>
</xml_diff>

<commit_message>
modified for my own needs, plus some typoos
</commit_message>
<xml_diff>
--- a/WDSR - zarys programu.pptx
+++ b/WDSR - zarys programu.pptx
@@ -14704,7 +14704,7 @@
             <a:fld id="{E906F336-2E39-43F8-9DF9-B9244679DDFB}" type="datetime5">
               <a:rPr lang="en-US" altLang="pl-PL"/>
               <a:pPr/>
-              <a:t>13-Feb-17</a:t>
+              <a:t>16-Feb-17</a:t>
             </a:fld>
             <a:endParaRPr lang="en-US" altLang="pl-PL"/>
           </a:p>
@@ -15031,7 +15031,7 @@
             <a:fld id="{7B2EBB8C-B024-47EA-BB67-9AC43555CB71}" type="datetime5">
               <a:rPr lang="en-US" altLang="pl-PL"/>
               <a:pPr/>
-              <a:t>13-Feb-17</a:t>
+              <a:t>16-Feb-17</a:t>
             </a:fld>
             <a:endParaRPr lang="en-US" altLang="pl-PL"/>
           </a:p>
@@ -15595,7 +15595,7 @@
             <a:fld id="{AF037DEB-4CF1-4C5F-B037-398229B9C945}" type="datetime5">
               <a:rPr lang="en-US" altLang="pl-PL"/>
               <a:pPr/>
-              <a:t>13-Feb-17</a:t>
+              <a:t>16-Feb-17</a:t>
             </a:fld>
             <a:endParaRPr lang="de-DE" altLang="pl-PL"/>
           </a:p>
@@ -15745,7 +15745,7 @@
             <a:fld id="{9D49F2BD-E1AC-4AED-B4E5-321CBE4AD3D2}" type="datetime5">
               <a:rPr lang="en-US" altLang="pl-PL"/>
               <a:pPr/>
-              <a:t>13-Feb-17</a:t>
+              <a:t>16-Feb-17</a:t>
             </a:fld>
             <a:endParaRPr lang="en-US" altLang="pl-PL"/>
           </a:p>
@@ -16019,7 +16019,7 @@
             <a:fld id="{6DE49DB7-DE0A-4B13-98D6-E8B911A92E91}" type="datetime5">
               <a:rPr lang="en-US" altLang="pl-PL"/>
               <a:pPr/>
-              <a:t>13-Feb-17</a:t>
+              <a:t>16-Feb-17</a:t>
             </a:fld>
             <a:endParaRPr lang="en-US" altLang="pl-PL"/>
           </a:p>
@@ -16476,7 +16476,7 @@
             <a:fld id="{57896E6B-B1BC-4ECC-9043-421F9FF1FF7E}" type="datetime5">
               <a:rPr lang="en-US" altLang="pl-PL"/>
               <a:pPr/>
-              <a:t>13-Feb-17</a:t>
+              <a:t>16-Feb-17</a:t>
             </a:fld>
             <a:endParaRPr lang="en-US" altLang="pl-PL"/>
           </a:p>
@@ -17193,7 +17193,7 @@
               <a:rPr lang="pl-PL" altLang="pl-PL" dirty="0" smtClean="0">
                 <a:cs typeface="ＭＳ Ｐゴシック" charset="-128"/>
               </a:rPr>
-              <a:t>Mateusz Kołodziejski</a:t>
+              <a:t>Daniel Boguszewicz</a:t>
             </a:r>
             <a:endParaRPr lang="pl-PL" altLang="pl-PL" dirty="0" smtClean="0">
               <a:cs typeface="ＭＳ Ｐゴシック" charset="-128"/>
@@ -17208,17 +17208,8 @@
               <a:rPr lang="pl-PL" altLang="pl-PL" dirty="0" smtClean="0">
                 <a:cs typeface="ＭＳ Ｐゴシック" charset="-128"/>
               </a:rPr>
-              <a:t>Semestr letni </a:t>
+              <a:t>Semestr letni 2017</a:t>
             </a:r>
-            <a:r>
-              <a:rPr lang="pl-PL" altLang="pl-PL" dirty="0" smtClean="0">
-                <a:cs typeface="ＭＳ Ｐゴシック" charset="-128"/>
-              </a:rPr>
-              <a:t>2017</a:t>
-            </a:r>
-            <a:endParaRPr lang="pl-PL" altLang="pl-PL" dirty="0" smtClean="0">
-              <a:cs typeface="ＭＳ Ｐゴシック" charset="-128"/>
-            </a:endParaRPr>
           </a:p>
           <a:p>
             <a:pPr>
@@ -17229,13 +17220,7 @@
               <a:rPr lang="pl-PL" altLang="pl-PL" dirty="0" smtClean="0">
                 <a:cs typeface="ＭＳ Ｐゴシック" charset="-128"/>
               </a:rPr>
-              <a:t>Wersja </a:t>
-            </a:r>
-            <a:r>
-              <a:rPr lang="pl-PL" altLang="pl-PL" dirty="0" smtClean="0">
-                <a:cs typeface="ＭＳ Ｐゴシック" charset="-128"/>
-              </a:rPr>
-              <a:t>1.3</a:t>
+              <a:t>Wersja 1.3</a:t>
             </a:r>
             <a:endParaRPr lang="en-US" altLang="pl-PL" dirty="0" smtClean="0">
               <a:cs typeface="ＭＳ Ｐゴシック" charset="-128"/>
@@ -17500,7 +17485,7 @@
                 </a:solidFill>
               </a:rPr>
               <a:pPr/>
-              <a:t>13-Feb-17</a:t>
+              <a:t>16-Feb-17</a:t>
             </a:fld>
             <a:endParaRPr lang="en-US" altLang="pl-PL" sz="900">
               <a:solidFill>
@@ -18136,7 +18121,6 @@
                         <a:rPr lang="pl-PL" sz="1100" dirty="0" smtClean="0"/>
                         <a:t>Zajęcia 12-14</a:t>
                       </a:r>
-                      <a:endParaRPr lang="pl-PL" sz="1100" dirty="0" smtClean="0"/>
                     </a:p>
                   </a:txBody>
                   <a:tcPr/>
@@ -18206,7 +18190,6 @@
                         <a:rPr lang="pl-PL" sz="1100" dirty="0" smtClean="0"/>
                         <a:t>Zajęcia 15</a:t>
                       </a:r>
-                      <a:endParaRPr lang="pl-PL" sz="1100" dirty="0" smtClean="0"/>
                     </a:p>
                   </a:txBody>
                   <a:tcPr/>
@@ -18363,8 +18346,13 @@
             </a:pPr>
             <a:r>
               <a:rPr lang="pl-PL" sz="1800" dirty="0" smtClean="0"/>
-              <a:t>Zamieszczenie kompletnych źródeł projektu na GitHub przez terminem 15-tych zajęć.</a:t>
+              <a:t>Zamieszczenie kompletnych źródeł projektu na GitHub </a:t>
             </a:r>
+            <a:r>
+              <a:rPr lang="pl-PL" sz="1800" dirty="0" smtClean="0"/>
+              <a:t>przed 15 zajęciami.</a:t>
+            </a:r>
+            <a:endParaRPr lang="pl-PL" sz="1800" dirty="0" smtClean="0"/>
           </a:p>
           <a:p>
             <a:pPr lvl="1">
@@ -18383,7 +18371,19 @@
             </a:pPr>
             <a:r>
               <a:rPr lang="pl-PL" sz="1800" dirty="0" smtClean="0"/>
-              <a:t>Pokrycie testami jednostkowymi na poziomie 60% (miara pokrycia linii kodu)</a:t>
+              <a:t>Pokrycie testami jednostkowymi </a:t>
+            </a:r>
+            <a:r>
+              <a:rPr lang="pl-PL" sz="1800" dirty="0" smtClean="0"/>
+              <a:t>na </a:t>
+            </a:r>
+            <a:r>
+              <a:rPr lang="pl-PL" sz="1800" dirty="0" smtClean="0"/>
+              <a:t>poziomie </a:t>
+            </a:r>
+            <a:r>
+              <a:rPr lang="pl-PL" sz="1800" dirty="0" smtClean="0"/>
+              <a:t>&gt;=60%.</a:t>
             </a:r>
           </a:p>
           <a:p>
@@ -18393,7 +18393,11 @@
             </a:pPr>
             <a:r>
               <a:rPr lang="pl-PL" sz="1800" dirty="0" smtClean="0"/>
-              <a:t>Krótkie zaprezentowanie działającej aplikacji na 15-tych zajęciach.</a:t>
+              <a:t>Krótkie </a:t>
+            </a:r>
+            <a:r>
+              <a:rPr lang="pl-PL" sz="1800" dirty="0" smtClean="0"/>
+              <a:t>zaprezentowanie działającej aplikacji na 15-tych zajęciach.</a:t>
             </a:r>
           </a:p>
           <a:p>
@@ -18403,7 +18407,15 @@
             </a:pPr>
             <a:r>
               <a:rPr lang="pl-PL" sz="1800" dirty="0" smtClean="0"/>
-              <a:t>Akceptowana jest dowolność interpretacji wymagań gdy są one nie precyzyjne. </a:t>
+              <a:t>Akceptowana jest dowolność interpretacji wymagań gdy są one </a:t>
+            </a:r>
+            <a:r>
+              <a:rPr lang="pl-PL" sz="1800" dirty="0" smtClean="0"/>
+              <a:t>nieprecyzyjne</a:t>
+            </a:r>
+            <a:r>
+              <a:rPr lang="pl-PL" sz="1800" dirty="0" smtClean="0"/>
+              <a:t>. </a:t>
             </a:r>
           </a:p>
         </p:txBody>
@@ -18449,7 +18461,7 @@
             <a:fld id="{E906F336-2E39-43F8-9DF9-B9244679DDFB}" type="datetime5">
               <a:rPr lang="en-US" altLang="pl-PL" smtClean="0"/>
               <a:pPr/>
-              <a:t>14-Feb-17</a:t>
+              <a:t>16-Feb-17</a:t>
             </a:fld>
             <a:endParaRPr lang="en-US" altLang="pl-PL"/>
           </a:p>
@@ -18712,7 +18724,7 @@
                 </a:solidFill>
               </a:rPr>
               <a:pPr/>
-              <a:t>13-Feb-17</a:t>
+              <a:t>16-Feb-17</a:t>
             </a:fld>
             <a:endParaRPr lang="en-US" altLang="pl-PL" sz="900">
               <a:solidFill>
@@ -19149,15 +19161,7 @@
             </a:pPr>
             <a:r>
               <a:rPr lang="pl-PL" sz="1600" dirty="0" smtClean="0"/>
-              <a:t>Zrób kopię (</a:t>
-            </a:r>
-            <a:r>
-              <a:rPr lang="pl-PL" sz="1600" dirty="0" err="1" smtClean="0"/>
-              <a:t>fork</a:t>
-            </a:r>
-            <a:r>
-              <a:rPr lang="pl-PL" sz="1600" dirty="0" smtClean="0"/>
-              <a:t>) repozytorium </a:t>
+              <a:t>Zrób kopię (fork) repozytorium </a:t>
             </a:r>
             <a:r>
               <a:rPr lang="pl-PL" sz="1600" dirty="0">
@@ -19169,7 +19173,7 @@
               <a:rPr lang="pl-PL" sz="1600" dirty="0" smtClean="0">
                 <a:hlinkClick r:id="rId4"/>
               </a:rPr>
-              <a:t>github.com/wdsr/exercise0</a:t>
+              <a:t>github.com/leinadb/exercise0</a:t>
             </a:r>
             <a:endParaRPr lang="pl-PL" sz="1600" dirty="0" smtClean="0"/>
           </a:p>
@@ -19623,7 +19627,7 @@
                   <a:srgbClr val="00B050"/>
                 </a:solidFill>
               </a:rPr>
-              <a:t>Ostateczny termin zaliczenia ćwiczenia: poniedziałek </a:t>
+              <a:t>Ostateczny termin zaliczenia ćwiczenia: </a:t>
             </a:r>
             <a:r>
               <a:rPr lang="pl-PL" sz="1600" b="1" dirty="0" smtClean="0">
@@ -19631,7 +19635,7 @@
                   <a:srgbClr val="00B050"/>
                 </a:solidFill>
               </a:rPr>
-              <a:t>27lutego</a:t>
+              <a:t>1.03.2017</a:t>
             </a:r>
             <a:endParaRPr lang="pl-PL" sz="1600" b="1" dirty="0" smtClean="0">
               <a:solidFill>
@@ -19884,7 +19888,7 @@
                 </a:solidFill>
               </a:rPr>
               <a:pPr/>
-              <a:t>13-Feb-17</a:t>
+              <a:t>16-Feb-17</a:t>
             </a:fld>
             <a:endParaRPr lang="en-US" altLang="pl-PL" sz="900">
               <a:solidFill>
@@ -20400,7 +20404,7 @@
                   <a:srgbClr val="00B050"/>
                 </a:solidFill>
               </a:rPr>
-              <a:t>Ostateczny termin zaliczenia ćwiczenia: poniedziałek </a:t>
+              <a:t>Ostateczny termin zaliczenia ćwiczenia</a:t>
             </a:r>
             <a:r>
               <a:rPr lang="pl-PL" sz="950" b="1" dirty="0" smtClean="0">
@@ -20408,7 +20412,7 @@
                   <a:srgbClr val="00B050"/>
                 </a:solidFill>
               </a:rPr>
-              <a:t>27lutego</a:t>
+              <a:t>: 1.03.2017</a:t>
             </a:r>
             <a:endParaRPr lang="pl-PL" sz="950" b="1" dirty="0" smtClean="0">
               <a:solidFill>
@@ -20742,7 +20746,7 @@
                 </a:solidFill>
                 <a:ea typeface="+mn-ea"/>
               </a:rPr>
-              <a:t>Mateusz Kołodziejski</a:t>
+              <a:t>Daniel Boguszewicz</a:t>
             </a:r>
             <a:endParaRPr lang="en-GB" sz="950" b="1" dirty="0">
               <a:solidFill>
@@ -20768,7 +20772,7 @@
                 </a:solidFill>
                 <a:ea typeface="+mn-ea"/>
               </a:rPr>
-              <a:t>Technical Lead</a:t>
+              <a:t>Java Developer</a:t>
             </a:r>
             <a:endParaRPr lang="en-GB" sz="950" dirty="0">
               <a:solidFill>
@@ -20874,13 +20878,22 @@
               <a:defRPr/>
             </a:pPr>
             <a:r>
-              <a:rPr lang="pl-PL" sz="950" dirty="0" smtClean="0">
+              <a:rPr lang="pl-PL" sz="950" dirty="0">
                 <a:solidFill>
                   <a:srgbClr val="213E7F"/>
                 </a:solidFill>
                 <a:ea typeface="+mn-ea"/>
               </a:rPr>
-              <a:t>mateusz.kolodziejski@gft.com</a:t>
+              <a:t>d</a:t>
+            </a:r>
+            <a:r>
+              <a:rPr lang="pl-PL" sz="950" dirty="0" smtClean="0">
+                <a:solidFill>
+                  <a:srgbClr val="213E7F"/>
+                </a:solidFill>
+                <a:ea typeface="+mn-ea"/>
+              </a:rPr>
+              <a:t>aniel.boguszewicz@gft.com</a:t>
             </a:r>
             <a:endParaRPr lang="en-GB" sz="950" dirty="0">
               <a:solidFill>
@@ -21100,7 +21113,7 @@
                 </a:solidFill>
               </a:rPr>
               <a:pPr/>
-              <a:t>13-Feb-17</a:t>
+              <a:t>16-Feb-17</a:t>
             </a:fld>
             <a:endParaRPr lang="en-US" altLang="pl-PL" sz="900">
               <a:solidFill>
@@ -21755,7 +21768,7 @@
                 </a:solidFill>
               </a:rPr>
               <a:pPr/>
-              <a:t>13-Feb-17</a:t>
+              <a:t>16-Feb-17</a:t>
             </a:fld>
             <a:endParaRPr lang="en-US" altLang="pl-PL" sz="900">
               <a:solidFill>
@@ -23095,7 +23108,7 @@
                 </a:solidFill>
               </a:rPr>
               <a:pPr/>
-              <a:t>13-Feb-17</a:t>
+              <a:t>16-Feb-17</a:t>
             </a:fld>
             <a:endParaRPr lang="en-US" altLang="pl-PL" sz="900">
               <a:solidFill>
@@ -24163,7 +24176,7 @@
                 </a:solidFill>
               </a:rPr>
               <a:pPr/>
-              <a:t>13-Feb-17</a:t>
+              <a:t>16-Feb-17</a:t>
             </a:fld>
             <a:endParaRPr lang="en-US" altLang="pl-PL" sz="900">
               <a:solidFill>
@@ -25035,7 +25048,7 @@
                 </a:solidFill>
               </a:rPr>
               <a:pPr/>
-              <a:t>13-Feb-17</a:t>
+              <a:t>16-Feb-17</a:t>
             </a:fld>
             <a:endParaRPr lang="en-US" altLang="pl-PL" sz="900">
               <a:solidFill>
@@ -26103,7 +26116,7 @@
                 </a:solidFill>
               </a:rPr>
               <a:pPr/>
-              <a:t>13-Feb-17</a:t>
+              <a:t>16-Feb-17</a:t>
             </a:fld>
             <a:endParaRPr lang="en-US" altLang="pl-PL" sz="900">
               <a:solidFill>
@@ -26715,7 +26728,7 @@
                 </a:solidFill>
               </a:rPr>
               <a:pPr/>
-              <a:t>13-Feb-17</a:t>
+              <a:t>16-Feb-17</a:t>
             </a:fld>
             <a:endParaRPr lang="en-US" altLang="pl-PL" sz="900">
               <a:solidFill>
@@ -27587,7 +27600,7 @@
                 </a:solidFill>
               </a:rPr>
               <a:pPr/>
-              <a:t>13-Feb-17</a:t>
+              <a:t>16-Feb-17</a:t>
             </a:fld>
             <a:endParaRPr lang="en-US" altLang="pl-PL" sz="900">
               <a:solidFill>
@@ -28001,11 +28014,7 @@
                     <a:p>
                       <a:r>
                         <a:rPr lang="pl-PL" sz="1100" baseline="0" dirty="0" smtClean="0"/>
-                        <a:t>(pozostało 14 </a:t>
-                      </a:r>
-                      <a:r>
-                        <a:rPr lang="pl-PL" sz="1100" baseline="0" dirty="0" smtClean="0"/>
-                        <a:t>zajęć </a:t>
+                        <a:t>(pozostało 14 zajęć </a:t>
                       </a:r>
                       <a:r>
                         <a:rPr lang="pl-PL" sz="1100" baseline="0" dirty="0" smtClean="0">
@@ -29844,18 +29853,18 @@
 </file>
 
 <file path=customXml/item2.xml><?xml version="1.0" encoding="utf-8"?>
+<p:properties xmlns:p="http://schemas.microsoft.com/office/2006/metadata/properties" xmlns:xsi="http://www.w3.org/2001/XMLSchema-instance" xmlns:pc="http://schemas.microsoft.com/office/infopath/2007/PartnerControls">
+  <documentManagement/>
+</p:properties>
+</file>
+
+<file path=customXml/item3.xml><?xml version="1.0" encoding="utf-8"?>
 <?mso-contentType ?>
 <FormTemplates xmlns="http://schemas.microsoft.com/sharepoint/v3/contenttype/forms">
   <Display>DocumentLibraryForm</Display>
   <Edit>DocumentLibraryForm</Edit>
   <New>DocumentLibraryForm</New>
 </FormTemplates>
-</file>
-
-<file path=customXml/item3.xml><?xml version="1.0" encoding="utf-8"?>
-<p:properties xmlns:p="http://schemas.microsoft.com/office/2006/metadata/properties" xmlns:xsi="http://www.w3.org/2001/XMLSchema-instance" xmlns:pc="http://schemas.microsoft.com/office/infopath/2007/PartnerControls">
-  <documentManagement/>
-</p:properties>
 </file>
 
 <file path=customXml/itemProps1.xml><?xml version="1.0" encoding="utf-8"?>
@@ -29875,14 +29884,6 @@
 </file>
 
 <file path=customXml/itemProps2.xml><?xml version="1.0" encoding="utf-8"?>
-<ds:datastoreItem xmlns:ds="http://schemas.openxmlformats.org/officeDocument/2006/customXml" ds:itemID="{A99115DC-C02A-4EF3-990D-5FF7CC0EE91A}">
-  <ds:schemaRefs>
-    <ds:schemaRef ds:uri="http://schemas.microsoft.com/sharepoint/v3/contenttype/forms"/>
-  </ds:schemaRefs>
-</ds:datastoreItem>
-</file>
-
-<file path=customXml/itemProps3.xml><?xml version="1.0" encoding="utf-8"?>
 <ds:datastoreItem xmlns:ds="http://schemas.openxmlformats.org/officeDocument/2006/customXml" ds:itemID="{5405BF3B-1233-4D26-8BBF-BED295340DF6}">
   <ds:schemaRefs>
     <ds:schemaRef ds:uri="http://purl.org/dc/terms/"/>
@@ -29895,4 +29896,12 @@
     <ds:schemaRef ds:uri="http://purl.org/dc/dcmitype/"/>
   </ds:schemaRefs>
 </ds:datastoreItem>
+</file>
+
+<file path=customXml/itemProps3.xml><?xml version="1.0" encoding="utf-8"?>
+<ds:datastoreItem xmlns:ds="http://schemas.openxmlformats.org/officeDocument/2006/customXml" ds:itemID="{A99115DC-C02A-4EF3-990D-5FF7CC0EE91A}">
+  <ds:schemaRefs>
+    <ds:schemaRef ds:uri="http://schemas.microsoft.com/sharepoint/v3/contenttype/forms"/>
+  </ds:schemaRefs>
+</ds:datastoreItem>
 </file>
</xml_diff>

<commit_message>
ex 0 description change
</commit_message>
<xml_diff>
--- a/WDSR - zarys programu.pptx
+++ b/WDSR - zarys programu.pptx
@@ -6430,690 +6430,6 @@
       <dsp:cNvGrpSpPr/>
     </dsp:nvGrpSpPr>
     <dsp:grpSpPr/>
-    <dsp:sp modelId="{401ECA87-A414-4C2E-815B-2E740FECD9DF}">
-      <dsp:nvSpPr>
-        <dsp:cNvPr id="0" name=""/>
-        <dsp:cNvSpPr/>
-      </dsp:nvSpPr>
-      <dsp:spPr>
-        <a:xfrm>
-          <a:off x="0" y="65571"/>
-          <a:ext cx="7363752" cy="421200"/>
-        </a:xfrm>
-        <a:prstGeom prst="roundRect">
-          <a:avLst/>
-        </a:prstGeom>
-        <a:solidFill>
-          <a:schemeClr val="accent1">
-            <a:hueOff val="0"/>
-            <a:satOff val="0"/>
-            <a:lumOff val="0"/>
-            <a:alphaOff val="0"/>
-          </a:schemeClr>
-        </a:solidFill>
-        <a:ln w="25400" cap="flat" cmpd="sng" algn="ctr">
-          <a:solidFill>
-            <a:schemeClr val="lt1">
-              <a:hueOff val="0"/>
-              <a:satOff val="0"/>
-              <a:lumOff val="0"/>
-              <a:alphaOff val="0"/>
-            </a:schemeClr>
-          </a:solidFill>
-          <a:prstDash val="solid"/>
-        </a:ln>
-        <a:effectLst/>
-      </dsp:spPr>
-      <dsp:style>
-        <a:lnRef idx="2">
-          <a:scrgbClr r="0" g="0" b="0"/>
-        </a:lnRef>
-        <a:fillRef idx="1">
-          <a:scrgbClr r="0" g="0" b="0"/>
-        </a:fillRef>
-        <a:effectRef idx="0">
-          <a:scrgbClr r="0" g="0" b="0"/>
-        </a:effectRef>
-        <a:fontRef idx="minor">
-          <a:schemeClr val="lt1"/>
-        </a:fontRef>
-      </dsp:style>
-      <dsp:txBody>
-        <a:bodyPr spcFirstLastPara="0" vert="horz" wrap="square" lIns="68580" tIns="68580" rIns="68580" bIns="68580" numCol="1" spcCol="1270" anchor="ctr" anchorCtr="0">
-          <a:noAutofit/>
-        </a:bodyPr>
-        <a:lstStyle/>
-        <a:p>
-          <a:pPr lvl="0" algn="l" defTabSz="800100">
-            <a:lnSpc>
-              <a:spcPct val="90000"/>
-            </a:lnSpc>
-            <a:spcBef>
-              <a:spcPct val="0"/>
-            </a:spcBef>
-            <a:spcAft>
-              <a:spcPct val="35000"/>
-            </a:spcAft>
-          </a:pPr>
-          <a:r>
-            <a:rPr lang="pl-PL" sz="1800" kern="1200" dirty="0" smtClean="0"/>
-            <a:t>Przezroczystość</a:t>
-          </a:r>
-          <a:endParaRPr lang="pl-PL" sz="1800" kern="1200" dirty="0"/>
-        </a:p>
-      </dsp:txBody>
-      <dsp:txXfrm>
-        <a:off x="20561" y="86132"/>
-        <a:ext cx="7322630" cy="380078"/>
-      </dsp:txXfrm>
-    </dsp:sp>
-    <dsp:sp modelId="{C7130AF6-5BCF-4F29-BA34-95CB85B72764}">
-      <dsp:nvSpPr>
-        <dsp:cNvPr id="0" name=""/>
-        <dsp:cNvSpPr/>
-      </dsp:nvSpPr>
-      <dsp:spPr>
-        <a:xfrm>
-          <a:off x="0" y="486771"/>
-          <a:ext cx="7363752" cy="419175"/>
-        </a:xfrm>
-        <a:prstGeom prst="rect">
-          <a:avLst/>
-        </a:prstGeom>
-        <a:noFill/>
-        <a:ln>
-          <a:noFill/>
-        </a:ln>
-        <a:effectLst/>
-      </dsp:spPr>
-      <dsp:style>
-        <a:lnRef idx="0">
-          <a:scrgbClr r="0" g="0" b="0"/>
-        </a:lnRef>
-        <a:fillRef idx="0">
-          <a:scrgbClr r="0" g="0" b="0"/>
-        </a:fillRef>
-        <a:effectRef idx="0">
-          <a:scrgbClr r="0" g="0" b="0"/>
-        </a:effectRef>
-        <a:fontRef idx="minor"/>
-      </dsp:style>
-      <dsp:txBody>
-        <a:bodyPr spcFirstLastPara="0" vert="horz" wrap="square" lIns="233799" tIns="22860" rIns="128016" bIns="22860" numCol="1" spcCol="1270" anchor="t" anchorCtr="0">
-          <a:noAutofit/>
-        </a:bodyPr>
-        <a:lstStyle/>
-        <a:p>
-          <a:pPr marL="114300" lvl="1" indent="-114300" algn="l" defTabSz="622300">
-            <a:lnSpc>
-              <a:spcPct val="90000"/>
-            </a:lnSpc>
-            <a:spcBef>
-              <a:spcPct val="0"/>
-            </a:spcBef>
-            <a:spcAft>
-              <a:spcPct val="20000"/>
-            </a:spcAft>
-            <a:buChar char="••"/>
-          </a:pPr>
-          <a:r>
-            <a:rPr lang="pl-PL" sz="1400" kern="1200" dirty="0" smtClean="0"/>
-            <a:t>Użytkownik nie musi być świadomy rozproszenia systemu, położenia zasobów, ich replikacji, awarii, wpływu innych użytkowników i innych czynników.</a:t>
-          </a:r>
-          <a:endParaRPr lang="pl-PL" sz="1400" kern="1200" dirty="0"/>
-        </a:p>
-      </dsp:txBody>
-      <dsp:txXfrm>
-        <a:off x="0" y="486771"/>
-        <a:ext cx="7363752" cy="419175"/>
-      </dsp:txXfrm>
-    </dsp:sp>
-    <dsp:sp modelId="{78DA6840-523F-44DE-8870-8809A7BF9028}">
-      <dsp:nvSpPr>
-        <dsp:cNvPr id="0" name=""/>
-        <dsp:cNvSpPr/>
-      </dsp:nvSpPr>
-      <dsp:spPr>
-        <a:xfrm>
-          <a:off x="0" y="905946"/>
-          <a:ext cx="7363752" cy="421200"/>
-        </a:xfrm>
-        <a:prstGeom prst="roundRect">
-          <a:avLst/>
-        </a:prstGeom>
-        <a:solidFill>
-          <a:schemeClr val="accent1">
-            <a:hueOff val="0"/>
-            <a:satOff val="0"/>
-            <a:lumOff val="0"/>
-            <a:alphaOff val="0"/>
-          </a:schemeClr>
-        </a:solidFill>
-        <a:ln w="25400" cap="flat" cmpd="sng" algn="ctr">
-          <a:solidFill>
-            <a:schemeClr val="lt1">
-              <a:hueOff val="0"/>
-              <a:satOff val="0"/>
-              <a:lumOff val="0"/>
-              <a:alphaOff val="0"/>
-            </a:schemeClr>
-          </a:solidFill>
-          <a:prstDash val="solid"/>
-        </a:ln>
-        <a:effectLst/>
-      </dsp:spPr>
-      <dsp:style>
-        <a:lnRef idx="2">
-          <a:scrgbClr r="0" g="0" b="0"/>
-        </a:lnRef>
-        <a:fillRef idx="1">
-          <a:scrgbClr r="0" g="0" b="0"/>
-        </a:fillRef>
-        <a:effectRef idx="0">
-          <a:scrgbClr r="0" g="0" b="0"/>
-        </a:effectRef>
-        <a:fontRef idx="minor">
-          <a:schemeClr val="lt1"/>
-        </a:fontRef>
-      </dsp:style>
-      <dsp:txBody>
-        <a:bodyPr spcFirstLastPara="0" vert="horz" wrap="square" lIns="68580" tIns="68580" rIns="68580" bIns="68580" numCol="1" spcCol="1270" anchor="ctr" anchorCtr="0">
-          <a:noAutofit/>
-        </a:bodyPr>
-        <a:lstStyle/>
-        <a:p>
-          <a:pPr lvl="0" algn="l" defTabSz="800100">
-            <a:lnSpc>
-              <a:spcPct val="90000"/>
-            </a:lnSpc>
-            <a:spcBef>
-              <a:spcPct val="0"/>
-            </a:spcBef>
-            <a:spcAft>
-              <a:spcPct val="35000"/>
-            </a:spcAft>
-          </a:pPr>
-          <a:r>
-            <a:rPr lang="pl-PL" sz="1800" kern="1200" dirty="0" smtClean="0"/>
-            <a:t>Otwartość</a:t>
-          </a:r>
-          <a:endParaRPr lang="pl-PL" sz="1800" kern="1200" dirty="0"/>
-        </a:p>
-      </dsp:txBody>
-      <dsp:txXfrm>
-        <a:off x="20561" y="926507"/>
-        <a:ext cx="7322630" cy="380078"/>
-      </dsp:txXfrm>
-    </dsp:sp>
-    <dsp:sp modelId="{9C495DF5-169D-4A31-B3DB-88DFF8C7AB22}">
-      <dsp:nvSpPr>
-        <dsp:cNvPr id="0" name=""/>
-        <dsp:cNvSpPr/>
-      </dsp:nvSpPr>
-      <dsp:spPr>
-        <a:xfrm>
-          <a:off x="0" y="1327146"/>
-          <a:ext cx="7363752" cy="419175"/>
-        </a:xfrm>
-        <a:prstGeom prst="rect">
-          <a:avLst/>
-        </a:prstGeom>
-        <a:noFill/>
-        <a:ln>
-          <a:noFill/>
-        </a:ln>
-        <a:effectLst/>
-      </dsp:spPr>
-      <dsp:style>
-        <a:lnRef idx="0">
-          <a:scrgbClr r="0" g="0" b="0"/>
-        </a:lnRef>
-        <a:fillRef idx="0">
-          <a:scrgbClr r="0" g="0" b="0"/>
-        </a:fillRef>
-        <a:effectRef idx="0">
-          <a:scrgbClr r="0" g="0" b="0"/>
-        </a:effectRef>
-        <a:fontRef idx="minor"/>
-      </dsp:style>
-      <dsp:txBody>
-        <a:bodyPr spcFirstLastPara="0" vert="horz" wrap="square" lIns="233799" tIns="22860" rIns="128016" bIns="22860" numCol="1" spcCol="1270" anchor="t" anchorCtr="0">
-          <a:noAutofit/>
-        </a:bodyPr>
-        <a:lstStyle/>
-        <a:p>
-          <a:pPr marL="114300" lvl="1" indent="-114300" algn="l" defTabSz="622300">
-            <a:lnSpc>
-              <a:spcPct val="90000"/>
-            </a:lnSpc>
-            <a:spcBef>
-              <a:spcPct val="0"/>
-            </a:spcBef>
-            <a:spcAft>
-              <a:spcPct val="20000"/>
-            </a:spcAft>
-            <a:buChar char="••"/>
-          </a:pPr>
-          <a:r>
-            <a:rPr lang="pl-PL" sz="1400" kern="1200" dirty="0" smtClean="0"/>
-            <a:t>Usługi poszczególnych elementów są zgodne ze standardowymi regułami definiującymi ich składnię i semantykę. Dzięki temu zmiana lub rozbudowa systemu jest ułatwiona.</a:t>
-          </a:r>
-          <a:endParaRPr lang="pl-PL" sz="1400" kern="1200" dirty="0"/>
-        </a:p>
-      </dsp:txBody>
-      <dsp:txXfrm>
-        <a:off x="0" y="1327146"/>
-        <a:ext cx="7363752" cy="419175"/>
-      </dsp:txXfrm>
-    </dsp:sp>
-    <dsp:sp modelId="{5AF62516-935A-4716-BC3C-96D1A9708875}">
-      <dsp:nvSpPr>
-        <dsp:cNvPr id="0" name=""/>
-        <dsp:cNvSpPr/>
-      </dsp:nvSpPr>
-      <dsp:spPr>
-        <a:xfrm>
-          <a:off x="0" y="1746321"/>
-          <a:ext cx="7363752" cy="421200"/>
-        </a:xfrm>
-        <a:prstGeom prst="roundRect">
-          <a:avLst/>
-        </a:prstGeom>
-        <a:solidFill>
-          <a:schemeClr val="accent1">
-            <a:hueOff val="0"/>
-            <a:satOff val="0"/>
-            <a:lumOff val="0"/>
-            <a:alphaOff val="0"/>
-          </a:schemeClr>
-        </a:solidFill>
-        <a:ln w="25400" cap="flat" cmpd="sng" algn="ctr">
-          <a:solidFill>
-            <a:schemeClr val="lt1">
-              <a:hueOff val="0"/>
-              <a:satOff val="0"/>
-              <a:lumOff val="0"/>
-              <a:alphaOff val="0"/>
-            </a:schemeClr>
-          </a:solidFill>
-          <a:prstDash val="solid"/>
-        </a:ln>
-        <a:effectLst/>
-      </dsp:spPr>
-      <dsp:style>
-        <a:lnRef idx="2">
-          <a:scrgbClr r="0" g="0" b="0"/>
-        </a:lnRef>
-        <a:fillRef idx="1">
-          <a:scrgbClr r="0" g="0" b="0"/>
-        </a:fillRef>
-        <a:effectRef idx="0">
-          <a:scrgbClr r="0" g="0" b="0"/>
-        </a:effectRef>
-        <a:fontRef idx="minor">
-          <a:schemeClr val="lt1"/>
-        </a:fontRef>
-      </dsp:style>
-      <dsp:txBody>
-        <a:bodyPr spcFirstLastPara="0" vert="horz" wrap="square" lIns="68580" tIns="68580" rIns="68580" bIns="68580" numCol="1" spcCol="1270" anchor="ctr" anchorCtr="0">
-          <a:noAutofit/>
-        </a:bodyPr>
-        <a:lstStyle/>
-        <a:p>
-          <a:pPr lvl="0" algn="l" defTabSz="800100">
-            <a:lnSpc>
-              <a:spcPct val="90000"/>
-            </a:lnSpc>
-            <a:spcBef>
-              <a:spcPct val="0"/>
-            </a:spcBef>
-            <a:spcAft>
-              <a:spcPct val="35000"/>
-            </a:spcAft>
-          </a:pPr>
-          <a:r>
-            <a:rPr lang="pl-PL" sz="1800" kern="1200" dirty="0" smtClean="0"/>
-            <a:t>Odporność na awarie</a:t>
-          </a:r>
-        </a:p>
-      </dsp:txBody>
-      <dsp:txXfrm>
-        <a:off x="20561" y="1766882"/>
-        <a:ext cx="7322630" cy="380078"/>
-      </dsp:txXfrm>
-    </dsp:sp>
-    <dsp:sp modelId="{5EE99CAA-C70B-49D9-9943-E42F93D8C815}">
-      <dsp:nvSpPr>
-        <dsp:cNvPr id="0" name=""/>
-        <dsp:cNvSpPr/>
-      </dsp:nvSpPr>
-      <dsp:spPr>
-        <a:xfrm>
-          <a:off x="0" y="2167521"/>
-          <a:ext cx="7363752" cy="419175"/>
-        </a:xfrm>
-        <a:prstGeom prst="rect">
-          <a:avLst/>
-        </a:prstGeom>
-        <a:noFill/>
-        <a:ln>
-          <a:noFill/>
-        </a:ln>
-        <a:effectLst/>
-      </dsp:spPr>
-      <dsp:style>
-        <a:lnRef idx="0">
-          <a:scrgbClr r="0" g="0" b="0"/>
-        </a:lnRef>
-        <a:fillRef idx="0">
-          <a:scrgbClr r="0" g="0" b="0"/>
-        </a:fillRef>
-        <a:effectRef idx="0">
-          <a:scrgbClr r="0" g="0" b="0"/>
-        </a:effectRef>
-        <a:fontRef idx="minor"/>
-      </dsp:style>
-      <dsp:txBody>
-        <a:bodyPr spcFirstLastPara="0" vert="horz" wrap="square" lIns="233799" tIns="22860" rIns="128016" bIns="22860" numCol="1" spcCol="1270" anchor="t" anchorCtr="0">
-          <a:noAutofit/>
-        </a:bodyPr>
-        <a:lstStyle/>
-        <a:p>
-          <a:pPr marL="114300" lvl="1" indent="-114300" algn="l" defTabSz="622300">
-            <a:lnSpc>
-              <a:spcPct val="90000"/>
-            </a:lnSpc>
-            <a:spcBef>
-              <a:spcPct val="0"/>
-            </a:spcBef>
-            <a:spcAft>
-              <a:spcPct val="20000"/>
-            </a:spcAft>
-            <a:buChar char="••"/>
-          </a:pPr>
-          <a:r>
-            <a:rPr lang="pl-PL" sz="1400" kern="1200" dirty="0" smtClean="0"/>
-            <a:t>System złożony z nadmiarowych elementów może być bardziej odporny niż system złożony z pojedynczych elementów.</a:t>
-          </a:r>
-        </a:p>
-      </dsp:txBody>
-      <dsp:txXfrm>
-        <a:off x="0" y="2167521"/>
-        <a:ext cx="7363752" cy="419175"/>
-      </dsp:txXfrm>
-    </dsp:sp>
-    <dsp:sp modelId="{8E384E35-9385-455F-B372-4AA6FE4C9346}">
-      <dsp:nvSpPr>
-        <dsp:cNvPr id="0" name=""/>
-        <dsp:cNvSpPr/>
-      </dsp:nvSpPr>
-      <dsp:spPr>
-        <a:xfrm>
-          <a:off x="0" y="2604074"/>
-          <a:ext cx="7363752" cy="421200"/>
-        </a:xfrm>
-        <a:prstGeom prst="roundRect">
-          <a:avLst/>
-        </a:prstGeom>
-        <a:solidFill>
-          <a:schemeClr val="accent1">
-            <a:hueOff val="0"/>
-            <a:satOff val="0"/>
-            <a:lumOff val="0"/>
-            <a:alphaOff val="0"/>
-          </a:schemeClr>
-        </a:solidFill>
-        <a:ln w="25400" cap="flat" cmpd="sng" algn="ctr">
-          <a:solidFill>
-            <a:schemeClr val="lt1">
-              <a:hueOff val="0"/>
-              <a:satOff val="0"/>
-              <a:lumOff val="0"/>
-              <a:alphaOff val="0"/>
-            </a:schemeClr>
-          </a:solidFill>
-          <a:prstDash val="solid"/>
-        </a:ln>
-        <a:effectLst/>
-      </dsp:spPr>
-      <dsp:style>
-        <a:lnRef idx="2">
-          <a:scrgbClr r="0" g="0" b="0"/>
-        </a:lnRef>
-        <a:fillRef idx="1">
-          <a:scrgbClr r="0" g="0" b="0"/>
-        </a:fillRef>
-        <a:effectRef idx="0">
-          <a:scrgbClr r="0" g="0" b="0"/>
-        </a:effectRef>
-        <a:fontRef idx="minor">
-          <a:schemeClr val="lt1"/>
-        </a:fontRef>
-      </dsp:style>
-      <dsp:txBody>
-        <a:bodyPr spcFirstLastPara="0" vert="horz" wrap="square" lIns="68580" tIns="68580" rIns="68580" bIns="68580" numCol="1" spcCol="1270" anchor="ctr" anchorCtr="0">
-          <a:noAutofit/>
-        </a:bodyPr>
-        <a:lstStyle/>
-        <a:p>
-          <a:pPr lvl="0" algn="l" defTabSz="800100">
-            <a:lnSpc>
-              <a:spcPct val="90000"/>
-            </a:lnSpc>
-            <a:spcBef>
-              <a:spcPct val="0"/>
-            </a:spcBef>
-            <a:spcAft>
-              <a:spcPct val="35000"/>
-            </a:spcAft>
-          </a:pPr>
-          <a:r>
-            <a:rPr lang="pl-PL" sz="1800" kern="1200" dirty="0" smtClean="0"/>
-            <a:t>Wydajność</a:t>
-          </a:r>
-        </a:p>
-      </dsp:txBody>
-      <dsp:txXfrm>
-        <a:off x="20561" y="2624635"/>
-        <a:ext cx="7322630" cy="380078"/>
-      </dsp:txXfrm>
-    </dsp:sp>
-    <dsp:sp modelId="{7E58D7A6-E1A3-4F64-B2F9-76B3525CD76E}">
-      <dsp:nvSpPr>
-        <dsp:cNvPr id="0" name=""/>
-        <dsp:cNvSpPr/>
-      </dsp:nvSpPr>
-      <dsp:spPr>
-        <a:xfrm>
-          <a:off x="0" y="3007896"/>
-          <a:ext cx="7363752" cy="782460"/>
-        </a:xfrm>
-        <a:prstGeom prst="rect">
-          <a:avLst/>
-        </a:prstGeom>
-        <a:noFill/>
-        <a:ln>
-          <a:noFill/>
-        </a:ln>
-        <a:effectLst/>
-      </dsp:spPr>
-      <dsp:style>
-        <a:lnRef idx="0">
-          <a:scrgbClr r="0" g="0" b="0"/>
-        </a:lnRef>
-        <a:fillRef idx="0">
-          <a:scrgbClr r="0" g="0" b="0"/>
-        </a:fillRef>
-        <a:effectRef idx="0">
-          <a:scrgbClr r="0" g="0" b="0"/>
-        </a:effectRef>
-        <a:fontRef idx="minor"/>
-      </dsp:style>
-      <dsp:txBody>
-        <a:bodyPr spcFirstLastPara="0" vert="horz" wrap="square" lIns="233799" tIns="22860" rIns="128016" bIns="22860" numCol="1" spcCol="1270" anchor="t" anchorCtr="0">
-          <a:noAutofit/>
-        </a:bodyPr>
-        <a:lstStyle/>
-        <a:p>
-          <a:pPr marL="114300" lvl="1" indent="-114300" algn="l" defTabSz="622300">
-            <a:lnSpc>
-              <a:spcPct val="90000"/>
-            </a:lnSpc>
-            <a:spcBef>
-              <a:spcPct val="0"/>
-            </a:spcBef>
-            <a:spcAft>
-              <a:spcPct val="20000"/>
-            </a:spcAft>
-            <a:buChar char="••"/>
-          </a:pPr>
-          <a:r>
-            <a:rPr lang="pl-PL" sz="1400" kern="1200" dirty="0" smtClean="0"/>
-            <a:t>Zmultiplikowane elementy pozwalają wykonać tę samą operację szybciej poprzez zrównoleglenie obliczeń. Trzeba jednak brać pod uwagę narzut na komunikację pomiędzy elementami oraz dodatkowe operacje potrzebne na przykład dla zapewnienia odporności na awarie.</a:t>
-          </a:r>
-        </a:p>
-      </dsp:txBody>
-      <dsp:txXfrm>
-        <a:off x="0" y="3007896"/>
-        <a:ext cx="7363752" cy="782460"/>
-      </dsp:txXfrm>
-    </dsp:sp>
-    <dsp:sp modelId="{1A51C3D3-58C0-4069-AB0A-A95B0B4B888D}">
-      <dsp:nvSpPr>
-        <dsp:cNvPr id="0" name=""/>
-        <dsp:cNvSpPr/>
-      </dsp:nvSpPr>
-      <dsp:spPr>
-        <a:xfrm>
-          <a:off x="0" y="3790356"/>
-          <a:ext cx="7363752" cy="421200"/>
-        </a:xfrm>
-        <a:prstGeom prst="roundRect">
-          <a:avLst/>
-        </a:prstGeom>
-        <a:solidFill>
-          <a:schemeClr val="accent1">
-            <a:hueOff val="0"/>
-            <a:satOff val="0"/>
-            <a:lumOff val="0"/>
-            <a:alphaOff val="0"/>
-          </a:schemeClr>
-        </a:solidFill>
-        <a:ln w="25400" cap="flat" cmpd="sng" algn="ctr">
-          <a:solidFill>
-            <a:schemeClr val="lt1">
-              <a:hueOff val="0"/>
-              <a:satOff val="0"/>
-              <a:lumOff val="0"/>
-              <a:alphaOff val="0"/>
-            </a:schemeClr>
-          </a:solidFill>
-          <a:prstDash val="solid"/>
-        </a:ln>
-        <a:effectLst/>
-      </dsp:spPr>
-      <dsp:style>
-        <a:lnRef idx="2">
-          <a:scrgbClr r="0" g="0" b="0"/>
-        </a:lnRef>
-        <a:fillRef idx="1">
-          <a:scrgbClr r="0" g="0" b="0"/>
-        </a:fillRef>
-        <a:effectRef idx="0">
-          <a:scrgbClr r="0" g="0" b="0"/>
-        </a:effectRef>
-        <a:fontRef idx="minor">
-          <a:schemeClr val="lt1"/>
-        </a:fontRef>
-      </dsp:style>
-      <dsp:txBody>
-        <a:bodyPr spcFirstLastPara="0" vert="horz" wrap="square" lIns="68580" tIns="68580" rIns="68580" bIns="68580" numCol="1" spcCol="1270" anchor="ctr" anchorCtr="0">
-          <a:noAutofit/>
-        </a:bodyPr>
-        <a:lstStyle/>
-        <a:p>
-          <a:pPr lvl="0" algn="l" defTabSz="800100">
-            <a:lnSpc>
-              <a:spcPct val="90000"/>
-            </a:lnSpc>
-            <a:spcBef>
-              <a:spcPct val="0"/>
-            </a:spcBef>
-            <a:spcAft>
-              <a:spcPct val="35000"/>
-            </a:spcAft>
-          </a:pPr>
-          <a:r>
-            <a:rPr lang="pl-PL" sz="1800" kern="1200" dirty="0" smtClean="0"/>
-            <a:t>Skalowalność</a:t>
-          </a:r>
-        </a:p>
-      </dsp:txBody>
-      <dsp:txXfrm>
-        <a:off x="20561" y="3810917"/>
-        <a:ext cx="7322630" cy="380078"/>
-      </dsp:txXfrm>
-    </dsp:sp>
-    <dsp:sp modelId="{C4D7444D-E9C0-4694-BF04-B566F459108B}">
-      <dsp:nvSpPr>
-        <dsp:cNvPr id="0" name=""/>
-        <dsp:cNvSpPr/>
-      </dsp:nvSpPr>
-      <dsp:spPr>
-        <a:xfrm>
-          <a:off x="0" y="4211556"/>
-          <a:ext cx="7363752" cy="419175"/>
-        </a:xfrm>
-        <a:prstGeom prst="rect">
-          <a:avLst/>
-        </a:prstGeom>
-        <a:noFill/>
-        <a:ln>
-          <a:noFill/>
-        </a:ln>
-        <a:effectLst/>
-      </dsp:spPr>
-      <dsp:style>
-        <a:lnRef idx="0">
-          <a:scrgbClr r="0" g="0" b="0"/>
-        </a:lnRef>
-        <a:fillRef idx="0">
-          <a:scrgbClr r="0" g="0" b="0"/>
-        </a:fillRef>
-        <a:effectRef idx="0">
-          <a:scrgbClr r="0" g="0" b="0"/>
-        </a:effectRef>
-        <a:fontRef idx="minor"/>
-      </dsp:style>
-      <dsp:txBody>
-        <a:bodyPr spcFirstLastPara="0" vert="horz" wrap="square" lIns="233799" tIns="22860" rIns="128016" bIns="22860" numCol="1" spcCol="1270" anchor="t" anchorCtr="0">
-          <a:noAutofit/>
-        </a:bodyPr>
-        <a:lstStyle/>
-        <a:p>
-          <a:pPr marL="114300" lvl="1" indent="-114300" algn="l" defTabSz="622300">
-            <a:lnSpc>
-              <a:spcPct val="90000"/>
-            </a:lnSpc>
-            <a:spcBef>
-              <a:spcPct val="0"/>
-            </a:spcBef>
-            <a:spcAft>
-              <a:spcPct val="20000"/>
-            </a:spcAft>
-            <a:buChar char="••"/>
-          </a:pPr>
-          <a:r>
-            <a:rPr lang="pl-PL" sz="1400" kern="1200" dirty="0" smtClean="0"/>
-            <a:t>Wydajność i pojemność dobrze zaprojektowanego systemu można modyfikować w miarę wzrostu potrzeb.</a:t>
-          </a:r>
-        </a:p>
-      </dsp:txBody>
-      <dsp:txXfrm>
-        <a:off x="0" y="4211556"/>
-        <a:ext cx="7363752" cy="419175"/>
-      </dsp:txXfrm>
-    </dsp:sp>
   </dsp:spTree>
 </dsp:drawing>
 </file>
@@ -14704,7 +14020,7 @@
             <a:fld id="{E906F336-2E39-43F8-9DF9-B9244679DDFB}" type="datetime5">
               <a:rPr lang="en-US" altLang="pl-PL"/>
               <a:pPr/>
-              <a:t>16-Feb-17</a:t>
+              <a:t>18-Feb-17</a:t>
             </a:fld>
             <a:endParaRPr lang="en-US" altLang="pl-PL"/>
           </a:p>
@@ -15031,7 +14347,7 @@
             <a:fld id="{7B2EBB8C-B024-47EA-BB67-9AC43555CB71}" type="datetime5">
               <a:rPr lang="en-US" altLang="pl-PL"/>
               <a:pPr/>
-              <a:t>16-Feb-17</a:t>
+              <a:t>18-Feb-17</a:t>
             </a:fld>
             <a:endParaRPr lang="en-US" altLang="pl-PL"/>
           </a:p>
@@ -15595,7 +14911,7 @@
             <a:fld id="{AF037DEB-4CF1-4C5F-B037-398229B9C945}" type="datetime5">
               <a:rPr lang="en-US" altLang="pl-PL"/>
               <a:pPr/>
-              <a:t>16-Feb-17</a:t>
+              <a:t>18-Feb-17</a:t>
             </a:fld>
             <a:endParaRPr lang="de-DE" altLang="pl-PL"/>
           </a:p>
@@ -15745,7 +15061,7 @@
             <a:fld id="{9D49F2BD-E1AC-4AED-B4E5-321CBE4AD3D2}" type="datetime5">
               <a:rPr lang="en-US" altLang="pl-PL"/>
               <a:pPr/>
-              <a:t>16-Feb-17</a:t>
+              <a:t>18-Feb-17</a:t>
             </a:fld>
             <a:endParaRPr lang="en-US" altLang="pl-PL"/>
           </a:p>
@@ -16019,7 +15335,7 @@
             <a:fld id="{6DE49DB7-DE0A-4B13-98D6-E8B911A92E91}" type="datetime5">
               <a:rPr lang="en-US" altLang="pl-PL"/>
               <a:pPr/>
-              <a:t>16-Feb-17</a:t>
+              <a:t>18-Feb-17</a:t>
             </a:fld>
             <a:endParaRPr lang="en-US" altLang="pl-PL"/>
           </a:p>
@@ -16476,7 +15792,7 @@
             <a:fld id="{57896E6B-B1BC-4ECC-9043-421F9FF1FF7E}" type="datetime5">
               <a:rPr lang="en-US" altLang="pl-PL"/>
               <a:pPr/>
-              <a:t>16-Feb-17</a:t>
+              <a:t>18-Feb-17</a:t>
             </a:fld>
             <a:endParaRPr lang="en-US" altLang="pl-PL"/>
           </a:p>
@@ -17195,9 +16511,6 @@
               </a:rPr>
               <a:t>Daniel Boguszewicz</a:t>
             </a:r>
-            <a:endParaRPr lang="pl-PL" altLang="pl-PL" dirty="0" smtClean="0">
-              <a:cs typeface="ＭＳ Ｐゴシック" charset="-128"/>
-            </a:endParaRPr>
           </a:p>
           <a:p>
             <a:pPr>
@@ -17485,7 +16798,7 @@
                 </a:solidFill>
               </a:rPr>
               <a:pPr/>
-              <a:t>16-Feb-17</a:t>
+              <a:t>18-Feb-17</a:t>
             </a:fld>
             <a:endParaRPr lang="en-US" altLang="pl-PL" sz="900">
               <a:solidFill>
@@ -18346,13 +17659,8 @@
             </a:pPr>
             <a:r>
               <a:rPr lang="pl-PL" sz="1800" dirty="0" smtClean="0"/>
-              <a:t>Zamieszczenie kompletnych źródeł projektu na GitHub </a:t>
+              <a:t>Zamieszczenie kompletnych źródeł projektu na GitHub przed 15 zajęciami.</a:t>
             </a:r>
-            <a:r>
-              <a:rPr lang="pl-PL" sz="1800" dirty="0" smtClean="0"/>
-              <a:t>przed 15 zajęciami.</a:t>
-            </a:r>
-            <a:endParaRPr lang="pl-PL" sz="1800" dirty="0" smtClean="0"/>
           </a:p>
           <a:p>
             <a:pPr lvl="1">
@@ -18371,19 +17679,7 @@
             </a:pPr>
             <a:r>
               <a:rPr lang="pl-PL" sz="1800" dirty="0" smtClean="0"/>
-              <a:t>Pokrycie testami jednostkowymi </a:t>
-            </a:r>
-            <a:r>
-              <a:rPr lang="pl-PL" sz="1800" dirty="0" smtClean="0"/>
-              <a:t>na </a:t>
-            </a:r>
-            <a:r>
-              <a:rPr lang="pl-PL" sz="1800" dirty="0" smtClean="0"/>
-              <a:t>poziomie </a:t>
-            </a:r>
-            <a:r>
-              <a:rPr lang="pl-PL" sz="1800" dirty="0" smtClean="0"/>
-              <a:t>&gt;=60%.</a:t>
+              <a:t>Pokrycie testami jednostkowymi na poziomie &gt;=60%.</a:t>
             </a:r>
           </a:p>
           <a:p>
@@ -18393,11 +17689,7 @@
             </a:pPr>
             <a:r>
               <a:rPr lang="pl-PL" sz="1800" dirty="0" smtClean="0"/>
-              <a:t>Krótkie </a:t>
-            </a:r>
-            <a:r>
-              <a:rPr lang="pl-PL" sz="1800" dirty="0" smtClean="0"/>
-              <a:t>zaprezentowanie działającej aplikacji na 15-tych zajęciach.</a:t>
+              <a:t>Krótkie zaprezentowanie działającej aplikacji na 15-tych zajęciach.</a:t>
             </a:r>
           </a:p>
           <a:p>
@@ -18407,15 +17699,7 @@
             </a:pPr>
             <a:r>
               <a:rPr lang="pl-PL" sz="1800" dirty="0" smtClean="0"/>
-              <a:t>Akceptowana jest dowolność interpretacji wymagań gdy są one </a:t>
-            </a:r>
-            <a:r>
-              <a:rPr lang="pl-PL" sz="1800" dirty="0" smtClean="0"/>
-              <a:t>nieprecyzyjne</a:t>
-            </a:r>
-            <a:r>
-              <a:rPr lang="pl-PL" sz="1800" dirty="0" smtClean="0"/>
-              <a:t>. </a:t>
+              <a:t>Akceptowana jest dowolność interpretacji wymagań gdy są one nieprecyzyjne. </a:t>
             </a:r>
           </a:p>
         </p:txBody>
@@ -18461,7 +17745,7 @@
             <a:fld id="{E906F336-2E39-43F8-9DF9-B9244679DDFB}" type="datetime5">
               <a:rPr lang="en-US" altLang="pl-PL" smtClean="0"/>
               <a:pPr/>
-              <a:t>16-Feb-17</a:t>
+              <a:t>18-Feb-17</a:t>
             </a:fld>
             <a:endParaRPr lang="en-US" altLang="pl-PL"/>
           </a:p>
@@ -18724,7 +18008,7 @@
                 </a:solidFill>
               </a:rPr>
               <a:pPr/>
-              <a:t>16-Feb-17</a:t>
+              <a:t>18-Feb-17</a:t>
             </a:fld>
             <a:endParaRPr lang="en-US" altLang="pl-PL" sz="900">
               <a:solidFill>
@@ -19317,7 +18601,11 @@
             </a:pPr>
             <a:r>
               <a:rPr lang="pl-PL" sz="1600" dirty="0" smtClean="0"/>
-              <a:t>Zmodyfikuj w dowolnym edytorze plik README.md – dopisz link do swojego profilu GitHub na końcu pliku.</a:t>
+              <a:t>Zmodyfikuj w dowolnym edytorze plik README.md – </a:t>
+            </a:r>
+            <a:r>
+              <a:rPr lang="pl-PL" sz="1600" dirty="0" smtClean="0"/>
+              <a:t>dodaj w nim swoje imie i nazwisko</a:t>
             </a:r>
           </a:p>
           <a:p>
@@ -19333,7 +18621,11 @@
             </a:pPr>
             <a:r>
               <a:rPr lang="pl-PL" sz="1600" dirty="0" smtClean="0"/>
-              <a:t>Wgraj zmodyfikowany plik z powrotem do repozytorium:</a:t>
+              <a:t>Wgraj </a:t>
+            </a:r>
+            <a:r>
+              <a:rPr lang="pl-PL" sz="1600" dirty="0" smtClean="0"/>
+              <a:t>zmodyfikowany plik z powrotem do repozytorium:</a:t>
             </a:r>
           </a:p>
           <a:p>
@@ -19627,21 +18919,8 @@
                   <a:srgbClr val="00B050"/>
                 </a:solidFill>
               </a:rPr>
-              <a:t>Ostateczny termin zaliczenia ćwiczenia: </a:t>
+              <a:t>Ostateczny termin zaliczenia ćwiczenia: 1.03.2017</a:t>
             </a:r>
-            <a:r>
-              <a:rPr lang="pl-PL" sz="1600" b="1" dirty="0" smtClean="0">
-                <a:solidFill>
-                  <a:srgbClr val="00B050"/>
-                </a:solidFill>
-              </a:rPr>
-              <a:t>1.03.2017</a:t>
-            </a:r>
-            <a:endParaRPr lang="pl-PL" sz="1600" b="1" dirty="0" smtClean="0">
-              <a:solidFill>
-                <a:srgbClr val="00B050"/>
-              </a:solidFill>
-            </a:endParaRPr>
           </a:p>
           <a:p>
             <a:pPr>
@@ -19888,7 +19167,7 @@
                 </a:solidFill>
               </a:rPr>
               <a:pPr/>
-              <a:t>16-Feb-17</a:t>
+              <a:t>18-Feb-17</a:t>
             </a:fld>
             <a:endParaRPr lang="en-US" altLang="pl-PL" sz="900">
               <a:solidFill>
@@ -20404,21 +19683,8 @@
                   <a:srgbClr val="00B050"/>
                 </a:solidFill>
               </a:rPr>
-              <a:t>Ostateczny termin zaliczenia ćwiczenia</a:t>
+              <a:t>Ostateczny termin zaliczenia ćwiczenia: 1.03.2017</a:t>
             </a:r>
-            <a:r>
-              <a:rPr lang="pl-PL" sz="950" b="1" dirty="0" smtClean="0">
-                <a:solidFill>
-                  <a:srgbClr val="00B050"/>
-                </a:solidFill>
-              </a:rPr>
-              <a:t>: 1.03.2017</a:t>
-            </a:r>
-            <a:endParaRPr lang="pl-PL" sz="950" b="1" dirty="0" smtClean="0">
-              <a:solidFill>
-                <a:srgbClr val="00B050"/>
-              </a:solidFill>
-            </a:endParaRPr>
           </a:p>
           <a:p>
             <a:pPr>
@@ -21113,7 +20379,7 @@
                 </a:solidFill>
               </a:rPr>
               <a:pPr/>
-              <a:t>16-Feb-17</a:t>
+              <a:t>18-Feb-17</a:t>
             </a:fld>
             <a:endParaRPr lang="en-US" altLang="pl-PL" sz="900">
               <a:solidFill>
@@ -21768,7 +21034,7 @@
                 </a:solidFill>
               </a:rPr>
               <a:pPr/>
-              <a:t>16-Feb-17</a:t>
+              <a:t>18-Feb-17</a:t>
             </a:fld>
             <a:endParaRPr lang="en-US" altLang="pl-PL" sz="900">
               <a:solidFill>
@@ -23108,7 +22374,7 @@
                 </a:solidFill>
               </a:rPr>
               <a:pPr/>
-              <a:t>16-Feb-17</a:t>
+              <a:t>18-Feb-17</a:t>
             </a:fld>
             <a:endParaRPr lang="en-US" altLang="pl-PL" sz="900">
               <a:solidFill>
@@ -24176,7 +23442,7 @@
                 </a:solidFill>
               </a:rPr>
               <a:pPr/>
-              <a:t>16-Feb-17</a:t>
+              <a:t>18-Feb-17</a:t>
             </a:fld>
             <a:endParaRPr lang="en-US" altLang="pl-PL" sz="900">
               <a:solidFill>
@@ -25048,7 +24314,7 @@
                 </a:solidFill>
               </a:rPr>
               <a:pPr/>
-              <a:t>16-Feb-17</a:t>
+              <a:t>18-Feb-17</a:t>
             </a:fld>
             <a:endParaRPr lang="en-US" altLang="pl-PL" sz="900">
               <a:solidFill>
@@ -26116,7 +25382,7 @@
                 </a:solidFill>
               </a:rPr>
               <a:pPr/>
-              <a:t>16-Feb-17</a:t>
+              <a:t>18-Feb-17</a:t>
             </a:fld>
             <a:endParaRPr lang="en-US" altLang="pl-PL" sz="900">
               <a:solidFill>
@@ -26728,7 +25994,7 @@
                 </a:solidFill>
               </a:rPr>
               <a:pPr/>
-              <a:t>16-Feb-17</a:t>
+              <a:t>18-Feb-17</a:t>
             </a:fld>
             <a:endParaRPr lang="en-US" altLang="pl-PL" sz="900">
               <a:solidFill>
@@ -27600,7 +26866,7 @@
                 </a:solidFill>
               </a:rPr>
               <a:pPr/>
-              <a:t>16-Feb-17</a:t>
+              <a:t>18-Feb-17</a:t>
             </a:fld>
             <a:endParaRPr lang="en-US" altLang="pl-PL" sz="900">
               <a:solidFill>
@@ -29853,18 +29119,18 @@
 </file>
 
 <file path=customXml/item2.xml><?xml version="1.0" encoding="utf-8"?>
-<p:properties xmlns:p="http://schemas.microsoft.com/office/2006/metadata/properties" xmlns:xsi="http://www.w3.org/2001/XMLSchema-instance" xmlns:pc="http://schemas.microsoft.com/office/infopath/2007/PartnerControls">
-  <documentManagement/>
-</p:properties>
-</file>
-
-<file path=customXml/item3.xml><?xml version="1.0" encoding="utf-8"?>
 <?mso-contentType ?>
 <FormTemplates xmlns="http://schemas.microsoft.com/sharepoint/v3/contenttype/forms">
   <Display>DocumentLibraryForm</Display>
   <Edit>DocumentLibraryForm</Edit>
   <New>DocumentLibraryForm</New>
 </FormTemplates>
+</file>
+
+<file path=customXml/item3.xml><?xml version="1.0" encoding="utf-8"?>
+<p:properties xmlns:p="http://schemas.microsoft.com/office/2006/metadata/properties" xmlns:xsi="http://www.w3.org/2001/XMLSchema-instance" xmlns:pc="http://schemas.microsoft.com/office/infopath/2007/PartnerControls">
+  <documentManagement/>
+</p:properties>
 </file>
 
 <file path=customXml/itemProps1.xml><?xml version="1.0" encoding="utf-8"?>
@@ -29884,6 +29150,14 @@
 </file>
 
 <file path=customXml/itemProps2.xml><?xml version="1.0" encoding="utf-8"?>
+<ds:datastoreItem xmlns:ds="http://schemas.openxmlformats.org/officeDocument/2006/customXml" ds:itemID="{A99115DC-C02A-4EF3-990D-5FF7CC0EE91A}">
+  <ds:schemaRefs>
+    <ds:schemaRef ds:uri="http://schemas.microsoft.com/sharepoint/v3/contenttype/forms"/>
+  </ds:schemaRefs>
+</ds:datastoreItem>
+</file>
+
+<file path=customXml/itemProps3.xml><?xml version="1.0" encoding="utf-8"?>
 <ds:datastoreItem xmlns:ds="http://schemas.openxmlformats.org/officeDocument/2006/customXml" ds:itemID="{5405BF3B-1233-4D26-8BBF-BED295340DF6}">
   <ds:schemaRefs>
     <ds:schemaRef ds:uri="http://purl.org/dc/terms/"/>
@@ -29896,12 +29170,4 @@
     <ds:schemaRef ds:uri="http://purl.org/dc/dcmitype/"/>
   </ds:schemaRefs>
 </ds:datastoreItem>
-</file>
-
-<file path=customXml/itemProps3.xml><?xml version="1.0" encoding="utf-8"?>
-<ds:datastoreItem xmlns:ds="http://schemas.openxmlformats.org/officeDocument/2006/customXml" ds:itemID="{A99115DC-C02A-4EF3-990D-5FF7CC0EE91A}">
-  <ds:schemaRefs>
-    <ds:schemaRef ds:uri="http://schemas.microsoft.com/sharepoint/v3/contenttype/forms"/>
-  </ds:schemaRefs>
-</ds:datastoreItem>
 </file>
</xml_diff>

<commit_message>
adjusted dates and precised passing by project info
</commit_message>
<xml_diff>
--- a/WDSR - zarys programu.pptx
+++ b/WDSR - zarys programu.pptx
@@ -5,10 +5,10 @@
     <p:sldMasterId id="2147483650" r:id="rId4"/>
   </p:sldMasterIdLst>
   <p:notesMasterIdLst>
-    <p:notesMasterId r:id="rId19"/>
+    <p:notesMasterId r:id="rId20"/>
   </p:notesMasterIdLst>
   <p:handoutMasterIdLst>
-    <p:handoutMasterId r:id="rId20"/>
+    <p:handoutMasterId r:id="rId21"/>
   </p:handoutMasterIdLst>
   <p:sldIdLst>
     <p:sldId id="556" r:id="rId5"/>
@@ -20,11 +20,12 @@
     <p:sldId id="564" r:id="rId11"/>
     <p:sldId id="566" r:id="rId12"/>
     <p:sldId id="569" r:id="rId13"/>
-    <p:sldId id="570" r:id="rId14"/>
-    <p:sldId id="571" r:id="rId15"/>
-    <p:sldId id="567" r:id="rId16"/>
-    <p:sldId id="568" r:id="rId17"/>
-    <p:sldId id="546" r:id="rId18"/>
+    <p:sldId id="572" r:id="rId14"/>
+    <p:sldId id="570" r:id="rId15"/>
+    <p:sldId id="571" r:id="rId16"/>
+    <p:sldId id="567" r:id="rId17"/>
+    <p:sldId id="568" r:id="rId18"/>
+    <p:sldId id="546" r:id="rId19"/>
   </p:sldIdLst>
   <p:sldSz cx="9144000" cy="6858000" type="screen4x3"/>
   <p:notesSz cx="6858000" cy="9926638"/>
@@ -11052,7 +11053,7 @@
             <a:fld id="{E9ED4B55-51F0-4636-8388-59997869CC7A}" type="slidenum">
               <a:rPr lang="de-DE" altLang="pl-PL" sz="1300"/>
               <a:pPr/>
-              <a:t>14</a:t>
+              <a:t>15</a:t>
             </a:fld>
             <a:endParaRPr lang="de-DE" altLang="pl-PL" sz="1300"/>
           </a:p>
@@ -12397,7 +12398,7 @@
             <a:fld id="{E906F336-2E39-43F8-9DF9-B9244679DDFB}" type="datetime5">
               <a:rPr lang="en-US" altLang="pl-PL"/>
               <a:pPr/>
-              <a:t>18-Feb-17</a:t>
+              <a:t>21-Feb-17</a:t>
             </a:fld>
             <a:endParaRPr lang="en-US" altLang="pl-PL"/>
           </a:p>
@@ -12724,7 +12725,7 @@
             <a:fld id="{7B2EBB8C-B024-47EA-BB67-9AC43555CB71}" type="datetime5">
               <a:rPr lang="en-US" altLang="pl-PL"/>
               <a:pPr/>
-              <a:t>18-Feb-17</a:t>
+              <a:t>21-Feb-17</a:t>
             </a:fld>
             <a:endParaRPr lang="en-US" altLang="pl-PL"/>
           </a:p>
@@ -13288,7 +13289,7 @@
             <a:fld id="{AF037DEB-4CF1-4C5F-B037-398229B9C945}" type="datetime5">
               <a:rPr lang="en-US" altLang="pl-PL"/>
               <a:pPr/>
-              <a:t>18-Feb-17</a:t>
+              <a:t>21-Feb-17</a:t>
             </a:fld>
             <a:endParaRPr lang="de-DE" altLang="pl-PL"/>
           </a:p>
@@ -13438,7 +13439,7 @@
             <a:fld id="{9D49F2BD-E1AC-4AED-B4E5-321CBE4AD3D2}" type="datetime5">
               <a:rPr lang="en-US" altLang="pl-PL"/>
               <a:pPr/>
-              <a:t>18-Feb-17</a:t>
+              <a:t>21-Feb-17</a:t>
             </a:fld>
             <a:endParaRPr lang="en-US" altLang="pl-PL"/>
           </a:p>
@@ -13712,7 +13713,7 @@
             <a:fld id="{6DE49DB7-DE0A-4B13-98D6-E8B911A92E91}" type="datetime5">
               <a:rPr lang="en-US" altLang="pl-PL"/>
               <a:pPr/>
-              <a:t>18-Feb-17</a:t>
+              <a:t>21-Feb-17</a:t>
             </a:fld>
             <a:endParaRPr lang="en-US" altLang="pl-PL"/>
           </a:p>
@@ -14169,7 +14170,7 @@
             <a:fld id="{57896E6B-B1BC-4ECC-9043-421F9FF1FF7E}" type="datetime5">
               <a:rPr lang="en-US" altLang="pl-PL"/>
               <a:pPr/>
-              <a:t>18-Feb-17</a:t>
+              <a:t>21-Feb-17</a:t>
             </a:fld>
             <a:endParaRPr lang="en-US" altLang="pl-PL"/>
           </a:p>
@@ -14870,8 +14871,8 @@
         </p:nvSpPr>
         <p:spPr>
           <a:xfrm>
-            <a:off x="287338" y="3763963"/>
-            <a:ext cx="2808287" cy="2808287"/>
+            <a:off x="0" y="4049713"/>
+            <a:ext cx="5071872" cy="2808287"/>
           </a:xfrm>
         </p:spPr>
         <p:txBody>
@@ -14886,7 +14887,37 @@
               <a:rPr lang="pl-PL" altLang="pl-PL" dirty="0" smtClean="0">
                 <a:cs typeface="ＭＳ Ｐゴシック" charset="-128"/>
               </a:rPr>
-              <a:t>Daniel Boguszewicz</a:t>
+              <a:t>Autor prezentacji: Marek Strejczek</a:t>
+            </a:r>
+          </a:p>
+          <a:p>
+            <a:pPr>
+              <a:buFontTx/>
+              <a:buNone/>
+            </a:pPr>
+            <a:r>
+              <a:rPr lang="pl-PL" altLang="pl-PL" dirty="0" smtClean="0">
+                <a:cs typeface="ＭＳ Ｐゴシック" charset="-128"/>
+              </a:rPr>
+              <a:t>Prowadzący:</a:t>
+            </a:r>
+            <a:r>
+              <a:rPr lang="pl-PL" altLang="pl-PL" dirty="0">
+                <a:cs typeface="ＭＳ Ｐゴシック" charset="-128"/>
+              </a:rPr>
+              <a:t> </a:t>
+            </a:r>
+            <a:r>
+              <a:rPr lang="pl-PL" altLang="pl-PL" dirty="0" smtClean="0">
+                <a:cs typeface="ＭＳ Ｐゴシック" charset="-128"/>
+              </a:rPr>
+              <a:t>Daniel </a:t>
+            </a:r>
+            <a:r>
+              <a:rPr lang="pl-PL" altLang="pl-PL" dirty="0" smtClean="0">
+                <a:cs typeface="ＭＳ Ｐゴシック" charset="-128"/>
+              </a:rPr>
+              <a:t>Boguszewicz</a:t>
             </a:r>
           </a:p>
           <a:p>
@@ -15003,6 +15034,933 @@
       </p:grpSpPr>
       <p:sp>
         <p:nvSpPr>
+          <p:cNvPr id="4" name="Date Placeholder 3"/>
+          <p:cNvSpPr>
+            <a:spLocks noGrp="1"/>
+          </p:cNvSpPr>
+          <p:nvPr>
+            <p:ph type="dt" sz="half" idx="10"/>
+          </p:nvPr>
+        </p:nvSpPr>
+        <p:spPr/>
+        <p:txBody>
+          <a:bodyPr/>
+          <a:lstStyle/>
+          <a:p>
+            <a:fld id="{E906F336-2E39-43F8-9DF9-B9244679DDFB}" type="datetime5">
+              <a:rPr lang="en-US" altLang="pl-PL" smtClean="0"/>
+              <a:pPr/>
+              <a:t>21-Feb-17</a:t>
+            </a:fld>
+            <a:endParaRPr lang="en-US" altLang="pl-PL"/>
+          </a:p>
+        </p:txBody>
+      </p:sp>
+      <p:sp>
+        <p:nvSpPr>
+          <p:cNvPr id="5" name="Footer Placeholder 4"/>
+          <p:cNvSpPr>
+            <a:spLocks noGrp="1"/>
+          </p:cNvSpPr>
+          <p:nvPr>
+            <p:ph type="ftr" sz="quarter" idx="11"/>
+          </p:nvPr>
+        </p:nvSpPr>
+        <p:spPr/>
+        <p:txBody>
+          <a:bodyPr/>
+          <a:lstStyle/>
+          <a:p>
+            <a:pPr>
+              <a:defRPr/>
+            </a:pPr>
+            <a:r>
+              <a:rPr lang="en-US" smtClean="0"/>
+              <a:t>GFT Technologies AG</a:t>
+            </a:r>
+            <a:endParaRPr lang="en-US"/>
+          </a:p>
+        </p:txBody>
+      </p:sp>
+      <p:sp>
+        <p:nvSpPr>
+          <p:cNvPr id="6" name="Slide Number Placeholder 5"/>
+          <p:cNvSpPr>
+            <a:spLocks noGrp="1"/>
+          </p:cNvSpPr>
+          <p:nvPr>
+            <p:ph type="sldNum" sz="quarter" idx="12"/>
+          </p:nvPr>
+        </p:nvSpPr>
+        <p:spPr/>
+        <p:txBody>
+          <a:bodyPr/>
+          <a:lstStyle/>
+          <a:p>
+            <a:fld id="{62008791-523A-4B28-9563-D3C392EF9C46}" type="slidenum">
+              <a:rPr lang="en-US" altLang="pl-PL" smtClean="0"/>
+              <a:pPr/>
+              <a:t>10</a:t>
+            </a:fld>
+            <a:endParaRPr lang="en-US" altLang="pl-PL"/>
+          </a:p>
+        </p:txBody>
+      </p:sp>
+      <p:graphicFrame>
+        <p:nvGraphicFramePr>
+          <p:cNvPr id="8" name="Tabela 1"/>
+          <p:cNvGraphicFramePr>
+            <a:graphicFrameLocks noGrp="1"/>
+          </p:cNvGraphicFramePr>
+          <p:nvPr>
+            <p:extLst>
+              <p:ext uri="{D42A27DB-BD31-4B8C-83A1-F6EECF244321}">
+                <p14:modId xmlns:p14="http://schemas.microsoft.com/office/powerpoint/2010/main" val="2023027111"/>
+              </p:ext>
+            </p:extLst>
+          </p:nvPr>
+        </p:nvGraphicFramePr>
+        <p:xfrm>
+          <a:off x="1859915" y="386080"/>
+          <a:ext cx="5565013" cy="6135996"/>
+        </p:xfrm>
+        <a:graphic>
+          <a:graphicData uri="http://schemas.openxmlformats.org/drawingml/2006/table">
+            <a:tbl>
+              <a:tblPr firstRow="1" bandRow="1">
+                <a:tableStyleId>{5C22544A-7EE6-4342-B048-85BDC9FD1C3A}</a:tableStyleId>
+              </a:tblPr>
+              <a:tblGrid>
+                <a:gridCol w="3125279"/>
+                <a:gridCol w="2439734"/>
+              </a:tblGrid>
+              <a:tr h="186117">
+                <a:tc>
+                  <a:txBody>
+                    <a:bodyPr/>
+                    <a:lstStyle/>
+                    <a:p>
+                      <a:endParaRPr lang="pl-PL" sz="1100" dirty="0"/>
+                    </a:p>
+                  </a:txBody>
+                  <a:tcPr/>
+                </a:tc>
+                <a:tc>
+                  <a:txBody>
+                    <a:bodyPr/>
+                    <a:lstStyle/>
+                    <a:p>
+                      <a:endParaRPr lang="pl-PL" sz="1100" dirty="0"/>
+                    </a:p>
+                  </a:txBody>
+                  <a:tcPr/>
+                </a:tc>
+              </a:tr>
+              <a:tr h="186117">
+                <a:tc>
+                  <a:txBody>
+                    <a:bodyPr/>
+                    <a:lstStyle/>
+                    <a:p>
+                      <a:r>
+                        <a:rPr lang="pl-PL" sz="1100" dirty="0" smtClean="0"/>
+                        <a:t>Ćwiczenie 0</a:t>
+                      </a:r>
+                      <a:r>
+                        <a:rPr lang="pl-PL" sz="1100" baseline="0" dirty="0" smtClean="0"/>
+                        <a:t> – </a:t>
+                      </a:r>
+                      <a:r>
+                        <a:rPr lang="pl-PL" sz="1100" dirty="0" smtClean="0"/>
+                        <a:t>Wstęp</a:t>
+                      </a:r>
+                      <a:endParaRPr lang="pl-PL" sz="1100" dirty="0"/>
+                    </a:p>
+                  </a:txBody>
+                  <a:tcPr/>
+                </a:tc>
+                <a:tc>
+                  <a:txBody>
+                    <a:bodyPr/>
+                    <a:lstStyle/>
+                    <a:p>
+                      <a:r>
+                        <a:rPr lang="pl-PL" sz="1100" dirty="0" smtClean="0"/>
+                        <a:t>22.02.2017</a:t>
+                      </a:r>
+                      <a:endParaRPr lang="pl-PL" sz="1100" dirty="0"/>
+                    </a:p>
+                  </a:txBody>
+                  <a:tcPr/>
+                </a:tc>
+              </a:tr>
+              <a:tr h="0">
+                <a:tc>
+                  <a:txBody>
+                    <a:bodyPr/>
+                    <a:lstStyle/>
+                    <a:p>
+                      <a:r>
+                        <a:rPr lang="pl-PL" sz="1100" dirty="0" smtClean="0"/>
+                        <a:t>Ćwiczenie 1</a:t>
+                      </a:r>
+                      <a:r>
+                        <a:rPr lang="pl-PL" sz="1100" baseline="0" dirty="0" smtClean="0"/>
+                        <a:t> – </a:t>
+                      </a:r>
+                      <a:r>
+                        <a:rPr lang="pl-PL" sz="1100" dirty="0" smtClean="0"/>
+                        <a:t>Narzędzia</a:t>
+                      </a:r>
+                      <a:endParaRPr lang="pl-PL" sz="1100" dirty="0"/>
+                    </a:p>
+                  </a:txBody>
+                  <a:tcPr/>
+                </a:tc>
+                <a:tc>
+                  <a:txBody>
+                    <a:bodyPr/>
+                    <a:lstStyle/>
+                    <a:p>
+                      <a:r>
+                        <a:rPr lang="pl-PL" sz="1100" dirty="0" smtClean="0"/>
+                        <a:t>1.03.2017</a:t>
+                      </a:r>
+                      <a:endParaRPr lang="pl-PL" sz="1100" dirty="0"/>
+                    </a:p>
+                  </a:txBody>
+                  <a:tcPr/>
+                </a:tc>
+              </a:tr>
+              <a:tr h="379569">
+                <a:tc>
+                  <a:txBody>
+                    <a:bodyPr/>
+                    <a:lstStyle/>
+                    <a:p>
+                      <a:r>
+                        <a:rPr lang="pl-PL" sz="1100" dirty="0" smtClean="0"/>
+                        <a:t>Ćwiczenie 1</a:t>
+                      </a:r>
+                      <a:r>
+                        <a:rPr lang="pl-PL" sz="1100" baseline="0" dirty="0" smtClean="0"/>
+                        <a:t> – </a:t>
+                      </a:r>
+                      <a:r>
+                        <a:rPr lang="pl-PL" sz="1100" dirty="0" smtClean="0"/>
+                        <a:t>Narzędzia</a:t>
+                      </a:r>
+                      <a:endParaRPr lang="pl-PL" sz="1100" dirty="0"/>
+                    </a:p>
+                  </a:txBody>
+                  <a:tcPr/>
+                </a:tc>
+                <a:tc>
+                  <a:txBody>
+                    <a:bodyPr/>
+                    <a:lstStyle/>
+                    <a:p>
+                      <a:r>
+                        <a:rPr lang="pl-PL" sz="1100" dirty="0" smtClean="0"/>
+                        <a:t>8.03.2017</a:t>
+                      </a:r>
+                      <a:endParaRPr lang="pl-PL" sz="1100" dirty="0"/>
+                    </a:p>
+                  </a:txBody>
+                  <a:tcPr/>
+                </a:tc>
+              </a:tr>
+              <a:tr h="379569">
+                <a:tc>
+                  <a:txBody>
+                    <a:bodyPr/>
+                    <a:lstStyle/>
+                    <a:p>
+                      <a:r>
+                        <a:rPr lang="pl-PL" sz="1100" dirty="0" smtClean="0"/>
+                        <a:t>Ćwiczenie 2</a:t>
+                      </a:r>
+                      <a:r>
+                        <a:rPr lang="pl-PL" sz="1100" baseline="0" dirty="0" smtClean="0"/>
+                        <a:t> - </a:t>
+                      </a:r>
+                      <a:r>
+                        <a:rPr lang="pl-PL" sz="1100" dirty="0" smtClean="0"/>
+                        <a:t>Progr. Współbieżne</a:t>
+                      </a:r>
+                      <a:endParaRPr lang="pl-PL" sz="1100" dirty="0"/>
+                    </a:p>
+                  </a:txBody>
+                  <a:tcPr/>
+                </a:tc>
+                <a:tc>
+                  <a:txBody>
+                    <a:bodyPr/>
+                    <a:lstStyle/>
+                    <a:p>
+                      <a:pPr marL="0" marR="0" lvl="0" indent="0" algn="l" defTabSz="914400" rtl="0" eaLnBrk="1" fontAlgn="auto" latinLnBrk="0" hangingPunct="1">
+                        <a:lnSpc>
+                          <a:spcPct val="100000"/>
+                        </a:lnSpc>
+                        <a:spcBef>
+                          <a:spcPts val="0"/>
+                        </a:spcBef>
+                        <a:spcAft>
+                          <a:spcPts val="0"/>
+                        </a:spcAft>
+                        <a:buClrTx/>
+                        <a:buSzTx/>
+                        <a:buFontTx/>
+                        <a:buNone/>
+                        <a:tabLst/>
+                        <a:defRPr/>
+                      </a:pPr>
+                      <a:r>
+                        <a:rPr lang="pl-PL" sz="1100" dirty="0" smtClean="0"/>
+                        <a:t>15.03.2017</a:t>
+                      </a:r>
+                      <a:endParaRPr lang="pl-PL" sz="1100" dirty="0" smtClean="0"/>
+                    </a:p>
+                  </a:txBody>
+                  <a:tcPr/>
+                </a:tc>
+              </a:tr>
+              <a:tr h="379569">
+                <a:tc>
+                  <a:txBody>
+                    <a:bodyPr/>
+                    <a:lstStyle/>
+                    <a:p>
+                      <a:r>
+                        <a:rPr lang="pl-PL" sz="1100" dirty="0" smtClean="0"/>
+                        <a:t>Ćwiczenie 2</a:t>
+                      </a:r>
+                      <a:r>
+                        <a:rPr lang="pl-PL" sz="1100" baseline="0" dirty="0" smtClean="0"/>
+                        <a:t> - </a:t>
+                      </a:r>
+                      <a:r>
+                        <a:rPr lang="pl-PL" sz="1100" dirty="0" smtClean="0"/>
+                        <a:t>Progr. Współbieżne</a:t>
+                      </a:r>
+                      <a:endParaRPr lang="pl-PL" sz="1100" dirty="0"/>
+                    </a:p>
+                  </a:txBody>
+                  <a:tcPr/>
+                </a:tc>
+                <a:tc>
+                  <a:txBody>
+                    <a:bodyPr/>
+                    <a:lstStyle/>
+                    <a:p>
+                      <a:r>
+                        <a:rPr lang="pl-PL" sz="1100" dirty="0" smtClean="0"/>
+                        <a:t>22.03.2017</a:t>
+                      </a:r>
+                      <a:endParaRPr lang="pl-PL" sz="1100" dirty="0"/>
+                    </a:p>
+                  </a:txBody>
+                  <a:tcPr/>
+                </a:tc>
+              </a:tr>
+              <a:tr h="379569">
+                <a:tc>
+                  <a:txBody>
+                    <a:bodyPr/>
+                    <a:lstStyle/>
+                    <a:p>
+                      <a:r>
+                        <a:rPr lang="pl-PL" sz="1100" dirty="0" smtClean="0"/>
+                        <a:t>Ćwiczenie 2</a:t>
+                      </a:r>
+                      <a:r>
+                        <a:rPr lang="pl-PL" sz="1100" baseline="0" dirty="0" smtClean="0"/>
+                        <a:t> - </a:t>
+                      </a:r>
+                      <a:r>
+                        <a:rPr lang="pl-PL" sz="1100" dirty="0" smtClean="0"/>
+                        <a:t>Progr. Współbieżne</a:t>
+                      </a:r>
+                      <a:endParaRPr lang="pl-PL" sz="1100" dirty="0"/>
+                    </a:p>
+                  </a:txBody>
+                  <a:tcPr/>
+                </a:tc>
+                <a:tc>
+                  <a:txBody>
+                    <a:bodyPr/>
+                    <a:lstStyle/>
+                    <a:p>
+                      <a:pPr marL="0" marR="0" lvl="0" indent="0" algn="l" defTabSz="914400" rtl="0" eaLnBrk="1" fontAlgn="auto" latinLnBrk="0" hangingPunct="1">
+                        <a:lnSpc>
+                          <a:spcPct val="100000"/>
+                        </a:lnSpc>
+                        <a:spcBef>
+                          <a:spcPts val="0"/>
+                        </a:spcBef>
+                        <a:spcAft>
+                          <a:spcPts val="0"/>
+                        </a:spcAft>
+                        <a:buClrTx/>
+                        <a:buSzTx/>
+                        <a:buFontTx/>
+                        <a:buNone/>
+                        <a:tabLst/>
+                        <a:defRPr/>
+                      </a:pPr>
+                      <a:r>
+                        <a:rPr lang="pl-PL" sz="1100" dirty="0" smtClean="0"/>
+                        <a:t>29.03.2017</a:t>
+                      </a:r>
+                      <a:endParaRPr lang="pl-PL" sz="1100" dirty="0" smtClean="0"/>
+                    </a:p>
+                  </a:txBody>
+                  <a:tcPr/>
+                </a:tc>
+              </a:tr>
+              <a:tr h="379569">
+                <a:tc>
+                  <a:txBody>
+                    <a:bodyPr/>
+                    <a:lstStyle/>
+                    <a:p>
+                      <a:pPr marL="0" marR="0" lvl="0" indent="0" algn="l" defTabSz="914400" rtl="0" eaLnBrk="1" fontAlgn="auto" latinLnBrk="0" hangingPunct="1">
+                        <a:lnSpc>
+                          <a:spcPct val="100000"/>
+                        </a:lnSpc>
+                        <a:spcBef>
+                          <a:spcPts val="0"/>
+                        </a:spcBef>
+                        <a:spcAft>
+                          <a:spcPts val="0"/>
+                        </a:spcAft>
+                        <a:buClrTx/>
+                        <a:buSzTx/>
+                        <a:buFontTx/>
+                        <a:buNone/>
+                        <a:tabLst/>
+                        <a:defRPr/>
+                      </a:pPr>
+                      <a:r>
+                        <a:rPr lang="pl-PL" sz="1100" dirty="0" smtClean="0"/>
+                        <a:t>Ćwiczenie 3</a:t>
+                      </a:r>
+                      <a:r>
+                        <a:rPr lang="pl-PL" sz="1100" baseline="0" dirty="0" smtClean="0"/>
+                        <a:t> - </a:t>
+                      </a:r>
+                      <a:r>
+                        <a:rPr lang="pl-PL" sz="1100" dirty="0" smtClean="0"/>
+                        <a:t>Komunikacja Synchr.</a:t>
+                      </a:r>
+                    </a:p>
+                    <a:p>
+                      <a:endParaRPr lang="pl-PL" sz="1100" dirty="0" smtClean="0"/>
+                    </a:p>
+                  </a:txBody>
+                  <a:tcPr/>
+                </a:tc>
+                <a:tc>
+                  <a:txBody>
+                    <a:bodyPr/>
+                    <a:lstStyle/>
+                    <a:p>
+                      <a:r>
+                        <a:rPr lang="pl-PL" sz="1100" dirty="0" smtClean="0"/>
+                        <a:t>5.04.2017</a:t>
+                      </a:r>
+                      <a:endParaRPr lang="pl-PL" sz="1100" dirty="0"/>
+                    </a:p>
+                  </a:txBody>
+                  <a:tcPr/>
+                </a:tc>
+              </a:tr>
+              <a:tr h="379569">
+                <a:tc>
+                  <a:txBody>
+                    <a:bodyPr/>
+                    <a:lstStyle/>
+                    <a:p>
+                      <a:pPr marL="0" marR="0" lvl="0" indent="0" algn="l" defTabSz="914400" rtl="0" eaLnBrk="1" fontAlgn="auto" latinLnBrk="0" hangingPunct="1">
+                        <a:lnSpc>
+                          <a:spcPct val="100000"/>
+                        </a:lnSpc>
+                        <a:spcBef>
+                          <a:spcPts val="0"/>
+                        </a:spcBef>
+                        <a:spcAft>
+                          <a:spcPts val="0"/>
+                        </a:spcAft>
+                        <a:buClrTx/>
+                        <a:buSzTx/>
+                        <a:buFontTx/>
+                        <a:buNone/>
+                        <a:tabLst/>
+                        <a:defRPr/>
+                      </a:pPr>
+                      <a:r>
+                        <a:rPr lang="pl-PL" sz="1100" dirty="0" smtClean="0"/>
+                        <a:t>Ćwiczenie 3</a:t>
+                      </a:r>
+                      <a:r>
+                        <a:rPr lang="pl-PL" sz="1100" baseline="0" dirty="0" smtClean="0"/>
+                        <a:t> - </a:t>
+                      </a:r>
+                      <a:r>
+                        <a:rPr lang="pl-PL" sz="1100" dirty="0" smtClean="0"/>
+                        <a:t>Komunikacja Synchr.</a:t>
+                      </a:r>
+                    </a:p>
+                    <a:p>
+                      <a:endParaRPr lang="pl-PL" sz="1100" dirty="0" smtClean="0"/>
+                    </a:p>
+                  </a:txBody>
+                  <a:tcPr/>
+                </a:tc>
+                <a:tc>
+                  <a:txBody>
+                    <a:bodyPr/>
+                    <a:lstStyle/>
+                    <a:p>
+                      <a:r>
+                        <a:rPr lang="pl-PL" sz="1100" dirty="0" smtClean="0"/>
+                        <a:t>12.04.2017</a:t>
+                      </a:r>
+                      <a:endParaRPr lang="pl-PL" sz="1100" dirty="0"/>
+                    </a:p>
+                  </a:txBody>
+                  <a:tcPr/>
+                </a:tc>
+              </a:tr>
+              <a:tr h="379569">
+                <a:tc>
+                  <a:txBody>
+                    <a:bodyPr/>
+                    <a:lstStyle/>
+                    <a:p>
+                      <a:pPr marL="0" marR="0" lvl="0" indent="0" algn="l" defTabSz="914400" rtl="0" eaLnBrk="1" fontAlgn="auto" latinLnBrk="0" hangingPunct="1">
+                        <a:lnSpc>
+                          <a:spcPct val="100000"/>
+                        </a:lnSpc>
+                        <a:spcBef>
+                          <a:spcPts val="0"/>
+                        </a:spcBef>
+                        <a:spcAft>
+                          <a:spcPts val="0"/>
+                        </a:spcAft>
+                        <a:buClrTx/>
+                        <a:buSzTx/>
+                        <a:buFontTx/>
+                        <a:buNone/>
+                        <a:tabLst/>
+                        <a:defRPr/>
+                      </a:pPr>
+                      <a:r>
+                        <a:rPr lang="pl-PL" sz="1100" dirty="0" smtClean="0"/>
+                        <a:t>Ćwiczenie 3</a:t>
+                      </a:r>
+                      <a:r>
+                        <a:rPr lang="pl-PL" sz="1100" baseline="0" dirty="0" smtClean="0"/>
+                        <a:t> - </a:t>
+                      </a:r>
+                      <a:r>
+                        <a:rPr lang="pl-PL" sz="1100" dirty="0" smtClean="0"/>
+                        <a:t>Komunikacja Synchr.</a:t>
+                      </a:r>
+                    </a:p>
+                    <a:p>
+                      <a:endParaRPr lang="pl-PL" sz="1100" dirty="0" smtClean="0"/>
+                    </a:p>
+                  </a:txBody>
+                  <a:tcPr/>
+                </a:tc>
+                <a:tc>
+                  <a:txBody>
+                    <a:bodyPr/>
+                    <a:lstStyle/>
+                    <a:p>
+                      <a:r>
+                        <a:rPr lang="pl-PL" sz="1100" dirty="0" smtClean="0"/>
+                        <a:t>19.04.2017</a:t>
+                      </a:r>
+                      <a:endParaRPr lang="pl-PL" sz="1100" dirty="0"/>
+                    </a:p>
+                  </a:txBody>
+                  <a:tcPr/>
+                </a:tc>
+              </a:tr>
+              <a:tr h="379569">
+                <a:tc>
+                  <a:txBody>
+                    <a:bodyPr/>
+                    <a:lstStyle/>
+                    <a:p>
+                      <a:pPr marL="0" marR="0" lvl="0" indent="0" algn="l" defTabSz="914400" rtl="0" eaLnBrk="1" fontAlgn="auto" latinLnBrk="0" hangingPunct="1">
+                        <a:lnSpc>
+                          <a:spcPct val="100000"/>
+                        </a:lnSpc>
+                        <a:spcBef>
+                          <a:spcPts val="0"/>
+                        </a:spcBef>
+                        <a:spcAft>
+                          <a:spcPts val="0"/>
+                        </a:spcAft>
+                        <a:buClrTx/>
+                        <a:buSzTx/>
+                        <a:buFontTx/>
+                        <a:buNone/>
+                        <a:tabLst/>
+                        <a:defRPr/>
+                      </a:pPr>
+                      <a:r>
+                        <a:rPr lang="pl-PL" sz="1100" dirty="0" smtClean="0"/>
+                        <a:t>Ćwiczenie 4</a:t>
+                      </a:r>
+                      <a:r>
+                        <a:rPr lang="pl-PL" sz="1100" baseline="0" dirty="0" smtClean="0"/>
+                        <a:t> - </a:t>
+                      </a:r>
+                      <a:r>
+                        <a:rPr lang="pl-PL" sz="1100" dirty="0" smtClean="0"/>
+                        <a:t>Komunikacja Asynchr.</a:t>
+                      </a:r>
+                    </a:p>
+                    <a:p>
+                      <a:endParaRPr lang="pl-PL" sz="1100" dirty="0" smtClean="0"/>
+                    </a:p>
+                  </a:txBody>
+                  <a:tcPr/>
+                </a:tc>
+                <a:tc>
+                  <a:txBody>
+                    <a:bodyPr/>
+                    <a:lstStyle/>
+                    <a:p>
+                      <a:r>
+                        <a:rPr lang="pl-PL" sz="1100" dirty="0" smtClean="0"/>
+                        <a:t>26.04.2017</a:t>
+                      </a:r>
+                      <a:endParaRPr lang="pl-PL" sz="1100" dirty="0"/>
+                    </a:p>
+                  </a:txBody>
+                  <a:tcPr/>
+                </a:tc>
+              </a:tr>
+              <a:tr h="379569">
+                <a:tc>
+                  <a:txBody>
+                    <a:bodyPr/>
+                    <a:lstStyle/>
+                    <a:p>
+                      <a:pPr marL="0" marR="0" lvl="0" indent="0" algn="l" defTabSz="914400" rtl="0" eaLnBrk="1" fontAlgn="auto" latinLnBrk="0" hangingPunct="1">
+                        <a:lnSpc>
+                          <a:spcPct val="100000"/>
+                        </a:lnSpc>
+                        <a:spcBef>
+                          <a:spcPts val="0"/>
+                        </a:spcBef>
+                        <a:spcAft>
+                          <a:spcPts val="0"/>
+                        </a:spcAft>
+                        <a:buClrTx/>
+                        <a:buSzTx/>
+                        <a:buFontTx/>
+                        <a:buNone/>
+                        <a:tabLst/>
+                        <a:defRPr/>
+                      </a:pPr>
+                      <a:r>
+                        <a:rPr lang="pl-PL" sz="1100" dirty="0" smtClean="0"/>
+                        <a:t>Ćwiczenie 4</a:t>
+                      </a:r>
+                      <a:r>
+                        <a:rPr lang="pl-PL" sz="1100" baseline="0" dirty="0" smtClean="0"/>
+                        <a:t> - </a:t>
+                      </a:r>
+                      <a:r>
+                        <a:rPr lang="pl-PL" sz="1100" dirty="0" smtClean="0"/>
+                        <a:t>Komunikacja Asynchr.</a:t>
+                      </a:r>
+                    </a:p>
+                    <a:p>
+                      <a:endParaRPr lang="pl-PL" sz="1100" dirty="0" smtClean="0"/>
+                    </a:p>
+                  </a:txBody>
+                  <a:tcPr/>
+                </a:tc>
+                <a:tc>
+                  <a:txBody>
+                    <a:bodyPr/>
+                    <a:lstStyle/>
+                    <a:p>
+                      <a:r>
+                        <a:rPr lang="pl-PL" sz="1100" dirty="0" smtClean="0"/>
+                        <a:t>10.05.2017</a:t>
+                      </a:r>
+                      <a:endParaRPr lang="pl-PL" sz="1100" dirty="0"/>
+                    </a:p>
+                  </a:txBody>
+                  <a:tcPr/>
+                </a:tc>
+              </a:tr>
+              <a:tr h="379569">
+                <a:tc>
+                  <a:txBody>
+                    <a:bodyPr/>
+                    <a:lstStyle/>
+                    <a:p>
+                      <a:pPr marL="0" marR="0" lvl="0" indent="0" algn="l" defTabSz="914400" rtl="0" eaLnBrk="1" fontAlgn="auto" latinLnBrk="0" hangingPunct="1">
+                        <a:lnSpc>
+                          <a:spcPct val="100000"/>
+                        </a:lnSpc>
+                        <a:spcBef>
+                          <a:spcPts val="0"/>
+                        </a:spcBef>
+                        <a:spcAft>
+                          <a:spcPts val="0"/>
+                        </a:spcAft>
+                        <a:buClrTx/>
+                        <a:buSzTx/>
+                        <a:buFontTx/>
+                        <a:buNone/>
+                        <a:tabLst/>
+                        <a:defRPr/>
+                      </a:pPr>
+                      <a:r>
+                        <a:rPr lang="pl-PL" sz="1100" dirty="0" smtClean="0"/>
+                        <a:t>Ćwiczenie 4</a:t>
+                      </a:r>
+                      <a:r>
+                        <a:rPr lang="pl-PL" sz="1100" baseline="0" dirty="0" smtClean="0"/>
+                        <a:t> - </a:t>
+                      </a:r>
+                      <a:r>
+                        <a:rPr lang="pl-PL" sz="1100" dirty="0" smtClean="0"/>
+                        <a:t>Komunikacja Asynchr.</a:t>
+                      </a:r>
+                    </a:p>
+                    <a:p>
+                      <a:endParaRPr lang="pl-PL" sz="1100" dirty="0" smtClean="0"/>
+                    </a:p>
+                  </a:txBody>
+                  <a:tcPr/>
+                </a:tc>
+                <a:tc>
+                  <a:txBody>
+                    <a:bodyPr/>
+                    <a:lstStyle/>
+                    <a:p>
+                      <a:r>
+                        <a:rPr lang="pl-PL" sz="1100" dirty="0" smtClean="0"/>
+                        <a:t>17.05.2017</a:t>
+                      </a:r>
+                      <a:endParaRPr lang="pl-PL" sz="1100" dirty="0"/>
+                    </a:p>
+                  </a:txBody>
+                  <a:tcPr/>
+                </a:tc>
+              </a:tr>
+              <a:tr h="379569">
+                <a:tc>
+                  <a:txBody>
+                    <a:bodyPr/>
+                    <a:lstStyle/>
+                    <a:p>
+                      <a:pPr marL="0" marR="0" lvl="0" indent="0" algn="l" defTabSz="914400" rtl="0" eaLnBrk="1" fontAlgn="auto" latinLnBrk="0" hangingPunct="1">
+                        <a:lnSpc>
+                          <a:spcPct val="100000"/>
+                        </a:lnSpc>
+                        <a:spcBef>
+                          <a:spcPts val="0"/>
+                        </a:spcBef>
+                        <a:spcAft>
+                          <a:spcPts val="0"/>
+                        </a:spcAft>
+                        <a:buClrTx/>
+                        <a:buSzTx/>
+                        <a:buFontTx/>
+                        <a:buNone/>
+                        <a:tabLst/>
+                        <a:defRPr/>
+                      </a:pPr>
+                      <a:r>
+                        <a:rPr lang="pl-PL" sz="1100" dirty="0" smtClean="0"/>
+                        <a:t>Ćwiczenie</a:t>
+                      </a:r>
+                      <a:r>
+                        <a:rPr lang="pl-PL" sz="1100" baseline="0" dirty="0" smtClean="0"/>
+                        <a:t> 5 - Baza danych</a:t>
+                      </a:r>
+                      <a:endParaRPr lang="pl-PL" sz="1100" dirty="0" smtClean="0"/>
+                    </a:p>
+                    <a:p>
+                      <a:endParaRPr lang="pl-PL" sz="1100" dirty="0" smtClean="0"/>
+                    </a:p>
+                  </a:txBody>
+                  <a:tcPr/>
+                </a:tc>
+                <a:tc>
+                  <a:txBody>
+                    <a:bodyPr/>
+                    <a:lstStyle/>
+                    <a:p>
+                      <a:r>
+                        <a:rPr lang="pl-PL" sz="1100" dirty="0" smtClean="0"/>
+                        <a:t>24.05.2017</a:t>
+                      </a:r>
+                      <a:endParaRPr lang="pl-PL" sz="1100" dirty="0"/>
+                    </a:p>
+                  </a:txBody>
+                  <a:tcPr/>
+                </a:tc>
+              </a:tr>
+              <a:tr h="379569">
+                <a:tc>
+                  <a:txBody>
+                    <a:bodyPr/>
+                    <a:lstStyle/>
+                    <a:p>
+                      <a:pPr marL="0" marR="0" lvl="0" indent="0" algn="l" defTabSz="914400" rtl="0" eaLnBrk="1" fontAlgn="auto" latinLnBrk="0" hangingPunct="1">
+                        <a:lnSpc>
+                          <a:spcPct val="100000"/>
+                        </a:lnSpc>
+                        <a:spcBef>
+                          <a:spcPts val="0"/>
+                        </a:spcBef>
+                        <a:spcAft>
+                          <a:spcPts val="0"/>
+                        </a:spcAft>
+                        <a:buClrTx/>
+                        <a:buSzTx/>
+                        <a:buFontTx/>
+                        <a:buNone/>
+                        <a:tabLst/>
+                        <a:defRPr/>
+                      </a:pPr>
+                      <a:r>
+                        <a:rPr lang="pl-PL" sz="1100" dirty="0" smtClean="0"/>
+                        <a:t>Ćwiczenie</a:t>
+                      </a:r>
+                      <a:r>
+                        <a:rPr lang="pl-PL" sz="1100" baseline="0" dirty="0" smtClean="0"/>
+                        <a:t> 5 - Baza danych</a:t>
+                      </a:r>
+                      <a:endParaRPr lang="pl-PL" sz="1100" dirty="0" smtClean="0"/>
+                    </a:p>
+                    <a:p>
+                      <a:endParaRPr lang="pl-PL" sz="1100" dirty="0" smtClean="0"/>
+                    </a:p>
+                  </a:txBody>
+                  <a:tcPr/>
+                </a:tc>
+                <a:tc>
+                  <a:txBody>
+                    <a:bodyPr/>
+                    <a:lstStyle/>
+                    <a:p>
+                      <a:r>
+                        <a:rPr lang="pl-PL" sz="1100" dirty="0" smtClean="0"/>
+                        <a:t>31.05.2017</a:t>
+                      </a:r>
+                      <a:endParaRPr lang="pl-PL" sz="1100" dirty="0"/>
+                    </a:p>
+                  </a:txBody>
+                  <a:tcPr/>
+                </a:tc>
+              </a:tr>
+              <a:tr h="379569">
+                <a:tc>
+                  <a:txBody>
+                    <a:bodyPr/>
+                    <a:lstStyle/>
+                    <a:p>
+                      <a:pPr marL="0" marR="0" lvl="0" indent="0" algn="l" defTabSz="914400" rtl="0" eaLnBrk="1" fontAlgn="auto" latinLnBrk="0" hangingPunct="1">
+                        <a:lnSpc>
+                          <a:spcPct val="100000"/>
+                        </a:lnSpc>
+                        <a:spcBef>
+                          <a:spcPts val="0"/>
+                        </a:spcBef>
+                        <a:spcAft>
+                          <a:spcPts val="0"/>
+                        </a:spcAft>
+                        <a:buClrTx/>
+                        <a:buSzTx/>
+                        <a:buFontTx/>
+                        <a:buNone/>
+                        <a:tabLst/>
+                        <a:defRPr/>
+                      </a:pPr>
+                      <a:r>
+                        <a:rPr lang="pl-PL" sz="1100" dirty="0" smtClean="0"/>
+                        <a:t>Ćwiczenie</a:t>
+                      </a:r>
+                      <a:r>
+                        <a:rPr lang="pl-PL" sz="1100" baseline="0" dirty="0" smtClean="0"/>
+                        <a:t> 5 - Baza danych</a:t>
+                      </a:r>
+                      <a:endParaRPr lang="pl-PL" sz="1100" dirty="0" smtClean="0"/>
+                    </a:p>
+                    <a:p>
+                      <a:endParaRPr lang="pl-PL" sz="1100" dirty="0" smtClean="0"/>
+                    </a:p>
+                  </a:txBody>
+                  <a:tcPr/>
+                </a:tc>
+                <a:tc>
+                  <a:txBody>
+                    <a:bodyPr/>
+                    <a:lstStyle/>
+                    <a:p>
+                      <a:r>
+                        <a:rPr lang="pl-PL" sz="1100" dirty="0" smtClean="0"/>
+                        <a:t>7.06.2017</a:t>
+                      </a:r>
+                      <a:endParaRPr lang="pl-PL" sz="1100" dirty="0"/>
+                    </a:p>
+                  </a:txBody>
+                  <a:tcPr/>
+                </a:tc>
+              </a:tr>
+            </a:tbl>
+          </a:graphicData>
+        </a:graphic>
+      </p:graphicFrame>
+    </p:spTree>
+    <p:extLst>
+      <p:ext uri="{BB962C8B-B14F-4D97-AF65-F5344CB8AC3E}">
+        <p14:creationId xmlns:p14="http://schemas.microsoft.com/office/powerpoint/2010/main" val="1589507490"/>
+      </p:ext>
+    </p:extLst>
+  </p:cSld>
+  <p:clrMapOvr>
+    <a:masterClrMapping/>
+  </p:clrMapOvr>
+  <p:transition spd="slow">
+    <p:push dir="u"/>
+  </p:transition>
+</p:sld>
+</file>
+
+<file path=ppt/slides/slide11.xml><?xml version="1.0" encoding="utf-8"?>
+<p:sld xmlns:a="http://schemas.openxmlformats.org/drawingml/2006/main" xmlns:r="http://schemas.openxmlformats.org/officeDocument/2006/relationships" xmlns:p="http://schemas.openxmlformats.org/presentationml/2006/main">
+  <p:cSld>
+    <p:spTree>
+      <p:nvGrpSpPr>
+        <p:cNvPr id="1" name=""/>
+        <p:cNvGrpSpPr/>
+        <p:nvPr/>
+      </p:nvGrpSpPr>
+      <p:grpSpPr>
+        <a:xfrm>
+          <a:off x="0" y="0"/>
+          <a:ext cx="0" cy="0"/>
+          <a:chOff x="0" y="0"/>
+          <a:chExt cx="0" cy="0"/>
+        </a:xfrm>
+      </p:grpSpPr>
+      <p:sp>
+        <p:nvSpPr>
           <p:cNvPr id="3" name="Titel 2"/>
           <p:cNvSpPr>
             <a:spLocks noGrp="1"/>
@@ -15175,7 +16133,7 @@
                 </a:solidFill>
               </a:rPr>
               <a:pPr/>
-              <a:t>18-Feb-17</a:t>
+              <a:t>21-Feb-17</a:t>
             </a:fld>
             <a:endParaRPr lang="en-US" altLang="pl-PL" sz="900">
               <a:solidFill>
@@ -15477,7 +16435,7 @@
                 </a:solidFill>
               </a:rPr>
               <a:pPr/>
-              <a:t>10</a:t>
+              <a:t>11</a:t>
             </a:fld>
             <a:endParaRPr lang="en-US" altLang="pl-PL" sz="900">
               <a:solidFill>
@@ -15496,14 +16454,14 @@
           <p:nvPr>
             <p:extLst>
               <p:ext uri="{D42A27DB-BD31-4B8C-83A1-F6EECF244321}">
-                <p14:modId xmlns:p14="http://schemas.microsoft.com/office/powerpoint/2010/main" val="36956152"/>
+                <p14:modId xmlns:p14="http://schemas.microsoft.com/office/powerpoint/2010/main" val="2653100420"/>
               </p:ext>
             </p:extLst>
           </p:nvPr>
         </p:nvGraphicFramePr>
         <p:xfrm>
           <a:off x="663546" y="1267857"/>
-          <a:ext cx="7640870" cy="2612244"/>
+          <a:ext cx="7640870" cy="2185524"/>
         </p:xfrm>
         <a:graphic>
           <a:graphicData uri="http://schemas.openxmlformats.org/drawingml/2006/table">
@@ -15642,7 +16600,7 @@
                     <a:p>
                       <a:r>
                         <a:rPr lang="pl-PL" sz="1100" dirty="0" smtClean="0"/>
-                        <a:t>Zajęcia 2</a:t>
+                        <a:t>Zajęcia 2-3</a:t>
                       </a:r>
                       <a:endParaRPr lang="pl-PL" sz="1100" dirty="0"/>
                     </a:p>
@@ -15684,7 +16642,7 @@
                     <a:p>
                       <a:r>
                         <a:rPr lang="pl-PL" sz="1100" dirty="0" smtClean="0"/>
-                        <a:t>Zajęcia 3-5</a:t>
+                        <a:t>Zajęcia 4-6</a:t>
                       </a:r>
                       <a:endParaRPr lang="pl-PL" sz="1100" dirty="0"/>
                     </a:p>
@@ -15730,7 +16688,7 @@
                     <a:p>
                       <a:r>
                         <a:rPr lang="pl-PL" sz="1100" dirty="0" smtClean="0"/>
-                        <a:t>Zajęcia 6-8</a:t>
+                        <a:t>Zajęcia 7-9</a:t>
                       </a:r>
                       <a:endParaRPr lang="pl-PL" sz="1100" dirty="0"/>
                     </a:p>
@@ -15775,7 +16733,7 @@
                     <a:p>
                       <a:r>
                         <a:rPr lang="pl-PL" sz="1100" dirty="0" smtClean="0"/>
-                        <a:t>Zajęcia 9-11</a:t>
+                        <a:t>Zajęcia 10-12</a:t>
                       </a:r>
                       <a:endParaRPr lang="pl-PL" sz="1100" dirty="0"/>
                     </a:p>
@@ -15809,76 +16767,7 @@
                     <a:p>
                       <a:r>
                         <a:rPr lang="pl-PL" sz="1100" dirty="0" smtClean="0"/>
-                        <a:t>Zajęcia 12-14</a:t>
-                      </a:r>
-                    </a:p>
-                  </a:txBody>
-                  <a:tcPr/>
-                </a:tc>
-              </a:tr>
-              <a:tr h="379569">
-                <a:tc>
-                  <a:txBody>
-                    <a:bodyPr/>
-                    <a:lstStyle/>
-                    <a:p>
-                      <a:pPr marL="0" algn="l" defTabSz="914400" rtl="0" eaLnBrk="1" latinLnBrk="0" hangingPunct="1"/>
-                      <a:r>
-                        <a:rPr lang="pl-PL" sz="1100" kern="1200" dirty="0" smtClean="0">
-                          <a:solidFill>
-                            <a:schemeClr val="dk1"/>
-                          </a:solidFill>
-                          <a:latin typeface="+mn-lt"/>
-                          <a:ea typeface="+mn-ea"/>
-                          <a:cs typeface="+mn-cs"/>
-                        </a:rPr>
-                        <a:t>Podsumowanie i końcowe oceny.</a:t>
-                      </a:r>
-                    </a:p>
-                    <a:p>
-                      <a:pPr marL="0" algn="l" defTabSz="914400" rtl="0" eaLnBrk="1" latinLnBrk="0" hangingPunct="1"/>
-                      <a:r>
-                        <a:rPr lang="pl-PL" sz="1100" kern="1200" dirty="0" smtClean="0">
-                          <a:solidFill>
-                            <a:schemeClr val="dk1"/>
-                          </a:solidFill>
-                          <a:latin typeface="+mn-lt"/>
-                          <a:ea typeface="+mn-ea"/>
-                          <a:cs typeface="+mn-cs"/>
-                        </a:rPr>
-                        <a:t>Ostateczny termin oddania</a:t>
-                      </a:r>
-                      <a:r>
-                        <a:rPr lang="pl-PL" sz="1100" kern="1200" baseline="0" dirty="0" smtClean="0">
-                          <a:solidFill>
-                            <a:schemeClr val="dk1"/>
-                          </a:solidFill>
-                          <a:latin typeface="+mn-lt"/>
-                          <a:ea typeface="+mn-ea"/>
-                          <a:cs typeface="+mn-cs"/>
-                        </a:rPr>
-                        <a:t> projektów lub zadań z ćwiczeń.</a:t>
-                      </a:r>
-                      <a:endParaRPr lang="en-GB" sz="1100" kern="1200" dirty="0">
-                        <a:solidFill>
-                          <a:schemeClr val="dk1"/>
-                        </a:solidFill>
-                        <a:latin typeface="+mn-lt"/>
-                        <a:ea typeface="+mn-ea"/>
-                        <a:cs typeface="+mn-cs"/>
-                      </a:endParaRPr>
-                    </a:p>
-                  </a:txBody>
-                  <a:tcPr/>
-                </a:tc>
-                <a:tc>
-                  <a:txBody>
-                    <a:bodyPr/>
-                    <a:lstStyle/>
-                    <a:p>
-                      <a:r>
-                        <a:rPr lang="pl-PL" sz="1100" dirty="0" smtClean="0"/>
-                        <a:t>Zajęcia 15</a:t>
+                        <a:t>Zajęcia 13-15</a:t>
                       </a:r>
                     </a:p>
                   </a:txBody>
@@ -15988,7 +16877,7 @@
 </p:sld>
 </file>
 
-<file path=ppt/slides/slide11.xml><?xml version="1.0" encoding="utf-8"?>
+<file path=ppt/slides/slide12.xml><?xml version="1.0" encoding="utf-8"?>
 <p:sld xmlns:a="http://schemas.openxmlformats.org/drawingml/2006/main" xmlns:r="http://schemas.openxmlformats.org/officeDocument/2006/relationships" xmlns:p="http://schemas.openxmlformats.org/presentationml/2006/main">
   <p:cSld>
     <p:spTree>
@@ -16122,7 +17011,7 @@
             <a:fld id="{E906F336-2E39-43F8-9DF9-B9244679DDFB}" type="datetime5">
               <a:rPr lang="en-US" altLang="pl-PL" smtClean="0"/>
               <a:pPr/>
-              <a:t>18-Feb-17</a:t>
+              <a:t>21-Feb-17</a:t>
             </a:fld>
             <a:endParaRPr lang="en-US" altLang="pl-PL"/>
           </a:p>
@@ -16172,7 +17061,7 @@
             <a:fld id="{62008791-523A-4B28-9563-D3C392EF9C46}" type="slidenum">
               <a:rPr lang="en-US" altLang="pl-PL" smtClean="0"/>
               <a:pPr/>
-              <a:t>11</a:t>
+              <a:t>12</a:t>
             </a:fld>
             <a:endParaRPr lang="en-US" altLang="pl-PL"/>
           </a:p>
@@ -16194,7 +17083,7 @@
 </p:sld>
 </file>
 
-<file path=ppt/slides/slide12.xml><?xml version="1.0" encoding="utf-8"?>
+<file path=ppt/slides/slide13.xml><?xml version="1.0" encoding="utf-8"?>
 <p:sld xmlns:a="http://schemas.openxmlformats.org/drawingml/2006/main" xmlns:r="http://schemas.openxmlformats.org/officeDocument/2006/relationships" xmlns:p="http://schemas.openxmlformats.org/presentationml/2006/main">
   <p:cSld>
     <p:spTree>
@@ -16385,7 +17274,7 @@
                 </a:solidFill>
               </a:rPr>
               <a:pPr/>
-              <a:t>18-Feb-17</a:t>
+              <a:t>21-Feb-17</a:t>
             </a:fld>
             <a:endParaRPr lang="en-US" altLang="pl-PL" sz="900">
               <a:solidFill>
@@ -16687,7 +17576,7 @@
                 </a:solidFill>
               </a:rPr>
               <a:pPr/>
-              <a:t>12</a:t>
+              <a:t>13</a:t>
             </a:fld>
             <a:endParaRPr lang="en-US" altLang="pl-PL" sz="900">
               <a:solidFill>
@@ -16978,11 +17867,7 @@
             </a:pPr>
             <a:r>
               <a:rPr lang="pl-PL" sz="1600" dirty="0" smtClean="0"/>
-              <a:t>Zmodyfikuj w dowolnym edytorze plik README.md – dodaj w nim swoje imie i </a:t>
-            </a:r>
-            <a:r>
-              <a:rPr lang="pl-PL" sz="1600" dirty="0" smtClean="0"/>
-              <a:t>nazwisko lub link do profilu np. </a:t>
+              <a:t>Zmodyfikuj w dowolnym edytorze plik README.md – dodaj w nim swoje imie i nazwisko lub link do profilu np. </a:t>
             </a:r>
             <a:r>
               <a:rPr lang="pl-PL" sz="1600" dirty="0">
@@ -17350,7 +18235,7 @@
 </p:sld>
 </file>
 
-<file path=ppt/slides/slide13.xml><?xml version="1.0" encoding="utf-8"?>
+<file path=ppt/slides/slide14.xml><?xml version="1.0" encoding="utf-8"?>
 <p:sld xmlns:a="http://schemas.openxmlformats.org/drawingml/2006/main" xmlns:r="http://schemas.openxmlformats.org/officeDocument/2006/relationships" xmlns:p="http://schemas.openxmlformats.org/presentationml/2006/main">
   <p:cSld>
     <p:spTree>
@@ -17547,7 +18432,7 @@
                 </a:solidFill>
               </a:rPr>
               <a:pPr/>
-              <a:t>18-Feb-17</a:t>
+              <a:t>21-Feb-17</a:t>
             </a:fld>
             <a:endParaRPr lang="en-US" altLang="pl-PL" sz="900">
               <a:solidFill>
@@ -17849,7 +18734,7 @@
                 </a:solidFill>
               </a:rPr>
               <a:pPr/>
-              <a:t>13</a:t>
+              <a:t>14</a:t>
             </a:fld>
             <a:endParaRPr lang="en-US" altLang="pl-PL" sz="900">
               <a:solidFill>
@@ -18114,7 +18999,7 @@
 </p:sld>
 </file>
 
-<file path=ppt/slides/slide14.xml><?xml version="1.0" encoding="utf-8"?>
+<file path=ppt/slides/slide15.xml><?xml version="1.0" encoding="utf-8"?>
 <p:sld xmlns:a="http://schemas.openxmlformats.org/drawingml/2006/main" xmlns:r="http://schemas.openxmlformats.org/officeDocument/2006/relationships" xmlns:p="http://schemas.openxmlformats.org/presentationml/2006/main">
   <p:cSld>
     <p:spTree>
@@ -18759,7 +19644,7 @@
                 </a:solidFill>
               </a:rPr>
               <a:pPr/>
-              <a:t>18-Feb-17</a:t>
+              <a:t>21-Feb-17</a:t>
             </a:fld>
             <a:endParaRPr lang="en-US" altLang="pl-PL" sz="900">
               <a:solidFill>
@@ -19414,7 +20299,7 @@
                 </a:solidFill>
               </a:rPr>
               <a:pPr/>
-              <a:t>18-Feb-17</a:t>
+              <a:t>21-Feb-17</a:t>
             </a:fld>
             <a:endParaRPr lang="en-US" altLang="pl-PL" sz="900">
               <a:solidFill>
@@ -20754,7 +21639,7 @@
                 </a:solidFill>
               </a:rPr>
               <a:pPr/>
-              <a:t>18-Feb-17</a:t>
+              <a:t>21-Feb-17</a:t>
             </a:fld>
             <a:endParaRPr lang="en-US" altLang="pl-PL" sz="900">
               <a:solidFill>
@@ -21822,7 +22707,7 @@
                 </a:solidFill>
               </a:rPr>
               <a:pPr/>
-              <a:t>18-Feb-17</a:t>
+              <a:t>21-Feb-17</a:t>
             </a:fld>
             <a:endParaRPr lang="en-US" altLang="pl-PL" sz="900">
               <a:solidFill>
@@ -22694,7 +23579,7 @@
                 </a:solidFill>
               </a:rPr>
               <a:pPr/>
-              <a:t>18-Feb-17</a:t>
+              <a:t>21-Feb-17</a:t>
             </a:fld>
             <a:endParaRPr lang="en-US" altLang="pl-PL" sz="900">
               <a:solidFill>
@@ -23762,7 +24647,7 @@
                 </a:solidFill>
               </a:rPr>
               <a:pPr/>
-              <a:t>18-Feb-17</a:t>
+              <a:t>21-Feb-17</a:t>
             </a:fld>
             <a:endParaRPr lang="en-US" altLang="pl-PL" sz="900">
               <a:solidFill>
@@ -24374,7 +25259,7 @@
                 </a:solidFill>
               </a:rPr>
               <a:pPr/>
-              <a:t>18-Feb-17</a:t>
+              <a:t>21-Feb-17</a:t>
             </a:fld>
             <a:endParaRPr lang="en-US" altLang="pl-PL" sz="900">
               <a:solidFill>
@@ -25246,7 +26131,7 @@
                 </a:solidFill>
               </a:rPr>
               <a:pPr/>
-              <a:t>18-Feb-17</a:t>
+              <a:t>21-Feb-17</a:t>
             </a:fld>
             <a:endParaRPr lang="en-US" altLang="pl-PL" sz="900">
               <a:solidFill>
@@ -27385,6 +28270,15 @@
 </file>
 
 <file path=customXml/item1.xml><?xml version="1.0" encoding="utf-8"?>
+<?mso-contentType ?>
+<FormTemplates xmlns="http://schemas.microsoft.com/sharepoint/v3/contenttype/forms">
+  <Display>DocumentLibraryForm</Display>
+  <Edit>DocumentLibraryForm</Edit>
+  <New>DocumentLibraryForm</New>
+</FormTemplates>
+</file>
+
+<file path=customXml/item2.xml><?xml version="1.0" encoding="utf-8"?>
 <ct:contentTypeSchema xmlns:ct="http://schemas.microsoft.com/office/2006/metadata/contentType" xmlns:ma="http://schemas.microsoft.com/office/2006/metadata/properties/metaAttributes" ct:_="" ma:_="" ma:contentTypeName="Dokument" ma:contentTypeID="0x010100AA54360A2A4C9D41BAEAEC5B88091E96" ma:contentTypeVersion="0" ma:contentTypeDescription="Ein neues Dokument erstellen." ma:contentTypeScope="" ma:versionID="adbe31085c672446fb9e5148d79a6dc6">
   <xsd:schema xmlns:xsd="http://www.w3.org/2001/XMLSchema" xmlns:xs="http://www.w3.org/2001/XMLSchema" xmlns:p="http://schemas.microsoft.com/office/2006/metadata/properties" targetNamespace="http://schemas.microsoft.com/office/2006/metadata/properties" ma:root="true" ma:fieldsID="cb715de677b26ad619381b53932d724a">
     <xsd:element name="properties">
@@ -27498,22 +28392,21 @@
 </ct:contentTypeSchema>
 </file>
 
-<file path=customXml/item2.xml><?xml version="1.0" encoding="utf-8"?>
+<file path=customXml/item3.xml><?xml version="1.0" encoding="utf-8"?>
 <p:properties xmlns:p="http://schemas.microsoft.com/office/2006/metadata/properties" xmlns:xsi="http://www.w3.org/2001/XMLSchema-instance" xmlns:pc="http://schemas.microsoft.com/office/infopath/2007/PartnerControls">
   <documentManagement/>
 </p:properties>
 </file>
 
-<file path=customXml/item3.xml><?xml version="1.0" encoding="utf-8"?>
-<?mso-contentType ?>
-<FormTemplates xmlns="http://schemas.microsoft.com/sharepoint/v3/contenttype/forms">
-  <Display>DocumentLibraryForm</Display>
-  <Edit>DocumentLibraryForm</Edit>
-  <New>DocumentLibraryForm</New>
-</FormTemplates>
+<file path=customXml/itemProps1.xml><?xml version="1.0" encoding="utf-8"?>
+<ds:datastoreItem xmlns:ds="http://schemas.openxmlformats.org/officeDocument/2006/customXml" ds:itemID="{A99115DC-C02A-4EF3-990D-5FF7CC0EE91A}">
+  <ds:schemaRefs>
+    <ds:schemaRef ds:uri="http://schemas.microsoft.com/sharepoint/v3/contenttype/forms"/>
+  </ds:schemaRefs>
+</ds:datastoreItem>
 </file>
 
-<file path=customXml/itemProps1.xml><?xml version="1.0" encoding="utf-8"?>
+<file path=customXml/itemProps2.xml><?xml version="1.0" encoding="utf-8"?>
 <ds:datastoreItem xmlns:ds="http://schemas.openxmlformats.org/officeDocument/2006/customXml" ds:itemID="{C17FC477-C6F3-4824-AF67-67A952D7D3F1}">
   <ds:schemaRefs>
     <ds:schemaRef ds:uri="http://schemas.microsoft.com/office/2006/metadata/contentType"/>
@@ -27529,7 +28422,7 @@
 </ds:datastoreItem>
 </file>
 
-<file path=customXml/itemProps2.xml><?xml version="1.0" encoding="utf-8"?>
+<file path=customXml/itemProps3.xml><?xml version="1.0" encoding="utf-8"?>
 <ds:datastoreItem xmlns:ds="http://schemas.openxmlformats.org/officeDocument/2006/customXml" ds:itemID="{5405BF3B-1233-4D26-8BBF-BED295340DF6}">
   <ds:schemaRefs>
     <ds:schemaRef ds:uri="http://purl.org/dc/terms/"/>
@@ -27542,12 +28435,4 @@
     <ds:schemaRef ds:uri="http://purl.org/dc/dcmitype/"/>
   </ds:schemaRefs>
 </ds:datastoreItem>
-</file>
-
-<file path=customXml/itemProps3.xml><?xml version="1.0" encoding="utf-8"?>
-<ds:datastoreItem xmlns:ds="http://schemas.openxmlformats.org/officeDocument/2006/customXml" ds:itemID="{A99115DC-C02A-4EF3-990D-5FF7CC0EE91A}">
-  <ds:schemaRefs>
-    <ds:schemaRef ds:uri="http://schemas.microsoft.com/sharepoint/v3/contenttype/forms"/>
-  </ds:schemaRefs>
-</ds:datastoreItem>
 </file>
</xml_diff>

<commit_message>
adjusted requirements for project
</commit_message>
<xml_diff>
--- a/WDSR - zarys programu.pptx
+++ b/WDSR - zarys programu.pptx
@@ -5,10 +5,10 @@
     <p:sldMasterId id="2147483650" r:id="rId4"/>
   </p:sldMasterIdLst>
   <p:notesMasterIdLst>
-    <p:notesMasterId r:id="rId20"/>
+    <p:notesMasterId r:id="rId19"/>
   </p:notesMasterIdLst>
   <p:handoutMasterIdLst>
-    <p:handoutMasterId r:id="rId21"/>
+    <p:handoutMasterId r:id="rId20"/>
   </p:handoutMasterIdLst>
   <p:sldIdLst>
     <p:sldId id="556" r:id="rId5"/>
@@ -20,12 +20,11 @@
     <p:sldId id="564" r:id="rId11"/>
     <p:sldId id="566" r:id="rId12"/>
     <p:sldId id="569" r:id="rId13"/>
-    <p:sldId id="572" r:id="rId14"/>
-    <p:sldId id="570" r:id="rId15"/>
-    <p:sldId id="571" r:id="rId16"/>
-    <p:sldId id="567" r:id="rId17"/>
-    <p:sldId id="568" r:id="rId18"/>
-    <p:sldId id="546" r:id="rId19"/>
+    <p:sldId id="570" r:id="rId14"/>
+    <p:sldId id="571" r:id="rId15"/>
+    <p:sldId id="567" r:id="rId16"/>
+    <p:sldId id="568" r:id="rId17"/>
+    <p:sldId id="546" r:id="rId18"/>
   </p:sldIdLst>
   <p:sldSz cx="9144000" cy="6858000" type="screen4x3"/>
   <p:notesSz cx="6858000" cy="9926638"/>
@@ -5288,6 +5287,713 @@
       <dsp:cNvGrpSpPr/>
     </dsp:nvGrpSpPr>
     <dsp:grpSpPr/>
+    <dsp:sp modelId="{401ECA87-A414-4C2E-815B-2E740FECD9DF}">
+      <dsp:nvSpPr>
+        <dsp:cNvPr id="0" name=""/>
+        <dsp:cNvSpPr/>
+      </dsp:nvSpPr>
+      <dsp:spPr>
+        <a:xfrm>
+          <a:off x="0" y="56842"/>
+          <a:ext cx="7242259" cy="444600"/>
+        </a:xfrm>
+        <a:prstGeom prst="roundRect">
+          <a:avLst/>
+        </a:prstGeom>
+        <a:solidFill>
+          <a:schemeClr val="accent1">
+            <a:hueOff val="0"/>
+            <a:satOff val="0"/>
+            <a:lumOff val="0"/>
+            <a:alphaOff val="0"/>
+          </a:schemeClr>
+        </a:solidFill>
+        <a:ln w="25400" cap="flat" cmpd="sng" algn="ctr">
+          <a:solidFill>
+            <a:schemeClr val="lt1">
+              <a:hueOff val="0"/>
+              <a:satOff val="0"/>
+              <a:lumOff val="0"/>
+              <a:alphaOff val="0"/>
+            </a:schemeClr>
+          </a:solidFill>
+          <a:prstDash val="solid"/>
+        </a:ln>
+        <a:effectLst/>
+      </dsp:spPr>
+      <dsp:style>
+        <a:lnRef idx="2">
+          <a:scrgbClr r="0" g="0" b="0"/>
+        </a:lnRef>
+        <a:fillRef idx="1">
+          <a:scrgbClr r="0" g="0" b="0"/>
+        </a:fillRef>
+        <a:effectRef idx="0">
+          <a:scrgbClr r="0" g="0" b="0"/>
+        </a:effectRef>
+        <a:fontRef idx="minor">
+          <a:schemeClr val="lt1"/>
+        </a:fontRef>
+      </dsp:style>
+      <dsp:txBody>
+        <a:bodyPr spcFirstLastPara="0" vert="horz" wrap="square" lIns="72390" tIns="72390" rIns="72390" bIns="72390" numCol="1" spcCol="1270" anchor="ctr" anchorCtr="0">
+          <a:noAutofit/>
+        </a:bodyPr>
+        <a:lstStyle/>
+        <a:p>
+          <a:pPr lvl="0" algn="l" defTabSz="844550">
+            <a:lnSpc>
+              <a:spcPct val="90000"/>
+            </a:lnSpc>
+            <a:spcBef>
+              <a:spcPct val="0"/>
+            </a:spcBef>
+            <a:spcAft>
+              <a:spcPct val="35000"/>
+            </a:spcAft>
+          </a:pPr>
+          <a:r>
+            <a:rPr lang="pl-PL" sz="1900" kern="1200" dirty="0" smtClean="0"/>
+            <a:t>Ekonomiczne</a:t>
+          </a:r>
+          <a:endParaRPr lang="pl-PL" sz="1900" kern="1200" dirty="0"/>
+        </a:p>
+      </dsp:txBody>
+      <dsp:txXfrm>
+        <a:off x="21704" y="78546"/>
+        <a:ext cx="7198851" cy="401192"/>
+      </dsp:txXfrm>
+    </dsp:sp>
+    <dsp:sp modelId="{C7130AF6-5BCF-4F29-BA34-95CB85B72764}">
+      <dsp:nvSpPr>
+        <dsp:cNvPr id="0" name=""/>
+        <dsp:cNvSpPr/>
+      </dsp:nvSpPr>
+      <dsp:spPr>
+        <a:xfrm>
+          <a:off x="0" y="501442"/>
+          <a:ext cx="7242259" cy="688274"/>
+        </a:xfrm>
+        <a:prstGeom prst="rect">
+          <a:avLst/>
+        </a:prstGeom>
+        <a:noFill/>
+        <a:ln>
+          <a:noFill/>
+        </a:ln>
+        <a:effectLst/>
+      </dsp:spPr>
+      <dsp:style>
+        <a:lnRef idx="0">
+          <a:scrgbClr r="0" g="0" b="0"/>
+        </a:lnRef>
+        <a:fillRef idx="0">
+          <a:scrgbClr r="0" g="0" b="0"/>
+        </a:fillRef>
+        <a:effectRef idx="0">
+          <a:scrgbClr r="0" g="0" b="0"/>
+        </a:effectRef>
+        <a:fontRef idx="minor"/>
+      </dsp:style>
+      <dsp:txBody>
+        <a:bodyPr spcFirstLastPara="0" vert="horz" wrap="square" lIns="229942" tIns="24130" rIns="135128" bIns="24130" numCol="1" spcCol="1270" anchor="t" anchorCtr="0">
+          <a:noAutofit/>
+        </a:bodyPr>
+        <a:lstStyle/>
+        <a:p>
+          <a:pPr marL="114300" lvl="1" indent="-114300" algn="l" defTabSz="666750">
+            <a:lnSpc>
+              <a:spcPct val="90000"/>
+            </a:lnSpc>
+            <a:spcBef>
+              <a:spcPct val="0"/>
+            </a:spcBef>
+            <a:spcAft>
+              <a:spcPct val="20000"/>
+            </a:spcAft>
+            <a:buChar char="••"/>
+          </a:pPr>
+          <a:r>
+            <a:rPr lang="pl-PL" sz="1500" kern="1200" dirty="0" smtClean="0"/>
+            <a:t>Współdzielenie zasobów</a:t>
+          </a:r>
+          <a:endParaRPr lang="pl-PL" sz="1500" kern="1200" dirty="0"/>
+        </a:p>
+        <a:p>
+          <a:pPr marL="114300" lvl="1" indent="-114300" algn="l" defTabSz="666750">
+            <a:lnSpc>
+              <a:spcPct val="90000"/>
+            </a:lnSpc>
+            <a:spcBef>
+              <a:spcPct val="0"/>
+            </a:spcBef>
+            <a:spcAft>
+              <a:spcPct val="20000"/>
+            </a:spcAft>
+            <a:buChar char="••"/>
+          </a:pPr>
+          <a:r>
+            <a:rPr lang="pl-PL" sz="1500" kern="1200" dirty="0" smtClean="0"/>
+            <a:t>Bardzo mocne maszyny są nieproporcjonalnie drogie – taniej jest je zastąpić większą liczbą popularnych urządzeń</a:t>
+          </a:r>
+          <a:endParaRPr lang="pl-PL" sz="1500" kern="1200" dirty="0"/>
+        </a:p>
+      </dsp:txBody>
+      <dsp:txXfrm>
+        <a:off x="0" y="501442"/>
+        <a:ext cx="7242259" cy="688274"/>
+      </dsp:txXfrm>
+    </dsp:sp>
+    <dsp:sp modelId="{376597F5-777C-4886-9496-C2590412E54E}">
+      <dsp:nvSpPr>
+        <dsp:cNvPr id="0" name=""/>
+        <dsp:cNvSpPr/>
+      </dsp:nvSpPr>
+      <dsp:spPr>
+        <a:xfrm>
+          <a:off x="0" y="1189717"/>
+          <a:ext cx="7242259" cy="444600"/>
+        </a:xfrm>
+        <a:prstGeom prst="roundRect">
+          <a:avLst/>
+        </a:prstGeom>
+        <a:solidFill>
+          <a:schemeClr val="accent1">
+            <a:hueOff val="0"/>
+            <a:satOff val="0"/>
+            <a:lumOff val="0"/>
+            <a:alphaOff val="0"/>
+          </a:schemeClr>
+        </a:solidFill>
+        <a:ln w="25400" cap="flat" cmpd="sng" algn="ctr">
+          <a:solidFill>
+            <a:schemeClr val="lt1">
+              <a:hueOff val="0"/>
+              <a:satOff val="0"/>
+              <a:lumOff val="0"/>
+              <a:alphaOff val="0"/>
+            </a:schemeClr>
+          </a:solidFill>
+          <a:prstDash val="solid"/>
+        </a:ln>
+        <a:effectLst/>
+      </dsp:spPr>
+      <dsp:style>
+        <a:lnRef idx="2">
+          <a:scrgbClr r="0" g="0" b="0"/>
+        </a:lnRef>
+        <a:fillRef idx="1">
+          <a:scrgbClr r="0" g="0" b="0"/>
+        </a:fillRef>
+        <a:effectRef idx="0">
+          <a:scrgbClr r="0" g="0" b="0"/>
+        </a:effectRef>
+        <a:fontRef idx="minor">
+          <a:schemeClr val="lt1"/>
+        </a:fontRef>
+      </dsp:style>
+      <dsp:txBody>
+        <a:bodyPr spcFirstLastPara="0" vert="horz" wrap="square" lIns="72390" tIns="72390" rIns="72390" bIns="72390" numCol="1" spcCol="1270" anchor="ctr" anchorCtr="0">
+          <a:noAutofit/>
+        </a:bodyPr>
+        <a:lstStyle/>
+        <a:p>
+          <a:pPr lvl="0" algn="l" defTabSz="844550">
+            <a:lnSpc>
+              <a:spcPct val="90000"/>
+            </a:lnSpc>
+            <a:spcBef>
+              <a:spcPct val="0"/>
+            </a:spcBef>
+            <a:spcAft>
+              <a:spcPct val="35000"/>
+            </a:spcAft>
+          </a:pPr>
+          <a:r>
+            <a:rPr lang="pl-PL" sz="1900" kern="1200" dirty="0" smtClean="0"/>
+            <a:t>Dostosowanie do świata rzeczywistego</a:t>
+          </a:r>
+          <a:endParaRPr lang="pl-PL" sz="1900" kern="1200" dirty="0"/>
+        </a:p>
+      </dsp:txBody>
+      <dsp:txXfrm>
+        <a:off x="21704" y="1211421"/>
+        <a:ext cx="7198851" cy="401192"/>
+      </dsp:txXfrm>
+    </dsp:sp>
+    <dsp:sp modelId="{0FB52419-7EF2-4113-8849-3B16BAEC9DD7}">
+      <dsp:nvSpPr>
+        <dsp:cNvPr id="0" name=""/>
+        <dsp:cNvSpPr/>
+      </dsp:nvSpPr>
+      <dsp:spPr>
+        <a:xfrm>
+          <a:off x="0" y="1634317"/>
+          <a:ext cx="7242259" cy="452295"/>
+        </a:xfrm>
+        <a:prstGeom prst="rect">
+          <a:avLst/>
+        </a:prstGeom>
+        <a:noFill/>
+        <a:ln>
+          <a:noFill/>
+        </a:ln>
+        <a:effectLst/>
+      </dsp:spPr>
+      <dsp:style>
+        <a:lnRef idx="0">
+          <a:scrgbClr r="0" g="0" b="0"/>
+        </a:lnRef>
+        <a:fillRef idx="0">
+          <a:scrgbClr r="0" g="0" b="0"/>
+        </a:fillRef>
+        <a:effectRef idx="0">
+          <a:scrgbClr r="0" g="0" b="0"/>
+        </a:effectRef>
+        <a:fontRef idx="minor"/>
+      </dsp:style>
+      <dsp:txBody>
+        <a:bodyPr spcFirstLastPara="0" vert="horz" wrap="square" lIns="229942" tIns="24130" rIns="135128" bIns="24130" numCol="1" spcCol="1270" anchor="t" anchorCtr="0">
+          <a:noAutofit/>
+        </a:bodyPr>
+        <a:lstStyle/>
+        <a:p>
+          <a:pPr marL="114300" lvl="1" indent="-114300" algn="l" defTabSz="666750">
+            <a:lnSpc>
+              <a:spcPct val="90000"/>
+            </a:lnSpc>
+            <a:spcBef>
+              <a:spcPct val="0"/>
+            </a:spcBef>
+            <a:spcAft>
+              <a:spcPct val="20000"/>
+            </a:spcAft>
+            <a:buChar char="••"/>
+          </a:pPr>
+          <a:r>
+            <a:rPr lang="pl-PL" sz="1500" kern="1200" dirty="0" smtClean="0"/>
+            <a:t>Model wielu dziedzin jest z natury rozproszony (na przykład system bankomatów)</a:t>
+          </a:r>
+          <a:endParaRPr lang="pl-PL" sz="1500" kern="1200" dirty="0"/>
+        </a:p>
+      </dsp:txBody>
+      <dsp:txXfrm>
+        <a:off x="0" y="1634317"/>
+        <a:ext cx="7242259" cy="452295"/>
+      </dsp:txXfrm>
+    </dsp:sp>
+    <dsp:sp modelId="{AF79282F-4587-49CB-B714-735A3E3EDCB9}">
+      <dsp:nvSpPr>
+        <dsp:cNvPr id="0" name=""/>
+        <dsp:cNvSpPr/>
+      </dsp:nvSpPr>
+      <dsp:spPr>
+        <a:xfrm>
+          <a:off x="0" y="2086612"/>
+          <a:ext cx="7242259" cy="444600"/>
+        </a:xfrm>
+        <a:prstGeom prst="roundRect">
+          <a:avLst/>
+        </a:prstGeom>
+        <a:solidFill>
+          <a:schemeClr val="accent1">
+            <a:hueOff val="0"/>
+            <a:satOff val="0"/>
+            <a:lumOff val="0"/>
+            <a:alphaOff val="0"/>
+          </a:schemeClr>
+        </a:solidFill>
+        <a:ln w="25400" cap="flat" cmpd="sng" algn="ctr">
+          <a:solidFill>
+            <a:schemeClr val="lt1">
+              <a:hueOff val="0"/>
+              <a:satOff val="0"/>
+              <a:lumOff val="0"/>
+              <a:alphaOff val="0"/>
+            </a:schemeClr>
+          </a:solidFill>
+          <a:prstDash val="solid"/>
+        </a:ln>
+        <a:effectLst/>
+      </dsp:spPr>
+      <dsp:style>
+        <a:lnRef idx="2">
+          <a:scrgbClr r="0" g="0" b="0"/>
+        </a:lnRef>
+        <a:fillRef idx="1">
+          <a:scrgbClr r="0" g="0" b="0"/>
+        </a:fillRef>
+        <a:effectRef idx="0">
+          <a:scrgbClr r="0" g="0" b="0"/>
+        </a:effectRef>
+        <a:fontRef idx="minor">
+          <a:schemeClr val="lt1"/>
+        </a:fontRef>
+      </dsp:style>
+      <dsp:txBody>
+        <a:bodyPr spcFirstLastPara="0" vert="horz" wrap="square" lIns="72390" tIns="72390" rIns="72390" bIns="72390" numCol="1" spcCol="1270" anchor="ctr" anchorCtr="0">
+          <a:noAutofit/>
+        </a:bodyPr>
+        <a:lstStyle/>
+        <a:p>
+          <a:pPr lvl="0" algn="l" defTabSz="844550">
+            <a:lnSpc>
+              <a:spcPct val="90000"/>
+            </a:lnSpc>
+            <a:spcBef>
+              <a:spcPct val="0"/>
+            </a:spcBef>
+            <a:spcAft>
+              <a:spcPct val="35000"/>
+            </a:spcAft>
+          </a:pPr>
+          <a:r>
+            <a:rPr lang="pl-PL" sz="1900" kern="1200" dirty="0" smtClean="0"/>
+            <a:t>Wydajność przetwarzania</a:t>
+          </a:r>
+          <a:endParaRPr lang="pl-PL" sz="1900" kern="1200" dirty="0"/>
+        </a:p>
+      </dsp:txBody>
+      <dsp:txXfrm>
+        <a:off x="21704" y="2108316"/>
+        <a:ext cx="7198851" cy="401192"/>
+      </dsp:txXfrm>
+    </dsp:sp>
+    <dsp:sp modelId="{3FFC3410-A2D0-4B28-A055-BFAC61BCB93F}">
+      <dsp:nvSpPr>
+        <dsp:cNvPr id="0" name=""/>
+        <dsp:cNvSpPr/>
+      </dsp:nvSpPr>
+      <dsp:spPr>
+        <a:xfrm>
+          <a:off x="0" y="2531212"/>
+          <a:ext cx="7242259" cy="314640"/>
+        </a:xfrm>
+        <a:prstGeom prst="rect">
+          <a:avLst/>
+        </a:prstGeom>
+        <a:noFill/>
+        <a:ln>
+          <a:noFill/>
+        </a:ln>
+        <a:effectLst/>
+      </dsp:spPr>
+      <dsp:style>
+        <a:lnRef idx="0">
+          <a:scrgbClr r="0" g="0" b="0"/>
+        </a:lnRef>
+        <a:fillRef idx="0">
+          <a:scrgbClr r="0" g="0" b="0"/>
+        </a:fillRef>
+        <a:effectRef idx="0">
+          <a:scrgbClr r="0" g="0" b="0"/>
+        </a:effectRef>
+        <a:fontRef idx="minor"/>
+      </dsp:style>
+      <dsp:txBody>
+        <a:bodyPr spcFirstLastPara="0" vert="horz" wrap="square" lIns="229942" tIns="24130" rIns="135128" bIns="24130" numCol="1" spcCol="1270" anchor="t" anchorCtr="0">
+          <a:noAutofit/>
+        </a:bodyPr>
+        <a:lstStyle/>
+        <a:p>
+          <a:pPr marL="114300" lvl="1" indent="-114300" algn="l" defTabSz="666750">
+            <a:lnSpc>
+              <a:spcPct val="90000"/>
+            </a:lnSpc>
+            <a:spcBef>
+              <a:spcPct val="0"/>
+            </a:spcBef>
+            <a:spcAft>
+              <a:spcPct val="20000"/>
+            </a:spcAft>
+            <a:buChar char="••"/>
+          </a:pPr>
+          <a:r>
+            <a:rPr lang="pl-PL" sz="1500" kern="1200" dirty="0" smtClean="0"/>
+            <a:t>Pojemność systemu nie jest ograniczona przez pojedynczą instancję</a:t>
+          </a:r>
+          <a:endParaRPr lang="pl-PL" sz="1500" kern="1200" dirty="0"/>
+        </a:p>
+      </dsp:txBody>
+      <dsp:txXfrm>
+        <a:off x="0" y="2531212"/>
+        <a:ext cx="7242259" cy="314640"/>
+      </dsp:txXfrm>
+    </dsp:sp>
+    <dsp:sp modelId="{78DA6840-523F-44DE-8870-8809A7BF9028}">
+      <dsp:nvSpPr>
+        <dsp:cNvPr id="0" name=""/>
+        <dsp:cNvSpPr/>
+      </dsp:nvSpPr>
+      <dsp:spPr>
+        <a:xfrm>
+          <a:off x="0" y="2845852"/>
+          <a:ext cx="7242259" cy="444600"/>
+        </a:xfrm>
+        <a:prstGeom prst="roundRect">
+          <a:avLst/>
+        </a:prstGeom>
+        <a:solidFill>
+          <a:schemeClr val="accent1">
+            <a:hueOff val="0"/>
+            <a:satOff val="0"/>
+            <a:lumOff val="0"/>
+            <a:alphaOff val="0"/>
+          </a:schemeClr>
+        </a:solidFill>
+        <a:ln w="25400" cap="flat" cmpd="sng" algn="ctr">
+          <a:solidFill>
+            <a:schemeClr val="lt1">
+              <a:hueOff val="0"/>
+              <a:satOff val="0"/>
+              <a:lumOff val="0"/>
+              <a:alphaOff val="0"/>
+            </a:schemeClr>
+          </a:solidFill>
+          <a:prstDash val="solid"/>
+        </a:ln>
+        <a:effectLst/>
+      </dsp:spPr>
+      <dsp:style>
+        <a:lnRef idx="2">
+          <a:scrgbClr r="0" g="0" b="0"/>
+        </a:lnRef>
+        <a:fillRef idx="1">
+          <a:scrgbClr r="0" g="0" b="0"/>
+        </a:fillRef>
+        <a:effectRef idx="0">
+          <a:scrgbClr r="0" g="0" b="0"/>
+        </a:effectRef>
+        <a:fontRef idx="minor">
+          <a:schemeClr val="lt1"/>
+        </a:fontRef>
+      </dsp:style>
+      <dsp:txBody>
+        <a:bodyPr spcFirstLastPara="0" vert="horz" wrap="square" lIns="72390" tIns="72390" rIns="72390" bIns="72390" numCol="1" spcCol="1270" anchor="ctr" anchorCtr="0">
+          <a:noAutofit/>
+        </a:bodyPr>
+        <a:lstStyle/>
+        <a:p>
+          <a:pPr lvl="0" algn="l" defTabSz="844550">
+            <a:lnSpc>
+              <a:spcPct val="90000"/>
+            </a:lnSpc>
+            <a:spcBef>
+              <a:spcPct val="0"/>
+            </a:spcBef>
+            <a:spcAft>
+              <a:spcPct val="35000"/>
+            </a:spcAft>
+          </a:pPr>
+          <a:r>
+            <a:rPr lang="pl-PL" sz="1900" kern="1200" dirty="0" smtClean="0"/>
+            <a:t>Odporność na awarie</a:t>
+          </a:r>
+          <a:endParaRPr lang="pl-PL" sz="1900" kern="1200" dirty="0"/>
+        </a:p>
+      </dsp:txBody>
+      <dsp:txXfrm>
+        <a:off x="21704" y="2867556"/>
+        <a:ext cx="7198851" cy="401192"/>
+      </dsp:txXfrm>
+    </dsp:sp>
+    <dsp:sp modelId="{9C495DF5-169D-4A31-B3DB-88DFF8C7AB22}">
+      <dsp:nvSpPr>
+        <dsp:cNvPr id="0" name=""/>
+        <dsp:cNvSpPr/>
+      </dsp:nvSpPr>
+      <dsp:spPr>
+        <a:xfrm>
+          <a:off x="0" y="3290452"/>
+          <a:ext cx="7242259" cy="314640"/>
+        </a:xfrm>
+        <a:prstGeom prst="rect">
+          <a:avLst/>
+        </a:prstGeom>
+        <a:noFill/>
+        <a:ln>
+          <a:noFill/>
+        </a:ln>
+        <a:effectLst/>
+      </dsp:spPr>
+      <dsp:style>
+        <a:lnRef idx="0">
+          <a:scrgbClr r="0" g="0" b="0"/>
+        </a:lnRef>
+        <a:fillRef idx="0">
+          <a:scrgbClr r="0" g="0" b="0"/>
+        </a:fillRef>
+        <a:effectRef idx="0">
+          <a:scrgbClr r="0" g="0" b="0"/>
+        </a:effectRef>
+        <a:fontRef idx="minor"/>
+      </dsp:style>
+      <dsp:txBody>
+        <a:bodyPr spcFirstLastPara="0" vert="horz" wrap="square" lIns="229942" tIns="24130" rIns="135128" bIns="24130" numCol="1" spcCol="1270" anchor="t" anchorCtr="0">
+          <a:noAutofit/>
+        </a:bodyPr>
+        <a:lstStyle/>
+        <a:p>
+          <a:pPr marL="114300" lvl="1" indent="-114300" algn="l" defTabSz="666750">
+            <a:lnSpc>
+              <a:spcPct val="90000"/>
+            </a:lnSpc>
+            <a:spcBef>
+              <a:spcPct val="0"/>
+            </a:spcBef>
+            <a:spcAft>
+              <a:spcPct val="20000"/>
+            </a:spcAft>
+            <a:buChar char="••"/>
+          </a:pPr>
+          <a:r>
+            <a:rPr lang="pl-PL" sz="1500" kern="1200" dirty="0" smtClean="0"/>
+            <a:t>Możliwość stosowania redundancji</a:t>
+          </a:r>
+          <a:endParaRPr lang="pl-PL" sz="1500" kern="1200" dirty="0"/>
+        </a:p>
+      </dsp:txBody>
+      <dsp:txXfrm>
+        <a:off x="0" y="3290452"/>
+        <a:ext cx="7242259" cy="314640"/>
+      </dsp:txXfrm>
+    </dsp:sp>
+    <dsp:sp modelId="{5AF62516-935A-4716-BC3C-96D1A9708875}">
+      <dsp:nvSpPr>
+        <dsp:cNvPr id="0" name=""/>
+        <dsp:cNvSpPr/>
+      </dsp:nvSpPr>
+      <dsp:spPr>
+        <a:xfrm>
+          <a:off x="0" y="3605092"/>
+          <a:ext cx="7242259" cy="444600"/>
+        </a:xfrm>
+        <a:prstGeom prst="roundRect">
+          <a:avLst/>
+        </a:prstGeom>
+        <a:solidFill>
+          <a:schemeClr val="accent1">
+            <a:hueOff val="0"/>
+            <a:satOff val="0"/>
+            <a:lumOff val="0"/>
+            <a:alphaOff val="0"/>
+          </a:schemeClr>
+        </a:solidFill>
+        <a:ln w="25400" cap="flat" cmpd="sng" algn="ctr">
+          <a:solidFill>
+            <a:schemeClr val="lt1">
+              <a:hueOff val="0"/>
+              <a:satOff val="0"/>
+              <a:lumOff val="0"/>
+              <a:alphaOff val="0"/>
+            </a:schemeClr>
+          </a:solidFill>
+          <a:prstDash val="solid"/>
+        </a:ln>
+        <a:effectLst/>
+      </dsp:spPr>
+      <dsp:style>
+        <a:lnRef idx="2">
+          <a:scrgbClr r="0" g="0" b="0"/>
+        </a:lnRef>
+        <a:fillRef idx="1">
+          <a:scrgbClr r="0" g="0" b="0"/>
+        </a:fillRef>
+        <a:effectRef idx="0">
+          <a:scrgbClr r="0" g="0" b="0"/>
+        </a:effectRef>
+        <a:fontRef idx="minor">
+          <a:schemeClr val="lt1"/>
+        </a:fontRef>
+      </dsp:style>
+      <dsp:txBody>
+        <a:bodyPr spcFirstLastPara="0" vert="horz" wrap="square" lIns="72390" tIns="72390" rIns="72390" bIns="72390" numCol="1" spcCol="1270" anchor="ctr" anchorCtr="0">
+          <a:noAutofit/>
+        </a:bodyPr>
+        <a:lstStyle/>
+        <a:p>
+          <a:pPr lvl="0" algn="l" defTabSz="844550">
+            <a:lnSpc>
+              <a:spcPct val="90000"/>
+            </a:lnSpc>
+            <a:spcBef>
+              <a:spcPct val="0"/>
+            </a:spcBef>
+            <a:spcAft>
+              <a:spcPct val="35000"/>
+            </a:spcAft>
+          </a:pPr>
+          <a:r>
+            <a:rPr lang="pl-PL" sz="1900" kern="1200" dirty="0" smtClean="0"/>
+            <a:t>Skalowalność</a:t>
+          </a:r>
+        </a:p>
+      </dsp:txBody>
+      <dsp:txXfrm>
+        <a:off x="21704" y="3626796"/>
+        <a:ext cx="7198851" cy="401192"/>
+      </dsp:txXfrm>
+    </dsp:sp>
+    <dsp:sp modelId="{5EE99CAA-C70B-49D9-9943-E42F93D8C815}">
+      <dsp:nvSpPr>
+        <dsp:cNvPr id="0" name=""/>
+        <dsp:cNvSpPr/>
+      </dsp:nvSpPr>
+      <dsp:spPr>
+        <a:xfrm>
+          <a:off x="0" y="4049692"/>
+          <a:ext cx="7242259" cy="314640"/>
+        </a:xfrm>
+        <a:prstGeom prst="rect">
+          <a:avLst/>
+        </a:prstGeom>
+        <a:noFill/>
+        <a:ln>
+          <a:noFill/>
+        </a:ln>
+        <a:effectLst/>
+      </dsp:spPr>
+      <dsp:style>
+        <a:lnRef idx="0">
+          <a:scrgbClr r="0" g="0" b="0"/>
+        </a:lnRef>
+        <a:fillRef idx="0">
+          <a:scrgbClr r="0" g="0" b="0"/>
+        </a:fillRef>
+        <a:effectRef idx="0">
+          <a:scrgbClr r="0" g="0" b="0"/>
+        </a:effectRef>
+        <a:fontRef idx="minor"/>
+      </dsp:style>
+      <dsp:txBody>
+        <a:bodyPr spcFirstLastPara="0" vert="horz" wrap="square" lIns="229942" tIns="24130" rIns="135128" bIns="24130" numCol="1" spcCol="1270" anchor="t" anchorCtr="0">
+          <a:noAutofit/>
+        </a:bodyPr>
+        <a:lstStyle/>
+        <a:p>
+          <a:pPr marL="114300" lvl="1" indent="-114300" algn="l" defTabSz="666750">
+            <a:lnSpc>
+              <a:spcPct val="90000"/>
+            </a:lnSpc>
+            <a:spcBef>
+              <a:spcPct val="0"/>
+            </a:spcBef>
+            <a:spcAft>
+              <a:spcPct val="20000"/>
+            </a:spcAft>
+            <a:buChar char="••"/>
+          </a:pPr>
+          <a:r>
+            <a:rPr lang="pl-PL" sz="1500" kern="1200" dirty="0" smtClean="0"/>
+            <a:t>Możliwość dostosowywania pojemności systemu do potrzeb</a:t>
+          </a:r>
+        </a:p>
+      </dsp:txBody>
+      <dsp:txXfrm>
+        <a:off x="0" y="4049692"/>
+        <a:ext cx="7242259" cy="314640"/>
+      </dsp:txXfrm>
+    </dsp:sp>
   </dsp:spTree>
 </dsp:drawing>
 </file>
@@ -5300,6 +6006,418 @@
       <dsp:cNvGrpSpPr/>
     </dsp:nvGrpSpPr>
     <dsp:grpSpPr/>
+    <dsp:sp modelId="{401ECA87-A414-4C2E-815B-2E740FECD9DF}">
+      <dsp:nvSpPr>
+        <dsp:cNvPr id="0" name=""/>
+        <dsp:cNvSpPr/>
+      </dsp:nvSpPr>
+      <dsp:spPr>
+        <a:xfrm>
+          <a:off x="0" y="77673"/>
+          <a:ext cx="7169544" cy="608400"/>
+        </a:xfrm>
+        <a:prstGeom prst="roundRect">
+          <a:avLst/>
+        </a:prstGeom>
+        <a:solidFill>
+          <a:schemeClr val="accent1">
+            <a:hueOff val="0"/>
+            <a:satOff val="0"/>
+            <a:lumOff val="0"/>
+            <a:alphaOff val="0"/>
+          </a:schemeClr>
+        </a:solidFill>
+        <a:ln w="25400" cap="flat" cmpd="sng" algn="ctr">
+          <a:solidFill>
+            <a:schemeClr val="lt1">
+              <a:hueOff val="0"/>
+              <a:satOff val="0"/>
+              <a:lumOff val="0"/>
+              <a:alphaOff val="0"/>
+            </a:schemeClr>
+          </a:solidFill>
+          <a:prstDash val="solid"/>
+        </a:ln>
+        <a:effectLst/>
+      </dsp:spPr>
+      <dsp:style>
+        <a:lnRef idx="2">
+          <a:scrgbClr r="0" g="0" b="0"/>
+        </a:lnRef>
+        <a:fillRef idx="1">
+          <a:scrgbClr r="0" g="0" b="0"/>
+        </a:fillRef>
+        <a:effectRef idx="0">
+          <a:scrgbClr r="0" g="0" b="0"/>
+        </a:effectRef>
+        <a:fontRef idx="minor">
+          <a:schemeClr val="lt1"/>
+        </a:fontRef>
+      </dsp:style>
+      <dsp:txBody>
+        <a:bodyPr spcFirstLastPara="0" vert="horz" wrap="square" lIns="99060" tIns="99060" rIns="99060" bIns="99060" numCol="1" spcCol="1270" anchor="ctr" anchorCtr="0">
+          <a:noAutofit/>
+        </a:bodyPr>
+        <a:lstStyle/>
+        <a:p>
+          <a:pPr lvl="0" algn="l" defTabSz="1155700">
+            <a:lnSpc>
+              <a:spcPct val="90000"/>
+            </a:lnSpc>
+            <a:spcBef>
+              <a:spcPct val="0"/>
+            </a:spcBef>
+            <a:spcAft>
+              <a:spcPct val="35000"/>
+            </a:spcAft>
+          </a:pPr>
+          <a:r>
+            <a:rPr lang="pl-PL" sz="2600" kern="1200" dirty="0" smtClean="0"/>
+            <a:t>Złożoność</a:t>
+          </a:r>
+          <a:endParaRPr lang="pl-PL" sz="2600" kern="1200" dirty="0"/>
+        </a:p>
+      </dsp:txBody>
+      <dsp:txXfrm>
+        <a:off x="29700" y="107373"/>
+        <a:ext cx="7110144" cy="549000"/>
+      </dsp:txXfrm>
+    </dsp:sp>
+    <dsp:sp modelId="{C7130AF6-5BCF-4F29-BA34-95CB85B72764}">
+      <dsp:nvSpPr>
+        <dsp:cNvPr id="0" name=""/>
+        <dsp:cNvSpPr/>
+      </dsp:nvSpPr>
+      <dsp:spPr>
+        <a:xfrm>
+          <a:off x="0" y="686073"/>
+          <a:ext cx="7169544" cy="592020"/>
+        </a:xfrm>
+        <a:prstGeom prst="rect">
+          <a:avLst/>
+        </a:prstGeom>
+        <a:noFill/>
+        <a:ln>
+          <a:noFill/>
+        </a:ln>
+        <a:effectLst/>
+      </dsp:spPr>
+      <dsp:style>
+        <a:lnRef idx="0">
+          <a:scrgbClr r="0" g="0" b="0"/>
+        </a:lnRef>
+        <a:fillRef idx="0">
+          <a:scrgbClr r="0" g="0" b="0"/>
+        </a:fillRef>
+        <a:effectRef idx="0">
+          <a:scrgbClr r="0" g="0" b="0"/>
+        </a:effectRef>
+        <a:fontRef idx="minor"/>
+      </dsp:style>
+      <dsp:txBody>
+        <a:bodyPr spcFirstLastPara="0" vert="horz" wrap="square" lIns="227633" tIns="33020" rIns="184912" bIns="33020" numCol="1" spcCol="1270" anchor="t" anchorCtr="0">
+          <a:noAutofit/>
+        </a:bodyPr>
+        <a:lstStyle/>
+        <a:p>
+          <a:pPr marL="228600" lvl="1" indent="-228600" algn="l" defTabSz="889000">
+            <a:lnSpc>
+              <a:spcPct val="90000"/>
+            </a:lnSpc>
+            <a:spcBef>
+              <a:spcPct val="0"/>
+            </a:spcBef>
+            <a:spcAft>
+              <a:spcPct val="20000"/>
+            </a:spcAft>
+            <a:buChar char="••"/>
+          </a:pPr>
+          <a:r>
+            <a:rPr lang="pl-PL" sz="2000" kern="1200" dirty="0" smtClean="0"/>
+            <a:t>Konieczność obsługi większej liczby sytuacji (korzystnych i niekorzystnych) niż w systemach monolitycznych</a:t>
+          </a:r>
+          <a:endParaRPr lang="pl-PL" sz="2000" kern="1200" dirty="0"/>
+        </a:p>
+      </dsp:txBody>
+      <dsp:txXfrm>
+        <a:off x="0" y="686073"/>
+        <a:ext cx="7169544" cy="592020"/>
+      </dsp:txXfrm>
+    </dsp:sp>
+    <dsp:sp modelId="{78DA6840-523F-44DE-8870-8809A7BF9028}">
+      <dsp:nvSpPr>
+        <dsp:cNvPr id="0" name=""/>
+        <dsp:cNvSpPr/>
+      </dsp:nvSpPr>
+      <dsp:spPr>
+        <a:xfrm>
+          <a:off x="0" y="1278093"/>
+          <a:ext cx="7169544" cy="608400"/>
+        </a:xfrm>
+        <a:prstGeom prst="roundRect">
+          <a:avLst/>
+        </a:prstGeom>
+        <a:solidFill>
+          <a:schemeClr val="accent1">
+            <a:hueOff val="0"/>
+            <a:satOff val="0"/>
+            <a:lumOff val="0"/>
+            <a:alphaOff val="0"/>
+          </a:schemeClr>
+        </a:solidFill>
+        <a:ln w="25400" cap="flat" cmpd="sng" algn="ctr">
+          <a:solidFill>
+            <a:schemeClr val="lt1">
+              <a:hueOff val="0"/>
+              <a:satOff val="0"/>
+              <a:lumOff val="0"/>
+              <a:alphaOff val="0"/>
+            </a:schemeClr>
+          </a:solidFill>
+          <a:prstDash val="solid"/>
+        </a:ln>
+        <a:effectLst/>
+      </dsp:spPr>
+      <dsp:style>
+        <a:lnRef idx="2">
+          <a:scrgbClr r="0" g="0" b="0"/>
+        </a:lnRef>
+        <a:fillRef idx="1">
+          <a:scrgbClr r="0" g="0" b="0"/>
+        </a:fillRef>
+        <a:effectRef idx="0">
+          <a:scrgbClr r="0" g="0" b="0"/>
+        </a:effectRef>
+        <a:fontRef idx="minor">
+          <a:schemeClr val="lt1"/>
+        </a:fontRef>
+      </dsp:style>
+      <dsp:txBody>
+        <a:bodyPr spcFirstLastPara="0" vert="horz" wrap="square" lIns="99060" tIns="99060" rIns="99060" bIns="99060" numCol="1" spcCol="1270" anchor="ctr" anchorCtr="0">
+          <a:noAutofit/>
+        </a:bodyPr>
+        <a:lstStyle/>
+        <a:p>
+          <a:pPr lvl="0" algn="l" defTabSz="1155700">
+            <a:lnSpc>
+              <a:spcPct val="90000"/>
+            </a:lnSpc>
+            <a:spcBef>
+              <a:spcPct val="0"/>
+            </a:spcBef>
+            <a:spcAft>
+              <a:spcPct val="35000"/>
+            </a:spcAft>
+          </a:pPr>
+          <a:r>
+            <a:rPr lang="pl-PL" sz="2600" kern="1200" dirty="0" smtClean="0"/>
+            <a:t>Wzrost liczby pojedynczych awarii</a:t>
+          </a:r>
+          <a:endParaRPr lang="pl-PL" sz="2600" kern="1200" dirty="0"/>
+        </a:p>
+      </dsp:txBody>
+      <dsp:txXfrm>
+        <a:off x="29700" y="1307793"/>
+        <a:ext cx="7110144" cy="549000"/>
+      </dsp:txXfrm>
+    </dsp:sp>
+    <dsp:sp modelId="{9C495DF5-169D-4A31-B3DB-88DFF8C7AB22}">
+      <dsp:nvSpPr>
+        <dsp:cNvPr id="0" name=""/>
+        <dsp:cNvSpPr/>
+      </dsp:nvSpPr>
+      <dsp:spPr>
+        <a:xfrm>
+          <a:off x="0" y="1886493"/>
+          <a:ext cx="7169544" cy="861120"/>
+        </a:xfrm>
+        <a:prstGeom prst="rect">
+          <a:avLst/>
+        </a:prstGeom>
+        <a:noFill/>
+        <a:ln>
+          <a:noFill/>
+        </a:ln>
+        <a:effectLst/>
+      </dsp:spPr>
+      <dsp:style>
+        <a:lnRef idx="0">
+          <a:scrgbClr r="0" g="0" b="0"/>
+        </a:lnRef>
+        <a:fillRef idx="0">
+          <a:scrgbClr r="0" g="0" b="0"/>
+        </a:fillRef>
+        <a:effectRef idx="0">
+          <a:scrgbClr r="0" g="0" b="0"/>
+        </a:effectRef>
+        <a:fontRef idx="minor"/>
+      </dsp:style>
+      <dsp:txBody>
+        <a:bodyPr spcFirstLastPara="0" vert="horz" wrap="square" lIns="227633" tIns="33020" rIns="184912" bIns="33020" numCol="1" spcCol="1270" anchor="t" anchorCtr="0">
+          <a:noAutofit/>
+        </a:bodyPr>
+        <a:lstStyle/>
+        <a:p>
+          <a:pPr marL="228600" lvl="1" indent="-228600" algn="l" defTabSz="889000">
+            <a:lnSpc>
+              <a:spcPct val="90000"/>
+            </a:lnSpc>
+            <a:spcBef>
+              <a:spcPct val="0"/>
+            </a:spcBef>
+            <a:spcAft>
+              <a:spcPct val="20000"/>
+            </a:spcAft>
+            <a:buChar char="••"/>
+          </a:pPr>
+          <a:r>
+            <a:rPr lang="pl-PL" sz="2000" kern="1200" dirty="0" smtClean="0"/>
+            <a:t>Każdy pojedynczy komponent systemu może ulec awarii – wpływ tych awarii na działanie systemu jako całości wymaga świadomego zarządzania</a:t>
+          </a:r>
+          <a:endParaRPr lang="pl-PL" sz="2000" kern="1200" dirty="0"/>
+        </a:p>
+      </dsp:txBody>
+      <dsp:txXfrm>
+        <a:off x="0" y="1886493"/>
+        <a:ext cx="7169544" cy="861120"/>
+      </dsp:txXfrm>
+    </dsp:sp>
+    <dsp:sp modelId="{5AF62516-935A-4716-BC3C-96D1A9708875}">
+      <dsp:nvSpPr>
+        <dsp:cNvPr id="0" name=""/>
+        <dsp:cNvSpPr/>
+      </dsp:nvSpPr>
+      <dsp:spPr>
+        <a:xfrm>
+          <a:off x="0" y="2747613"/>
+          <a:ext cx="7169544" cy="608400"/>
+        </a:xfrm>
+        <a:prstGeom prst="roundRect">
+          <a:avLst/>
+        </a:prstGeom>
+        <a:solidFill>
+          <a:schemeClr val="accent1">
+            <a:hueOff val="0"/>
+            <a:satOff val="0"/>
+            <a:lumOff val="0"/>
+            <a:alphaOff val="0"/>
+          </a:schemeClr>
+        </a:solidFill>
+        <a:ln w="25400" cap="flat" cmpd="sng" algn="ctr">
+          <a:solidFill>
+            <a:schemeClr val="lt1">
+              <a:hueOff val="0"/>
+              <a:satOff val="0"/>
+              <a:lumOff val="0"/>
+              <a:alphaOff val="0"/>
+            </a:schemeClr>
+          </a:solidFill>
+          <a:prstDash val="solid"/>
+        </a:ln>
+        <a:effectLst/>
+      </dsp:spPr>
+      <dsp:style>
+        <a:lnRef idx="2">
+          <a:scrgbClr r="0" g="0" b="0"/>
+        </a:lnRef>
+        <a:fillRef idx="1">
+          <a:scrgbClr r="0" g="0" b="0"/>
+        </a:fillRef>
+        <a:effectRef idx="0">
+          <a:scrgbClr r="0" g="0" b="0"/>
+        </a:effectRef>
+        <a:fontRef idx="minor">
+          <a:schemeClr val="lt1"/>
+        </a:fontRef>
+      </dsp:style>
+      <dsp:txBody>
+        <a:bodyPr spcFirstLastPara="0" vert="horz" wrap="square" lIns="99060" tIns="99060" rIns="99060" bIns="99060" numCol="1" spcCol="1270" anchor="ctr" anchorCtr="0">
+          <a:noAutofit/>
+        </a:bodyPr>
+        <a:lstStyle/>
+        <a:p>
+          <a:pPr lvl="0" algn="l" defTabSz="1155700">
+            <a:lnSpc>
+              <a:spcPct val="90000"/>
+            </a:lnSpc>
+            <a:spcBef>
+              <a:spcPct val="0"/>
+            </a:spcBef>
+            <a:spcAft>
+              <a:spcPct val="35000"/>
+            </a:spcAft>
+          </a:pPr>
+          <a:r>
+            <a:rPr lang="pl-PL" sz="2600" kern="1200" dirty="0" smtClean="0"/>
+            <a:t>Bezpieczeństwo</a:t>
+          </a:r>
+        </a:p>
+      </dsp:txBody>
+      <dsp:txXfrm>
+        <a:off x="29700" y="2777313"/>
+        <a:ext cx="7110144" cy="549000"/>
+      </dsp:txXfrm>
+    </dsp:sp>
+    <dsp:sp modelId="{5EE99CAA-C70B-49D9-9943-E42F93D8C815}">
+      <dsp:nvSpPr>
+        <dsp:cNvPr id="0" name=""/>
+        <dsp:cNvSpPr/>
+      </dsp:nvSpPr>
+      <dsp:spPr>
+        <a:xfrm>
+          <a:off x="0" y="3356013"/>
+          <a:ext cx="7169544" cy="1130220"/>
+        </a:xfrm>
+        <a:prstGeom prst="rect">
+          <a:avLst/>
+        </a:prstGeom>
+        <a:noFill/>
+        <a:ln>
+          <a:noFill/>
+        </a:ln>
+        <a:effectLst/>
+      </dsp:spPr>
+      <dsp:style>
+        <a:lnRef idx="0">
+          <a:scrgbClr r="0" g="0" b="0"/>
+        </a:lnRef>
+        <a:fillRef idx="0">
+          <a:scrgbClr r="0" g="0" b="0"/>
+        </a:fillRef>
+        <a:effectRef idx="0">
+          <a:scrgbClr r="0" g="0" b="0"/>
+        </a:effectRef>
+        <a:fontRef idx="minor"/>
+      </dsp:style>
+      <dsp:txBody>
+        <a:bodyPr spcFirstLastPara="0" vert="horz" wrap="square" lIns="227633" tIns="33020" rIns="184912" bIns="33020" numCol="1" spcCol="1270" anchor="t" anchorCtr="0">
+          <a:noAutofit/>
+        </a:bodyPr>
+        <a:lstStyle/>
+        <a:p>
+          <a:pPr marL="228600" lvl="1" indent="-228600" algn="l" defTabSz="889000">
+            <a:lnSpc>
+              <a:spcPct val="90000"/>
+            </a:lnSpc>
+            <a:spcBef>
+              <a:spcPct val="0"/>
+            </a:spcBef>
+            <a:spcAft>
+              <a:spcPct val="20000"/>
+            </a:spcAft>
+            <a:buChar char="••"/>
+          </a:pPr>
+          <a:r>
+            <a:rPr lang="pl-PL" sz="2000" kern="1200" dirty="0" smtClean="0"/>
+            <a:t>Zwiększona powierzchnia ataku (większa liczba elementów do zabezpieczenia, konieczność zabezpieczenia informacji przesyłanych pomiędzy węzłami systemu)</a:t>
+          </a:r>
+        </a:p>
+      </dsp:txBody>
+      <dsp:txXfrm>
+        <a:off x="0" y="3356013"/>
+        <a:ext cx="7169544" cy="1130220"/>
+      </dsp:txXfrm>
+    </dsp:sp>
   </dsp:spTree>
 </dsp:drawing>
 </file>
@@ -5312,6 +6430,690 @@
       <dsp:cNvGrpSpPr/>
     </dsp:nvGrpSpPr>
     <dsp:grpSpPr/>
+    <dsp:sp modelId="{401ECA87-A414-4C2E-815B-2E740FECD9DF}">
+      <dsp:nvSpPr>
+        <dsp:cNvPr id="0" name=""/>
+        <dsp:cNvSpPr/>
+      </dsp:nvSpPr>
+      <dsp:spPr>
+        <a:xfrm>
+          <a:off x="0" y="65571"/>
+          <a:ext cx="7363752" cy="421200"/>
+        </a:xfrm>
+        <a:prstGeom prst="roundRect">
+          <a:avLst/>
+        </a:prstGeom>
+        <a:solidFill>
+          <a:schemeClr val="accent1">
+            <a:hueOff val="0"/>
+            <a:satOff val="0"/>
+            <a:lumOff val="0"/>
+            <a:alphaOff val="0"/>
+          </a:schemeClr>
+        </a:solidFill>
+        <a:ln w="25400" cap="flat" cmpd="sng" algn="ctr">
+          <a:solidFill>
+            <a:schemeClr val="lt1">
+              <a:hueOff val="0"/>
+              <a:satOff val="0"/>
+              <a:lumOff val="0"/>
+              <a:alphaOff val="0"/>
+            </a:schemeClr>
+          </a:solidFill>
+          <a:prstDash val="solid"/>
+        </a:ln>
+        <a:effectLst/>
+      </dsp:spPr>
+      <dsp:style>
+        <a:lnRef idx="2">
+          <a:scrgbClr r="0" g="0" b="0"/>
+        </a:lnRef>
+        <a:fillRef idx="1">
+          <a:scrgbClr r="0" g="0" b="0"/>
+        </a:fillRef>
+        <a:effectRef idx="0">
+          <a:scrgbClr r="0" g="0" b="0"/>
+        </a:effectRef>
+        <a:fontRef idx="minor">
+          <a:schemeClr val="lt1"/>
+        </a:fontRef>
+      </dsp:style>
+      <dsp:txBody>
+        <a:bodyPr spcFirstLastPara="0" vert="horz" wrap="square" lIns="68580" tIns="68580" rIns="68580" bIns="68580" numCol="1" spcCol="1270" anchor="ctr" anchorCtr="0">
+          <a:noAutofit/>
+        </a:bodyPr>
+        <a:lstStyle/>
+        <a:p>
+          <a:pPr lvl="0" algn="l" defTabSz="800100">
+            <a:lnSpc>
+              <a:spcPct val="90000"/>
+            </a:lnSpc>
+            <a:spcBef>
+              <a:spcPct val="0"/>
+            </a:spcBef>
+            <a:spcAft>
+              <a:spcPct val="35000"/>
+            </a:spcAft>
+          </a:pPr>
+          <a:r>
+            <a:rPr lang="pl-PL" sz="1800" kern="1200" dirty="0" smtClean="0"/>
+            <a:t>Przezroczystość</a:t>
+          </a:r>
+          <a:endParaRPr lang="pl-PL" sz="1800" kern="1200" dirty="0"/>
+        </a:p>
+      </dsp:txBody>
+      <dsp:txXfrm>
+        <a:off x="20561" y="86132"/>
+        <a:ext cx="7322630" cy="380078"/>
+      </dsp:txXfrm>
+    </dsp:sp>
+    <dsp:sp modelId="{C7130AF6-5BCF-4F29-BA34-95CB85B72764}">
+      <dsp:nvSpPr>
+        <dsp:cNvPr id="0" name=""/>
+        <dsp:cNvSpPr/>
+      </dsp:nvSpPr>
+      <dsp:spPr>
+        <a:xfrm>
+          <a:off x="0" y="486771"/>
+          <a:ext cx="7363752" cy="419175"/>
+        </a:xfrm>
+        <a:prstGeom prst="rect">
+          <a:avLst/>
+        </a:prstGeom>
+        <a:noFill/>
+        <a:ln>
+          <a:noFill/>
+        </a:ln>
+        <a:effectLst/>
+      </dsp:spPr>
+      <dsp:style>
+        <a:lnRef idx="0">
+          <a:scrgbClr r="0" g="0" b="0"/>
+        </a:lnRef>
+        <a:fillRef idx="0">
+          <a:scrgbClr r="0" g="0" b="0"/>
+        </a:fillRef>
+        <a:effectRef idx="0">
+          <a:scrgbClr r="0" g="0" b="0"/>
+        </a:effectRef>
+        <a:fontRef idx="minor"/>
+      </dsp:style>
+      <dsp:txBody>
+        <a:bodyPr spcFirstLastPara="0" vert="horz" wrap="square" lIns="233799" tIns="22860" rIns="128016" bIns="22860" numCol="1" spcCol="1270" anchor="t" anchorCtr="0">
+          <a:noAutofit/>
+        </a:bodyPr>
+        <a:lstStyle/>
+        <a:p>
+          <a:pPr marL="114300" lvl="1" indent="-114300" algn="l" defTabSz="622300">
+            <a:lnSpc>
+              <a:spcPct val="90000"/>
+            </a:lnSpc>
+            <a:spcBef>
+              <a:spcPct val="0"/>
+            </a:spcBef>
+            <a:spcAft>
+              <a:spcPct val="20000"/>
+            </a:spcAft>
+            <a:buChar char="••"/>
+          </a:pPr>
+          <a:r>
+            <a:rPr lang="pl-PL" sz="1400" kern="1200" dirty="0" smtClean="0"/>
+            <a:t>Użytkownik nie musi być świadomy rozproszenia systemu, położenia zasobów, ich replikacji, awarii, wpływu innych użytkowników i innych czynników.</a:t>
+          </a:r>
+          <a:endParaRPr lang="pl-PL" sz="1400" kern="1200" dirty="0"/>
+        </a:p>
+      </dsp:txBody>
+      <dsp:txXfrm>
+        <a:off x="0" y="486771"/>
+        <a:ext cx="7363752" cy="419175"/>
+      </dsp:txXfrm>
+    </dsp:sp>
+    <dsp:sp modelId="{78DA6840-523F-44DE-8870-8809A7BF9028}">
+      <dsp:nvSpPr>
+        <dsp:cNvPr id="0" name=""/>
+        <dsp:cNvSpPr/>
+      </dsp:nvSpPr>
+      <dsp:spPr>
+        <a:xfrm>
+          <a:off x="0" y="905946"/>
+          <a:ext cx="7363752" cy="421200"/>
+        </a:xfrm>
+        <a:prstGeom prst="roundRect">
+          <a:avLst/>
+        </a:prstGeom>
+        <a:solidFill>
+          <a:schemeClr val="accent1">
+            <a:hueOff val="0"/>
+            <a:satOff val="0"/>
+            <a:lumOff val="0"/>
+            <a:alphaOff val="0"/>
+          </a:schemeClr>
+        </a:solidFill>
+        <a:ln w="25400" cap="flat" cmpd="sng" algn="ctr">
+          <a:solidFill>
+            <a:schemeClr val="lt1">
+              <a:hueOff val="0"/>
+              <a:satOff val="0"/>
+              <a:lumOff val="0"/>
+              <a:alphaOff val="0"/>
+            </a:schemeClr>
+          </a:solidFill>
+          <a:prstDash val="solid"/>
+        </a:ln>
+        <a:effectLst/>
+      </dsp:spPr>
+      <dsp:style>
+        <a:lnRef idx="2">
+          <a:scrgbClr r="0" g="0" b="0"/>
+        </a:lnRef>
+        <a:fillRef idx="1">
+          <a:scrgbClr r="0" g="0" b="0"/>
+        </a:fillRef>
+        <a:effectRef idx="0">
+          <a:scrgbClr r="0" g="0" b="0"/>
+        </a:effectRef>
+        <a:fontRef idx="minor">
+          <a:schemeClr val="lt1"/>
+        </a:fontRef>
+      </dsp:style>
+      <dsp:txBody>
+        <a:bodyPr spcFirstLastPara="0" vert="horz" wrap="square" lIns="68580" tIns="68580" rIns="68580" bIns="68580" numCol="1" spcCol="1270" anchor="ctr" anchorCtr="0">
+          <a:noAutofit/>
+        </a:bodyPr>
+        <a:lstStyle/>
+        <a:p>
+          <a:pPr lvl="0" algn="l" defTabSz="800100">
+            <a:lnSpc>
+              <a:spcPct val="90000"/>
+            </a:lnSpc>
+            <a:spcBef>
+              <a:spcPct val="0"/>
+            </a:spcBef>
+            <a:spcAft>
+              <a:spcPct val="35000"/>
+            </a:spcAft>
+          </a:pPr>
+          <a:r>
+            <a:rPr lang="pl-PL" sz="1800" kern="1200" dirty="0" smtClean="0"/>
+            <a:t>Otwartość</a:t>
+          </a:r>
+          <a:endParaRPr lang="pl-PL" sz="1800" kern="1200" dirty="0"/>
+        </a:p>
+      </dsp:txBody>
+      <dsp:txXfrm>
+        <a:off x="20561" y="926507"/>
+        <a:ext cx="7322630" cy="380078"/>
+      </dsp:txXfrm>
+    </dsp:sp>
+    <dsp:sp modelId="{9C495DF5-169D-4A31-B3DB-88DFF8C7AB22}">
+      <dsp:nvSpPr>
+        <dsp:cNvPr id="0" name=""/>
+        <dsp:cNvSpPr/>
+      </dsp:nvSpPr>
+      <dsp:spPr>
+        <a:xfrm>
+          <a:off x="0" y="1327146"/>
+          <a:ext cx="7363752" cy="419175"/>
+        </a:xfrm>
+        <a:prstGeom prst="rect">
+          <a:avLst/>
+        </a:prstGeom>
+        <a:noFill/>
+        <a:ln>
+          <a:noFill/>
+        </a:ln>
+        <a:effectLst/>
+      </dsp:spPr>
+      <dsp:style>
+        <a:lnRef idx="0">
+          <a:scrgbClr r="0" g="0" b="0"/>
+        </a:lnRef>
+        <a:fillRef idx="0">
+          <a:scrgbClr r="0" g="0" b="0"/>
+        </a:fillRef>
+        <a:effectRef idx="0">
+          <a:scrgbClr r="0" g="0" b="0"/>
+        </a:effectRef>
+        <a:fontRef idx="minor"/>
+      </dsp:style>
+      <dsp:txBody>
+        <a:bodyPr spcFirstLastPara="0" vert="horz" wrap="square" lIns="233799" tIns="22860" rIns="128016" bIns="22860" numCol="1" spcCol="1270" anchor="t" anchorCtr="0">
+          <a:noAutofit/>
+        </a:bodyPr>
+        <a:lstStyle/>
+        <a:p>
+          <a:pPr marL="114300" lvl="1" indent="-114300" algn="l" defTabSz="622300">
+            <a:lnSpc>
+              <a:spcPct val="90000"/>
+            </a:lnSpc>
+            <a:spcBef>
+              <a:spcPct val="0"/>
+            </a:spcBef>
+            <a:spcAft>
+              <a:spcPct val="20000"/>
+            </a:spcAft>
+            <a:buChar char="••"/>
+          </a:pPr>
+          <a:r>
+            <a:rPr lang="pl-PL" sz="1400" kern="1200" dirty="0" smtClean="0"/>
+            <a:t>Usługi poszczególnych elementów są zgodne ze standardowymi regułami definiującymi ich składnię i semantykę. Dzięki temu zmiana lub rozbudowa systemu jest ułatwiona.</a:t>
+          </a:r>
+          <a:endParaRPr lang="pl-PL" sz="1400" kern="1200" dirty="0"/>
+        </a:p>
+      </dsp:txBody>
+      <dsp:txXfrm>
+        <a:off x="0" y="1327146"/>
+        <a:ext cx="7363752" cy="419175"/>
+      </dsp:txXfrm>
+    </dsp:sp>
+    <dsp:sp modelId="{5AF62516-935A-4716-BC3C-96D1A9708875}">
+      <dsp:nvSpPr>
+        <dsp:cNvPr id="0" name=""/>
+        <dsp:cNvSpPr/>
+      </dsp:nvSpPr>
+      <dsp:spPr>
+        <a:xfrm>
+          <a:off x="0" y="1746321"/>
+          <a:ext cx="7363752" cy="421200"/>
+        </a:xfrm>
+        <a:prstGeom prst="roundRect">
+          <a:avLst/>
+        </a:prstGeom>
+        <a:solidFill>
+          <a:schemeClr val="accent1">
+            <a:hueOff val="0"/>
+            <a:satOff val="0"/>
+            <a:lumOff val="0"/>
+            <a:alphaOff val="0"/>
+          </a:schemeClr>
+        </a:solidFill>
+        <a:ln w="25400" cap="flat" cmpd="sng" algn="ctr">
+          <a:solidFill>
+            <a:schemeClr val="lt1">
+              <a:hueOff val="0"/>
+              <a:satOff val="0"/>
+              <a:lumOff val="0"/>
+              <a:alphaOff val="0"/>
+            </a:schemeClr>
+          </a:solidFill>
+          <a:prstDash val="solid"/>
+        </a:ln>
+        <a:effectLst/>
+      </dsp:spPr>
+      <dsp:style>
+        <a:lnRef idx="2">
+          <a:scrgbClr r="0" g="0" b="0"/>
+        </a:lnRef>
+        <a:fillRef idx="1">
+          <a:scrgbClr r="0" g="0" b="0"/>
+        </a:fillRef>
+        <a:effectRef idx="0">
+          <a:scrgbClr r="0" g="0" b="0"/>
+        </a:effectRef>
+        <a:fontRef idx="minor">
+          <a:schemeClr val="lt1"/>
+        </a:fontRef>
+      </dsp:style>
+      <dsp:txBody>
+        <a:bodyPr spcFirstLastPara="0" vert="horz" wrap="square" lIns="68580" tIns="68580" rIns="68580" bIns="68580" numCol="1" spcCol="1270" anchor="ctr" anchorCtr="0">
+          <a:noAutofit/>
+        </a:bodyPr>
+        <a:lstStyle/>
+        <a:p>
+          <a:pPr lvl="0" algn="l" defTabSz="800100">
+            <a:lnSpc>
+              <a:spcPct val="90000"/>
+            </a:lnSpc>
+            <a:spcBef>
+              <a:spcPct val="0"/>
+            </a:spcBef>
+            <a:spcAft>
+              <a:spcPct val="35000"/>
+            </a:spcAft>
+          </a:pPr>
+          <a:r>
+            <a:rPr lang="pl-PL" sz="1800" kern="1200" dirty="0" smtClean="0"/>
+            <a:t>Odporność na awarie</a:t>
+          </a:r>
+        </a:p>
+      </dsp:txBody>
+      <dsp:txXfrm>
+        <a:off x="20561" y="1766882"/>
+        <a:ext cx="7322630" cy="380078"/>
+      </dsp:txXfrm>
+    </dsp:sp>
+    <dsp:sp modelId="{5EE99CAA-C70B-49D9-9943-E42F93D8C815}">
+      <dsp:nvSpPr>
+        <dsp:cNvPr id="0" name=""/>
+        <dsp:cNvSpPr/>
+      </dsp:nvSpPr>
+      <dsp:spPr>
+        <a:xfrm>
+          <a:off x="0" y="2167521"/>
+          <a:ext cx="7363752" cy="419175"/>
+        </a:xfrm>
+        <a:prstGeom prst="rect">
+          <a:avLst/>
+        </a:prstGeom>
+        <a:noFill/>
+        <a:ln>
+          <a:noFill/>
+        </a:ln>
+        <a:effectLst/>
+      </dsp:spPr>
+      <dsp:style>
+        <a:lnRef idx="0">
+          <a:scrgbClr r="0" g="0" b="0"/>
+        </a:lnRef>
+        <a:fillRef idx="0">
+          <a:scrgbClr r="0" g="0" b="0"/>
+        </a:fillRef>
+        <a:effectRef idx="0">
+          <a:scrgbClr r="0" g="0" b="0"/>
+        </a:effectRef>
+        <a:fontRef idx="minor"/>
+      </dsp:style>
+      <dsp:txBody>
+        <a:bodyPr spcFirstLastPara="0" vert="horz" wrap="square" lIns="233799" tIns="22860" rIns="128016" bIns="22860" numCol="1" spcCol="1270" anchor="t" anchorCtr="0">
+          <a:noAutofit/>
+        </a:bodyPr>
+        <a:lstStyle/>
+        <a:p>
+          <a:pPr marL="114300" lvl="1" indent="-114300" algn="l" defTabSz="622300">
+            <a:lnSpc>
+              <a:spcPct val="90000"/>
+            </a:lnSpc>
+            <a:spcBef>
+              <a:spcPct val="0"/>
+            </a:spcBef>
+            <a:spcAft>
+              <a:spcPct val="20000"/>
+            </a:spcAft>
+            <a:buChar char="••"/>
+          </a:pPr>
+          <a:r>
+            <a:rPr lang="pl-PL" sz="1400" kern="1200" dirty="0" smtClean="0"/>
+            <a:t>System złożony z nadmiarowych elementów może być bardziej odporny niż system złożony z pojedynczych elementów.</a:t>
+          </a:r>
+        </a:p>
+      </dsp:txBody>
+      <dsp:txXfrm>
+        <a:off x="0" y="2167521"/>
+        <a:ext cx="7363752" cy="419175"/>
+      </dsp:txXfrm>
+    </dsp:sp>
+    <dsp:sp modelId="{8E384E35-9385-455F-B372-4AA6FE4C9346}">
+      <dsp:nvSpPr>
+        <dsp:cNvPr id="0" name=""/>
+        <dsp:cNvSpPr/>
+      </dsp:nvSpPr>
+      <dsp:spPr>
+        <a:xfrm>
+          <a:off x="0" y="2604074"/>
+          <a:ext cx="7363752" cy="421200"/>
+        </a:xfrm>
+        <a:prstGeom prst="roundRect">
+          <a:avLst/>
+        </a:prstGeom>
+        <a:solidFill>
+          <a:schemeClr val="accent1">
+            <a:hueOff val="0"/>
+            <a:satOff val="0"/>
+            <a:lumOff val="0"/>
+            <a:alphaOff val="0"/>
+          </a:schemeClr>
+        </a:solidFill>
+        <a:ln w="25400" cap="flat" cmpd="sng" algn="ctr">
+          <a:solidFill>
+            <a:schemeClr val="lt1">
+              <a:hueOff val="0"/>
+              <a:satOff val="0"/>
+              <a:lumOff val="0"/>
+              <a:alphaOff val="0"/>
+            </a:schemeClr>
+          </a:solidFill>
+          <a:prstDash val="solid"/>
+        </a:ln>
+        <a:effectLst/>
+      </dsp:spPr>
+      <dsp:style>
+        <a:lnRef idx="2">
+          <a:scrgbClr r="0" g="0" b="0"/>
+        </a:lnRef>
+        <a:fillRef idx="1">
+          <a:scrgbClr r="0" g="0" b="0"/>
+        </a:fillRef>
+        <a:effectRef idx="0">
+          <a:scrgbClr r="0" g="0" b="0"/>
+        </a:effectRef>
+        <a:fontRef idx="minor">
+          <a:schemeClr val="lt1"/>
+        </a:fontRef>
+      </dsp:style>
+      <dsp:txBody>
+        <a:bodyPr spcFirstLastPara="0" vert="horz" wrap="square" lIns="68580" tIns="68580" rIns="68580" bIns="68580" numCol="1" spcCol="1270" anchor="ctr" anchorCtr="0">
+          <a:noAutofit/>
+        </a:bodyPr>
+        <a:lstStyle/>
+        <a:p>
+          <a:pPr lvl="0" algn="l" defTabSz="800100">
+            <a:lnSpc>
+              <a:spcPct val="90000"/>
+            </a:lnSpc>
+            <a:spcBef>
+              <a:spcPct val="0"/>
+            </a:spcBef>
+            <a:spcAft>
+              <a:spcPct val="35000"/>
+            </a:spcAft>
+          </a:pPr>
+          <a:r>
+            <a:rPr lang="pl-PL" sz="1800" kern="1200" dirty="0" smtClean="0"/>
+            <a:t>Wydajność</a:t>
+          </a:r>
+        </a:p>
+      </dsp:txBody>
+      <dsp:txXfrm>
+        <a:off x="20561" y="2624635"/>
+        <a:ext cx="7322630" cy="380078"/>
+      </dsp:txXfrm>
+    </dsp:sp>
+    <dsp:sp modelId="{7E58D7A6-E1A3-4F64-B2F9-76B3525CD76E}">
+      <dsp:nvSpPr>
+        <dsp:cNvPr id="0" name=""/>
+        <dsp:cNvSpPr/>
+      </dsp:nvSpPr>
+      <dsp:spPr>
+        <a:xfrm>
+          <a:off x="0" y="3007896"/>
+          <a:ext cx="7363752" cy="782460"/>
+        </a:xfrm>
+        <a:prstGeom prst="rect">
+          <a:avLst/>
+        </a:prstGeom>
+        <a:noFill/>
+        <a:ln>
+          <a:noFill/>
+        </a:ln>
+        <a:effectLst/>
+      </dsp:spPr>
+      <dsp:style>
+        <a:lnRef idx="0">
+          <a:scrgbClr r="0" g="0" b="0"/>
+        </a:lnRef>
+        <a:fillRef idx="0">
+          <a:scrgbClr r="0" g="0" b="0"/>
+        </a:fillRef>
+        <a:effectRef idx="0">
+          <a:scrgbClr r="0" g="0" b="0"/>
+        </a:effectRef>
+        <a:fontRef idx="minor"/>
+      </dsp:style>
+      <dsp:txBody>
+        <a:bodyPr spcFirstLastPara="0" vert="horz" wrap="square" lIns="233799" tIns="22860" rIns="128016" bIns="22860" numCol="1" spcCol="1270" anchor="t" anchorCtr="0">
+          <a:noAutofit/>
+        </a:bodyPr>
+        <a:lstStyle/>
+        <a:p>
+          <a:pPr marL="114300" lvl="1" indent="-114300" algn="l" defTabSz="622300">
+            <a:lnSpc>
+              <a:spcPct val="90000"/>
+            </a:lnSpc>
+            <a:spcBef>
+              <a:spcPct val="0"/>
+            </a:spcBef>
+            <a:spcAft>
+              <a:spcPct val="20000"/>
+            </a:spcAft>
+            <a:buChar char="••"/>
+          </a:pPr>
+          <a:r>
+            <a:rPr lang="pl-PL" sz="1400" kern="1200" dirty="0" smtClean="0"/>
+            <a:t>Zmultiplikowane elementy pozwalają wykonać tę samą operację szybciej poprzez zrównoleglenie obliczeń. Trzeba jednak brać pod uwagę narzut na komunikację pomiędzy elementami oraz dodatkowe operacje potrzebne na przykład dla zapewnienia odporności na awarie.</a:t>
+          </a:r>
+        </a:p>
+      </dsp:txBody>
+      <dsp:txXfrm>
+        <a:off x="0" y="3007896"/>
+        <a:ext cx="7363752" cy="782460"/>
+      </dsp:txXfrm>
+    </dsp:sp>
+    <dsp:sp modelId="{1A51C3D3-58C0-4069-AB0A-A95B0B4B888D}">
+      <dsp:nvSpPr>
+        <dsp:cNvPr id="0" name=""/>
+        <dsp:cNvSpPr/>
+      </dsp:nvSpPr>
+      <dsp:spPr>
+        <a:xfrm>
+          <a:off x="0" y="3790356"/>
+          <a:ext cx="7363752" cy="421200"/>
+        </a:xfrm>
+        <a:prstGeom prst="roundRect">
+          <a:avLst/>
+        </a:prstGeom>
+        <a:solidFill>
+          <a:schemeClr val="accent1">
+            <a:hueOff val="0"/>
+            <a:satOff val="0"/>
+            <a:lumOff val="0"/>
+            <a:alphaOff val="0"/>
+          </a:schemeClr>
+        </a:solidFill>
+        <a:ln w="25400" cap="flat" cmpd="sng" algn="ctr">
+          <a:solidFill>
+            <a:schemeClr val="lt1">
+              <a:hueOff val="0"/>
+              <a:satOff val="0"/>
+              <a:lumOff val="0"/>
+              <a:alphaOff val="0"/>
+            </a:schemeClr>
+          </a:solidFill>
+          <a:prstDash val="solid"/>
+        </a:ln>
+        <a:effectLst/>
+      </dsp:spPr>
+      <dsp:style>
+        <a:lnRef idx="2">
+          <a:scrgbClr r="0" g="0" b="0"/>
+        </a:lnRef>
+        <a:fillRef idx="1">
+          <a:scrgbClr r="0" g="0" b="0"/>
+        </a:fillRef>
+        <a:effectRef idx="0">
+          <a:scrgbClr r="0" g="0" b="0"/>
+        </a:effectRef>
+        <a:fontRef idx="minor">
+          <a:schemeClr val="lt1"/>
+        </a:fontRef>
+      </dsp:style>
+      <dsp:txBody>
+        <a:bodyPr spcFirstLastPara="0" vert="horz" wrap="square" lIns="68580" tIns="68580" rIns="68580" bIns="68580" numCol="1" spcCol="1270" anchor="ctr" anchorCtr="0">
+          <a:noAutofit/>
+        </a:bodyPr>
+        <a:lstStyle/>
+        <a:p>
+          <a:pPr lvl="0" algn="l" defTabSz="800100">
+            <a:lnSpc>
+              <a:spcPct val="90000"/>
+            </a:lnSpc>
+            <a:spcBef>
+              <a:spcPct val="0"/>
+            </a:spcBef>
+            <a:spcAft>
+              <a:spcPct val="35000"/>
+            </a:spcAft>
+          </a:pPr>
+          <a:r>
+            <a:rPr lang="pl-PL" sz="1800" kern="1200" dirty="0" smtClean="0"/>
+            <a:t>Skalowalność</a:t>
+          </a:r>
+        </a:p>
+      </dsp:txBody>
+      <dsp:txXfrm>
+        <a:off x="20561" y="3810917"/>
+        <a:ext cx="7322630" cy="380078"/>
+      </dsp:txXfrm>
+    </dsp:sp>
+    <dsp:sp modelId="{C4D7444D-E9C0-4694-BF04-B566F459108B}">
+      <dsp:nvSpPr>
+        <dsp:cNvPr id="0" name=""/>
+        <dsp:cNvSpPr/>
+      </dsp:nvSpPr>
+      <dsp:spPr>
+        <a:xfrm>
+          <a:off x="0" y="4211556"/>
+          <a:ext cx="7363752" cy="419175"/>
+        </a:xfrm>
+        <a:prstGeom prst="rect">
+          <a:avLst/>
+        </a:prstGeom>
+        <a:noFill/>
+        <a:ln>
+          <a:noFill/>
+        </a:ln>
+        <a:effectLst/>
+      </dsp:spPr>
+      <dsp:style>
+        <a:lnRef idx="0">
+          <a:scrgbClr r="0" g="0" b="0"/>
+        </a:lnRef>
+        <a:fillRef idx="0">
+          <a:scrgbClr r="0" g="0" b="0"/>
+        </a:fillRef>
+        <a:effectRef idx="0">
+          <a:scrgbClr r="0" g="0" b="0"/>
+        </a:effectRef>
+        <a:fontRef idx="minor"/>
+      </dsp:style>
+      <dsp:txBody>
+        <a:bodyPr spcFirstLastPara="0" vert="horz" wrap="square" lIns="233799" tIns="22860" rIns="128016" bIns="22860" numCol="1" spcCol="1270" anchor="t" anchorCtr="0">
+          <a:noAutofit/>
+        </a:bodyPr>
+        <a:lstStyle/>
+        <a:p>
+          <a:pPr marL="114300" lvl="1" indent="-114300" algn="l" defTabSz="622300">
+            <a:lnSpc>
+              <a:spcPct val="90000"/>
+            </a:lnSpc>
+            <a:spcBef>
+              <a:spcPct val="0"/>
+            </a:spcBef>
+            <a:spcAft>
+              <a:spcPct val="20000"/>
+            </a:spcAft>
+            <a:buChar char="••"/>
+          </a:pPr>
+          <a:r>
+            <a:rPr lang="pl-PL" sz="1400" kern="1200" dirty="0" smtClean="0"/>
+            <a:t>Wydajność i pojemność dobrze zaprojektowanego systemu można modyfikować w miarę wzrostu potrzeb.</a:t>
+          </a:r>
+        </a:p>
+      </dsp:txBody>
+      <dsp:txXfrm>
+        <a:off x="0" y="4211556"/>
+        <a:ext cx="7363752" cy="419175"/>
+      </dsp:txXfrm>
+    </dsp:sp>
   </dsp:spTree>
 </dsp:drawing>
 </file>
@@ -5324,6 +7126,510 @@
       <dsp:cNvGrpSpPr/>
     </dsp:nvGrpSpPr>
     <dsp:grpSpPr/>
+    <dsp:sp modelId="{401ECA87-A414-4C2E-815B-2E740FECD9DF}">
+      <dsp:nvSpPr>
+        <dsp:cNvPr id="0" name=""/>
+        <dsp:cNvSpPr/>
+      </dsp:nvSpPr>
+      <dsp:spPr>
+        <a:xfrm>
+          <a:off x="0" y="507291"/>
+          <a:ext cx="7363752" cy="491399"/>
+        </a:xfrm>
+        <a:prstGeom prst="roundRect">
+          <a:avLst/>
+        </a:prstGeom>
+        <a:solidFill>
+          <a:schemeClr val="accent1">
+            <a:hueOff val="0"/>
+            <a:satOff val="0"/>
+            <a:lumOff val="0"/>
+            <a:alphaOff val="0"/>
+          </a:schemeClr>
+        </a:solidFill>
+        <a:ln w="25400" cap="flat" cmpd="sng" algn="ctr">
+          <a:solidFill>
+            <a:schemeClr val="lt1">
+              <a:hueOff val="0"/>
+              <a:satOff val="0"/>
+              <a:lumOff val="0"/>
+              <a:alphaOff val="0"/>
+            </a:schemeClr>
+          </a:solidFill>
+          <a:prstDash val="solid"/>
+        </a:ln>
+        <a:effectLst/>
+      </dsp:spPr>
+      <dsp:style>
+        <a:lnRef idx="2">
+          <a:scrgbClr r="0" g="0" b="0"/>
+        </a:lnRef>
+        <a:fillRef idx="1">
+          <a:scrgbClr r="0" g="0" b="0"/>
+        </a:fillRef>
+        <a:effectRef idx="0">
+          <a:scrgbClr r="0" g="0" b="0"/>
+        </a:effectRef>
+        <a:fontRef idx="minor">
+          <a:schemeClr val="lt1"/>
+        </a:fontRef>
+      </dsp:style>
+      <dsp:txBody>
+        <a:bodyPr spcFirstLastPara="0" vert="horz" wrap="square" lIns="80010" tIns="80010" rIns="80010" bIns="80010" numCol="1" spcCol="1270" anchor="ctr" anchorCtr="0">
+          <a:noAutofit/>
+        </a:bodyPr>
+        <a:lstStyle/>
+        <a:p>
+          <a:pPr lvl="0" algn="l" defTabSz="933450">
+            <a:lnSpc>
+              <a:spcPct val="90000"/>
+            </a:lnSpc>
+            <a:spcBef>
+              <a:spcPct val="0"/>
+            </a:spcBef>
+            <a:spcAft>
+              <a:spcPct val="35000"/>
+            </a:spcAft>
+          </a:pPr>
+          <a:r>
+            <a:rPr lang="pl-PL" sz="2100" kern="1200" dirty="0" smtClean="0"/>
+            <a:t>Narzędzia programistyczne</a:t>
+          </a:r>
+          <a:endParaRPr lang="pl-PL" sz="2100" kern="1200" dirty="0"/>
+        </a:p>
+      </dsp:txBody>
+      <dsp:txXfrm>
+        <a:off x="23988" y="531279"/>
+        <a:ext cx="7315776" cy="443423"/>
+      </dsp:txXfrm>
+    </dsp:sp>
+    <dsp:sp modelId="{C7130AF6-5BCF-4F29-BA34-95CB85B72764}">
+      <dsp:nvSpPr>
+        <dsp:cNvPr id="0" name=""/>
+        <dsp:cNvSpPr/>
+      </dsp:nvSpPr>
+      <dsp:spPr>
+        <a:xfrm>
+          <a:off x="0" y="998691"/>
+          <a:ext cx="7363752" cy="1043280"/>
+        </a:xfrm>
+        <a:prstGeom prst="rect">
+          <a:avLst/>
+        </a:prstGeom>
+        <a:noFill/>
+        <a:ln>
+          <a:noFill/>
+        </a:ln>
+        <a:effectLst/>
+      </dsp:spPr>
+      <dsp:style>
+        <a:lnRef idx="0">
+          <a:scrgbClr r="0" g="0" b="0"/>
+        </a:lnRef>
+        <a:fillRef idx="0">
+          <a:scrgbClr r="0" g="0" b="0"/>
+        </a:fillRef>
+        <a:effectRef idx="0">
+          <a:scrgbClr r="0" g="0" b="0"/>
+        </a:effectRef>
+        <a:fontRef idx="minor"/>
+      </dsp:style>
+      <dsp:txBody>
+        <a:bodyPr spcFirstLastPara="0" vert="horz" wrap="square" lIns="233799" tIns="26670" rIns="149352" bIns="26670" numCol="1" spcCol="1270" anchor="t" anchorCtr="0">
+          <a:noAutofit/>
+        </a:bodyPr>
+        <a:lstStyle/>
+        <a:p>
+          <a:pPr marL="171450" lvl="1" indent="-171450" algn="l" defTabSz="711200">
+            <a:lnSpc>
+              <a:spcPct val="90000"/>
+            </a:lnSpc>
+            <a:spcBef>
+              <a:spcPct val="0"/>
+            </a:spcBef>
+            <a:spcAft>
+              <a:spcPct val="20000"/>
+            </a:spcAft>
+            <a:buChar char="••"/>
+          </a:pPr>
+          <a:r>
+            <a:rPr lang="pl-PL" sz="1600" kern="1200" dirty="0" smtClean="0"/>
+            <a:t>Kontrola wersji i praca zespołowa – Git</a:t>
+          </a:r>
+          <a:endParaRPr lang="pl-PL" sz="1600" kern="1200" dirty="0"/>
+        </a:p>
+        <a:p>
+          <a:pPr marL="171450" lvl="1" indent="-171450" algn="l" defTabSz="711200">
+            <a:lnSpc>
+              <a:spcPct val="90000"/>
+            </a:lnSpc>
+            <a:spcBef>
+              <a:spcPct val="0"/>
+            </a:spcBef>
+            <a:spcAft>
+              <a:spcPct val="20000"/>
+            </a:spcAft>
+            <a:buChar char="••"/>
+          </a:pPr>
+          <a:r>
+            <a:rPr lang="pl-PL" sz="1600" kern="1200" dirty="0" smtClean="0"/>
+            <a:t>Budowanie aplikacji i zarządzanie zależnościami – </a:t>
+          </a:r>
+          <a:r>
+            <a:rPr lang="pl-PL" sz="1600" kern="1200" dirty="0" err="1" smtClean="0"/>
+            <a:t>Gradle</a:t>
+          </a:r>
+          <a:endParaRPr lang="pl-PL" sz="1600" kern="1200" dirty="0"/>
+        </a:p>
+        <a:p>
+          <a:pPr marL="171450" lvl="1" indent="-171450" algn="l" defTabSz="711200">
+            <a:lnSpc>
+              <a:spcPct val="90000"/>
+            </a:lnSpc>
+            <a:spcBef>
+              <a:spcPct val="0"/>
+            </a:spcBef>
+            <a:spcAft>
+              <a:spcPct val="20000"/>
+            </a:spcAft>
+            <a:buChar char="••"/>
+          </a:pPr>
+          <a:r>
+            <a:rPr lang="pl-PL" sz="1600" kern="1200" dirty="0" smtClean="0"/>
+            <a:t>Logowanie – Log4J 2</a:t>
+          </a:r>
+          <a:endParaRPr lang="pl-PL" sz="1600" kern="1200" dirty="0"/>
+        </a:p>
+        <a:p>
+          <a:pPr marL="171450" lvl="1" indent="-171450" algn="l" defTabSz="711200">
+            <a:lnSpc>
+              <a:spcPct val="90000"/>
+            </a:lnSpc>
+            <a:spcBef>
+              <a:spcPct val="0"/>
+            </a:spcBef>
+            <a:spcAft>
+              <a:spcPct val="20000"/>
+            </a:spcAft>
+            <a:buChar char="••"/>
+          </a:pPr>
+          <a:r>
+            <a:rPr lang="pl-PL" sz="1600" kern="1200" dirty="0" smtClean="0"/>
+            <a:t>Testowanie jednostkowe - JUnit</a:t>
+          </a:r>
+          <a:endParaRPr lang="pl-PL" sz="1600" kern="1200" dirty="0"/>
+        </a:p>
+      </dsp:txBody>
+      <dsp:txXfrm>
+        <a:off x="0" y="998691"/>
+        <a:ext cx="7363752" cy="1043280"/>
+      </dsp:txXfrm>
+    </dsp:sp>
+    <dsp:sp modelId="{78DA6840-523F-44DE-8870-8809A7BF9028}">
+      <dsp:nvSpPr>
+        <dsp:cNvPr id="0" name=""/>
+        <dsp:cNvSpPr/>
+      </dsp:nvSpPr>
+      <dsp:spPr>
+        <a:xfrm>
+          <a:off x="0" y="2041971"/>
+          <a:ext cx="7363752" cy="491399"/>
+        </a:xfrm>
+        <a:prstGeom prst="roundRect">
+          <a:avLst/>
+        </a:prstGeom>
+        <a:solidFill>
+          <a:schemeClr val="accent1">
+            <a:hueOff val="0"/>
+            <a:satOff val="0"/>
+            <a:lumOff val="0"/>
+            <a:alphaOff val="0"/>
+          </a:schemeClr>
+        </a:solidFill>
+        <a:ln w="25400" cap="flat" cmpd="sng" algn="ctr">
+          <a:solidFill>
+            <a:schemeClr val="lt1">
+              <a:hueOff val="0"/>
+              <a:satOff val="0"/>
+              <a:lumOff val="0"/>
+              <a:alphaOff val="0"/>
+            </a:schemeClr>
+          </a:solidFill>
+          <a:prstDash val="solid"/>
+        </a:ln>
+        <a:effectLst/>
+      </dsp:spPr>
+      <dsp:style>
+        <a:lnRef idx="2">
+          <a:scrgbClr r="0" g="0" b="0"/>
+        </a:lnRef>
+        <a:fillRef idx="1">
+          <a:scrgbClr r="0" g="0" b="0"/>
+        </a:fillRef>
+        <a:effectRef idx="0">
+          <a:scrgbClr r="0" g="0" b="0"/>
+        </a:effectRef>
+        <a:fontRef idx="minor">
+          <a:schemeClr val="lt1"/>
+        </a:fontRef>
+      </dsp:style>
+      <dsp:txBody>
+        <a:bodyPr spcFirstLastPara="0" vert="horz" wrap="square" lIns="80010" tIns="80010" rIns="80010" bIns="80010" numCol="1" spcCol="1270" anchor="ctr" anchorCtr="0">
+          <a:noAutofit/>
+        </a:bodyPr>
+        <a:lstStyle/>
+        <a:p>
+          <a:pPr lvl="0" algn="l" defTabSz="933450">
+            <a:lnSpc>
+              <a:spcPct val="90000"/>
+            </a:lnSpc>
+            <a:spcBef>
+              <a:spcPct val="0"/>
+            </a:spcBef>
+            <a:spcAft>
+              <a:spcPct val="35000"/>
+            </a:spcAft>
+          </a:pPr>
+          <a:r>
+            <a:rPr lang="pl-PL" sz="2100" kern="1200" dirty="0" smtClean="0"/>
+            <a:t>Programowanie współbieżne</a:t>
+          </a:r>
+          <a:endParaRPr lang="pl-PL" sz="2100" kern="1200" dirty="0"/>
+        </a:p>
+      </dsp:txBody>
+      <dsp:txXfrm>
+        <a:off x="23988" y="2065959"/>
+        <a:ext cx="7315776" cy="443423"/>
+      </dsp:txXfrm>
+    </dsp:sp>
+    <dsp:sp modelId="{5AF62516-935A-4716-BC3C-96D1A9708875}">
+      <dsp:nvSpPr>
+        <dsp:cNvPr id="0" name=""/>
+        <dsp:cNvSpPr/>
+      </dsp:nvSpPr>
+      <dsp:spPr>
+        <a:xfrm>
+          <a:off x="0" y="2593851"/>
+          <a:ext cx="7363752" cy="491399"/>
+        </a:xfrm>
+        <a:prstGeom prst="roundRect">
+          <a:avLst/>
+        </a:prstGeom>
+        <a:solidFill>
+          <a:schemeClr val="accent1">
+            <a:hueOff val="0"/>
+            <a:satOff val="0"/>
+            <a:lumOff val="0"/>
+            <a:alphaOff val="0"/>
+          </a:schemeClr>
+        </a:solidFill>
+        <a:ln w="25400" cap="flat" cmpd="sng" algn="ctr">
+          <a:solidFill>
+            <a:schemeClr val="lt1">
+              <a:hueOff val="0"/>
+              <a:satOff val="0"/>
+              <a:lumOff val="0"/>
+              <a:alphaOff val="0"/>
+            </a:schemeClr>
+          </a:solidFill>
+          <a:prstDash val="solid"/>
+        </a:ln>
+        <a:effectLst/>
+      </dsp:spPr>
+      <dsp:style>
+        <a:lnRef idx="2">
+          <a:scrgbClr r="0" g="0" b="0"/>
+        </a:lnRef>
+        <a:fillRef idx="1">
+          <a:scrgbClr r="0" g="0" b="0"/>
+        </a:fillRef>
+        <a:effectRef idx="0">
+          <a:scrgbClr r="0" g="0" b="0"/>
+        </a:effectRef>
+        <a:fontRef idx="minor">
+          <a:schemeClr val="lt1"/>
+        </a:fontRef>
+      </dsp:style>
+      <dsp:txBody>
+        <a:bodyPr spcFirstLastPara="0" vert="horz" wrap="square" lIns="80010" tIns="80010" rIns="80010" bIns="80010" numCol="1" spcCol="1270" anchor="ctr" anchorCtr="0">
+          <a:noAutofit/>
+        </a:bodyPr>
+        <a:lstStyle/>
+        <a:p>
+          <a:pPr lvl="0" algn="l" defTabSz="933450">
+            <a:lnSpc>
+              <a:spcPct val="90000"/>
+            </a:lnSpc>
+            <a:spcBef>
+              <a:spcPct val="0"/>
+            </a:spcBef>
+            <a:spcAft>
+              <a:spcPct val="35000"/>
+            </a:spcAft>
+          </a:pPr>
+          <a:r>
+            <a:rPr lang="pl-PL" sz="2100" kern="1200" dirty="0" smtClean="0"/>
+            <a:t>Komunikacja synchroniczna z wykorzystaniem web services</a:t>
+          </a:r>
+        </a:p>
+      </dsp:txBody>
+      <dsp:txXfrm>
+        <a:off x="23988" y="2617839"/>
+        <a:ext cx="7315776" cy="443423"/>
+      </dsp:txXfrm>
+    </dsp:sp>
+    <dsp:sp modelId="{8E384E35-9385-455F-B372-4AA6FE4C9346}">
+      <dsp:nvSpPr>
+        <dsp:cNvPr id="0" name=""/>
+        <dsp:cNvSpPr/>
+      </dsp:nvSpPr>
+      <dsp:spPr>
+        <a:xfrm>
+          <a:off x="0" y="3147074"/>
+          <a:ext cx="7363752" cy="491399"/>
+        </a:xfrm>
+        <a:prstGeom prst="roundRect">
+          <a:avLst/>
+        </a:prstGeom>
+        <a:solidFill>
+          <a:schemeClr val="accent1">
+            <a:hueOff val="0"/>
+            <a:satOff val="0"/>
+            <a:lumOff val="0"/>
+            <a:alphaOff val="0"/>
+          </a:schemeClr>
+        </a:solidFill>
+        <a:ln w="25400" cap="flat" cmpd="sng" algn="ctr">
+          <a:solidFill>
+            <a:schemeClr val="lt1">
+              <a:hueOff val="0"/>
+              <a:satOff val="0"/>
+              <a:lumOff val="0"/>
+              <a:alphaOff val="0"/>
+            </a:schemeClr>
+          </a:solidFill>
+          <a:prstDash val="solid"/>
+        </a:ln>
+        <a:effectLst/>
+      </dsp:spPr>
+      <dsp:style>
+        <a:lnRef idx="2">
+          <a:scrgbClr r="0" g="0" b="0"/>
+        </a:lnRef>
+        <a:fillRef idx="1">
+          <a:scrgbClr r="0" g="0" b="0"/>
+        </a:fillRef>
+        <a:effectRef idx="0">
+          <a:scrgbClr r="0" g="0" b="0"/>
+        </a:effectRef>
+        <a:fontRef idx="minor">
+          <a:schemeClr val="lt1"/>
+        </a:fontRef>
+      </dsp:style>
+      <dsp:txBody>
+        <a:bodyPr spcFirstLastPara="0" vert="horz" wrap="square" lIns="80010" tIns="80010" rIns="80010" bIns="80010" numCol="1" spcCol="1270" anchor="ctr" anchorCtr="0">
+          <a:noAutofit/>
+        </a:bodyPr>
+        <a:lstStyle/>
+        <a:p>
+          <a:pPr lvl="0" algn="l" defTabSz="933450">
+            <a:lnSpc>
+              <a:spcPct val="90000"/>
+            </a:lnSpc>
+            <a:spcBef>
+              <a:spcPct val="0"/>
+            </a:spcBef>
+            <a:spcAft>
+              <a:spcPct val="35000"/>
+            </a:spcAft>
+          </a:pPr>
+          <a:r>
+            <a:rPr lang="pl-PL" sz="2100" kern="1200" dirty="0" smtClean="0"/>
+            <a:t>Komunikacja asynchroniczna z wykorzystaniem JMS</a:t>
+          </a:r>
+        </a:p>
+      </dsp:txBody>
+      <dsp:txXfrm>
+        <a:off x="23988" y="3171062"/>
+        <a:ext cx="7315776" cy="443423"/>
+      </dsp:txXfrm>
+    </dsp:sp>
+    <dsp:sp modelId="{1A51C3D3-58C0-4069-AB0A-A95B0B4B888D}">
+      <dsp:nvSpPr>
+        <dsp:cNvPr id="0" name=""/>
+        <dsp:cNvSpPr/>
+      </dsp:nvSpPr>
+      <dsp:spPr>
+        <a:xfrm>
+          <a:off x="0" y="3697611"/>
+          <a:ext cx="7363752" cy="491399"/>
+        </a:xfrm>
+        <a:prstGeom prst="roundRect">
+          <a:avLst/>
+        </a:prstGeom>
+        <a:solidFill>
+          <a:schemeClr val="accent1">
+            <a:hueOff val="0"/>
+            <a:satOff val="0"/>
+            <a:lumOff val="0"/>
+            <a:alphaOff val="0"/>
+          </a:schemeClr>
+        </a:solidFill>
+        <a:ln w="25400" cap="flat" cmpd="sng" algn="ctr">
+          <a:solidFill>
+            <a:schemeClr val="lt1">
+              <a:hueOff val="0"/>
+              <a:satOff val="0"/>
+              <a:lumOff val="0"/>
+              <a:alphaOff val="0"/>
+            </a:schemeClr>
+          </a:solidFill>
+          <a:prstDash val="solid"/>
+        </a:ln>
+        <a:effectLst/>
+      </dsp:spPr>
+      <dsp:style>
+        <a:lnRef idx="2">
+          <a:scrgbClr r="0" g="0" b="0"/>
+        </a:lnRef>
+        <a:fillRef idx="1">
+          <a:scrgbClr r="0" g="0" b="0"/>
+        </a:fillRef>
+        <a:effectRef idx="0">
+          <a:scrgbClr r="0" g="0" b="0"/>
+        </a:effectRef>
+        <a:fontRef idx="minor">
+          <a:schemeClr val="lt1"/>
+        </a:fontRef>
+      </dsp:style>
+      <dsp:txBody>
+        <a:bodyPr spcFirstLastPara="0" vert="horz" wrap="square" lIns="80010" tIns="80010" rIns="80010" bIns="80010" numCol="1" spcCol="1270" anchor="ctr" anchorCtr="0">
+          <a:noAutofit/>
+        </a:bodyPr>
+        <a:lstStyle/>
+        <a:p>
+          <a:pPr lvl="0" algn="l" defTabSz="933450">
+            <a:lnSpc>
+              <a:spcPct val="90000"/>
+            </a:lnSpc>
+            <a:spcBef>
+              <a:spcPct val="0"/>
+            </a:spcBef>
+            <a:spcAft>
+              <a:spcPct val="35000"/>
+            </a:spcAft>
+          </a:pPr>
+          <a:r>
+            <a:rPr lang="pl-PL" sz="2100" kern="1200" dirty="0" smtClean="0"/>
+            <a:t>Korzystanie z serwerów baz danych</a:t>
+          </a:r>
+        </a:p>
+      </dsp:txBody>
+      <dsp:txXfrm>
+        <a:off x="23988" y="3721599"/>
+        <a:ext cx="7315776" cy="443423"/>
+      </dsp:txXfrm>
+    </dsp:sp>
   </dsp:spTree>
 </dsp:drawing>
 </file>
@@ -11053,7 +13359,7 @@
             <a:fld id="{E9ED4B55-51F0-4636-8388-59997869CC7A}" type="slidenum">
               <a:rPr lang="de-DE" altLang="pl-PL" sz="1300"/>
               <a:pPr/>
-              <a:t>15</a:t>
+              <a:t>14</a:t>
             </a:fld>
             <a:endParaRPr lang="de-DE" altLang="pl-PL" sz="1300"/>
           </a:p>
@@ -15034,933 +17340,6 @@
       </p:grpSpPr>
       <p:sp>
         <p:nvSpPr>
-          <p:cNvPr id="4" name="Date Placeholder 3"/>
-          <p:cNvSpPr>
-            <a:spLocks noGrp="1"/>
-          </p:cNvSpPr>
-          <p:nvPr>
-            <p:ph type="dt" sz="half" idx="10"/>
-          </p:nvPr>
-        </p:nvSpPr>
-        <p:spPr/>
-        <p:txBody>
-          <a:bodyPr/>
-          <a:lstStyle/>
-          <a:p>
-            <a:fld id="{E906F336-2E39-43F8-9DF9-B9244679DDFB}" type="datetime5">
-              <a:rPr lang="en-US" altLang="pl-PL" smtClean="0"/>
-              <a:pPr/>
-              <a:t>21-Feb-17</a:t>
-            </a:fld>
-            <a:endParaRPr lang="en-US" altLang="pl-PL"/>
-          </a:p>
-        </p:txBody>
-      </p:sp>
-      <p:sp>
-        <p:nvSpPr>
-          <p:cNvPr id="5" name="Footer Placeholder 4"/>
-          <p:cNvSpPr>
-            <a:spLocks noGrp="1"/>
-          </p:cNvSpPr>
-          <p:nvPr>
-            <p:ph type="ftr" sz="quarter" idx="11"/>
-          </p:nvPr>
-        </p:nvSpPr>
-        <p:spPr/>
-        <p:txBody>
-          <a:bodyPr/>
-          <a:lstStyle/>
-          <a:p>
-            <a:pPr>
-              <a:defRPr/>
-            </a:pPr>
-            <a:r>
-              <a:rPr lang="en-US" smtClean="0"/>
-              <a:t>GFT Technologies AG</a:t>
-            </a:r>
-            <a:endParaRPr lang="en-US"/>
-          </a:p>
-        </p:txBody>
-      </p:sp>
-      <p:sp>
-        <p:nvSpPr>
-          <p:cNvPr id="6" name="Slide Number Placeholder 5"/>
-          <p:cNvSpPr>
-            <a:spLocks noGrp="1"/>
-          </p:cNvSpPr>
-          <p:nvPr>
-            <p:ph type="sldNum" sz="quarter" idx="12"/>
-          </p:nvPr>
-        </p:nvSpPr>
-        <p:spPr/>
-        <p:txBody>
-          <a:bodyPr/>
-          <a:lstStyle/>
-          <a:p>
-            <a:fld id="{62008791-523A-4B28-9563-D3C392EF9C46}" type="slidenum">
-              <a:rPr lang="en-US" altLang="pl-PL" smtClean="0"/>
-              <a:pPr/>
-              <a:t>10</a:t>
-            </a:fld>
-            <a:endParaRPr lang="en-US" altLang="pl-PL"/>
-          </a:p>
-        </p:txBody>
-      </p:sp>
-      <p:graphicFrame>
-        <p:nvGraphicFramePr>
-          <p:cNvPr id="8" name="Tabela 1"/>
-          <p:cNvGraphicFramePr>
-            <a:graphicFrameLocks noGrp="1"/>
-          </p:cNvGraphicFramePr>
-          <p:nvPr>
-            <p:extLst>
-              <p:ext uri="{D42A27DB-BD31-4B8C-83A1-F6EECF244321}">
-                <p14:modId xmlns:p14="http://schemas.microsoft.com/office/powerpoint/2010/main" val="2023027111"/>
-              </p:ext>
-            </p:extLst>
-          </p:nvPr>
-        </p:nvGraphicFramePr>
-        <p:xfrm>
-          <a:off x="1859915" y="386080"/>
-          <a:ext cx="5565013" cy="6135996"/>
-        </p:xfrm>
-        <a:graphic>
-          <a:graphicData uri="http://schemas.openxmlformats.org/drawingml/2006/table">
-            <a:tbl>
-              <a:tblPr firstRow="1" bandRow="1">
-                <a:tableStyleId>{5C22544A-7EE6-4342-B048-85BDC9FD1C3A}</a:tableStyleId>
-              </a:tblPr>
-              <a:tblGrid>
-                <a:gridCol w="3125279"/>
-                <a:gridCol w="2439734"/>
-              </a:tblGrid>
-              <a:tr h="186117">
-                <a:tc>
-                  <a:txBody>
-                    <a:bodyPr/>
-                    <a:lstStyle/>
-                    <a:p>
-                      <a:endParaRPr lang="pl-PL" sz="1100" dirty="0"/>
-                    </a:p>
-                  </a:txBody>
-                  <a:tcPr/>
-                </a:tc>
-                <a:tc>
-                  <a:txBody>
-                    <a:bodyPr/>
-                    <a:lstStyle/>
-                    <a:p>
-                      <a:endParaRPr lang="pl-PL" sz="1100" dirty="0"/>
-                    </a:p>
-                  </a:txBody>
-                  <a:tcPr/>
-                </a:tc>
-              </a:tr>
-              <a:tr h="186117">
-                <a:tc>
-                  <a:txBody>
-                    <a:bodyPr/>
-                    <a:lstStyle/>
-                    <a:p>
-                      <a:r>
-                        <a:rPr lang="pl-PL" sz="1100" dirty="0" smtClean="0"/>
-                        <a:t>Ćwiczenie 0</a:t>
-                      </a:r>
-                      <a:r>
-                        <a:rPr lang="pl-PL" sz="1100" baseline="0" dirty="0" smtClean="0"/>
-                        <a:t> – </a:t>
-                      </a:r>
-                      <a:r>
-                        <a:rPr lang="pl-PL" sz="1100" dirty="0" smtClean="0"/>
-                        <a:t>Wstęp</a:t>
-                      </a:r>
-                      <a:endParaRPr lang="pl-PL" sz="1100" dirty="0"/>
-                    </a:p>
-                  </a:txBody>
-                  <a:tcPr/>
-                </a:tc>
-                <a:tc>
-                  <a:txBody>
-                    <a:bodyPr/>
-                    <a:lstStyle/>
-                    <a:p>
-                      <a:r>
-                        <a:rPr lang="pl-PL" sz="1100" dirty="0" smtClean="0"/>
-                        <a:t>22.02.2017</a:t>
-                      </a:r>
-                      <a:endParaRPr lang="pl-PL" sz="1100" dirty="0"/>
-                    </a:p>
-                  </a:txBody>
-                  <a:tcPr/>
-                </a:tc>
-              </a:tr>
-              <a:tr h="0">
-                <a:tc>
-                  <a:txBody>
-                    <a:bodyPr/>
-                    <a:lstStyle/>
-                    <a:p>
-                      <a:r>
-                        <a:rPr lang="pl-PL" sz="1100" dirty="0" smtClean="0"/>
-                        <a:t>Ćwiczenie 1</a:t>
-                      </a:r>
-                      <a:r>
-                        <a:rPr lang="pl-PL" sz="1100" baseline="0" dirty="0" smtClean="0"/>
-                        <a:t> – </a:t>
-                      </a:r>
-                      <a:r>
-                        <a:rPr lang="pl-PL" sz="1100" dirty="0" smtClean="0"/>
-                        <a:t>Narzędzia</a:t>
-                      </a:r>
-                      <a:endParaRPr lang="pl-PL" sz="1100" dirty="0"/>
-                    </a:p>
-                  </a:txBody>
-                  <a:tcPr/>
-                </a:tc>
-                <a:tc>
-                  <a:txBody>
-                    <a:bodyPr/>
-                    <a:lstStyle/>
-                    <a:p>
-                      <a:r>
-                        <a:rPr lang="pl-PL" sz="1100" dirty="0" smtClean="0"/>
-                        <a:t>1.03.2017</a:t>
-                      </a:r>
-                      <a:endParaRPr lang="pl-PL" sz="1100" dirty="0"/>
-                    </a:p>
-                  </a:txBody>
-                  <a:tcPr/>
-                </a:tc>
-              </a:tr>
-              <a:tr h="379569">
-                <a:tc>
-                  <a:txBody>
-                    <a:bodyPr/>
-                    <a:lstStyle/>
-                    <a:p>
-                      <a:r>
-                        <a:rPr lang="pl-PL" sz="1100" dirty="0" smtClean="0"/>
-                        <a:t>Ćwiczenie 1</a:t>
-                      </a:r>
-                      <a:r>
-                        <a:rPr lang="pl-PL" sz="1100" baseline="0" dirty="0" smtClean="0"/>
-                        <a:t> – </a:t>
-                      </a:r>
-                      <a:r>
-                        <a:rPr lang="pl-PL" sz="1100" dirty="0" smtClean="0"/>
-                        <a:t>Narzędzia</a:t>
-                      </a:r>
-                      <a:endParaRPr lang="pl-PL" sz="1100" dirty="0"/>
-                    </a:p>
-                  </a:txBody>
-                  <a:tcPr/>
-                </a:tc>
-                <a:tc>
-                  <a:txBody>
-                    <a:bodyPr/>
-                    <a:lstStyle/>
-                    <a:p>
-                      <a:r>
-                        <a:rPr lang="pl-PL" sz="1100" dirty="0" smtClean="0"/>
-                        <a:t>8.03.2017</a:t>
-                      </a:r>
-                      <a:endParaRPr lang="pl-PL" sz="1100" dirty="0"/>
-                    </a:p>
-                  </a:txBody>
-                  <a:tcPr/>
-                </a:tc>
-              </a:tr>
-              <a:tr h="379569">
-                <a:tc>
-                  <a:txBody>
-                    <a:bodyPr/>
-                    <a:lstStyle/>
-                    <a:p>
-                      <a:r>
-                        <a:rPr lang="pl-PL" sz="1100" dirty="0" smtClean="0"/>
-                        <a:t>Ćwiczenie 2</a:t>
-                      </a:r>
-                      <a:r>
-                        <a:rPr lang="pl-PL" sz="1100" baseline="0" dirty="0" smtClean="0"/>
-                        <a:t> - </a:t>
-                      </a:r>
-                      <a:r>
-                        <a:rPr lang="pl-PL" sz="1100" dirty="0" smtClean="0"/>
-                        <a:t>Progr. Współbieżne</a:t>
-                      </a:r>
-                      <a:endParaRPr lang="pl-PL" sz="1100" dirty="0"/>
-                    </a:p>
-                  </a:txBody>
-                  <a:tcPr/>
-                </a:tc>
-                <a:tc>
-                  <a:txBody>
-                    <a:bodyPr/>
-                    <a:lstStyle/>
-                    <a:p>
-                      <a:pPr marL="0" marR="0" lvl="0" indent="0" algn="l" defTabSz="914400" rtl="0" eaLnBrk="1" fontAlgn="auto" latinLnBrk="0" hangingPunct="1">
-                        <a:lnSpc>
-                          <a:spcPct val="100000"/>
-                        </a:lnSpc>
-                        <a:spcBef>
-                          <a:spcPts val="0"/>
-                        </a:spcBef>
-                        <a:spcAft>
-                          <a:spcPts val="0"/>
-                        </a:spcAft>
-                        <a:buClrTx/>
-                        <a:buSzTx/>
-                        <a:buFontTx/>
-                        <a:buNone/>
-                        <a:tabLst/>
-                        <a:defRPr/>
-                      </a:pPr>
-                      <a:r>
-                        <a:rPr lang="pl-PL" sz="1100" dirty="0" smtClean="0"/>
-                        <a:t>15.03.2017</a:t>
-                      </a:r>
-                      <a:endParaRPr lang="pl-PL" sz="1100" dirty="0" smtClean="0"/>
-                    </a:p>
-                  </a:txBody>
-                  <a:tcPr/>
-                </a:tc>
-              </a:tr>
-              <a:tr h="379569">
-                <a:tc>
-                  <a:txBody>
-                    <a:bodyPr/>
-                    <a:lstStyle/>
-                    <a:p>
-                      <a:r>
-                        <a:rPr lang="pl-PL" sz="1100" dirty="0" smtClean="0"/>
-                        <a:t>Ćwiczenie 2</a:t>
-                      </a:r>
-                      <a:r>
-                        <a:rPr lang="pl-PL" sz="1100" baseline="0" dirty="0" smtClean="0"/>
-                        <a:t> - </a:t>
-                      </a:r>
-                      <a:r>
-                        <a:rPr lang="pl-PL" sz="1100" dirty="0" smtClean="0"/>
-                        <a:t>Progr. Współbieżne</a:t>
-                      </a:r>
-                      <a:endParaRPr lang="pl-PL" sz="1100" dirty="0"/>
-                    </a:p>
-                  </a:txBody>
-                  <a:tcPr/>
-                </a:tc>
-                <a:tc>
-                  <a:txBody>
-                    <a:bodyPr/>
-                    <a:lstStyle/>
-                    <a:p>
-                      <a:r>
-                        <a:rPr lang="pl-PL" sz="1100" dirty="0" smtClean="0"/>
-                        <a:t>22.03.2017</a:t>
-                      </a:r>
-                      <a:endParaRPr lang="pl-PL" sz="1100" dirty="0"/>
-                    </a:p>
-                  </a:txBody>
-                  <a:tcPr/>
-                </a:tc>
-              </a:tr>
-              <a:tr h="379569">
-                <a:tc>
-                  <a:txBody>
-                    <a:bodyPr/>
-                    <a:lstStyle/>
-                    <a:p>
-                      <a:r>
-                        <a:rPr lang="pl-PL" sz="1100" dirty="0" smtClean="0"/>
-                        <a:t>Ćwiczenie 2</a:t>
-                      </a:r>
-                      <a:r>
-                        <a:rPr lang="pl-PL" sz="1100" baseline="0" dirty="0" smtClean="0"/>
-                        <a:t> - </a:t>
-                      </a:r>
-                      <a:r>
-                        <a:rPr lang="pl-PL" sz="1100" dirty="0" smtClean="0"/>
-                        <a:t>Progr. Współbieżne</a:t>
-                      </a:r>
-                      <a:endParaRPr lang="pl-PL" sz="1100" dirty="0"/>
-                    </a:p>
-                  </a:txBody>
-                  <a:tcPr/>
-                </a:tc>
-                <a:tc>
-                  <a:txBody>
-                    <a:bodyPr/>
-                    <a:lstStyle/>
-                    <a:p>
-                      <a:pPr marL="0" marR="0" lvl="0" indent="0" algn="l" defTabSz="914400" rtl="0" eaLnBrk="1" fontAlgn="auto" latinLnBrk="0" hangingPunct="1">
-                        <a:lnSpc>
-                          <a:spcPct val="100000"/>
-                        </a:lnSpc>
-                        <a:spcBef>
-                          <a:spcPts val="0"/>
-                        </a:spcBef>
-                        <a:spcAft>
-                          <a:spcPts val="0"/>
-                        </a:spcAft>
-                        <a:buClrTx/>
-                        <a:buSzTx/>
-                        <a:buFontTx/>
-                        <a:buNone/>
-                        <a:tabLst/>
-                        <a:defRPr/>
-                      </a:pPr>
-                      <a:r>
-                        <a:rPr lang="pl-PL" sz="1100" dirty="0" smtClean="0"/>
-                        <a:t>29.03.2017</a:t>
-                      </a:r>
-                      <a:endParaRPr lang="pl-PL" sz="1100" dirty="0" smtClean="0"/>
-                    </a:p>
-                  </a:txBody>
-                  <a:tcPr/>
-                </a:tc>
-              </a:tr>
-              <a:tr h="379569">
-                <a:tc>
-                  <a:txBody>
-                    <a:bodyPr/>
-                    <a:lstStyle/>
-                    <a:p>
-                      <a:pPr marL="0" marR="0" lvl="0" indent="0" algn="l" defTabSz="914400" rtl="0" eaLnBrk="1" fontAlgn="auto" latinLnBrk="0" hangingPunct="1">
-                        <a:lnSpc>
-                          <a:spcPct val="100000"/>
-                        </a:lnSpc>
-                        <a:spcBef>
-                          <a:spcPts val="0"/>
-                        </a:spcBef>
-                        <a:spcAft>
-                          <a:spcPts val="0"/>
-                        </a:spcAft>
-                        <a:buClrTx/>
-                        <a:buSzTx/>
-                        <a:buFontTx/>
-                        <a:buNone/>
-                        <a:tabLst/>
-                        <a:defRPr/>
-                      </a:pPr>
-                      <a:r>
-                        <a:rPr lang="pl-PL" sz="1100" dirty="0" smtClean="0"/>
-                        <a:t>Ćwiczenie 3</a:t>
-                      </a:r>
-                      <a:r>
-                        <a:rPr lang="pl-PL" sz="1100" baseline="0" dirty="0" smtClean="0"/>
-                        <a:t> - </a:t>
-                      </a:r>
-                      <a:r>
-                        <a:rPr lang="pl-PL" sz="1100" dirty="0" smtClean="0"/>
-                        <a:t>Komunikacja Synchr.</a:t>
-                      </a:r>
-                    </a:p>
-                    <a:p>
-                      <a:endParaRPr lang="pl-PL" sz="1100" dirty="0" smtClean="0"/>
-                    </a:p>
-                  </a:txBody>
-                  <a:tcPr/>
-                </a:tc>
-                <a:tc>
-                  <a:txBody>
-                    <a:bodyPr/>
-                    <a:lstStyle/>
-                    <a:p>
-                      <a:r>
-                        <a:rPr lang="pl-PL" sz="1100" dirty="0" smtClean="0"/>
-                        <a:t>5.04.2017</a:t>
-                      </a:r>
-                      <a:endParaRPr lang="pl-PL" sz="1100" dirty="0"/>
-                    </a:p>
-                  </a:txBody>
-                  <a:tcPr/>
-                </a:tc>
-              </a:tr>
-              <a:tr h="379569">
-                <a:tc>
-                  <a:txBody>
-                    <a:bodyPr/>
-                    <a:lstStyle/>
-                    <a:p>
-                      <a:pPr marL="0" marR="0" lvl="0" indent="0" algn="l" defTabSz="914400" rtl="0" eaLnBrk="1" fontAlgn="auto" latinLnBrk="0" hangingPunct="1">
-                        <a:lnSpc>
-                          <a:spcPct val="100000"/>
-                        </a:lnSpc>
-                        <a:spcBef>
-                          <a:spcPts val="0"/>
-                        </a:spcBef>
-                        <a:spcAft>
-                          <a:spcPts val="0"/>
-                        </a:spcAft>
-                        <a:buClrTx/>
-                        <a:buSzTx/>
-                        <a:buFontTx/>
-                        <a:buNone/>
-                        <a:tabLst/>
-                        <a:defRPr/>
-                      </a:pPr>
-                      <a:r>
-                        <a:rPr lang="pl-PL" sz="1100" dirty="0" smtClean="0"/>
-                        <a:t>Ćwiczenie 3</a:t>
-                      </a:r>
-                      <a:r>
-                        <a:rPr lang="pl-PL" sz="1100" baseline="0" dirty="0" smtClean="0"/>
-                        <a:t> - </a:t>
-                      </a:r>
-                      <a:r>
-                        <a:rPr lang="pl-PL" sz="1100" dirty="0" smtClean="0"/>
-                        <a:t>Komunikacja Synchr.</a:t>
-                      </a:r>
-                    </a:p>
-                    <a:p>
-                      <a:endParaRPr lang="pl-PL" sz="1100" dirty="0" smtClean="0"/>
-                    </a:p>
-                  </a:txBody>
-                  <a:tcPr/>
-                </a:tc>
-                <a:tc>
-                  <a:txBody>
-                    <a:bodyPr/>
-                    <a:lstStyle/>
-                    <a:p>
-                      <a:r>
-                        <a:rPr lang="pl-PL" sz="1100" dirty="0" smtClean="0"/>
-                        <a:t>12.04.2017</a:t>
-                      </a:r>
-                      <a:endParaRPr lang="pl-PL" sz="1100" dirty="0"/>
-                    </a:p>
-                  </a:txBody>
-                  <a:tcPr/>
-                </a:tc>
-              </a:tr>
-              <a:tr h="379569">
-                <a:tc>
-                  <a:txBody>
-                    <a:bodyPr/>
-                    <a:lstStyle/>
-                    <a:p>
-                      <a:pPr marL="0" marR="0" lvl="0" indent="0" algn="l" defTabSz="914400" rtl="0" eaLnBrk="1" fontAlgn="auto" latinLnBrk="0" hangingPunct="1">
-                        <a:lnSpc>
-                          <a:spcPct val="100000"/>
-                        </a:lnSpc>
-                        <a:spcBef>
-                          <a:spcPts val="0"/>
-                        </a:spcBef>
-                        <a:spcAft>
-                          <a:spcPts val="0"/>
-                        </a:spcAft>
-                        <a:buClrTx/>
-                        <a:buSzTx/>
-                        <a:buFontTx/>
-                        <a:buNone/>
-                        <a:tabLst/>
-                        <a:defRPr/>
-                      </a:pPr>
-                      <a:r>
-                        <a:rPr lang="pl-PL" sz="1100" dirty="0" smtClean="0"/>
-                        <a:t>Ćwiczenie 3</a:t>
-                      </a:r>
-                      <a:r>
-                        <a:rPr lang="pl-PL" sz="1100" baseline="0" dirty="0" smtClean="0"/>
-                        <a:t> - </a:t>
-                      </a:r>
-                      <a:r>
-                        <a:rPr lang="pl-PL" sz="1100" dirty="0" smtClean="0"/>
-                        <a:t>Komunikacja Synchr.</a:t>
-                      </a:r>
-                    </a:p>
-                    <a:p>
-                      <a:endParaRPr lang="pl-PL" sz="1100" dirty="0" smtClean="0"/>
-                    </a:p>
-                  </a:txBody>
-                  <a:tcPr/>
-                </a:tc>
-                <a:tc>
-                  <a:txBody>
-                    <a:bodyPr/>
-                    <a:lstStyle/>
-                    <a:p>
-                      <a:r>
-                        <a:rPr lang="pl-PL" sz="1100" dirty="0" smtClean="0"/>
-                        <a:t>19.04.2017</a:t>
-                      </a:r>
-                      <a:endParaRPr lang="pl-PL" sz="1100" dirty="0"/>
-                    </a:p>
-                  </a:txBody>
-                  <a:tcPr/>
-                </a:tc>
-              </a:tr>
-              <a:tr h="379569">
-                <a:tc>
-                  <a:txBody>
-                    <a:bodyPr/>
-                    <a:lstStyle/>
-                    <a:p>
-                      <a:pPr marL="0" marR="0" lvl="0" indent="0" algn="l" defTabSz="914400" rtl="0" eaLnBrk="1" fontAlgn="auto" latinLnBrk="0" hangingPunct="1">
-                        <a:lnSpc>
-                          <a:spcPct val="100000"/>
-                        </a:lnSpc>
-                        <a:spcBef>
-                          <a:spcPts val="0"/>
-                        </a:spcBef>
-                        <a:spcAft>
-                          <a:spcPts val="0"/>
-                        </a:spcAft>
-                        <a:buClrTx/>
-                        <a:buSzTx/>
-                        <a:buFontTx/>
-                        <a:buNone/>
-                        <a:tabLst/>
-                        <a:defRPr/>
-                      </a:pPr>
-                      <a:r>
-                        <a:rPr lang="pl-PL" sz="1100" dirty="0" smtClean="0"/>
-                        <a:t>Ćwiczenie 4</a:t>
-                      </a:r>
-                      <a:r>
-                        <a:rPr lang="pl-PL" sz="1100" baseline="0" dirty="0" smtClean="0"/>
-                        <a:t> - </a:t>
-                      </a:r>
-                      <a:r>
-                        <a:rPr lang="pl-PL" sz="1100" dirty="0" smtClean="0"/>
-                        <a:t>Komunikacja Asynchr.</a:t>
-                      </a:r>
-                    </a:p>
-                    <a:p>
-                      <a:endParaRPr lang="pl-PL" sz="1100" dirty="0" smtClean="0"/>
-                    </a:p>
-                  </a:txBody>
-                  <a:tcPr/>
-                </a:tc>
-                <a:tc>
-                  <a:txBody>
-                    <a:bodyPr/>
-                    <a:lstStyle/>
-                    <a:p>
-                      <a:r>
-                        <a:rPr lang="pl-PL" sz="1100" dirty="0" smtClean="0"/>
-                        <a:t>26.04.2017</a:t>
-                      </a:r>
-                      <a:endParaRPr lang="pl-PL" sz="1100" dirty="0"/>
-                    </a:p>
-                  </a:txBody>
-                  <a:tcPr/>
-                </a:tc>
-              </a:tr>
-              <a:tr h="379569">
-                <a:tc>
-                  <a:txBody>
-                    <a:bodyPr/>
-                    <a:lstStyle/>
-                    <a:p>
-                      <a:pPr marL="0" marR="0" lvl="0" indent="0" algn="l" defTabSz="914400" rtl="0" eaLnBrk="1" fontAlgn="auto" latinLnBrk="0" hangingPunct="1">
-                        <a:lnSpc>
-                          <a:spcPct val="100000"/>
-                        </a:lnSpc>
-                        <a:spcBef>
-                          <a:spcPts val="0"/>
-                        </a:spcBef>
-                        <a:spcAft>
-                          <a:spcPts val="0"/>
-                        </a:spcAft>
-                        <a:buClrTx/>
-                        <a:buSzTx/>
-                        <a:buFontTx/>
-                        <a:buNone/>
-                        <a:tabLst/>
-                        <a:defRPr/>
-                      </a:pPr>
-                      <a:r>
-                        <a:rPr lang="pl-PL" sz="1100" dirty="0" smtClean="0"/>
-                        <a:t>Ćwiczenie 4</a:t>
-                      </a:r>
-                      <a:r>
-                        <a:rPr lang="pl-PL" sz="1100" baseline="0" dirty="0" smtClean="0"/>
-                        <a:t> - </a:t>
-                      </a:r>
-                      <a:r>
-                        <a:rPr lang="pl-PL" sz="1100" dirty="0" smtClean="0"/>
-                        <a:t>Komunikacja Asynchr.</a:t>
-                      </a:r>
-                    </a:p>
-                    <a:p>
-                      <a:endParaRPr lang="pl-PL" sz="1100" dirty="0" smtClean="0"/>
-                    </a:p>
-                  </a:txBody>
-                  <a:tcPr/>
-                </a:tc>
-                <a:tc>
-                  <a:txBody>
-                    <a:bodyPr/>
-                    <a:lstStyle/>
-                    <a:p>
-                      <a:r>
-                        <a:rPr lang="pl-PL" sz="1100" dirty="0" smtClean="0"/>
-                        <a:t>10.05.2017</a:t>
-                      </a:r>
-                      <a:endParaRPr lang="pl-PL" sz="1100" dirty="0"/>
-                    </a:p>
-                  </a:txBody>
-                  <a:tcPr/>
-                </a:tc>
-              </a:tr>
-              <a:tr h="379569">
-                <a:tc>
-                  <a:txBody>
-                    <a:bodyPr/>
-                    <a:lstStyle/>
-                    <a:p>
-                      <a:pPr marL="0" marR="0" lvl="0" indent="0" algn="l" defTabSz="914400" rtl="0" eaLnBrk="1" fontAlgn="auto" latinLnBrk="0" hangingPunct="1">
-                        <a:lnSpc>
-                          <a:spcPct val="100000"/>
-                        </a:lnSpc>
-                        <a:spcBef>
-                          <a:spcPts val="0"/>
-                        </a:spcBef>
-                        <a:spcAft>
-                          <a:spcPts val="0"/>
-                        </a:spcAft>
-                        <a:buClrTx/>
-                        <a:buSzTx/>
-                        <a:buFontTx/>
-                        <a:buNone/>
-                        <a:tabLst/>
-                        <a:defRPr/>
-                      </a:pPr>
-                      <a:r>
-                        <a:rPr lang="pl-PL" sz="1100" dirty="0" smtClean="0"/>
-                        <a:t>Ćwiczenie 4</a:t>
-                      </a:r>
-                      <a:r>
-                        <a:rPr lang="pl-PL" sz="1100" baseline="0" dirty="0" smtClean="0"/>
-                        <a:t> - </a:t>
-                      </a:r>
-                      <a:r>
-                        <a:rPr lang="pl-PL" sz="1100" dirty="0" smtClean="0"/>
-                        <a:t>Komunikacja Asynchr.</a:t>
-                      </a:r>
-                    </a:p>
-                    <a:p>
-                      <a:endParaRPr lang="pl-PL" sz="1100" dirty="0" smtClean="0"/>
-                    </a:p>
-                  </a:txBody>
-                  <a:tcPr/>
-                </a:tc>
-                <a:tc>
-                  <a:txBody>
-                    <a:bodyPr/>
-                    <a:lstStyle/>
-                    <a:p>
-                      <a:r>
-                        <a:rPr lang="pl-PL" sz="1100" dirty="0" smtClean="0"/>
-                        <a:t>17.05.2017</a:t>
-                      </a:r>
-                      <a:endParaRPr lang="pl-PL" sz="1100" dirty="0"/>
-                    </a:p>
-                  </a:txBody>
-                  <a:tcPr/>
-                </a:tc>
-              </a:tr>
-              <a:tr h="379569">
-                <a:tc>
-                  <a:txBody>
-                    <a:bodyPr/>
-                    <a:lstStyle/>
-                    <a:p>
-                      <a:pPr marL="0" marR="0" lvl="0" indent="0" algn="l" defTabSz="914400" rtl="0" eaLnBrk="1" fontAlgn="auto" latinLnBrk="0" hangingPunct="1">
-                        <a:lnSpc>
-                          <a:spcPct val="100000"/>
-                        </a:lnSpc>
-                        <a:spcBef>
-                          <a:spcPts val="0"/>
-                        </a:spcBef>
-                        <a:spcAft>
-                          <a:spcPts val="0"/>
-                        </a:spcAft>
-                        <a:buClrTx/>
-                        <a:buSzTx/>
-                        <a:buFontTx/>
-                        <a:buNone/>
-                        <a:tabLst/>
-                        <a:defRPr/>
-                      </a:pPr>
-                      <a:r>
-                        <a:rPr lang="pl-PL" sz="1100" dirty="0" smtClean="0"/>
-                        <a:t>Ćwiczenie</a:t>
-                      </a:r>
-                      <a:r>
-                        <a:rPr lang="pl-PL" sz="1100" baseline="0" dirty="0" smtClean="0"/>
-                        <a:t> 5 - Baza danych</a:t>
-                      </a:r>
-                      <a:endParaRPr lang="pl-PL" sz="1100" dirty="0" smtClean="0"/>
-                    </a:p>
-                    <a:p>
-                      <a:endParaRPr lang="pl-PL" sz="1100" dirty="0" smtClean="0"/>
-                    </a:p>
-                  </a:txBody>
-                  <a:tcPr/>
-                </a:tc>
-                <a:tc>
-                  <a:txBody>
-                    <a:bodyPr/>
-                    <a:lstStyle/>
-                    <a:p>
-                      <a:r>
-                        <a:rPr lang="pl-PL" sz="1100" dirty="0" smtClean="0"/>
-                        <a:t>24.05.2017</a:t>
-                      </a:r>
-                      <a:endParaRPr lang="pl-PL" sz="1100" dirty="0"/>
-                    </a:p>
-                  </a:txBody>
-                  <a:tcPr/>
-                </a:tc>
-              </a:tr>
-              <a:tr h="379569">
-                <a:tc>
-                  <a:txBody>
-                    <a:bodyPr/>
-                    <a:lstStyle/>
-                    <a:p>
-                      <a:pPr marL="0" marR="0" lvl="0" indent="0" algn="l" defTabSz="914400" rtl="0" eaLnBrk="1" fontAlgn="auto" latinLnBrk="0" hangingPunct="1">
-                        <a:lnSpc>
-                          <a:spcPct val="100000"/>
-                        </a:lnSpc>
-                        <a:spcBef>
-                          <a:spcPts val="0"/>
-                        </a:spcBef>
-                        <a:spcAft>
-                          <a:spcPts val="0"/>
-                        </a:spcAft>
-                        <a:buClrTx/>
-                        <a:buSzTx/>
-                        <a:buFontTx/>
-                        <a:buNone/>
-                        <a:tabLst/>
-                        <a:defRPr/>
-                      </a:pPr>
-                      <a:r>
-                        <a:rPr lang="pl-PL" sz="1100" dirty="0" smtClean="0"/>
-                        <a:t>Ćwiczenie</a:t>
-                      </a:r>
-                      <a:r>
-                        <a:rPr lang="pl-PL" sz="1100" baseline="0" dirty="0" smtClean="0"/>
-                        <a:t> 5 - Baza danych</a:t>
-                      </a:r>
-                      <a:endParaRPr lang="pl-PL" sz="1100" dirty="0" smtClean="0"/>
-                    </a:p>
-                    <a:p>
-                      <a:endParaRPr lang="pl-PL" sz="1100" dirty="0" smtClean="0"/>
-                    </a:p>
-                  </a:txBody>
-                  <a:tcPr/>
-                </a:tc>
-                <a:tc>
-                  <a:txBody>
-                    <a:bodyPr/>
-                    <a:lstStyle/>
-                    <a:p>
-                      <a:r>
-                        <a:rPr lang="pl-PL" sz="1100" dirty="0" smtClean="0"/>
-                        <a:t>31.05.2017</a:t>
-                      </a:r>
-                      <a:endParaRPr lang="pl-PL" sz="1100" dirty="0"/>
-                    </a:p>
-                  </a:txBody>
-                  <a:tcPr/>
-                </a:tc>
-              </a:tr>
-              <a:tr h="379569">
-                <a:tc>
-                  <a:txBody>
-                    <a:bodyPr/>
-                    <a:lstStyle/>
-                    <a:p>
-                      <a:pPr marL="0" marR="0" lvl="0" indent="0" algn="l" defTabSz="914400" rtl="0" eaLnBrk="1" fontAlgn="auto" latinLnBrk="0" hangingPunct="1">
-                        <a:lnSpc>
-                          <a:spcPct val="100000"/>
-                        </a:lnSpc>
-                        <a:spcBef>
-                          <a:spcPts val="0"/>
-                        </a:spcBef>
-                        <a:spcAft>
-                          <a:spcPts val="0"/>
-                        </a:spcAft>
-                        <a:buClrTx/>
-                        <a:buSzTx/>
-                        <a:buFontTx/>
-                        <a:buNone/>
-                        <a:tabLst/>
-                        <a:defRPr/>
-                      </a:pPr>
-                      <a:r>
-                        <a:rPr lang="pl-PL" sz="1100" dirty="0" smtClean="0"/>
-                        <a:t>Ćwiczenie</a:t>
-                      </a:r>
-                      <a:r>
-                        <a:rPr lang="pl-PL" sz="1100" baseline="0" dirty="0" smtClean="0"/>
-                        <a:t> 5 - Baza danych</a:t>
-                      </a:r>
-                      <a:endParaRPr lang="pl-PL" sz="1100" dirty="0" smtClean="0"/>
-                    </a:p>
-                    <a:p>
-                      <a:endParaRPr lang="pl-PL" sz="1100" dirty="0" smtClean="0"/>
-                    </a:p>
-                  </a:txBody>
-                  <a:tcPr/>
-                </a:tc>
-                <a:tc>
-                  <a:txBody>
-                    <a:bodyPr/>
-                    <a:lstStyle/>
-                    <a:p>
-                      <a:r>
-                        <a:rPr lang="pl-PL" sz="1100" dirty="0" smtClean="0"/>
-                        <a:t>7.06.2017</a:t>
-                      </a:r>
-                      <a:endParaRPr lang="pl-PL" sz="1100" dirty="0"/>
-                    </a:p>
-                  </a:txBody>
-                  <a:tcPr/>
-                </a:tc>
-              </a:tr>
-            </a:tbl>
-          </a:graphicData>
-        </a:graphic>
-      </p:graphicFrame>
-    </p:spTree>
-    <p:extLst>
-      <p:ext uri="{BB962C8B-B14F-4D97-AF65-F5344CB8AC3E}">
-        <p14:creationId xmlns:p14="http://schemas.microsoft.com/office/powerpoint/2010/main" val="1589507490"/>
-      </p:ext>
-    </p:extLst>
-  </p:cSld>
-  <p:clrMapOvr>
-    <a:masterClrMapping/>
-  </p:clrMapOvr>
-  <p:transition spd="slow">
-    <p:push dir="u"/>
-  </p:transition>
-</p:sld>
-</file>
-
-<file path=ppt/slides/slide11.xml><?xml version="1.0" encoding="utf-8"?>
-<p:sld xmlns:a="http://schemas.openxmlformats.org/drawingml/2006/main" xmlns:r="http://schemas.openxmlformats.org/officeDocument/2006/relationships" xmlns:p="http://schemas.openxmlformats.org/presentationml/2006/main">
-  <p:cSld>
-    <p:spTree>
-      <p:nvGrpSpPr>
-        <p:cNvPr id="1" name=""/>
-        <p:cNvGrpSpPr/>
-        <p:nvPr/>
-      </p:nvGrpSpPr>
-      <p:grpSpPr>
-        <a:xfrm>
-          <a:off x="0" y="0"/>
-          <a:ext cx="0" cy="0"/>
-          <a:chOff x="0" y="0"/>
-          <a:chExt cx="0" cy="0"/>
-        </a:xfrm>
-      </p:grpSpPr>
-      <p:sp>
-        <p:nvSpPr>
           <p:cNvPr id="3" name="Titel 2"/>
           <p:cNvSpPr>
             <a:spLocks noGrp="1"/>
@@ -16435,7 +17814,7 @@
                 </a:solidFill>
               </a:rPr>
               <a:pPr/>
-              <a:t>11</a:t>
+              <a:t>10</a:t>
             </a:fld>
             <a:endParaRPr lang="en-US" altLang="pl-PL" sz="900">
               <a:solidFill>
@@ -16877,7 +18256,7 @@
 </p:sld>
 </file>
 
-<file path=ppt/slides/slide12.xml><?xml version="1.0" encoding="utf-8"?>
+<file path=ppt/slides/slide11.xml><?xml version="1.0" encoding="utf-8"?>
 <p:sld xmlns:a="http://schemas.openxmlformats.org/drawingml/2006/main" xmlns:r="http://schemas.openxmlformats.org/officeDocument/2006/relationships" xmlns:p="http://schemas.openxmlformats.org/presentationml/2006/main">
   <p:cSld>
     <p:spTree>
@@ -16967,6 +18346,28 @@
               <a:rPr lang="pl-PL" sz="1800" dirty="0" smtClean="0"/>
               <a:t>Akceptowana jest dowolność interpretacji wymagań gdy są one nieprecyzyjne. </a:t>
             </a:r>
+            <a:endParaRPr lang="pl-PL" sz="1800" dirty="0" smtClean="0"/>
+          </a:p>
+          <a:p>
+            <a:pPr lvl="1">
+              <a:buFont typeface="Arial" panose="020B0604020202020204" pitchFamily="34" charset="0"/>
+              <a:buChar char="•"/>
+            </a:pPr>
+            <a:r>
+              <a:rPr lang="pl-PL" sz="1800" dirty="0" smtClean="0"/>
+              <a:t>Sprawozdanie z zadania.</a:t>
+            </a:r>
+          </a:p>
+          <a:p>
+            <a:pPr lvl="1">
+              <a:buFont typeface="Arial" panose="020B0604020202020204" pitchFamily="34" charset="0"/>
+              <a:buChar char="•"/>
+            </a:pPr>
+            <a:r>
+              <a:rPr lang="pl-PL" sz="1800" smtClean="0"/>
+              <a:t>Jakość kodu ma wpływ na ocenę, w szczególności nazewnictwo metod, pól, zmiennych, odpowiedzialność klas, czytelność etc.</a:t>
+            </a:r>
+            <a:endParaRPr lang="pl-PL" sz="1800" dirty="0" smtClean="0"/>
           </a:p>
         </p:txBody>
       </p:sp>
@@ -17061,7 +18462,7 @@
             <a:fld id="{62008791-523A-4B28-9563-D3C392EF9C46}" type="slidenum">
               <a:rPr lang="en-US" altLang="pl-PL" smtClean="0"/>
               <a:pPr/>
-              <a:t>12</a:t>
+              <a:t>11</a:t>
             </a:fld>
             <a:endParaRPr lang="en-US" altLang="pl-PL"/>
           </a:p>
@@ -17083,7 +18484,7 @@
 </p:sld>
 </file>
 
-<file path=ppt/slides/slide13.xml><?xml version="1.0" encoding="utf-8"?>
+<file path=ppt/slides/slide12.xml><?xml version="1.0" encoding="utf-8"?>
 <p:sld xmlns:a="http://schemas.openxmlformats.org/drawingml/2006/main" xmlns:r="http://schemas.openxmlformats.org/officeDocument/2006/relationships" xmlns:p="http://schemas.openxmlformats.org/presentationml/2006/main">
   <p:cSld>
     <p:spTree>
@@ -17576,7 +18977,7 @@
                 </a:solidFill>
               </a:rPr>
               <a:pPr/>
-              <a:t>13</a:t>
+              <a:t>12</a:t>
             </a:fld>
             <a:endParaRPr lang="en-US" altLang="pl-PL" sz="900">
               <a:solidFill>
@@ -18235,7 +19636,7 @@
 </p:sld>
 </file>
 
-<file path=ppt/slides/slide14.xml><?xml version="1.0" encoding="utf-8"?>
+<file path=ppt/slides/slide13.xml><?xml version="1.0" encoding="utf-8"?>
 <p:sld xmlns:a="http://schemas.openxmlformats.org/drawingml/2006/main" xmlns:r="http://schemas.openxmlformats.org/officeDocument/2006/relationships" xmlns:p="http://schemas.openxmlformats.org/presentationml/2006/main">
   <p:cSld>
     <p:spTree>
@@ -18734,7 +20135,7 @@
                 </a:solidFill>
               </a:rPr>
               <a:pPr/>
-              <a:t>14</a:t>
+              <a:t>13</a:t>
             </a:fld>
             <a:endParaRPr lang="en-US" altLang="pl-PL" sz="900">
               <a:solidFill>
@@ -18999,7 +20400,7 @@
 </p:sld>
 </file>
 
-<file path=ppt/slides/slide15.xml><?xml version="1.0" encoding="utf-8"?>
+<file path=ppt/slides/slide14.xml><?xml version="1.0" encoding="utf-8"?>
 <p:sld xmlns:a="http://schemas.openxmlformats.org/drawingml/2006/main" xmlns:r="http://schemas.openxmlformats.org/officeDocument/2006/relationships" xmlns:p="http://schemas.openxmlformats.org/presentationml/2006/main">
   <p:cSld>
     <p:spTree>
@@ -26452,7 +27853,7 @@
           <p:nvPr>
             <p:extLst>
               <p:ext uri="{D42A27DB-BD31-4B8C-83A1-F6EECF244321}">
-                <p14:modId xmlns:p14="http://schemas.microsoft.com/office/powerpoint/2010/main" val="3524606262"/>
+                <p14:modId xmlns:p14="http://schemas.microsoft.com/office/powerpoint/2010/main" val="699722602"/>
               </p:ext>
             </p:extLst>
           </p:nvPr>
@@ -26882,7 +28283,7 @@
           <p:nvPr>
             <p:extLst>
               <p:ext uri="{D42A27DB-BD31-4B8C-83A1-F6EECF244321}">
-                <p14:modId xmlns:p14="http://schemas.microsoft.com/office/powerpoint/2010/main" val="3857556710"/>
+                <p14:modId xmlns:p14="http://schemas.microsoft.com/office/powerpoint/2010/main" val="1995451125"/>
               </p:ext>
             </p:extLst>
           </p:nvPr>
@@ -26973,7 +28374,15 @@
                     <a:p>
                       <a:r>
                         <a:rPr lang="pl-PL" sz="1400" dirty="0" smtClean="0"/>
-                        <a:t>60 – 70</a:t>
+                        <a:t>60 </a:t>
+                      </a:r>
+                      <a:r>
+                        <a:rPr lang="pl-PL" sz="1400" dirty="0" smtClean="0"/>
+                        <a:t>– </a:t>
+                      </a:r>
+                      <a:r>
+                        <a:rPr lang="pl-PL" sz="1400" dirty="0" smtClean="0"/>
+                        <a:t>75</a:t>
                       </a:r>
                       <a:endParaRPr lang="pl-PL" sz="1400" dirty="0"/>
                     </a:p>
@@ -27003,11 +28412,11 @@
                     <a:p>
                       <a:r>
                         <a:rPr lang="pl-PL" sz="1400" dirty="0" smtClean="0"/>
-                        <a:t>70</a:t>
+                        <a:t>75</a:t>
                       </a:r>
                       <a:r>
                         <a:rPr lang="pl-PL" sz="1400" baseline="0" dirty="0" smtClean="0"/>
-                        <a:t> – 80</a:t>
+                        <a:t>– 90</a:t>
                       </a:r>
                       <a:endParaRPr lang="pl-PL" sz="1400" dirty="0"/>
                     </a:p>
@@ -27037,7 +28446,15 @@
                     <a:p>
                       <a:r>
                         <a:rPr lang="pl-PL" sz="1400" dirty="0" smtClean="0"/>
-                        <a:t>80 - 100</a:t>
+                        <a:t>90 </a:t>
+                      </a:r>
+                      <a:r>
+                        <a:rPr lang="pl-PL" sz="1400" dirty="0" smtClean="0"/>
+                        <a:t>- </a:t>
+                      </a:r>
+                      <a:r>
+                        <a:rPr lang="pl-PL" sz="1400" dirty="0" smtClean="0"/>
+                        <a:t>100</a:t>
                       </a:r>
                       <a:endParaRPr lang="pl-PL" sz="1400" dirty="0"/>
                     </a:p>
@@ -28425,14 +29842,14 @@
 <file path=customXml/itemProps3.xml><?xml version="1.0" encoding="utf-8"?>
 <ds:datastoreItem xmlns:ds="http://schemas.openxmlformats.org/officeDocument/2006/customXml" ds:itemID="{5405BF3B-1233-4D26-8BBF-BED295340DF6}">
   <ds:schemaRefs>
+    <ds:schemaRef ds:uri="http://schemas.microsoft.com/office/infopath/2007/PartnerControls"/>
+    <ds:schemaRef ds:uri="http://purl.org/dc/elements/1.1/"/>
+    <ds:schemaRef ds:uri="http://schemas.microsoft.com/office/2006/documentManagement/types"/>
     <ds:schemaRef ds:uri="http://purl.org/dc/terms/"/>
     <ds:schemaRef ds:uri="http://schemas.openxmlformats.org/package/2006/metadata/core-properties"/>
-    <ds:schemaRef ds:uri="http://schemas.microsoft.com/office/2006/documentManagement/types"/>
-    <ds:schemaRef ds:uri="http://schemas.microsoft.com/office/infopath/2007/PartnerControls"/>
-    <ds:schemaRef ds:uri="http://purl.org/dc/elements/1.1/"/>
+    <ds:schemaRef ds:uri="http://purl.org/dc/dcmitype/"/>
     <ds:schemaRef ds:uri="http://schemas.microsoft.com/office/2006/metadata/properties"/>
     <ds:schemaRef ds:uri="http://www.w3.org/XML/1998/namespace"/>
-    <ds:schemaRef ds:uri="http://purl.org/dc/dcmitype/"/>
   </ds:schemaRefs>
 </ds:datastoreItem>
 </file>
</xml_diff>